<commit_message>
Updated cloud image to fit with current branding
</commit_message>
<xml_diff>
--- a/WebCampsKeynote.pptx
+++ b/WebCampsKeynote.pptx
@@ -25497,7 +25497,7 @@
           <a:graphicData uri="http://schemas.openxmlformats.org/presentationml/2006/ole">
             <mc:AlternateContent xmlns:mc="http://schemas.openxmlformats.org/markup-compatibility/2006">
               <mc:Choice xmlns:v="urn:schemas-microsoft-com:vml" Requires="v">
-                <p:oleObj spid="_x0000_s67592" name="think-cell Slide" r:id="rId5" imgW="270" imgH="270" progId="TCLayout.ActiveDocument.1">
+                <p:oleObj spid="_x0000_s67593" name="think-cell Slide" r:id="rId5" imgW="270" imgH="270" progId="TCLayout.ActiveDocument.1">
                   <p:embed/>
                 </p:oleObj>
               </mc:Choice>
@@ -27283,7 +27283,7 @@
           <a:graphicData uri="http://schemas.openxmlformats.org/presentationml/2006/ole">
             <mc:AlternateContent xmlns:mc="http://schemas.openxmlformats.org/markup-compatibility/2006">
               <mc:Choice xmlns:v="urn:schemas-microsoft-com:vml" Requires="v">
-                <p:oleObj spid="_x0000_s65560" name="think-cell Slide" r:id="rId5" imgW="270" imgH="270" progId="TCLayout.ActiveDocument.1">
+                <p:oleObj spid="_x0000_s65561" name="think-cell Slide" r:id="rId5" imgW="270" imgH="270" progId="TCLayout.ActiveDocument.1">
                   <p:embed/>
                 </p:oleObj>
               </mc:Choice>
@@ -29335,7 +29335,7 @@
           <a:graphicData uri="http://schemas.openxmlformats.org/presentationml/2006/ole">
             <mc:AlternateContent xmlns:mc="http://schemas.openxmlformats.org/markup-compatibility/2006">
               <mc:Choice xmlns:v="urn:schemas-microsoft-com:vml" Requires="v">
-                <p:oleObj spid="_x0000_s57422" name="think-cell Slide" r:id="rId6" imgW="270" imgH="270" progId="TCLayout.ActiveDocument.1">
+                <p:oleObj spid="_x0000_s57423" name="think-cell Slide" r:id="rId6" imgW="270" imgH="270" progId="TCLayout.ActiveDocument.1">
                   <p:embed/>
                 </p:oleObj>
               </mc:Choice>
@@ -29802,7 +29802,7 @@
           <a:graphicData uri="http://schemas.openxmlformats.org/presentationml/2006/ole">
             <mc:AlternateContent xmlns:mc="http://schemas.openxmlformats.org/markup-compatibility/2006">
               <mc:Choice xmlns:v="urn:schemas-microsoft-com:vml" Requires="v">
-                <p:oleObj spid="_x0000_s58443" name="think-cell Slide" r:id="rId5" imgW="270" imgH="270" progId="TCLayout.ActiveDocument.1">
+                <p:oleObj spid="_x0000_s58444" name="think-cell Slide" r:id="rId5" imgW="270" imgH="270" progId="TCLayout.ActiveDocument.1">
                   <p:embed/>
                 </p:oleObj>
               </mc:Choice>
@@ -29911,7 +29911,7 @@
           <a:graphicData uri="http://schemas.openxmlformats.org/presentationml/2006/ole">
             <mc:AlternateContent xmlns:mc="http://schemas.openxmlformats.org/markup-compatibility/2006">
               <mc:Choice xmlns:v="urn:schemas-microsoft-com:vml" Requires="v">
-                <p:oleObj spid="_x0000_s59464" name="think-cell Slide" r:id="rId5" imgW="270" imgH="270" progId="TCLayout.ActiveDocument.1">
+                <p:oleObj spid="_x0000_s59465" name="think-cell Slide" r:id="rId5" imgW="270" imgH="270" progId="TCLayout.ActiveDocument.1">
                   <p:embed/>
                 </p:oleObj>
               </mc:Choice>
@@ -30094,7 +30094,7 @@
           <a:graphicData uri="http://schemas.openxmlformats.org/presentationml/2006/ole">
             <mc:AlternateContent xmlns:mc="http://schemas.openxmlformats.org/markup-compatibility/2006">
               <mc:Choice xmlns:v="urn:schemas-microsoft-com:vml" Requires="v">
-                <p:oleObj spid="_x0000_s23632" name="think-cell Slide" r:id="rId7" imgW="270" imgH="270" progId="TCLayout.ActiveDocument.1">
+                <p:oleObj spid="_x0000_s23633" name="think-cell Slide" r:id="rId7" imgW="270" imgH="270" progId="TCLayout.ActiveDocument.1">
                   <p:embed/>
                 </p:oleObj>
               </mc:Choice>
@@ -30310,7 +30310,7 @@
           <a:graphicData uri="http://schemas.openxmlformats.org/presentationml/2006/ole">
             <mc:AlternateContent xmlns:mc="http://schemas.openxmlformats.org/markup-compatibility/2006">
               <mc:Choice xmlns:v="urn:schemas-microsoft-com:vml" Requires="v">
-                <p:oleObj spid="_x0000_s60456" name="think-cell Slide" r:id="rId5" imgW="270" imgH="270" progId="TCLayout.ActiveDocument.1">
+                <p:oleObj spid="_x0000_s60457" name="think-cell Slide" r:id="rId5" imgW="270" imgH="270" progId="TCLayout.ActiveDocument.1">
                   <p:embed/>
                 </p:oleObj>
               </mc:Choice>
@@ -32218,7 +32218,7 @@
           <a:graphicData uri="http://schemas.openxmlformats.org/presentationml/2006/ole">
             <mc:AlternateContent xmlns:mc="http://schemas.openxmlformats.org/markup-compatibility/2006">
               <mc:Choice xmlns:v="urn:schemas-microsoft-com:vml" Requires="v">
-                <p:oleObj spid="_x0000_s61484" name="think-cell Slide" r:id="rId5" imgW="270" imgH="270" progId="TCLayout.ActiveDocument.1">
+                <p:oleObj spid="_x0000_s61485" name="think-cell Slide" r:id="rId5" imgW="270" imgH="270" progId="TCLayout.ActiveDocument.1">
                   <p:embed/>
                 </p:oleObj>
               </mc:Choice>
@@ -33079,7 +33079,7 @@
           <a:graphicData uri="http://schemas.openxmlformats.org/presentationml/2006/ole">
             <mc:AlternateContent xmlns:mc="http://schemas.openxmlformats.org/markup-compatibility/2006">
               <mc:Choice xmlns:v="urn:schemas-microsoft-com:vml" Requires="v">
-                <p:oleObj spid="_x0000_s66573" name="think-cell Slide" r:id="rId5" imgW="270" imgH="270" progId="TCLayout.ActiveDocument.1">
+                <p:oleObj spid="_x0000_s66574" name="think-cell Slide" r:id="rId5" imgW="270" imgH="270" progId="TCLayout.ActiveDocument.1">
                   <p:embed/>
                 </p:oleObj>
               </mc:Choice>
@@ -33232,11 +33232,7 @@
             </a:r>
             <a:r>
               <a:rPr lang="en-US" sz="2400" smtClean="0"/>
-              <a:t>installed </a:t>
-            </a:r>
-            <a:r>
-              <a:rPr lang="en-US" sz="2400" smtClean="0"/>
-              <a:t>packages</a:t>
+              <a:t>installed packages</a:t>
             </a:r>
             <a:endParaRPr lang="en-US" sz="2400" dirty="0" smtClean="0"/>
           </a:p>
@@ -35799,76 +35795,6 @@
           <a:chExt cx="0" cy="0"/>
         </a:xfrm>
       </p:grpSpPr>
-      <p:sp>
-        <p:nvSpPr>
-          <p:cNvPr id="10" name="Rectangle 9"/>
-          <p:cNvSpPr/>
-          <p:nvPr/>
-        </p:nvSpPr>
-        <p:spPr bwMode="auto">
-          <a:xfrm>
-            <a:off x="6078537" y="1695450"/>
-            <a:ext cx="5597525" cy="4089124"/>
-          </a:xfrm>
-          <a:prstGeom prst="rect">
-            <a:avLst/>
-          </a:prstGeom>
-          <a:solidFill>
-            <a:schemeClr val="tx2"/>
-          </a:solidFill>
-          <a:ln>
-            <a:noFill/>
-            <a:headEnd type="none" w="med" len="med"/>
-            <a:tailEnd type="none" w="med" len="med"/>
-          </a:ln>
-          <a:effectLst/>
-        </p:spPr>
-        <p:style>
-          <a:lnRef idx="1">
-            <a:schemeClr val="accent2"/>
-          </a:lnRef>
-          <a:fillRef idx="3">
-            <a:schemeClr val="accent2"/>
-          </a:fillRef>
-          <a:effectRef idx="2">
-            <a:schemeClr val="accent2"/>
-          </a:effectRef>
-          <a:fontRef idx="minor">
-            <a:schemeClr val="lt1"/>
-          </a:fontRef>
-        </p:style>
-        <p:txBody>
-          <a:bodyPr vert="horz" wrap="square" lIns="91436" tIns="45718" rIns="91436" bIns="45718" numCol="1" rtlCol="0" anchor="ctr" anchorCtr="0" compatLnSpc="1">
-            <a:prstTxWarp prst="textNoShape">
-              <a:avLst/>
-            </a:prstTxWarp>
-          </a:bodyPr>
-          <a:lstStyle/>
-          <a:p>
-            <a:pPr algn="ctr" defTabSz="914099" fontAlgn="base">
-              <a:spcBef>
-                <a:spcPct val="0"/>
-              </a:spcBef>
-              <a:spcAft>
-                <a:spcPct val="0"/>
-              </a:spcAft>
-            </a:pPr>
-            <a:endParaRPr lang="en-US" sz="2200" dirty="0" smtClean="0">
-              <a:gradFill>
-                <a:gsLst>
-                  <a:gs pos="0">
-                    <a:srgbClr val="FFFFFF"/>
-                  </a:gs>
-                  <a:gs pos="100000">
-                    <a:srgbClr val="FFFFFF"/>
-                  </a:gs>
-                </a:gsLst>
-                <a:lin ang="5400000" scaled="0"/>
-              </a:gradFill>
-            </a:endParaRPr>
-          </a:p>
-        </p:txBody>
-      </p:sp>
       <p:graphicFrame>
         <p:nvGraphicFramePr>
           <p:cNvPr id="2" name="Object 1" hidden="1"/>
@@ -35894,7 +35820,7 @@
           <a:graphicData uri="http://schemas.openxmlformats.org/presentationml/2006/ole">
             <mc:AlternateContent xmlns:mc="http://schemas.openxmlformats.org/markup-compatibility/2006">
               <mc:Choice xmlns:v="urn:schemas-microsoft-com:vml" Requires="v">
-                <p:oleObj spid="_x0000_s64549" name="think-cell Slide" r:id="rId5" imgW="270" imgH="270" progId="TCLayout.ActiveDocument.1">
+                <p:oleObj spid="_x0000_s64550" name="think-cell Slide" r:id="rId5" imgW="270" imgH="270" progId="TCLayout.ActiveDocument.1">
                   <p:embed/>
                 </p:oleObj>
               </mc:Choice>
@@ -35965,2160 +35891,6 @@
               <a:rPr lang="en-US" sz="4000" dirty="0"/>
               <a:t>to the Cloud</a:t>
             </a:r>
-          </a:p>
-        </p:txBody>
-      </p:sp>
-      <p:sp>
-        <p:nvSpPr>
-          <p:cNvPr id="8" name="Freeform 139"/>
-          <p:cNvSpPr>
-            <a:spLocks noEditPoints="1"/>
-          </p:cNvSpPr>
-          <p:nvPr/>
-        </p:nvSpPr>
-        <p:spPr bwMode="black">
-          <a:xfrm>
-            <a:off x="7546615" y="2835546"/>
-            <a:ext cx="2661368" cy="1808932"/>
-          </a:xfrm>
-          <a:custGeom>
-            <a:avLst/>
-            <a:gdLst>
-              <a:gd name="T0" fmla="*/ 1232 w 3162"/>
-              <a:gd name="T1" fmla="*/ 548 h 2150"/>
-              <a:gd name="T2" fmla="*/ 1114 w 3162"/>
-              <a:gd name="T3" fmla="*/ 859 h 2150"/>
-              <a:gd name="T4" fmla="*/ 746 w 3162"/>
-              <a:gd name="T5" fmla="*/ 895 h 2150"/>
-              <a:gd name="T6" fmla="*/ 549 w 3162"/>
-              <a:gd name="T7" fmla="*/ 925 h 2150"/>
-              <a:gd name="T8" fmla="*/ 862 w 3162"/>
-              <a:gd name="T9" fmla="*/ 348 h 2150"/>
-              <a:gd name="T10" fmla="*/ 1240 w 3162"/>
-              <a:gd name="T11" fmla="*/ 502 h 2150"/>
-              <a:gd name="T12" fmla="*/ 725 w 3162"/>
-              <a:gd name="T13" fmla="*/ 1177 h 2150"/>
-              <a:gd name="T14" fmla="*/ 560 w 3162"/>
-              <a:gd name="T15" fmla="*/ 929 h 2150"/>
-              <a:gd name="T16" fmla="*/ 592 w 3162"/>
-              <a:gd name="T17" fmla="*/ 942 h 2150"/>
-              <a:gd name="T18" fmla="*/ 779 w 3162"/>
-              <a:gd name="T19" fmla="*/ 1124 h 2150"/>
-              <a:gd name="T20" fmla="*/ 1229 w 3162"/>
-              <a:gd name="T21" fmla="*/ 555 h 2150"/>
-              <a:gd name="T22" fmla="*/ 2213 w 3162"/>
-              <a:gd name="T23" fmla="*/ 1670 h 2150"/>
-              <a:gd name="T24" fmla="*/ 2168 w 3162"/>
-              <a:gd name="T25" fmla="*/ 1483 h 2150"/>
-              <a:gd name="T26" fmla="*/ 2454 w 3162"/>
-              <a:gd name="T27" fmla="*/ 1382 h 2150"/>
-              <a:gd name="T28" fmla="*/ 2658 w 3162"/>
-              <a:gd name="T29" fmla="*/ 1554 h 2150"/>
-              <a:gd name="T30" fmla="*/ 2367 w 3162"/>
-              <a:gd name="T31" fmla="*/ 1746 h 2150"/>
-              <a:gd name="T32" fmla="*/ 2609 w 3162"/>
-              <a:gd name="T33" fmla="*/ 1544 h 2150"/>
-              <a:gd name="T34" fmla="*/ 2301 w 3162"/>
-              <a:gd name="T35" fmla="*/ 1388 h 2150"/>
-              <a:gd name="T36" fmla="*/ 2293 w 3162"/>
-              <a:gd name="T37" fmla="*/ 1645 h 2150"/>
-              <a:gd name="T38" fmla="*/ 2456 w 3162"/>
-              <a:gd name="T39" fmla="*/ 1656 h 2150"/>
-              <a:gd name="T40" fmla="*/ 2490 w 3162"/>
-              <a:gd name="T41" fmla="*/ 1720 h 2150"/>
-              <a:gd name="T42" fmla="*/ 2538 w 3162"/>
-              <a:gd name="T43" fmla="*/ 1520 h 2150"/>
-              <a:gd name="T44" fmla="*/ 2229 w 3162"/>
-              <a:gd name="T45" fmla="*/ 1507 h 2150"/>
-              <a:gd name="T46" fmla="*/ 2175 w 3162"/>
-              <a:gd name="T47" fmla="*/ 1470 h 2150"/>
-              <a:gd name="T48" fmla="*/ 3161 w 3162"/>
-              <a:gd name="T49" fmla="*/ 1198 h 2150"/>
-              <a:gd name="T50" fmla="*/ 2691 w 3162"/>
-              <a:gd name="T51" fmla="*/ 1251 h 2150"/>
-              <a:gd name="T52" fmla="*/ 2744 w 3162"/>
-              <a:gd name="T53" fmla="*/ 1098 h 2150"/>
-              <a:gd name="T54" fmla="*/ 2784 w 3162"/>
-              <a:gd name="T55" fmla="*/ 1091 h 2150"/>
-              <a:gd name="T56" fmla="*/ 2784 w 3162"/>
-              <a:gd name="T57" fmla="*/ 1091 h 2150"/>
-              <a:gd name="T58" fmla="*/ 2677 w 3162"/>
-              <a:gd name="T59" fmla="*/ 1503 h 2150"/>
-              <a:gd name="T60" fmla="*/ 3081 w 3162"/>
-              <a:gd name="T61" fmla="*/ 1322 h 2150"/>
-              <a:gd name="T62" fmla="*/ 779 w 3162"/>
-              <a:gd name="T63" fmla="*/ 1123 h 2150"/>
-              <a:gd name="T64" fmla="*/ 600 w 3162"/>
-              <a:gd name="T65" fmla="*/ 1445 h 2150"/>
-              <a:gd name="T66" fmla="*/ 594 w 3162"/>
-              <a:gd name="T67" fmla="*/ 1563 h 2150"/>
-              <a:gd name="T68" fmla="*/ 779 w 3162"/>
-              <a:gd name="T69" fmla="*/ 1123 h 2150"/>
-              <a:gd name="T70" fmla="*/ 394 w 3162"/>
-              <a:gd name="T71" fmla="*/ 1456 h 2150"/>
-              <a:gd name="T72" fmla="*/ 394 w 3162"/>
-              <a:gd name="T73" fmla="*/ 1456 h 2150"/>
-              <a:gd name="T74" fmla="*/ 730 w 3162"/>
-              <a:gd name="T75" fmla="*/ 1147 h 2150"/>
-              <a:gd name="T76" fmla="*/ 730 w 3162"/>
-              <a:gd name="T77" fmla="*/ 1147 h 2150"/>
-              <a:gd name="T78" fmla="*/ 2090 w 3162"/>
-              <a:gd name="T79" fmla="*/ 1387 h 2150"/>
-              <a:gd name="T80" fmla="*/ 1909 w 3162"/>
-              <a:gd name="T81" fmla="*/ 1116 h 2150"/>
-              <a:gd name="T82" fmla="*/ 1360 w 3162"/>
-              <a:gd name="T83" fmla="*/ 1038 h 2150"/>
-              <a:gd name="T84" fmla="*/ 1643 w 3162"/>
-              <a:gd name="T85" fmla="*/ 608 h 2150"/>
-              <a:gd name="T86" fmla="*/ 1700 w 3162"/>
-              <a:gd name="T87" fmla="*/ 181 h 2150"/>
-              <a:gd name="T88" fmla="*/ 2216 w 3162"/>
-              <a:gd name="T89" fmla="*/ 631 h 2150"/>
-              <a:gd name="T90" fmla="*/ 2245 w 3162"/>
-              <a:gd name="T91" fmla="*/ 712 h 2150"/>
-              <a:gd name="T92" fmla="*/ 2066 w 3162"/>
-              <a:gd name="T93" fmla="*/ 1368 h 2150"/>
-              <a:gd name="T94" fmla="*/ 1437 w 3162"/>
-              <a:gd name="T95" fmla="*/ 1081 h 2150"/>
-              <a:gd name="T96" fmla="*/ 1925 w 3162"/>
-              <a:gd name="T97" fmla="*/ 1306 h 2150"/>
-              <a:gd name="T98" fmla="*/ 1949 w 3162"/>
-              <a:gd name="T99" fmla="*/ 1312 h 2150"/>
-              <a:gd name="T100" fmla="*/ 1733 w 3162"/>
-              <a:gd name="T101" fmla="*/ 1818 h 2150"/>
-              <a:gd name="T102" fmla="*/ 1651 w 3162"/>
-              <a:gd name="T103" fmla="*/ 1364 h 2150"/>
-              <a:gd name="T104" fmla="*/ 1962 w 3162"/>
-              <a:gd name="T105" fmla="*/ 1484 h 2150"/>
-              <a:gd name="T106" fmla="*/ 1934 w 3162"/>
-              <a:gd name="T107" fmla="*/ 1843 h 2150"/>
-              <a:gd name="T108" fmla="*/ 2150 w 3162"/>
-              <a:gd name="T109" fmla="*/ 1690 h 2150"/>
-              <a:gd name="T110" fmla="*/ 1978 w 3162"/>
-              <a:gd name="T111" fmla="*/ 1496 h 2150"/>
-              <a:gd name="T112" fmla="*/ 893 w 3162"/>
-              <a:gd name="T113" fmla="*/ 1047 h 2150"/>
-              <a:gd name="T114" fmla="*/ 1229 w 3162"/>
-              <a:gd name="T115" fmla="*/ 1432 h 2150"/>
-              <a:gd name="T116" fmla="*/ 1097 w 3162"/>
-              <a:gd name="T117" fmla="*/ 1406 h 2150"/>
-              <a:gd name="T118" fmla="*/ 693 w 3162"/>
-              <a:gd name="T119" fmla="*/ 1380 h 2150"/>
-              <a:gd name="T120" fmla="*/ 785 w 3162"/>
-              <a:gd name="T121" fmla="*/ 1842 h 2150"/>
-              <a:gd name="T122" fmla="*/ 1229 w 3162"/>
-              <a:gd name="T123" fmla="*/ 1990 h 2150"/>
-              <a:gd name="T124" fmla="*/ 1520 w 3162"/>
-              <a:gd name="T125" fmla="*/ 1266 h 2150"/>
-            </a:gdLst>
-            <a:ahLst/>
-            <a:cxnLst>
-              <a:cxn ang="0">
-                <a:pos x="T0" y="T1"/>
-              </a:cxn>
-              <a:cxn ang="0">
-                <a:pos x="T2" y="T3"/>
-              </a:cxn>
-              <a:cxn ang="0">
-                <a:pos x="T4" y="T5"/>
-              </a:cxn>
-              <a:cxn ang="0">
-                <a:pos x="T6" y="T7"/>
-              </a:cxn>
-              <a:cxn ang="0">
-                <a:pos x="T8" y="T9"/>
-              </a:cxn>
-              <a:cxn ang="0">
-                <a:pos x="T10" y="T11"/>
-              </a:cxn>
-              <a:cxn ang="0">
-                <a:pos x="T12" y="T13"/>
-              </a:cxn>
-              <a:cxn ang="0">
-                <a:pos x="T14" y="T15"/>
-              </a:cxn>
-              <a:cxn ang="0">
-                <a:pos x="T16" y="T17"/>
-              </a:cxn>
-              <a:cxn ang="0">
-                <a:pos x="T18" y="T19"/>
-              </a:cxn>
-              <a:cxn ang="0">
-                <a:pos x="T20" y="T21"/>
-              </a:cxn>
-              <a:cxn ang="0">
-                <a:pos x="T22" y="T23"/>
-              </a:cxn>
-              <a:cxn ang="0">
-                <a:pos x="T24" y="T25"/>
-              </a:cxn>
-              <a:cxn ang="0">
-                <a:pos x="T26" y="T27"/>
-              </a:cxn>
-              <a:cxn ang="0">
-                <a:pos x="T28" y="T29"/>
-              </a:cxn>
-              <a:cxn ang="0">
-                <a:pos x="T30" y="T31"/>
-              </a:cxn>
-              <a:cxn ang="0">
-                <a:pos x="T32" y="T33"/>
-              </a:cxn>
-              <a:cxn ang="0">
-                <a:pos x="T34" y="T35"/>
-              </a:cxn>
-              <a:cxn ang="0">
-                <a:pos x="T36" y="T37"/>
-              </a:cxn>
-              <a:cxn ang="0">
-                <a:pos x="T38" y="T39"/>
-              </a:cxn>
-              <a:cxn ang="0">
-                <a:pos x="T40" y="T41"/>
-              </a:cxn>
-              <a:cxn ang="0">
-                <a:pos x="T42" y="T43"/>
-              </a:cxn>
-              <a:cxn ang="0">
-                <a:pos x="T44" y="T45"/>
-              </a:cxn>
-              <a:cxn ang="0">
-                <a:pos x="T46" y="T47"/>
-              </a:cxn>
-              <a:cxn ang="0">
-                <a:pos x="T48" y="T49"/>
-              </a:cxn>
-              <a:cxn ang="0">
-                <a:pos x="T50" y="T51"/>
-              </a:cxn>
-              <a:cxn ang="0">
-                <a:pos x="T52" y="T53"/>
-              </a:cxn>
-              <a:cxn ang="0">
-                <a:pos x="T54" y="T55"/>
-              </a:cxn>
-              <a:cxn ang="0">
-                <a:pos x="T56" y="T57"/>
-              </a:cxn>
-              <a:cxn ang="0">
-                <a:pos x="T58" y="T59"/>
-              </a:cxn>
-              <a:cxn ang="0">
-                <a:pos x="T60" y="T61"/>
-              </a:cxn>
-              <a:cxn ang="0">
-                <a:pos x="T62" y="T63"/>
-              </a:cxn>
-              <a:cxn ang="0">
-                <a:pos x="T64" y="T65"/>
-              </a:cxn>
-              <a:cxn ang="0">
-                <a:pos x="T66" y="T67"/>
-              </a:cxn>
-              <a:cxn ang="0">
-                <a:pos x="T68" y="T69"/>
-              </a:cxn>
-              <a:cxn ang="0">
-                <a:pos x="T70" y="T71"/>
-              </a:cxn>
-              <a:cxn ang="0">
-                <a:pos x="T72" y="T73"/>
-              </a:cxn>
-              <a:cxn ang="0">
-                <a:pos x="T74" y="T75"/>
-              </a:cxn>
-              <a:cxn ang="0">
-                <a:pos x="T76" y="T77"/>
-              </a:cxn>
-              <a:cxn ang="0">
-                <a:pos x="T78" y="T79"/>
-              </a:cxn>
-              <a:cxn ang="0">
-                <a:pos x="T80" y="T81"/>
-              </a:cxn>
-              <a:cxn ang="0">
-                <a:pos x="T82" y="T83"/>
-              </a:cxn>
-              <a:cxn ang="0">
-                <a:pos x="T84" y="T85"/>
-              </a:cxn>
-              <a:cxn ang="0">
-                <a:pos x="T86" y="T87"/>
-              </a:cxn>
-              <a:cxn ang="0">
-                <a:pos x="T88" y="T89"/>
-              </a:cxn>
-              <a:cxn ang="0">
-                <a:pos x="T90" y="T91"/>
-              </a:cxn>
-              <a:cxn ang="0">
-                <a:pos x="T92" y="T93"/>
-              </a:cxn>
-              <a:cxn ang="0">
-                <a:pos x="T94" y="T95"/>
-              </a:cxn>
-              <a:cxn ang="0">
-                <a:pos x="T96" y="T97"/>
-              </a:cxn>
-              <a:cxn ang="0">
-                <a:pos x="T98" y="T99"/>
-              </a:cxn>
-              <a:cxn ang="0">
-                <a:pos x="T100" y="T101"/>
-              </a:cxn>
-              <a:cxn ang="0">
-                <a:pos x="T102" y="T103"/>
-              </a:cxn>
-              <a:cxn ang="0">
-                <a:pos x="T104" y="T105"/>
-              </a:cxn>
-              <a:cxn ang="0">
-                <a:pos x="T106" y="T107"/>
-              </a:cxn>
-              <a:cxn ang="0">
-                <a:pos x="T108" y="T109"/>
-              </a:cxn>
-              <a:cxn ang="0">
-                <a:pos x="T110" y="T111"/>
-              </a:cxn>
-              <a:cxn ang="0">
-                <a:pos x="T112" y="T113"/>
-              </a:cxn>
-              <a:cxn ang="0">
-                <a:pos x="T114" y="T115"/>
-              </a:cxn>
-              <a:cxn ang="0">
-                <a:pos x="T116" y="T117"/>
-              </a:cxn>
-              <a:cxn ang="0">
-                <a:pos x="T118" y="T119"/>
-              </a:cxn>
-              <a:cxn ang="0">
-                <a:pos x="T120" y="T121"/>
-              </a:cxn>
-              <a:cxn ang="0">
-                <a:pos x="T122" y="T123"/>
-              </a:cxn>
-              <a:cxn ang="0">
-                <a:pos x="T124" y="T125"/>
-              </a:cxn>
-            </a:cxnLst>
-            <a:rect l="0" t="0" r="r" b="b"/>
-            <a:pathLst>
-              <a:path w="3162" h="2150">
-                <a:moveTo>
-                  <a:pt x="762" y="1139"/>
-                </a:moveTo>
-                <a:cubicBezTo>
-                  <a:pt x="766" y="1135"/>
-                  <a:pt x="770" y="1131"/>
-                  <a:pt x="775" y="1127"/>
-                </a:cubicBezTo>
-                <a:cubicBezTo>
-                  <a:pt x="774" y="1127"/>
-                  <a:pt x="774" y="1127"/>
-                  <a:pt x="774" y="1128"/>
-                </a:cubicBezTo>
-                <a:cubicBezTo>
-                  <a:pt x="770" y="1131"/>
-                  <a:pt x="766" y="1135"/>
-                  <a:pt x="762" y="1139"/>
-                </a:cubicBezTo>
-                <a:close/>
-                <a:moveTo>
-                  <a:pt x="1275" y="447"/>
-                </a:moveTo>
-                <a:cubicBezTo>
-                  <a:pt x="1258" y="479"/>
-                  <a:pt x="1243" y="513"/>
-                  <a:pt x="1232" y="548"/>
-                </a:cubicBezTo>
-                <a:cubicBezTo>
-                  <a:pt x="1232" y="548"/>
-                  <a:pt x="1232" y="548"/>
-                  <a:pt x="1232" y="548"/>
-                </a:cubicBezTo>
-                <a:cubicBezTo>
-                  <a:pt x="1108" y="636"/>
-                  <a:pt x="1108" y="636"/>
-                  <a:pt x="1108" y="636"/>
-                </a:cubicBezTo>
-                <a:cubicBezTo>
-                  <a:pt x="1145" y="696"/>
-                  <a:pt x="1150" y="767"/>
-                  <a:pt x="1127" y="830"/>
-                </a:cubicBezTo>
-                <a:cubicBezTo>
-                  <a:pt x="1196" y="861"/>
-                  <a:pt x="1196" y="861"/>
-                  <a:pt x="1196" y="861"/>
-                </a:cubicBezTo>
-                <a:cubicBezTo>
-                  <a:pt x="1197" y="873"/>
-                  <a:pt x="1199" y="886"/>
-                  <a:pt x="1201" y="899"/>
-                </a:cubicBezTo>
-                <a:cubicBezTo>
-                  <a:pt x="1114" y="859"/>
-                  <a:pt x="1114" y="859"/>
-                  <a:pt x="1114" y="859"/>
-                </a:cubicBezTo>
-                <a:cubicBezTo>
-                  <a:pt x="1098" y="888"/>
-                  <a:pt x="1076" y="914"/>
-                  <a:pt x="1048" y="934"/>
-                </a:cubicBezTo>
-                <a:cubicBezTo>
-                  <a:pt x="1019" y="954"/>
-                  <a:pt x="988" y="967"/>
-                  <a:pt x="956" y="972"/>
-                </a:cubicBezTo>
-                <a:cubicBezTo>
-                  <a:pt x="960" y="1019"/>
-                  <a:pt x="960" y="1019"/>
-                  <a:pt x="960" y="1019"/>
-                </a:cubicBezTo>
-                <a:cubicBezTo>
-                  <a:pt x="950" y="1022"/>
-                  <a:pt x="939" y="1026"/>
-                  <a:pt x="929" y="1031"/>
-                </a:cubicBezTo>
-                <a:cubicBezTo>
-                  <a:pt x="923" y="975"/>
-                  <a:pt x="923" y="975"/>
-                  <a:pt x="923" y="975"/>
-                </a:cubicBezTo>
-                <a:cubicBezTo>
-                  <a:pt x="857" y="977"/>
-                  <a:pt x="791" y="949"/>
-                  <a:pt x="746" y="895"/>
-                </a:cubicBezTo>
-                <a:cubicBezTo>
-                  <a:pt x="642" y="969"/>
-                  <a:pt x="642" y="969"/>
-                  <a:pt x="642" y="969"/>
-                </a:cubicBezTo>
-                <a:cubicBezTo>
-                  <a:pt x="632" y="963"/>
-                  <a:pt x="622" y="957"/>
-                  <a:pt x="612" y="951"/>
-                </a:cubicBezTo>
-                <a:cubicBezTo>
-                  <a:pt x="727" y="869"/>
-                  <a:pt x="727" y="869"/>
-                  <a:pt x="727" y="869"/>
-                </a:cubicBezTo>
-                <a:cubicBezTo>
-                  <a:pt x="690" y="809"/>
-                  <a:pt x="685" y="737"/>
-                  <a:pt x="708" y="675"/>
-                </a:cubicBezTo>
-                <a:cubicBezTo>
-                  <a:pt x="540" y="598"/>
-                  <a:pt x="540" y="598"/>
-                  <a:pt x="540" y="598"/>
-                </a:cubicBezTo>
-                <a:cubicBezTo>
-                  <a:pt x="498" y="702"/>
-                  <a:pt x="499" y="821"/>
-                  <a:pt x="549" y="925"/>
-                </a:cubicBezTo>
-                <a:cubicBezTo>
-                  <a:pt x="524" y="918"/>
-                  <a:pt x="500" y="913"/>
-                  <a:pt x="476" y="910"/>
-                </a:cubicBezTo>
-                <a:cubicBezTo>
-                  <a:pt x="454" y="849"/>
-                  <a:pt x="444" y="782"/>
-                  <a:pt x="450" y="713"/>
-                </a:cubicBezTo>
-                <a:cubicBezTo>
-                  <a:pt x="471" y="455"/>
-                  <a:pt x="698" y="263"/>
-                  <a:pt x="957" y="284"/>
-                </a:cubicBezTo>
-                <a:cubicBezTo>
-                  <a:pt x="1085" y="295"/>
-                  <a:pt x="1197" y="356"/>
-                  <a:pt x="1275" y="447"/>
-                </a:cubicBezTo>
-                <a:close/>
-                <a:moveTo>
-                  <a:pt x="880" y="532"/>
-                </a:moveTo>
-                <a:cubicBezTo>
-                  <a:pt x="862" y="348"/>
-                  <a:pt x="862" y="348"/>
-                  <a:pt x="862" y="348"/>
-                </a:cubicBezTo>
-                <a:cubicBezTo>
-                  <a:pt x="799" y="356"/>
-                  <a:pt x="736" y="380"/>
-                  <a:pt x="681" y="420"/>
-                </a:cubicBezTo>
-                <a:cubicBezTo>
-                  <a:pt x="625" y="460"/>
-                  <a:pt x="582" y="511"/>
-                  <a:pt x="553" y="569"/>
-                </a:cubicBezTo>
-                <a:cubicBezTo>
-                  <a:pt x="722" y="645"/>
-                  <a:pt x="722" y="645"/>
-                  <a:pt x="722" y="645"/>
-                </a:cubicBezTo>
-                <a:cubicBezTo>
-                  <a:pt x="737" y="617"/>
-                  <a:pt x="760" y="591"/>
-                  <a:pt x="788" y="570"/>
-                </a:cubicBezTo>
-                <a:cubicBezTo>
-                  <a:pt x="816" y="550"/>
-                  <a:pt x="848" y="537"/>
-                  <a:pt x="880" y="532"/>
-                </a:cubicBezTo>
-                <a:close/>
-                <a:moveTo>
-                  <a:pt x="1240" y="502"/>
-                </a:moveTo>
-                <a:cubicBezTo>
-                  <a:pt x="1155" y="392"/>
-                  <a:pt x="1025" y="338"/>
-                  <a:pt x="895" y="345"/>
-                </a:cubicBezTo>
-                <a:cubicBezTo>
-                  <a:pt x="912" y="529"/>
-                  <a:pt x="912" y="529"/>
-                  <a:pt x="912" y="529"/>
-                </a:cubicBezTo>
-                <a:cubicBezTo>
-                  <a:pt x="979" y="527"/>
-                  <a:pt x="1045" y="555"/>
-                  <a:pt x="1090" y="610"/>
-                </a:cubicBezTo>
-                <a:lnTo>
-                  <a:pt x="1240" y="502"/>
-                </a:lnTo>
-                <a:close/>
-                <a:moveTo>
-                  <a:pt x="741" y="1160"/>
-                </a:moveTo>
-                <a:cubicBezTo>
-                  <a:pt x="735" y="1166"/>
-                  <a:pt x="730" y="1172"/>
-                  <a:pt x="725" y="1177"/>
-                </a:cubicBezTo>
-                <a:cubicBezTo>
-                  <a:pt x="730" y="1172"/>
-                  <a:pt x="735" y="1166"/>
-                  <a:pt x="741" y="1160"/>
-                </a:cubicBezTo>
-                <a:close/>
-                <a:moveTo>
-                  <a:pt x="742" y="1158"/>
-                </a:moveTo>
-                <a:cubicBezTo>
-                  <a:pt x="747" y="1153"/>
-                  <a:pt x="752" y="1148"/>
-                  <a:pt x="757" y="1143"/>
-                </a:cubicBezTo>
-                <a:cubicBezTo>
-                  <a:pt x="752" y="1148"/>
-                  <a:pt x="747" y="1153"/>
-                  <a:pt x="742" y="1158"/>
-                </a:cubicBezTo>
-                <a:close/>
-                <a:moveTo>
-                  <a:pt x="549" y="926"/>
-                </a:moveTo>
-                <a:cubicBezTo>
-                  <a:pt x="553" y="927"/>
-                  <a:pt x="557" y="928"/>
-                  <a:pt x="560" y="929"/>
-                </a:cubicBezTo>
-                <a:cubicBezTo>
-                  <a:pt x="557" y="928"/>
-                  <a:pt x="553" y="927"/>
-                  <a:pt x="549" y="925"/>
-                </a:cubicBezTo>
-                <a:cubicBezTo>
-                  <a:pt x="549" y="925"/>
-                  <a:pt x="549" y="925"/>
-                  <a:pt x="549" y="926"/>
-                </a:cubicBezTo>
-                <a:close/>
-                <a:moveTo>
-                  <a:pt x="592" y="942"/>
-                </a:moveTo>
-                <a:cubicBezTo>
-                  <a:pt x="599" y="945"/>
-                  <a:pt x="605" y="948"/>
-                  <a:pt x="611" y="951"/>
-                </a:cubicBezTo>
-                <a:cubicBezTo>
-                  <a:pt x="612" y="951"/>
-                  <a:pt x="612" y="951"/>
-                  <a:pt x="612" y="951"/>
-                </a:cubicBezTo>
-                <a:cubicBezTo>
-                  <a:pt x="605" y="948"/>
-                  <a:pt x="599" y="945"/>
-                  <a:pt x="592" y="942"/>
-                </a:cubicBezTo>
-                <a:close/>
-                <a:moveTo>
-                  <a:pt x="642" y="969"/>
-                </a:moveTo>
-                <a:cubicBezTo>
-                  <a:pt x="644" y="970"/>
-                  <a:pt x="646" y="972"/>
-                  <a:pt x="648" y="973"/>
-                </a:cubicBezTo>
-                <a:cubicBezTo>
-                  <a:pt x="646" y="971"/>
-                  <a:pt x="644" y="970"/>
-                  <a:pt x="642" y="969"/>
-                </a:cubicBezTo>
-                <a:close/>
-                <a:moveTo>
-                  <a:pt x="775" y="1127"/>
-                </a:moveTo>
-                <a:cubicBezTo>
-                  <a:pt x="777" y="1125"/>
-                  <a:pt x="779" y="1124"/>
-                  <a:pt x="781" y="1122"/>
-                </a:cubicBezTo>
-                <a:cubicBezTo>
-                  <a:pt x="780" y="1122"/>
-                  <a:pt x="779" y="1123"/>
-                  <a:pt x="779" y="1124"/>
-                </a:cubicBezTo>
-                <a:cubicBezTo>
-                  <a:pt x="777" y="1125"/>
-                  <a:pt x="776" y="1126"/>
-                  <a:pt x="775" y="1127"/>
-                </a:cubicBezTo>
-                <a:close/>
-                <a:moveTo>
-                  <a:pt x="960" y="1019"/>
-                </a:moveTo>
-                <a:cubicBezTo>
-                  <a:pt x="967" y="1016"/>
-                  <a:pt x="974" y="1014"/>
-                  <a:pt x="982" y="1012"/>
-                </a:cubicBezTo>
-                <a:cubicBezTo>
-                  <a:pt x="974" y="1014"/>
-                  <a:pt x="967" y="1016"/>
-                  <a:pt x="960" y="1019"/>
-                </a:cubicBezTo>
-                <a:close/>
-                <a:moveTo>
-                  <a:pt x="1220" y="583"/>
-                </a:moveTo>
-                <a:cubicBezTo>
-                  <a:pt x="1223" y="574"/>
-                  <a:pt x="1226" y="564"/>
-                  <a:pt x="1229" y="555"/>
-                </a:cubicBezTo>
-                <a:cubicBezTo>
-                  <a:pt x="1226" y="564"/>
-                  <a:pt x="1223" y="574"/>
-                  <a:pt x="1220" y="583"/>
-                </a:cubicBezTo>
-                <a:close/>
-                <a:moveTo>
-                  <a:pt x="2658" y="1554"/>
-                </a:moveTo>
-                <a:cubicBezTo>
-                  <a:pt x="2648" y="1634"/>
-                  <a:pt x="2604" y="1709"/>
-                  <a:pt x="2530" y="1755"/>
-                </a:cubicBezTo>
-                <a:cubicBezTo>
-                  <a:pt x="2425" y="1820"/>
-                  <a:pt x="2294" y="1807"/>
-                  <a:pt x="2205" y="1732"/>
-                </a:cubicBezTo>
-                <a:cubicBezTo>
-                  <a:pt x="2209" y="1711"/>
-                  <a:pt x="2212" y="1689"/>
-                  <a:pt x="2213" y="1667"/>
-                </a:cubicBezTo>
-                <a:cubicBezTo>
-                  <a:pt x="2213" y="1668"/>
-                  <a:pt x="2213" y="1669"/>
-                  <a:pt x="2213" y="1670"/>
-                </a:cubicBezTo>
-                <a:cubicBezTo>
-                  <a:pt x="2224" y="1682"/>
-                  <a:pt x="2236" y="1694"/>
-                  <a:pt x="2249" y="1703"/>
-                </a:cubicBezTo>
-                <a:cubicBezTo>
-                  <a:pt x="2290" y="1643"/>
-                  <a:pt x="2290" y="1643"/>
-                  <a:pt x="2290" y="1643"/>
-                </a:cubicBezTo>
-                <a:cubicBezTo>
-                  <a:pt x="2252" y="1614"/>
-                  <a:pt x="2227" y="1568"/>
-                  <a:pt x="2228" y="1517"/>
-                </a:cubicBezTo>
-                <a:cubicBezTo>
-                  <a:pt x="2183" y="1514"/>
-                  <a:pt x="2183" y="1514"/>
-                  <a:pt x="2183" y="1514"/>
-                </a:cubicBezTo>
-                <a:cubicBezTo>
-                  <a:pt x="2184" y="1516"/>
-                  <a:pt x="2185" y="1518"/>
-                  <a:pt x="2186" y="1520"/>
-                </a:cubicBezTo>
-                <a:cubicBezTo>
-                  <a:pt x="2181" y="1507"/>
-                  <a:pt x="2175" y="1495"/>
-                  <a:pt x="2168" y="1483"/>
-                </a:cubicBezTo>
-                <a:cubicBezTo>
-                  <a:pt x="2171" y="1488"/>
-                  <a:pt x="2173" y="1492"/>
-                  <a:pt x="2175" y="1497"/>
-                </a:cubicBezTo>
-                <a:cubicBezTo>
-                  <a:pt x="2230" y="1501"/>
-                  <a:pt x="2230" y="1501"/>
-                  <a:pt x="2230" y="1501"/>
-                </a:cubicBezTo>
-                <a:cubicBezTo>
-                  <a:pt x="2233" y="1477"/>
-                  <a:pt x="2241" y="1455"/>
-                  <a:pt x="2253" y="1436"/>
-                </a:cubicBezTo>
-                <a:cubicBezTo>
-                  <a:pt x="2293" y="1416"/>
-                  <a:pt x="2330" y="1393"/>
-                  <a:pt x="2365" y="1366"/>
-                </a:cubicBezTo>
-                <a:cubicBezTo>
-                  <a:pt x="2374" y="1365"/>
-                  <a:pt x="2384" y="1365"/>
-                  <a:pt x="2394" y="1365"/>
-                </a:cubicBezTo>
-                <a:cubicBezTo>
-                  <a:pt x="2416" y="1367"/>
-                  <a:pt x="2436" y="1373"/>
-                  <a:pt x="2454" y="1382"/>
-                </a:cubicBezTo>
-                <a:cubicBezTo>
-                  <a:pt x="2454" y="1382"/>
-                  <a:pt x="2453" y="1381"/>
-                  <a:pt x="2453" y="1380"/>
-                </a:cubicBezTo>
-                <a:cubicBezTo>
-                  <a:pt x="2473" y="1418"/>
-                  <a:pt x="2500" y="1451"/>
-                  <a:pt x="2532" y="1480"/>
-                </a:cubicBezTo>
-                <a:cubicBezTo>
-                  <a:pt x="2536" y="1493"/>
-                  <a:pt x="2538" y="1508"/>
-                  <a:pt x="2538" y="1523"/>
-                </a:cubicBezTo>
-                <a:cubicBezTo>
-                  <a:pt x="2599" y="1527"/>
-                  <a:pt x="2599" y="1527"/>
-                  <a:pt x="2599" y="1527"/>
-                </a:cubicBezTo>
-                <a:cubicBezTo>
-                  <a:pt x="2599" y="1527"/>
-                  <a:pt x="2599" y="1527"/>
-                  <a:pt x="2599" y="1527"/>
-                </a:cubicBezTo>
-                <a:cubicBezTo>
-                  <a:pt x="2618" y="1538"/>
-                  <a:pt x="2638" y="1547"/>
-                  <a:pt x="2658" y="1554"/>
-                </a:cubicBezTo>
-                <a:close/>
-                <a:moveTo>
-                  <a:pt x="2475" y="1727"/>
-                </a:moveTo>
-                <a:cubicBezTo>
-                  <a:pt x="2443" y="1662"/>
-                  <a:pt x="2443" y="1662"/>
-                  <a:pt x="2443" y="1662"/>
-                </a:cubicBezTo>
-                <a:cubicBezTo>
-                  <a:pt x="2422" y="1671"/>
-                  <a:pt x="2397" y="1676"/>
-                  <a:pt x="2372" y="1674"/>
-                </a:cubicBezTo>
-                <a:cubicBezTo>
-                  <a:pt x="2347" y="1672"/>
-                  <a:pt x="2323" y="1664"/>
-                  <a:pt x="2303" y="1652"/>
-                </a:cubicBezTo>
-                <a:cubicBezTo>
-                  <a:pt x="2262" y="1712"/>
-                  <a:pt x="2262" y="1712"/>
-                  <a:pt x="2262" y="1712"/>
-                </a:cubicBezTo>
-                <a:cubicBezTo>
-                  <a:pt x="2293" y="1732"/>
-                  <a:pt x="2328" y="1744"/>
-                  <a:pt x="2367" y="1746"/>
-                </a:cubicBezTo>
-                <a:cubicBezTo>
-                  <a:pt x="2405" y="1749"/>
-                  <a:pt x="2442" y="1742"/>
-                  <a:pt x="2475" y="1727"/>
-                </a:cubicBezTo>
-                <a:close/>
-                <a:moveTo>
-                  <a:pt x="2609" y="1544"/>
-                </a:moveTo>
-                <a:cubicBezTo>
-                  <a:pt x="2536" y="1539"/>
-                  <a:pt x="2536" y="1539"/>
-                  <a:pt x="2536" y="1539"/>
-                </a:cubicBezTo>
-                <a:cubicBezTo>
-                  <a:pt x="2530" y="1589"/>
-                  <a:pt x="2500" y="1632"/>
-                  <a:pt x="2458" y="1655"/>
-                </a:cubicBezTo>
-                <a:cubicBezTo>
-                  <a:pt x="2490" y="1720"/>
-                  <a:pt x="2490" y="1720"/>
-                  <a:pt x="2490" y="1720"/>
-                </a:cubicBezTo>
-                <a:cubicBezTo>
-                  <a:pt x="2554" y="1686"/>
-                  <a:pt x="2601" y="1621"/>
-                  <a:pt x="2609" y="1544"/>
-                </a:cubicBezTo>
-                <a:close/>
-                <a:moveTo>
-                  <a:pt x="2278" y="1319"/>
-                </a:moveTo>
-                <a:cubicBezTo>
-                  <a:pt x="2278" y="1319"/>
-                  <a:pt x="2278" y="1319"/>
-                  <a:pt x="2278" y="1319"/>
-                </a:cubicBezTo>
-                <a:moveTo>
-                  <a:pt x="2268" y="1324"/>
-                </a:moveTo>
-                <a:cubicBezTo>
-                  <a:pt x="2268" y="1324"/>
-                  <a:pt x="2268" y="1324"/>
-                  <a:pt x="2268" y="1324"/>
-                </a:cubicBezTo>
-                <a:moveTo>
-                  <a:pt x="2301" y="1388"/>
-                </a:moveTo>
-                <a:cubicBezTo>
-                  <a:pt x="2301" y="1388"/>
-                  <a:pt x="2301" y="1388"/>
-                  <a:pt x="2301" y="1388"/>
-                </a:cubicBezTo>
-                <a:moveTo>
-                  <a:pt x="2312" y="1382"/>
-                </a:moveTo>
-                <a:cubicBezTo>
-                  <a:pt x="2312" y="1382"/>
-                  <a:pt x="2312" y="1382"/>
-                  <a:pt x="2312" y="1382"/>
-                </a:cubicBezTo>
-                <a:moveTo>
-                  <a:pt x="2303" y="1652"/>
-                </a:moveTo>
-                <a:cubicBezTo>
-                  <a:pt x="2303" y="1652"/>
-                  <a:pt x="2303" y="1652"/>
-                  <a:pt x="2303" y="1652"/>
-                </a:cubicBezTo>
-                <a:moveTo>
-                  <a:pt x="2293" y="1645"/>
-                </a:moveTo>
-                <a:cubicBezTo>
-                  <a:pt x="2293" y="1645"/>
-                  <a:pt x="2293" y="1645"/>
-                  <a:pt x="2293" y="1645"/>
-                </a:cubicBezTo>
-                <a:moveTo>
-                  <a:pt x="2256" y="1707"/>
-                </a:moveTo>
-                <a:cubicBezTo>
-                  <a:pt x="2256" y="1707"/>
-                  <a:pt x="2256" y="1707"/>
-                  <a:pt x="2256" y="1707"/>
-                </a:cubicBezTo>
-                <a:moveTo>
-                  <a:pt x="2266" y="1713"/>
-                </a:moveTo>
-                <a:cubicBezTo>
-                  <a:pt x="2266" y="1713"/>
-                  <a:pt x="2266" y="1713"/>
-                  <a:pt x="2266" y="1713"/>
-                </a:cubicBezTo>
-                <a:moveTo>
-                  <a:pt x="2456" y="1656"/>
-                </a:moveTo>
-                <a:cubicBezTo>
-                  <a:pt x="2456" y="1656"/>
-                  <a:pt x="2456" y="1656"/>
-                  <a:pt x="2456" y="1656"/>
-                </a:cubicBezTo>
-                <a:moveTo>
-                  <a:pt x="2446" y="1661"/>
-                </a:moveTo>
-                <a:cubicBezTo>
-                  <a:pt x="2446" y="1661"/>
-                  <a:pt x="2446" y="1661"/>
-                  <a:pt x="2446" y="1661"/>
-                </a:cubicBezTo>
-                <a:moveTo>
-                  <a:pt x="2479" y="1725"/>
-                </a:moveTo>
-                <a:cubicBezTo>
-                  <a:pt x="2479" y="1725"/>
-                  <a:pt x="2479" y="1725"/>
-                  <a:pt x="2479" y="1725"/>
-                </a:cubicBezTo>
-                <a:moveTo>
-                  <a:pt x="2490" y="1720"/>
-                </a:moveTo>
-                <a:cubicBezTo>
-                  <a:pt x="2490" y="1720"/>
-                  <a:pt x="2490" y="1720"/>
-                  <a:pt x="2490" y="1720"/>
-                </a:cubicBezTo>
-                <a:moveTo>
-                  <a:pt x="2610" y="1536"/>
-                </a:moveTo>
-                <a:cubicBezTo>
-                  <a:pt x="2610" y="1536"/>
-                  <a:pt x="2610" y="1536"/>
-                  <a:pt x="2610" y="1536"/>
-                </a:cubicBezTo>
-                <a:moveTo>
-                  <a:pt x="2610" y="1524"/>
-                </a:moveTo>
-                <a:cubicBezTo>
-                  <a:pt x="2610" y="1524"/>
-                  <a:pt x="2610" y="1524"/>
-                  <a:pt x="2610" y="1524"/>
-                </a:cubicBezTo>
-                <a:moveTo>
-                  <a:pt x="2538" y="1520"/>
-                </a:moveTo>
-                <a:cubicBezTo>
-                  <a:pt x="2538" y="1520"/>
-                  <a:pt x="2538" y="1520"/>
-                  <a:pt x="2538" y="1520"/>
-                </a:cubicBezTo>
-                <a:moveTo>
-                  <a:pt x="2538" y="1532"/>
-                </a:moveTo>
-                <a:cubicBezTo>
-                  <a:pt x="2538" y="1532"/>
-                  <a:pt x="2538" y="1532"/>
-                  <a:pt x="2538" y="1532"/>
-                </a:cubicBezTo>
-                <a:moveTo>
-                  <a:pt x="2229" y="1519"/>
-                </a:moveTo>
-                <a:cubicBezTo>
-                  <a:pt x="2229" y="1519"/>
-                  <a:pt x="2229" y="1519"/>
-                  <a:pt x="2229" y="1519"/>
-                </a:cubicBezTo>
-                <a:moveTo>
-                  <a:pt x="2229" y="1507"/>
-                </a:moveTo>
-                <a:cubicBezTo>
-                  <a:pt x="2229" y="1507"/>
-                  <a:pt x="2229" y="1507"/>
-                  <a:pt x="2229" y="1507"/>
-                </a:cubicBezTo>
-                <a:moveTo>
-                  <a:pt x="2158" y="1503"/>
-                </a:moveTo>
-                <a:cubicBezTo>
-                  <a:pt x="2158" y="1503"/>
-                  <a:pt x="2158" y="1503"/>
-                  <a:pt x="2158" y="1503"/>
-                </a:cubicBezTo>
-                <a:moveTo>
-                  <a:pt x="2157" y="1515"/>
-                </a:moveTo>
-                <a:cubicBezTo>
-                  <a:pt x="2157" y="1515"/>
-                  <a:pt x="2157" y="1515"/>
-                  <a:pt x="2157" y="1515"/>
-                </a:cubicBezTo>
-                <a:moveTo>
-                  <a:pt x="2198" y="1462"/>
-                </a:moveTo>
-                <a:cubicBezTo>
-                  <a:pt x="2190" y="1465"/>
-                  <a:pt x="2182" y="1468"/>
-                  <a:pt x="2175" y="1470"/>
-                </a:cubicBezTo>
-                <a:cubicBezTo>
-                  <a:pt x="2182" y="1468"/>
-                  <a:pt x="2190" y="1465"/>
-                  <a:pt x="2198" y="1462"/>
-                </a:cubicBezTo>
-                <a:close/>
-                <a:moveTo>
-                  <a:pt x="2424" y="1315"/>
-                </a:moveTo>
-                <a:cubicBezTo>
-                  <a:pt x="2425" y="1314"/>
-                  <a:pt x="2426" y="1313"/>
-                  <a:pt x="2427" y="1312"/>
-                </a:cubicBezTo>
-                <a:cubicBezTo>
-                  <a:pt x="2425" y="1315"/>
-                  <a:pt x="2423" y="1317"/>
-                  <a:pt x="2421" y="1319"/>
-                </a:cubicBezTo>
-                <a:cubicBezTo>
-                  <a:pt x="2422" y="1318"/>
-                  <a:pt x="2423" y="1317"/>
-                  <a:pt x="2424" y="1315"/>
-                </a:cubicBezTo>
-                <a:close/>
-                <a:moveTo>
-                  <a:pt x="3161" y="1198"/>
-                </a:moveTo>
-                <a:cubicBezTo>
-                  <a:pt x="3161" y="1407"/>
-                  <a:pt x="2991" y="1576"/>
-                  <a:pt x="2782" y="1575"/>
-                </a:cubicBezTo>
-                <a:cubicBezTo>
-                  <a:pt x="2615" y="1575"/>
-                  <a:pt x="2474" y="1466"/>
-                  <a:pt x="2424" y="1315"/>
-                </a:cubicBezTo>
-                <a:cubicBezTo>
-                  <a:pt x="2440" y="1300"/>
-                  <a:pt x="2456" y="1284"/>
-                  <a:pt x="2470" y="1267"/>
-                </a:cubicBezTo>
-                <a:cubicBezTo>
-                  <a:pt x="2470" y="1268"/>
-                  <a:pt x="2469" y="1269"/>
-                  <a:pt x="2469" y="1270"/>
-                </a:cubicBezTo>
-                <a:cubicBezTo>
-                  <a:pt x="2479" y="1314"/>
-                  <a:pt x="2499" y="1356"/>
-                  <a:pt x="2526" y="1393"/>
-                </a:cubicBezTo>
-                <a:cubicBezTo>
-                  <a:pt x="2691" y="1251"/>
-                  <a:pt x="2691" y="1251"/>
-                  <a:pt x="2691" y="1251"/>
-                </a:cubicBezTo>
-                <a:cubicBezTo>
-                  <a:pt x="2679" y="1230"/>
-                  <a:pt x="2674" y="1206"/>
-                  <a:pt x="2678" y="1182"/>
-                </a:cubicBezTo>
-                <a:cubicBezTo>
-                  <a:pt x="2560" y="1141"/>
-                  <a:pt x="2560" y="1141"/>
-                  <a:pt x="2560" y="1141"/>
-                </a:cubicBezTo>
-                <a:cubicBezTo>
-                  <a:pt x="2567" y="1128"/>
-                  <a:pt x="2574" y="1115"/>
-                  <a:pt x="2580" y="1102"/>
-                </a:cubicBezTo>
-                <a:cubicBezTo>
-                  <a:pt x="2580" y="1103"/>
-                  <a:pt x="2579" y="1104"/>
-                  <a:pt x="2579" y="1105"/>
-                </a:cubicBezTo>
-                <a:cubicBezTo>
-                  <a:pt x="2691" y="1144"/>
-                  <a:pt x="2691" y="1144"/>
-                  <a:pt x="2691" y="1144"/>
-                </a:cubicBezTo>
-                <a:cubicBezTo>
-                  <a:pt x="2703" y="1123"/>
-                  <a:pt x="2722" y="1107"/>
-                  <a:pt x="2744" y="1098"/>
-                </a:cubicBezTo>
-                <a:cubicBezTo>
-                  <a:pt x="2703" y="884"/>
-                  <a:pt x="2703" y="884"/>
-                  <a:pt x="2703" y="884"/>
-                </a:cubicBezTo>
-                <a:cubicBezTo>
-                  <a:pt x="2682" y="890"/>
-                  <a:pt x="2662" y="897"/>
-                  <a:pt x="2642" y="907"/>
-                </a:cubicBezTo>
-                <a:cubicBezTo>
-                  <a:pt x="2646" y="886"/>
-                  <a:pt x="2649" y="865"/>
-                  <a:pt x="2650" y="844"/>
-                </a:cubicBezTo>
-                <a:cubicBezTo>
-                  <a:pt x="2692" y="828"/>
-                  <a:pt x="2737" y="819"/>
-                  <a:pt x="2784" y="819"/>
-                </a:cubicBezTo>
-                <a:cubicBezTo>
-                  <a:pt x="2993" y="820"/>
-                  <a:pt x="3162" y="989"/>
-                  <a:pt x="3161" y="1198"/>
-                </a:cubicBezTo>
-                <a:close/>
-                <a:moveTo>
-                  <a:pt x="2784" y="1091"/>
-                </a:moveTo>
-                <a:cubicBezTo>
-                  <a:pt x="2795" y="1091"/>
-                  <a:pt x="2807" y="1092"/>
-                  <a:pt x="2818" y="1096"/>
-                </a:cubicBezTo>
-                <a:cubicBezTo>
-                  <a:pt x="2830" y="1100"/>
-                  <a:pt x="2840" y="1106"/>
-                  <a:pt x="2850" y="1114"/>
-                </a:cubicBezTo>
-                <a:cubicBezTo>
-                  <a:pt x="3014" y="971"/>
-                  <a:pt x="3014" y="971"/>
-                  <a:pt x="3014" y="971"/>
-                </a:cubicBezTo>
-                <a:cubicBezTo>
-                  <a:pt x="2980" y="937"/>
-                  <a:pt x="2938" y="909"/>
-                  <a:pt x="2889" y="892"/>
-                </a:cubicBezTo>
-                <a:cubicBezTo>
-                  <a:pt x="2841" y="875"/>
-                  <a:pt x="2791" y="871"/>
-                  <a:pt x="2743" y="877"/>
-                </a:cubicBezTo>
-                <a:lnTo>
-                  <a:pt x="2784" y="1091"/>
-                </a:lnTo>
-                <a:close/>
-                <a:moveTo>
-                  <a:pt x="2824" y="1518"/>
-                </a:moveTo>
-                <a:cubicBezTo>
-                  <a:pt x="2783" y="1304"/>
-                  <a:pt x="2783" y="1304"/>
-                  <a:pt x="2783" y="1304"/>
-                </a:cubicBezTo>
-                <a:cubicBezTo>
-                  <a:pt x="2772" y="1304"/>
-                  <a:pt x="2760" y="1302"/>
-                  <a:pt x="2748" y="1298"/>
-                </a:cubicBezTo>
-                <a:cubicBezTo>
-                  <a:pt x="2737" y="1294"/>
-                  <a:pt x="2726" y="1288"/>
-                  <a:pt x="2717" y="1281"/>
-                </a:cubicBezTo>
-                <a:cubicBezTo>
-                  <a:pt x="2553" y="1423"/>
-                  <a:pt x="2553" y="1423"/>
-                  <a:pt x="2553" y="1423"/>
-                </a:cubicBezTo>
-                <a:cubicBezTo>
-                  <a:pt x="2586" y="1458"/>
-                  <a:pt x="2629" y="1486"/>
-                  <a:pt x="2677" y="1503"/>
-                </a:cubicBezTo>
-                <a:cubicBezTo>
-                  <a:pt x="2726" y="1519"/>
-                  <a:pt x="2776" y="1524"/>
-                  <a:pt x="2824" y="1518"/>
-                </a:cubicBezTo>
-                <a:close/>
-                <a:moveTo>
-                  <a:pt x="3081" y="1322"/>
-                </a:moveTo>
-                <a:cubicBezTo>
-                  <a:pt x="2876" y="1251"/>
-                  <a:pt x="2876" y="1251"/>
-                  <a:pt x="2876" y="1251"/>
-                </a:cubicBezTo>
-                <a:cubicBezTo>
-                  <a:pt x="2864" y="1272"/>
-                  <a:pt x="2845" y="1288"/>
-                  <a:pt x="2823" y="1296"/>
-                </a:cubicBezTo>
-                <a:cubicBezTo>
-                  <a:pt x="2864" y="1510"/>
-                  <a:pt x="2864" y="1510"/>
-                  <a:pt x="2864" y="1510"/>
-                </a:cubicBezTo>
-                <a:cubicBezTo>
-                  <a:pt x="2959" y="1486"/>
-                  <a:pt x="3041" y="1418"/>
-                  <a:pt x="3081" y="1322"/>
-                </a:cubicBezTo>
-                <a:close/>
-                <a:moveTo>
-                  <a:pt x="3095" y="1284"/>
-                </a:moveTo>
-                <a:cubicBezTo>
-                  <a:pt x="3123" y="1184"/>
-                  <a:pt x="3100" y="1080"/>
-                  <a:pt x="3041" y="1002"/>
-                </a:cubicBezTo>
-                <a:cubicBezTo>
-                  <a:pt x="2876" y="1144"/>
-                  <a:pt x="2876" y="1144"/>
-                  <a:pt x="2876" y="1144"/>
-                </a:cubicBezTo>
-                <a:cubicBezTo>
-                  <a:pt x="2888" y="1164"/>
-                  <a:pt x="2892" y="1188"/>
-                  <a:pt x="2889" y="1213"/>
-                </a:cubicBezTo>
-                <a:lnTo>
-                  <a:pt x="3095" y="1284"/>
-                </a:lnTo>
-                <a:close/>
-                <a:moveTo>
-                  <a:pt x="779" y="1123"/>
-                </a:moveTo>
-                <a:cubicBezTo>
-                  <a:pt x="753" y="1146"/>
-                  <a:pt x="729" y="1171"/>
-                  <a:pt x="708" y="1198"/>
-                </a:cubicBezTo>
-                <a:cubicBezTo>
-                  <a:pt x="597" y="1245"/>
-                  <a:pt x="597" y="1245"/>
-                  <a:pt x="597" y="1245"/>
-                </a:cubicBezTo>
-                <a:cubicBezTo>
-                  <a:pt x="610" y="1288"/>
-                  <a:pt x="605" y="1337"/>
-                  <a:pt x="580" y="1378"/>
-                </a:cubicBezTo>
-                <a:cubicBezTo>
-                  <a:pt x="609" y="1400"/>
-                  <a:pt x="609" y="1400"/>
-                  <a:pt x="609" y="1400"/>
-                </a:cubicBezTo>
-                <a:cubicBezTo>
-                  <a:pt x="610" y="1399"/>
-                  <a:pt x="610" y="1398"/>
-                  <a:pt x="611" y="1396"/>
-                </a:cubicBezTo>
-                <a:cubicBezTo>
-                  <a:pt x="606" y="1412"/>
-                  <a:pt x="603" y="1429"/>
-                  <a:pt x="600" y="1445"/>
-                </a:cubicBezTo>
-                <a:cubicBezTo>
-                  <a:pt x="600" y="1444"/>
-                  <a:pt x="601" y="1443"/>
-                  <a:pt x="601" y="1442"/>
-                </a:cubicBezTo>
-                <a:cubicBezTo>
-                  <a:pt x="557" y="1409"/>
-                  <a:pt x="557" y="1409"/>
-                  <a:pt x="557" y="1409"/>
-                </a:cubicBezTo>
-                <a:cubicBezTo>
-                  <a:pt x="523" y="1444"/>
-                  <a:pt x="478" y="1461"/>
-                  <a:pt x="433" y="1461"/>
-                </a:cubicBezTo>
-                <a:cubicBezTo>
-                  <a:pt x="413" y="1620"/>
-                  <a:pt x="413" y="1620"/>
-                  <a:pt x="413" y="1620"/>
-                </a:cubicBezTo>
-                <a:cubicBezTo>
-                  <a:pt x="476" y="1625"/>
-                  <a:pt x="539" y="1611"/>
-                  <a:pt x="595" y="1579"/>
-                </a:cubicBezTo>
-                <a:cubicBezTo>
-                  <a:pt x="595" y="1574"/>
-                  <a:pt x="594" y="1569"/>
-                  <a:pt x="594" y="1563"/>
-                </a:cubicBezTo>
-                <a:cubicBezTo>
-                  <a:pt x="594" y="1565"/>
-                  <a:pt x="594" y="1566"/>
-                  <a:pt x="594" y="1567"/>
-                </a:cubicBezTo>
-                <a:cubicBezTo>
-                  <a:pt x="596" y="1590"/>
-                  <a:pt x="599" y="1613"/>
-                  <a:pt x="603" y="1636"/>
-                </a:cubicBezTo>
-                <a:cubicBezTo>
-                  <a:pt x="511" y="1682"/>
-                  <a:pt x="401" y="1690"/>
-                  <a:pt x="297" y="1650"/>
-                </a:cubicBezTo>
-                <a:cubicBezTo>
-                  <a:pt x="99" y="1574"/>
-                  <a:pt x="0" y="1352"/>
-                  <a:pt x="76" y="1154"/>
-                </a:cubicBezTo>
-                <a:cubicBezTo>
-                  <a:pt x="152" y="956"/>
-                  <a:pt x="374" y="858"/>
-                  <a:pt x="572" y="934"/>
-                </a:cubicBezTo>
-                <a:cubicBezTo>
-                  <a:pt x="666" y="970"/>
-                  <a:pt x="738" y="1039"/>
-                  <a:pt x="779" y="1123"/>
-                </a:cubicBezTo>
-                <a:close/>
-                <a:moveTo>
-                  <a:pt x="124" y="1401"/>
-                </a:moveTo>
-                <a:cubicBezTo>
-                  <a:pt x="272" y="1339"/>
-                  <a:pt x="272" y="1339"/>
-                  <a:pt x="272" y="1339"/>
-                </a:cubicBezTo>
-                <a:cubicBezTo>
-                  <a:pt x="260" y="1295"/>
-                  <a:pt x="265" y="1247"/>
-                  <a:pt x="289" y="1206"/>
-                </a:cubicBezTo>
-                <a:cubicBezTo>
-                  <a:pt x="161" y="1109"/>
-                  <a:pt x="161" y="1109"/>
-                  <a:pt x="161" y="1109"/>
-                </a:cubicBezTo>
-                <a:cubicBezTo>
-                  <a:pt x="101" y="1197"/>
-                  <a:pt x="91" y="1306"/>
-                  <a:pt x="124" y="1401"/>
-                </a:cubicBezTo>
-                <a:close/>
-                <a:moveTo>
-                  <a:pt x="394" y="1456"/>
-                </a:moveTo>
-                <a:cubicBezTo>
-                  <a:pt x="372" y="1451"/>
-                  <a:pt x="351" y="1441"/>
-                  <a:pt x="332" y="1427"/>
-                </a:cubicBezTo>
-                <a:cubicBezTo>
-                  <a:pt x="313" y="1412"/>
-                  <a:pt x="298" y="1394"/>
-                  <a:pt x="287" y="1375"/>
-                </a:cubicBezTo>
-                <a:cubicBezTo>
-                  <a:pt x="139" y="1437"/>
-                  <a:pt x="139" y="1437"/>
-                  <a:pt x="139" y="1437"/>
-                </a:cubicBezTo>
-                <a:cubicBezTo>
-                  <a:pt x="161" y="1482"/>
-                  <a:pt x="193" y="1522"/>
-                  <a:pt x="235" y="1554"/>
-                </a:cubicBezTo>
-                <a:cubicBezTo>
-                  <a:pt x="278" y="1586"/>
-                  <a:pt x="325" y="1607"/>
-                  <a:pt x="374" y="1616"/>
-                </a:cubicBezTo>
-                <a:lnTo>
-                  <a:pt x="394" y="1456"/>
-                </a:lnTo>
-                <a:close/>
-                <a:moveTo>
-                  <a:pt x="457" y="963"/>
-                </a:moveTo>
-                <a:cubicBezTo>
-                  <a:pt x="356" y="957"/>
-                  <a:pt x="254" y="996"/>
-                  <a:pt x="184" y="1078"/>
-                </a:cubicBezTo>
-                <a:cubicBezTo>
-                  <a:pt x="312" y="1175"/>
-                  <a:pt x="312" y="1175"/>
-                  <a:pt x="312" y="1175"/>
-                </a:cubicBezTo>
-                <a:cubicBezTo>
-                  <a:pt x="346" y="1140"/>
-                  <a:pt x="391" y="1122"/>
-                  <a:pt x="436" y="1123"/>
-                </a:cubicBezTo>
-                <a:lnTo>
-                  <a:pt x="457" y="963"/>
-                </a:lnTo>
-                <a:close/>
-                <a:moveTo>
-                  <a:pt x="730" y="1147"/>
-                </a:moveTo>
-                <a:cubicBezTo>
-                  <a:pt x="708" y="1102"/>
-                  <a:pt x="676" y="1062"/>
-                  <a:pt x="634" y="1030"/>
-                </a:cubicBezTo>
-                <a:cubicBezTo>
-                  <a:pt x="591" y="997"/>
-                  <a:pt x="544" y="977"/>
-                  <a:pt x="495" y="968"/>
-                </a:cubicBezTo>
-                <a:cubicBezTo>
-                  <a:pt x="475" y="1128"/>
-                  <a:pt x="475" y="1128"/>
-                  <a:pt x="475" y="1128"/>
-                </a:cubicBezTo>
-                <a:cubicBezTo>
-                  <a:pt x="497" y="1133"/>
-                  <a:pt x="518" y="1143"/>
-                  <a:pt x="537" y="1157"/>
-                </a:cubicBezTo>
-                <a:cubicBezTo>
-                  <a:pt x="556" y="1172"/>
-                  <a:pt x="571" y="1189"/>
-                  <a:pt x="582" y="1209"/>
-                </a:cubicBezTo>
-                <a:lnTo>
-                  <a:pt x="730" y="1147"/>
-                </a:lnTo>
-                <a:close/>
-                <a:moveTo>
-                  <a:pt x="594" y="1552"/>
-                </a:moveTo>
-                <a:cubicBezTo>
-                  <a:pt x="594" y="1552"/>
-                  <a:pt x="594" y="1553"/>
-                  <a:pt x="594" y="1553"/>
-                </a:cubicBezTo>
-                <a:cubicBezTo>
-                  <a:pt x="594" y="1554"/>
-                  <a:pt x="594" y="1554"/>
-                  <a:pt x="594" y="1555"/>
-                </a:cubicBezTo>
-                <a:cubicBezTo>
-                  <a:pt x="594" y="1554"/>
-                  <a:pt x="594" y="1553"/>
-                  <a:pt x="594" y="1552"/>
-                </a:cubicBezTo>
-                <a:close/>
-                <a:moveTo>
-                  <a:pt x="2163" y="1475"/>
-                </a:moveTo>
-                <a:cubicBezTo>
-                  <a:pt x="2143" y="1441"/>
-                  <a:pt x="2118" y="1412"/>
-                  <a:pt x="2090" y="1387"/>
-                </a:cubicBezTo>
-                <a:cubicBezTo>
-                  <a:pt x="2095" y="1392"/>
-                  <a:pt x="2101" y="1397"/>
-                  <a:pt x="2106" y="1402"/>
-                </a:cubicBezTo>
-                <a:cubicBezTo>
-                  <a:pt x="2119" y="1398"/>
-                  <a:pt x="2132" y="1394"/>
-                  <a:pt x="2145" y="1389"/>
-                </a:cubicBezTo>
-                <a:cubicBezTo>
-                  <a:pt x="2241" y="1354"/>
-                  <a:pt x="2323" y="1298"/>
-                  <a:pt x="2389" y="1228"/>
-                </a:cubicBezTo>
-                <a:cubicBezTo>
-                  <a:pt x="2148" y="1028"/>
-                  <a:pt x="2148" y="1028"/>
-                  <a:pt x="2148" y="1028"/>
-                </a:cubicBezTo>
-                <a:cubicBezTo>
-                  <a:pt x="2116" y="1057"/>
-                  <a:pt x="2079" y="1080"/>
-                  <a:pt x="2037" y="1096"/>
-                </a:cubicBezTo>
-                <a:cubicBezTo>
-                  <a:pt x="1995" y="1111"/>
-                  <a:pt x="1951" y="1118"/>
-                  <a:pt x="1909" y="1116"/>
-                </a:cubicBezTo>
-                <a:cubicBezTo>
-                  <a:pt x="1877" y="1300"/>
-                  <a:pt x="1877" y="1300"/>
-                  <a:pt x="1877" y="1300"/>
-                </a:cubicBezTo>
-                <a:cubicBezTo>
-                  <a:pt x="1848" y="1298"/>
-                  <a:pt x="1819" y="1300"/>
-                  <a:pt x="1790" y="1305"/>
-                </a:cubicBezTo>
-                <a:cubicBezTo>
-                  <a:pt x="1825" y="1102"/>
-                  <a:pt x="1825" y="1102"/>
-                  <a:pt x="1825" y="1102"/>
-                </a:cubicBezTo>
-                <a:cubicBezTo>
-                  <a:pt x="1742" y="1076"/>
-                  <a:pt x="1671" y="1019"/>
-                  <a:pt x="1629" y="939"/>
-                </a:cubicBezTo>
-                <a:cubicBezTo>
-                  <a:pt x="1360" y="1038"/>
-                  <a:pt x="1360" y="1038"/>
-                  <a:pt x="1360" y="1038"/>
-                </a:cubicBezTo>
-                <a:cubicBezTo>
-                  <a:pt x="1360" y="1038"/>
-                  <a:pt x="1360" y="1038"/>
-                  <a:pt x="1360" y="1038"/>
-                </a:cubicBezTo>
-                <a:cubicBezTo>
-                  <a:pt x="1316" y="1019"/>
-                  <a:pt x="1270" y="1005"/>
-                  <a:pt x="1223" y="997"/>
-                </a:cubicBezTo>
-                <a:cubicBezTo>
-                  <a:pt x="1214" y="966"/>
-                  <a:pt x="1207" y="933"/>
-                  <a:pt x="1201" y="900"/>
-                </a:cubicBezTo>
-                <a:cubicBezTo>
-                  <a:pt x="1138" y="502"/>
-                  <a:pt x="1409" y="128"/>
-                  <a:pt x="1807" y="64"/>
-                </a:cubicBezTo>
-                <a:cubicBezTo>
-                  <a:pt x="2205" y="0"/>
-                  <a:pt x="2580" y="272"/>
-                  <a:pt x="2643" y="670"/>
-                </a:cubicBezTo>
-                <a:cubicBezTo>
-                  <a:pt x="2700" y="1025"/>
-                  <a:pt x="2491" y="1361"/>
-                  <a:pt x="2163" y="1475"/>
-                </a:cubicBezTo>
-                <a:close/>
-                <a:moveTo>
-                  <a:pt x="1643" y="608"/>
-                </a:moveTo>
-                <a:cubicBezTo>
-                  <a:pt x="1401" y="407"/>
-                  <a:pt x="1401" y="407"/>
-                  <a:pt x="1401" y="407"/>
-                </a:cubicBezTo>
-                <a:cubicBezTo>
-                  <a:pt x="1288" y="564"/>
-                  <a:pt x="1247" y="770"/>
-                  <a:pt x="1305" y="967"/>
-                </a:cubicBezTo>
-                <a:cubicBezTo>
-                  <a:pt x="1600" y="859"/>
-                  <a:pt x="1600" y="859"/>
-                  <a:pt x="1600" y="859"/>
-                </a:cubicBezTo>
-                <a:cubicBezTo>
-                  <a:pt x="1579" y="771"/>
-                  <a:pt x="1597" y="681"/>
-                  <a:pt x="1643" y="608"/>
-                </a:cubicBezTo>
-                <a:close/>
-                <a:moveTo>
-                  <a:pt x="1989" y="145"/>
-                </a:moveTo>
-                <a:cubicBezTo>
-                  <a:pt x="1894" y="135"/>
-                  <a:pt x="1795" y="146"/>
-                  <a:pt x="1700" y="181"/>
-                </a:cubicBezTo>
-                <a:cubicBezTo>
-                  <a:pt x="1604" y="216"/>
-                  <a:pt x="1522" y="272"/>
-                  <a:pt x="1456" y="342"/>
-                </a:cubicBezTo>
-                <a:cubicBezTo>
-                  <a:pt x="1697" y="542"/>
-                  <a:pt x="1697" y="542"/>
-                  <a:pt x="1697" y="542"/>
-                </a:cubicBezTo>
-                <a:cubicBezTo>
-                  <a:pt x="1728" y="513"/>
-                  <a:pt x="1765" y="490"/>
-                  <a:pt x="1808" y="474"/>
-                </a:cubicBezTo>
-                <a:cubicBezTo>
-                  <a:pt x="1850" y="459"/>
-                  <a:pt x="1894" y="452"/>
-                  <a:pt x="1936" y="454"/>
-                </a:cubicBezTo>
-                <a:lnTo>
-                  <a:pt x="1989" y="145"/>
-                </a:lnTo>
-                <a:close/>
-                <a:moveTo>
-                  <a:pt x="2216" y="631"/>
-                </a:moveTo>
-                <a:cubicBezTo>
-                  <a:pt x="2510" y="523"/>
-                  <a:pt x="2510" y="523"/>
-                  <a:pt x="2510" y="523"/>
-                </a:cubicBezTo>
-                <a:cubicBezTo>
-                  <a:pt x="2427" y="335"/>
-                  <a:pt x="2262" y="205"/>
-                  <a:pt x="2073" y="159"/>
-                </a:cubicBezTo>
-                <a:cubicBezTo>
-                  <a:pt x="2020" y="469"/>
-                  <a:pt x="2020" y="469"/>
-                  <a:pt x="2020" y="469"/>
-                </a:cubicBezTo>
-                <a:cubicBezTo>
-                  <a:pt x="2102" y="494"/>
-                  <a:pt x="2174" y="551"/>
-                  <a:pt x="2216" y="631"/>
-                </a:cubicBezTo>
-                <a:close/>
-                <a:moveTo>
-                  <a:pt x="2539" y="603"/>
-                </a:moveTo>
-                <a:cubicBezTo>
-                  <a:pt x="2245" y="712"/>
-                  <a:pt x="2245" y="712"/>
-                  <a:pt x="2245" y="712"/>
-                </a:cubicBezTo>
-                <a:cubicBezTo>
-                  <a:pt x="2265" y="800"/>
-                  <a:pt x="2248" y="890"/>
-                  <a:pt x="2202" y="962"/>
-                </a:cubicBezTo>
-                <a:cubicBezTo>
-                  <a:pt x="2443" y="1163"/>
-                  <a:pt x="2443" y="1163"/>
-                  <a:pt x="2443" y="1163"/>
-                </a:cubicBezTo>
-                <a:cubicBezTo>
-                  <a:pt x="2557" y="1006"/>
-                  <a:pt x="2598" y="800"/>
-                  <a:pt x="2539" y="603"/>
-                </a:cubicBezTo>
-                <a:close/>
-                <a:moveTo>
-                  <a:pt x="2066" y="1368"/>
-                </a:moveTo>
-                <a:cubicBezTo>
-                  <a:pt x="2072" y="1372"/>
-                  <a:pt x="2078" y="1377"/>
-                  <a:pt x="2084" y="1382"/>
-                </a:cubicBezTo>
-                <a:cubicBezTo>
-                  <a:pt x="2078" y="1377"/>
-                  <a:pt x="2072" y="1372"/>
-                  <a:pt x="2066" y="1368"/>
-                </a:cubicBezTo>
-                <a:close/>
-                <a:moveTo>
-                  <a:pt x="1390" y="1053"/>
-                </a:moveTo>
-                <a:cubicBezTo>
-                  <a:pt x="1383" y="1050"/>
-                  <a:pt x="1377" y="1046"/>
-                  <a:pt x="1370" y="1043"/>
-                </a:cubicBezTo>
-                <a:cubicBezTo>
-                  <a:pt x="1377" y="1046"/>
-                  <a:pt x="1383" y="1050"/>
-                  <a:pt x="1390" y="1053"/>
-                </a:cubicBezTo>
-                <a:close/>
-                <a:moveTo>
-                  <a:pt x="1437" y="1081"/>
-                </a:moveTo>
-                <a:cubicBezTo>
-                  <a:pt x="1432" y="1078"/>
-                  <a:pt x="1426" y="1074"/>
-                  <a:pt x="1420" y="1070"/>
-                </a:cubicBezTo>
-                <a:cubicBezTo>
-                  <a:pt x="1426" y="1074"/>
-                  <a:pt x="1432" y="1078"/>
-                  <a:pt x="1437" y="1081"/>
-                </a:cubicBezTo>
-                <a:close/>
-                <a:moveTo>
-                  <a:pt x="1764" y="1311"/>
-                </a:moveTo>
-                <a:cubicBezTo>
-                  <a:pt x="1773" y="1309"/>
-                  <a:pt x="1781" y="1307"/>
-                  <a:pt x="1790" y="1305"/>
-                </a:cubicBezTo>
-                <a:cubicBezTo>
-                  <a:pt x="1790" y="1305"/>
-                  <a:pt x="1790" y="1305"/>
-                  <a:pt x="1790" y="1305"/>
-                </a:cubicBezTo>
-                <a:cubicBezTo>
-                  <a:pt x="1781" y="1307"/>
-                  <a:pt x="1773" y="1309"/>
-                  <a:pt x="1764" y="1311"/>
-                </a:cubicBezTo>
-                <a:close/>
-                <a:moveTo>
-                  <a:pt x="1877" y="1300"/>
-                </a:moveTo>
-                <a:cubicBezTo>
-                  <a:pt x="1893" y="1301"/>
-                  <a:pt x="1909" y="1303"/>
-                  <a:pt x="1925" y="1306"/>
-                </a:cubicBezTo>
-                <a:cubicBezTo>
-                  <a:pt x="1909" y="1303"/>
-                  <a:pt x="1893" y="1301"/>
-                  <a:pt x="1877" y="1300"/>
-                </a:cubicBezTo>
-                <a:close/>
-                <a:moveTo>
-                  <a:pt x="1940" y="1309"/>
-                </a:moveTo>
-                <a:cubicBezTo>
-                  <a:pt x="1935" y="1308"/>
-                  <a:pt x="1930" y="1307"/>
-                  <a:pt x="1925" y="1306"/>
-                </a:cubicBezTo>
-                <a:cubicBezTo>
-                  <a:pt x="1930" y="1307"/>
-                  <a:pt x="1935" y="1308"/>
-                  <a:pt x="1940" y="1309"/>
-                </a:cubicBezTo>
-                <a:close/>
-                <a:moveTo>
-                  <a:pt x="1964" y="1316"/>
-                </a:moveTo>
-                <a:cubicBezTo>
-                  <a:pt x="1959" y="1315"/>
-                  <a:pt x="1954" y="1313"/>
-                  <a:pt x="1949" y="1312"/>
-                </a:cubicBezTo>
-                <a:cubicBezTo>
-                  <a:pt x="1954" y="1313"/>
-                  <a:pt x="1959" y="1315"/>
-                  <a:pt x="1964" y="1316"/>
-                </a:cubicBezTo>
-                <a:close/>
-                <a:moveTo>
-                  <a:pt x="1963" y="1997"/>
-                </a:moveTo>
-                <a:cubicBezTo>
-                  <a:pt x="1811" y="2045"/>
-                  <a:pt x="1651" y="1986"/>
-                  <a:pt x="1564" y="1863"/>
-                </a:cubicBezTo>
-                <a:cubicBezTo>
-                  <a:pt x="1578" y="1846"/>
-                  <a:pt x="1590" y="1827"/>
-                  <a:pt x="1602" y="1808"/>
-                </a:cubicBezTo>
-                <a:cubicBezTo>
-                  <a:pt x="1622" y="1842"/>
-                  <a:pt x="1648" y="1871"/>
-                  <a:pt x="1680" y="1895"/>
-                </a:cubicBezTo>
-                <a:cubicBezTo>
-                  <a:pt x="1733" y="1818"/>
-                  <a:pt x="1733" y="1818"/>
-                  <a:pt x="1733" y="1818"/>
-                </a:cubicBezTo>
-                <a:cubicBezTo>
-                  <a:pt x="1691" y="1786"/>
-                  <a:pt x="1663" y="1738"/>
-                  <a:pt x="1655" y="1685"/>
-                </a:cubicBezTo>
-                <a:cubicBezTo>
-                  <a:pt x="1667" y="1645"/>
-                  <a:pt x="1674" y="1604"/>
-                  <a:pt x="1677" y="1562"/>
-                </a:cubicBezTo>
-                <a:cubicBezTo>
-                  <a:pt x="1695" y="1527"/>
-                  <a:pt x="1724" y="1498"/>
-                  <a:pt x="1759" y="1479"/>
-                </a:cubicBezTo>
-                <a:cubicBezTo>
-                  <a:pt x="1719" y="1394"/>
-                  <a:pt x="1719" y="1394"/>
-                  <a:pt x="1719" y="1394"/>
-                </a:cubicBezTo>
-                <a:cubicBezTo>
-                  <a:pt x="1701" y="1404"/>
-                  <a:pt x="1683" y="1415"/>
-                  <a:pt x="1668" y="1428"/>
-                </a:cubicBezTo>
-                <a:cubicBezTo>
-                  <a:pt x="1663" y="1407"/>
-                  <a:pt x="1658" y="1385"/>
-                  <a:pt x="1651" y="1364"/>
-                </a:cubicBezTo>
-                <a:cubicBezTo>
-                  <a:pt x="1680" y="1343"/>
-                  <a:pt x="1713" y="1327"/>
-                  <a:pt x="1749" y="1316"/>
-                </a:cubicBezTo>
-                <a:cubicBezTo>
-                  <a:pt x="1937" y="1257"/>
-                  <a:pt x="2137" y="1361"/>
-                  <a:pt x="2196" y="1550"/>
-                </a:cubicBezTo>
-                <a:cubicBezTo>
-                  <a:pt x="2256" y="1738"/>
-                  <a:pt x="2151" y="1938"/>
-                  <a:pt x="1963" y="1997"/>
-                </a:cubicBezTo>
-                <a:close/>
-                <a:moveTo>
-                  <a:pt x="1778" y="1470"/>
-                </a:moveTo>
-                <a:cubicBezTo>
-                  <a:pt x="1806" y="1458"/>
-                  <a:pt x="1838" y="1452"/>
-                  <a:pt x="1871" y="1455"/>
-                </a:cubicBezTo>
-                <a:cubicBezTo>
-                  <a:pt x="1904" y="1457"/>
-                  <a:pt x="1935" y="1468"/>
-                  <a:pt x="1962" y="1484"/>
-                </a:cubicBezTo>
-                <a:cubicBezTo>
-                  <a:pt x="2015" y="1407"/>
-                  <a:pt x="2015" y="1407"/>
-                  <a:pt x="2015" y="1407"/>
-                </a:cubicBezTo>
-                <a:cubicBezTo>
-                  <a:pt x="1975" y="1382"/>
-                  <a:pt x="1929" y="1365"/>
-                  <a:pt x="1878" y="1362"/>
-                </a:cubicBezTo>
-                <a:cubicBezTo>
-                  <a:pt x="1828" y="1358"/>
-                  <a:pt x="1780" y="1367"/>
-                  <a:pt x="1737" y="1385"/>
-                </a:cubicBezTo>
-                <a:lnTo>
-                  <a:pt x="1778" y="1470"/>
-                </a:lnTo>
-                <a:close/>
-                <a:moveTo>
-                  <a:pt x="1974" y="1928"/>
-                </a:moveTo>
-                <a:cubicBezTo>
-                  <a:pt x="1934" y="1843"/>
-                  <a:pt x="1934" y="1843"/>
-                  <a:pt x="1934" y="1843"/>
-                </a:cubicBezTo>
-                <a:cubicBezTo>
-                  <a:pt x="1905" y="1855"/>
-                  <a:pt x="1873" y="1861"/>
-                  <a:pt x="1840" y="1858"/>
-                </a:cubicBezTo>
-                <a:cubicBezTo>
-                  <a:pt x="1807" y="1856"/>
-                  <a:pt x="1776" y="1845"/>
-                  <a:pt x="1750" y="1829"/>
-                </a:cubicBezTo>
-                <a:cubicBezTo>
-                  <a:pt x="1697" y="1906"/>
-                  <a:pt x="1697" y="1906"/>
-                  <a:pt x="1697" y="1906"/>
-                </a:cubicBezTo>
-                <a:cubicBezTo>
-                  <a:pt x="1736" y="1932"/>
-                  <a:pt x="1783" y="1948"/>
-                  <a:pt x="1833" y="1952"/>
-                </a:cubicBezTo>
-                <a:cubicBezTo>
-                  <a:pt x="1883" y="1955"/>
-                  <a:pt x="1931" y="1947"/>
-                  <a:pt x="1974" y="1928"/>
-                </a:cubicBezTo>
-                <a:close/>
-                <a:moveTo>
-                  <a:pt x="2150" y="1690"/>
-                </a:moveTo>
-                <a:cubicBezTo>
-                  <a:pt x="2056" y="1682"/>
-                  <a:pt x="2056" y="1682"/>
-                  <a:pt x="2056" y="1682"/>
-                </a:cubicBezTo>
-                <a:cubicBezTo>
-                  <a:pt x="2048" y="1749"/>
-                  <a:pt x="2007" y="1804"/>
-                  <a:pt x="1952" y="1834"/>
-                </a:cubicBezTo>
-                <a:cubicBezTo>
-                  <a:pt x="1992" y="1919"/>
-                  <a:pt x="1992" y="1919"/>
-                  <a:pt x="1992" y="1919"/>
-                </a:cubicBezTo>
-                <a:cubicBezTo>
-                  <a:pt x="2077" y="1875"/>
-                  <a:pt x="2138" y="1791"/>
-                  <a:pt x="2150" y="1690"/>
-                </a:cubicBezTo>
-                <a:close/>
-                <a:moveTo>
-                  <a:pt x="2031" y="1418"/>
-                </a:moveTo>
-                <a:cubicBezTo>
-                  <a:pt x="1978" y="1496"/>
-                  <a:pt x="1978" y="1496"/>
-                  <a:pt x="1978" y="1496"/>
-                </a:cubicBezTo>
-                <a:cubicBezTo>
-                  <a:pt x="2028" y="1534"/>
-                  <a:pt x="2060" y="1595"/>
-                  <a:pt x="2058" y="1662"/>
-                </a:cubicBezTo>
-                <a:cubicBezTo>
-                  <a:pt x="2151" y="1669"/>
-                  <a:pt x="2151" y="1669"/>
-                  <a:pt x="2151" y="1669"/>
-                </a:cubicBezTo>
-                <a:cubicBezTo>
-                  <a:pt x="2155" y="1568"/>
-                  <a:pt x="2108" y="1475"/>
-                  <a:pt x="2031" y="1418"/>
-                </a:cubicBezTo>
-                <a:close/>
-                <a:moveTo>
-                  <a:pt x="1377" y="2017"/>
-                </a:moveTo>
-                <a:cubicBezTo>
-                  <a:pt x="1109" y="2150"/>
-                  <a:pt x="784" y="2042"/>
-                  <a:pt x="650" y="1774"/>
-                </a:cubicBezTo>
-                <a:cubicBezTo>
-                  <a:pt x="517" y="1506"/>
-                  <a:pt x="626" y="1180"/>
-                  <a:pt x="893" y="1047"/>
-                </a:cubicBezTo>
-                <a:cubicBezTo>
-                  <a:pt x="1161" y="913"/>
-                  <a:pt x="1487" y="1022"/>
-                  <a:pt x="1620" y="1290"/>
-                </a:cubicBezTo>
-                <a:cubicBezTo>
-                  <a:pt x="1754" y="1558"/>
-                  <a:pt x="1645" y="1883"/>
-                  <a:pt x="1377" y="2017"/>
-                </a:cubicBezTo>
-                <a:close/>
-                <a:moveTo>
-                  <a:pt x="1097" y="1065"/>
-                </a:moveTo>
-                <a:cubicBezTo>
-                  <a:pt x="1145" y="1399"/>
-                  <a:pt x="1145" y="1399"/>
-                  <a:pt x="1145" y="1399"/>
-                </a:cubicBezTo>
-                <a:cubicBezTo>
-                  <a:pt x="1160" y="1399"/>
-                  <a:pt x="1176" y="1402"/>
-                  <a:pt x="1191" y="1408"/>
-                </a:cubicBezTo>
-                <a:cubicBezTo>
-                  <a:pt x="1205" y="1414"/>
-                  <a:pt x="1218" y="1422"/>
-                  <a:pt x="1229" y="1432"/>
-                </a:cubicBezTo>
-                <a:cubicBezTo>
-                  <a:pt x="1491" y="1227"/>
-                  <a:pt x="1491" y="1227"/>
-                  <a:pt x="1491" y="1227"/>
-                </a:cubicBezTo>
-                <a:cubicBezTo>
-                  <a:pt x="1443" y="1172"/>
-                  <a:pt x="1382" y="1126"/>
-                  <a:pt x="1310" y="1097"/>
-                </a:cubicBezTo>
-                <a:cubicBezTo>
-                  <a:pt x="1240" y="1069"/>
-                  <a:pt x="1168" y="1059"/>
-                  <a:pt x="1097" y="1065"/>
-                </a:cubicBezTo>
-                <a:close/>
-                <a:moveTo>
-                  <a:pt x="711" y="1335"/>
-                </a:moveTo>
-                <a:cubicBezTo>
-                  <a:pt x="1026" y="1462"/>
-                  <a:pt x="1026" y="1462"/>
-                  <a:pt x="1026" y="1462"/>
-                </a:cubicBezTo>
-                <a:cubicBezTo>
-                  <a:pt x="1043" y="1435"/>
-                  <a:pt x="1068" y="1415"/>
-                  <a:pt x="1097" y="1406"/>
-                </a:cubicBezTo>
-                <a:cubicBezTo>
-                  <a:pt x="1050" y="1072"/>
-                  <a:pt x="1050" y="1072"/>
-                  <a:pt x="1050" y="1072"/>
-                </a:cubicBezTo>
-                <a:cubicBezTo>
-                  <a:pt x="905" y="1099"/>
-                  <a:pt x="776" y="1193"/>
-                  <a:pt x="711" y="1335"/>
-                </a:cubicBezTo>
-                <a:close/>
-                <a:moveTo>
-                  <a:pt x="755" y="1805"/>
-                </a:moveTo>
-                <a:cubicBezTo>
-                  <a:pt x="1021" y="1596"/>
-                  <a:pt x="1021" y="1596"/>
-                  <a:pt x="1021" y="1596"/>
-                </a:cubicBezTo>
-                <a:cubicBezTo>
-                  <a:pt x="1007" y="1569"/>
-                  <a:pt x="1002" y="1538"/>
-                  <a:pt x="1008" y="1507"/>
-                </a:cubicBezTo>
-                <a:cubicBezTo>
-                  <a:pt x="693" y="1380"/>
-                  <a:pt x="693" y="1380"/>
-                  <a:pt x="693" y="1380"/>
-                </a:cubicBezTo>
-                <a:cubicBezTo>
-                  <a:pt x="642" y="1528"/>
-                  <a:pt x="670" y="1685"/>
-                  <a:pt x="755" y="1805"/>
-                </a:cubicBezTo>
-                <a:close/>
-                <a:moveTo>
-                  <a:pt x="1182" y="1998"/>
-                </a:moveTo>
-                <a:cubicBezTo>
-                  <a:pt x="1135" y="1669"/>
-                  <a:pt x="1135" y="1669"/>
-                  <a:pt x="1135" y="1669"/>
-                </a:cubicBezTo>
-                <a:cubicBezTo>
-                  <a:pt x="1120" y="1668"/>
-                  <a:pt x="1105" y="1665"/>
-                  <a:pt x="1090" y="1659"/>
-                </a:cubicBezTo>
-                <a:cubicBezTo>
-                  <a:pt x="1075" y="1653"/>
-                  <a:pt x="1062" y="1645"/>
-                  <a:pt x="1050" y="1634"/>
-                </a:cubicBezTo>
-                <a:cubicBezTo>
-                  <a:pt x="785" y="1842"/>
-                  <a:pt x="785" y="1842"/>
-                  <a:pt x="785" y="1842"/>
-                </a:cubicBezTo>
-                <a:cubicBezTo>
-                  <a:pt x="832" y="1895"/>
-                  <a:pt x="891" y="1938"/>
-                  <a:pt x="961" y="1966"/>
-                </a:cubicBezTo>
-                <a:cubicBezTo>
-                  <a:pt x="1033" y="1995"/>
-                  <a:pt x="1109" y="2005"/>
-                  <a:pt x="1182" y="1998"/>
-                </a:cubicBezTo>
-                <a:close/>
-                <a:moveTo>
-                  <a:pt x="1560" y="1728"/>
-                </a:moveTo>
-                <a:cubicBezTo>
-                  <a:pt x="1255" y="1606"/>
-                  <a:pt x="1255" y="1606"/>
-                  <a:pt x="1255" y="1606"/>
-                </a:cubicBezTo>
-                <a:cubicBezTo>
-                  <a:pt x="1237" y="1633"/>
-                  <a:pt x="1212" y="1652"/>
-                  <a:pt x="1183" y="1662"/>
-                </a:cubicBezTo>
-                <a:cubicBezTo>
-                  <a:pt x="1229" y="1990"/>
-                  <a:pt x="1229" y="1990"/>
-                  <a:pt x="1229" y="1990"/>
-                </a:cubicBezTo>
-                <a:cubicBezTo>
-                  <a:pt x="1371" y="1961"/>
-                  <a:pt x="1496" y="1867"/>
-                  <a:pt x="1560" y="1728"/>
-                </a:cubicBezTo>
-                <a:close/>
-                <a:moveTo>
-                  <a:pt x="1520" y="1266"/>
-                </a:moveTo>
-                <a:cubicBezTo>
-                  <a:pt x="1260" y="1470"/>
-                  <a:pt x="1260" y="1470"/>
-                  <a:pt x="1260" y="1470"/>
-                </a:cubicBezTo>
-                <a:cubicBezTo>
-                  <a:pt x="1274" y="1497"/>
-                  <a:pt x="1279" y="1529"/>
-                  <a:pt x="1272" y="1561"/>
-                </a:cubicBezTo>
-                <a:cubicBezTo>
-                  <a:pt x="1578" y="1683"/>
-                  <a:pt x="1578" y="1683"/>
-                  <a:pt x="1578" y="1683"/>
-                </a:cubicBezTo>
-                <a:cubicBezTo>
-                  <a:pt x="1628" y="1538"/>
-                  <a:pt x="1602" y="1384"/>
-                  <a:pt x="1520" y="1266"/>
-                </a:cubicBezTo>
-                <a:close/>
-              </a:path>
-            </a:pathLst>
-          </a:custGeom>
-          <a:solidFill>
-            <a:srgbClr val="FFFFFF"/>
-          </a:solidFill>
-          <a:ln>
-            <a:noFill/>
-          </a:ln>
-          <a:extLst>
-            <a:ext uri="{91240B29-F687-4F45-9708-019B960494DF}">
-              <a14:hiddenLine xmlns:a14="http://schemas.microsoft.com/office/drawing/2010/main" w="9525">
-                <a:solidFill>
-                  <a:srgbClr val="000000"/>
-                </a:solidFill>
-                <a:round/>
-                <a:headEnd/>
-                <a:tailEnd/>
-              </a14:hiddenLine>
-            </a:ext>
-          </a:extLst>
-        </p:spPr>
-        <p:txBody>
-          <a:bodyPr vert="horz" wrap="square" lIns="91440" tIns="45720" rIns="91440" bIns="45720" numCol="1" anchor="t" anchorCtr="0" compatLnSpc="1">
-            <a:prstTxWarp prst="textNoShape">
-              <a:avLst/>
-            </a:prstTxWarp>
-          </a:bodyPr>
-          <a:lstStyle/>
-          <a:p>
-            <a:endParaRPr lang="en-US"/>
           </a:p>
         </p:txBody>
       </p:sp>
@@ -38210,6 +35982,36 @@
           </a:p>
         </p:txBody>
       </p:sp>
+      <p:pic>
+        <p:nvPicPr>
+          <p:cNvPr id="3" name="Picture 2"/>
+          <p:cNvPicPr>
+            <a:picLocks noChangeAspect="1"/>
+          </p:cNvPicPr>
+          <p:nvPr/>
+        </p:nvPicPr>
+        <p:blipFill>
+          <a:blip r:embed="rId7" cstate="print">
+            <a:extLst>
+              <a:ext uri="{28A0092B-C50C-407E-A947-70E740481C1C}">
+                <a14:useLocalDpi xmlns:a14="http://schemas.microsoft.com/office/drawing/2010/main" val="0"/>
+              </a:ext>
+            </a:extLst>
+          </a:blip>
+          <a:stretch>
+            <a:fillRect/>
+          </a:stretch>
+        </p:blipFill>
+        <p:spPr>
+          <a:xfrm>
+            <a:off x="4457728" y="101600"/>
+            <a:ext cx="10598728" cy="6858000"/>
+          </a:xfrm>
+          <a:prstGeom prst="rect">
+            <a:avLst/>
+          </a:prstGeom>
+        </p:spPr>
+      </p:pic>
     </p:spTree>
     <p:extLst>
       <p:ext uri="{BB962C8B-B14F-4D97-AF65-F5344CB8AC3E}">
@@ -38596,9 +36398,9 @@
                                 </p:cTn>
                               </p:par>
                               <p:par>
-                                <p:cTn id="21" presetID="2" presetClass="entr" presetSubtype="2" decel="100000" fill="hold" grpId="0" nodeType="withEffect">
+                                <p:cTn id="21" presetID="2" presetClass="entr" presetSubtype="2" fill="hold" nodeType="withEffect">
                                   <p:stCondLst>
-                                    <p:cond delay="250"/>
+                                    <p:cond delay="0"/>
                                   </p:stCondLst>
                                   <p:childTnLst>
                                     <p:set>
@@ -38609,7 +36411,7 @@
                                           </p:stCondLst>
                                         </p:cTn>
                                         <p:tgtEl>
-                                          <p:spTgt spid="10"/>
+                                          <p:spTgt spid="3"/>
                                         </p:tgtEl>
                                         <p:attrNameLst>
                                           <p:attrName>style.visibility</p:attrName>
@@ -38623,7 +36425,7 @@
                                       <p:cBhvr additive="base">
                                         <p:cTn id="23" dur="500" fill="hold"/>
                                         <p:tgtEl>
-                                          <p:spTgt spid="10"/>
+                                          <p:spTgt spid="3"/>
                                         </p:tgtEl>
                                         <p:attrNameLst>
                                           <p:attrName>ppt_x</p:attrName>
@@ -38646,7 +36448,7 @@
                                       <p:cBhvr additive="base">
                                         <p:cTn id="24" dur="500" fill="hold"/>
                                         <p:tgtEl>
-                                          <p:spTgt spid="10"/>
+                                          <p:spTgt spid="3"/>
                                         </p:tgtEl>
                                         <p:attrNameLst>
                                           <p:attrName>ppt_y</p:attrName>
@@ -38696,7 +36498,6 @@
       </p:par>
     </p:tnLst>
     <p:bldLst>
-      <p:bldP spid="10" grpId="0" animBg="1"/>
       <p:bldP spid="5" grpId="0" uiExpand="1" build="p"/>
     </p:bldLst>
   </p:timing>
@@ -40098,26 +37899,6 @@
 </file>
 
 <file path=customXml/item1.xml><?xml version="1.0" encoding="utf-8"?>
-<p:properties xmlns:p="http://schemas.microsoft.com/office/2006/metadata/properties" xmlns:xsi="http://www.w3.org/2001/XMLSchema-instance" xmlns:pc="http://schemas.microsoft.com/office/infopath/2007/PartnerControls">
-  <documentManagement>
-    <TaxKeywordTaxHTField xmlns="230e9df3-be65-4c73-a93b-d1236ebd677e">
-      <Terms xmlns="http://schemas.microsoft.com/office/infopath/2007/PartnerControls"/>
-    </TaxKeywordTaxHTField>
-    <TaxCatchAll xmlns="230e9df3-be65-4c73-a93b-d1236ebd677e"/>
-  </documentManagement>
-</p:properties>
-</file>
-
-<file path=customXml/item2.xml><?xml version="1.0" encoding="utf-8"?>
-<?mso-contentType ?>
-<FormTemplates xmlns="http://schemas.microsoft.com/sharepoint/v3/contenttype/forms">
-  <Display>DocumentLibraryForm</Display>
-  <Edit>DocumentLibraryForm</Edit>
-  <New>DocumentLibraryForm</New>
-</FormTemplates>
-</file>
-
-<file path=customXml/item3.xml><?xml version="1.0" encoding="utf-8"?>
 <ct:contentTypeSchema xmlns:ct="http://schemas.microsoft.com/office/2006/metadata/contentType" xmlns:ma="http://schemas.microsoft.com/office/2006/metadata/properties/metaAttributes" ct:_="" ma:_="" ma:contentTypeName="Document" ma:contentTypeID="0x010100CA05B43BE68FE54B90DD26FDFB72BB05" ma:contentTypeVersion="0" ma:contentTypeDescription="Create a new document." ma:contentTypeScope="" ma:versionID="6df1bece345c1749bd9b91e82fa4a03a">
   <xsd:schema xmlns:xsd="http://www.w3.org/2001/XMLSchema" xmlns:xs="http://www.w3.org/2001/XMLSchema" xmlns:p="http://schemas.microsoft.com/office/2006/metadata/properties" xmlns:ns2="230e9df3-be65-4c73-a93b-d1236ebd677e" targetNamespace="http://schemas.microsoft.com/office/2006/metadata/properties" ma:root="true" ma:fieldsID="e317b0b832c9845d3aae3abd1bb0954e" ns2:_="">
     <xsd:import namespace="230e9df3-be65-4c73-a93b-d1236ebd677e"/>
@@ -40269,31 +38050,27 @@
 </ct:contentTypeSchema>
 </file>
 
-<file path=customXml/itemProps1.xml><?xml version="1.0" encoding="utf-8"?>
-<ds:datastoreItem xmlns:ds="http://schemas.openxmlformats.org/officeDocument/2006/customXml" ds:itemID="{69B2F97D-0457-4986-9734-D03EB073C5EA}">
-  <ds:schemaRefs>
-    <ds:schemaRef ds:uri="http://purl.org/dc/terms/"/>
-    <ds:schemaRef ds:uri="http://schemas.microsoft.com/office/2006/documentManagement/types"/>
-    <ds:schemaRef ds:uri="http://schemas.openxmlformats.org/package/2006/metadata/core-properties"/>
-    <ds:schemaRef ds:uri="http://purl.org/dc/elements/1.1/"/>
-    <ds:schemaRef ds:uri="http://schemas.microsoft.com/office/2006/metadata/properties"/>
-    <ds:schemaRef ds:uri="http://schemas.microsoft.com/office/infopath/2007/PartnerControls"/>
-    <ds:schemaRef ds:uri="230e9df3-be65-4c73-a93b-d1236ebd677e"/>
-    <ds:schemaRef ds:uri="http://www.w3.org/XML/1998/namespace"/>
-    <ds:schemaRef ds:uri="http://purl.org/dc/dcmitype/"/>
-  </ds:schemaRefs>
-</ds:datastoreItem>
+<file path=customXml/item2.xml><?xml version="1.0" encoding="utf-8"?>
+<?mso-contentType ?>
+<FormTemplates xmlns="http://schemas.microsoft.com/sharepoint/v3/contenttype/forms">
+  <Display>DocumentLibraryForm</Display>
+  <Edit>DocumentLibraryForm</Edit>
+  <New>DocumentLibraryForm</New>
+</FormTemplates>
 </file>
 
-<file path=customXml/itemProps2.xml><?xml version="1.0" encoding="utf-8"?>
-<ds:datastoreItem xmlns:ds="http://schemas.openxmlformats.org/officeDocument/2006/customXml" ds:itemID="{B882D8D6-9D38-4159-A398-AAC3689D3D7C}">
-  <ds:schemaRefs>
-    <ds:schemaRef ds:uri="http://schemas.microsoft.com/sharepoint/v3/contenttype/forms"/>
-  </ds:schemaRefs>
-</ds:datastoreItem>
+<file path=customXml/item3.xml><?xml version="1.0" encoding="utf-8"?>
+<p:properties xmlns:p="http://schemas.microsoft.com/office/2006/metadata/properties" xmlns:xsi="http://www.w3.org/2001/XMLSchema-instance" xmlns:pc="http://schemas.microsoft.com/office/infopath/2007/PartnerControls">
+  <documentManagement>
+    <TaxKeywordTaxHTField xmlns="230e9df3-be65-4c73-a93b-d1236ebd677e">
+      <Terms xmlns="http://schemas.microsoft.com/office/infopath/2007/PartnerControls"/>
+    </TaxKeywordTaxHTField>
+    <TaxCatchAll xmlns="230e9df3-be65-4c73-a93b-d1236ebd677e"/>
+  </documentManagement>
+</p:properties>
 </file>
 
-<file path=customXml/itemProps3.xml><?xml version="1.0" encoding="utf-8"?>
+<file path=customXml/itemProps1.xml><?xml version="1.0" encoding="utf-8"?>
 <ds:datastoreItem xmlns:ds="http://schemas.openxmlformats.org/officeDocument/2006/customXml" ds:itemID="{8F590144-748D-417B-8B69-088F107B0F98}">
   <ds:schemaRefs>
     <ds:schemaRef ds:uri="http://schemas.microsoft.com/office/2006/metadata/contentType"/>
@@ -40309,4 +38086,28 @@
     <ds:schemaRef ds:uri="http://schemas.microsoft.com/internal/obd"/>
   </ds:schemaRefs>
 </ds:datastoreItem>
+</file>
+
+<file path=customXml/itemProps2.xml><?xml version="1.0" encoding="utf-8"?>
+<ds:datastoreItem xmlns:ds="http://schemas.openxmlformats.org/officeDocument/2006/customXml" ds:itemID="{B882D8D6-9D38-4159-A398-AAC3689D3D7C}">
+  <ds:schemaRefs>
+    <ds:schemaRef ds:uri="http://schemas.microsoft.com/sharepoint/v3/contenttype/forms"/>
+  </ds:schemaRefs>
+</ds:datastoreItem>
+</file>
+
+<file path=customXml/itemProps3.xml><?xml version="1.0" encoding="utf-8"?>
+<ds:datastoreItem xmlns:ds="http://schemas.openxmlformats.org/officeDocument/2006/customXml" ds:itemID="{69B2F97D-0457-4986-9734-D03EB073C5EA}">
+  <ds:schemaRefs>
+    <ds:schemaRef ds:uri="http://purl.org/dc/terms/"/>
+    <ds:schemaRef ds:uri="http://schemas.microsoft.com/office/2006/documentManagement/types"/>
+    <ds:schemaRef ds:uri="http://schemas.openxmlformats.org/package/2006/metadata/core-properties"/>
+    <ds:schemaRef ds:uri="http://purl.org/dc/elements/1.1/"/>
+    <ds:schemaRef ds:uri="http://schemas.microsoft.com/office/2006/metadata/properties"/>
+    <ds:schemaRef ds:uri="http://schemas.microsoft.com/office/infopath/2007/PartnerControls"/>
+    <ds:schemaRef ds:uri="230e9df3-be65-4c73-a93b-d1236ebd677e"/>
+    <ds:schemaRef ds:uri="http://www.w3.org/XML/1998/namespace"/>
+    <ds:schemaRef ds:uri="http://purl.org/dc/dcmitype/"/>
+  </ds:schemaRefs>
+</ds:datastoreItem>
 </file>
</xml_diff>

<commit_message>
Added Azure signup screenshots, signup link
</commit_message>
<xml_diff>
--- a/WebCampsKeynote.pptx
+++ b/WebCampsKeynote.pptx
@@ -6,10 +6,10 @@
     <p:sldMasterId id="2147483779" r:id="rId5"/>
   </p:sldMasterIdLst>
   <p:notesMasterIdLst>
-    <p:notesMasterId r:id="rId19"/>
+    <p:notesMasterId r:id="rId27"/>
   </p:notesMasterIdLst>
   <p:handoutMasterIdLst>
-    <p:handoutMasterId r:id="rId20"/>
+    <p:handoutMasterId r:id="rId28"/>
   </p:handoutMasterIdLst>
   <p:sldIdLst>
     <p:sldId id="295" r:id="rId6"/>
@@ -21,41 +21,49 @@
     <p:sldId id="301" r:id="rId12"/>
     <p:sldId id="299" r:id="rId13"/>
     <p:sldId id="304" r:id="rId14"/>
-    <p:sldId id="305" r:id="rId15"/>
-    <p:sldId id="300" r:id="rId16"/>
-    <p:sldId id="291" r:id="rId17"/>
-    <p:sldId id="292" r:id="rId18"/>
+    <p:sldId id="313" r:id="rId15"/>
+    <p:sldId id="306" r:id="rId16"/>
+    <p:sldId id="307" r:id="rId17"/>
+    <p:sldId id="308" r:id="rId18"/>
+    <p:sldId id="309" r:id="rId19"/>
+    <p:sldId id="310" r:id="rId20"/>
+    <p:sldId id="311" r:id="rId21"/>
+    <p:sldId id="312" r:id="rId22"/>
+    <p:sldId id="305" r:id="rId23"/>
+    <p:sldId id="300" r:id="rId24"/>
+    <p:sldId id="291" r:id="rId25"/>
+    <p:sldId id="292" r:id="rId26"/>
   </p:sldIdLst>
   <p:sldSz cx="12188825" cy="6858000"/>
   <p:notesSz cx="6858000" cy="9296400"/>
   <p:embeddedFontLst>
     <p:embeddedFont>
       <p:font typeface="Consolas" panose="020B0609020204030204" pitchFamily="49" charset="0"/>
-      <p:regular r:id="rId21"/>
-      <p:bold r:id="rId22"/>
-      <p:italic r:id="rId23"/>
-      <p:boldItalic r:id="rId24"/>
-    </p:embeddedFont>
-    <p:embeddedFont>
-      <p:font typeface="Segoe Light" panose="020B0604020202020204" charset="0"/>
-      <p:regular r:id="rId25"/>
-      <p:italic r:id="rId26"/>
-    </p:embeddedFont>
-    <p:embeddedFont>
-      <p:font typeface="Segoe UI Light" panose="020B0502040204020203" pitchFamily="34" charset="0"/>
-      <p:regular r:id="rId27"/>
-      <p:italic r:id="rId28"/>
-    </p:embeddedFont>
-    <p:embeddedFont>
-      <p:font typeface="Segoe UI" panose="020B0502040204020203" pitchFamily="34" charset="0"/>
       <p:regular r:id="rId29"/>
       <p:bold r:id="rId30"/>
       <p:italic r:id="rId31"/>
       <p:boldItalic r:id="rId32"/>
     </p:embeddedFont>
+    <p:embeddedFont>
+      <p:font typeface="Segoe Light" panose="020B0604020202020204" charset="0"/>
+      <p:regular r:id="rId33"/>
+      <p:italic r:id="rId34"/>
+    </p:embeddedFont>
+    <p:embeddedFont>
+      <p:font typeface="Segoe UI" panose="020B0502040204020203" pitchFamily="34" charset="0"/>
+      <p:regular r:id="rId35"/>
+      <p:bold r:id="rId36"/>
+      <p:italic r:id="rId37"/>
+      <p:boldItalic r:id="rId38"/>
+    </p:embeddedFont>
+    <p:embeddedFont>
+      <p:font typeface="Segoe UI Light" panose="020B0502040204020203" pitchFamily="34" charset="0"/>
+      <p:regular r:id="rId39"/>
+      <p:italic r:id="rId40"/>
+    </p:embeddedFont>
   </p:embeddedFontLst>
   <p:custDataLst>
-    <p:tags r:id="rId33"/>
+    <p:tags r:id="rId41"/>
   </p:custDataLst>
   <p:defaultTextStyle>
     <a:defPPr>
@@ -10755,7 +10763,7 @@
               <a:rPr lang="en-US" smtClean="0">
                 <a:latin typeface="Segoe UI" pitchFamily="34" charset="0"/>
               </a:rPr>
-              <a:t>11/29/2012</a:t>
+              <a:t>12/4/2012</a:t>
             </a:fld>
             <a:endParaRPr lang="en-US" dirty="0">
               <a:latin typeface="Segoe UI" pitchFamily="34" charset="0"/>
@@ -10937,7 +10945,7 @@
             <a:fld id="{CAE3F082-F902-42D8-A765-720E172C3194}" type="datetimeFigureOut">
               <a:rPr lang="en-US" smtClean="0"/>
               <a:pPr/>
-              <a:t>11/29/2012</a:t>
+              <a:t>12/4/2012</a:t>
             </a:fld>
             <a:endParaRPr lang="en-US" dirty="0"/>
           </a:p>
@@ -11513,6 +11521,91 @@
           <a:bodyPr/>
           <a:lstStyle/>
           <a:p>
+            <a:endParaRPr lang="en-US"/>
+          </a:p>
+        </p:txBody>
+      </p:sp>
+      <p:sp>
+        <p:nvSpPr>
+          <p:cNvPr id="4" name="Slide Number Placeholder 3"/>
+          <p:cNvSpPr>
+            <a:spLocks noGrp="1"/>
+          </p:cNvSpPr>
+          <p:nvPr>
+            <p:ph type="sldNum" sz="quarter" idx="10"/>
+          </p:nvPr>
+        </p:nvSpPr>
+        <p:spPr/>
+        <p:txBody>
+          <a:bodyPr/>
+          <a:lstStyle/>
+          <a:p>
+            <a:fld id="{82AABF77-E2E4-44CA-BA5C-65E132CF08D8}" type="slidenum">
+              <a:rPr lang="en-US" smtClean="0"/>
+              <a:pPr/>
+              <a:t>18</a:t>
+            </a:fld>
+            <a:endParaRPr lang="en-US" dirty="0"/>
+          </a:p>
+        </p:txBody>
+      </p:sp>
+    </p:spTree>
+    <p:extLst>
+      <p:ext uri="{BB962C8B-B14F-4D97-AF65-F5344CB8AC3E}">
+        <p14:creationId xmlns:p14="http://schemas.microsoft.com/office/powerpoint/2010/main" val="566569752"/>
+      </p:ext>
+    </p:extLst>
+  </p:cSld>
+  <p:clrMapOvr>
+    <a:masterClrMapping/>
+  </p:clrMapOvr>
+</p:notes>
+</file>
+
+<file path=ppt/notesSlides/notesSlide11.xml><?xml version="1.0" encoding="utf-8"?>
+<p:notes xmlns:a="http://schemas.openxmlformats.org/drawingml/2006/main" xmlns:r="http://schemas.openxmlformats.org/officeDocument/2006/relationships" xmlns:p="http://schemas.openxmlformats.org/presentationml/2006/main">
+  <p:cSld>
+    <p:spTree>
+      <p:nvGrpSpPr>
+        <p:cNvPr id="1" name=""/>
+        <p:cNvGrpSpPr/>
+        <p:nvPr/>
+      </p:nvGrpSpPr>
+      <p:grpSpPr>
+        <a:xfrm>
+          <a:off x="0" y="0"/>
+          <a:ext cx="0" cy="0"/>
+          <a:chOff x="0" y="0"/>
+          <a:chExt cx="0" cy="0"/>
+        </a:xfrm>
+      </p:grpSpPr>
+      <p:sp>
+        <p:nvSpPr>
+          <p:cNvPr id="2" name="Slide Image Placeholder 1"/>
+          <p:cNvSpPr>
+            <a:spLocks noGrp="1" noRot="1" noChangeAspect="1"/>
+          </p:cNvSpPr>
+          <p:nvPr>
+            <p:ph type="sldImg"/>
+          </p:nvPr>
+        </p:nvSpPr>
+        <p:spPr/>
+      </p:sp>
+      <p:sp>
+        <p:nvSpPr>
+          <p:cNvPr id="3" name="Notes Placeholder 2"/>
+          <p:cNvSpPr>
+            <a:spLocks noGrp="1"/>
+          </p:cNvSpPr>
+          <p:nvPr>
+            <p:ph type="body" idx="1"/>
+          </p:nvPr>
+        </p:nvSpPr>
+        <p:spPr/>
+        <p:txBody>
+          <a:bodyPr/>
+          <a:lstStyle/>
+          <a:p>
             <a:r>
               <a:rPr lang="en-US" dirty="0" smtClean="0"/>
               <a:t>Note: Should add other key scenarios we won’t be covering </a:t>
@@ -11543,7 +11636,7 @@
             <a:fld id="{82AABF77-E2E4-44CA-BA5C-65E132CF08D8}" type="slidenum">
               <a:rPr lang="en-US" smtClean="0"/>
               <a:pPr/>
-              <a:t>11</a:t>
+              <a:t>19</a:t>
             </a:fld>
             <a:endParaRPr lang="en-US" dirty="0"/>
           </a:p>
@@ -11562,7 +11655,7 @@
 </p:notes>
 </file>
 
-<file path=ppt/notesSlides/notesSlide11.xml><?xml version="1.0" encoding="utf-8"?>
+<file path=ppt/notesSlides/notesSlide12.xml><?xml version="1.0" encoding="utf-8"?>
 <p:notes xmlns:a="http://schemas.openxmlformats.org/drawingml/2006/main" xmlns:r="http://schemas.openxmlformats.org/officeDocument/2006/relationships" xmlns:p="http://schemas.openxmlformats.org/presentationml/2006/main">
   <p:cSld>
     <p:spTree>
@@ -11628,7 +11721,7 @@
             <a:fld id="{82AABF77-E2E4-44CA-BA5C-65E132CF08D8}" type="slidenum">
               <a:rPr lang="en-US" smtClean="0"/>
               <a:pPr/>
-              <a:t>12</a:t>
+              <a:t>20</a:t>
             </a:fld>
             <a:endParaRPr lang="en-US" dirty="0"/>
           </a:p>
@@ -11647,7 +11740,7 @@
 </p:notes>
 </file>
 
-<file path=ppt/notesSlides/notesSlide12.xml><?xml version="1.0" encoding="utf-8"?>
+<file path=ppt/notesSlides/notesSlide13.xml><?xml version="1.0" encoding="utf-8"?>
 <p:notes xmlns:a="http://schemas.openxmlformats.org/drawingml/2006/main" xmlns:r="http://schemas.openxmlformats.org/officeDocument/2006/relationships" xmlns:p="http://schemas.openxmlformats.org/presentationml/2006/main">
   <p:cSld>
     <p:spTree>
@@ -11717,7 +11810,7 @@
           <a:p>
             <a:fld id="{82AABF77-E2E4-44CA-BA5C-65E132CF08D8}" type="slidenum">
               <a:rPr lang="en-US" smtClean="0"/>
-              <a:t>13</a:t>
+              <a:t>21</a:t>
             </a:fld>
             <a:endParaRPr lang="en-US" dirty="0"/>
           </a:p>
@@ -12475,7 +12568,11 @@
           <a:bodyPr/>
           <a:lstStyle/>
           <a:p>
-            <a:endParaRPr lang="en-US"/>
+            <a:r>
+              <a:rPr lang="en-US" dirty="0" smtClean="0"/>
+              <a:t>http://aka.ms/webcamps-azure</a:t>
+            </a:r>
+            <a:endParaRPr lang="en-US" dirty="0"/>
           </a:p>
         </p:txBody>
       </p:sp>
@@ -12497,7 +12594,7 @@
             <a:fld id="{82AABF77-E2E4-44CA-BA5C-65E132CF08D8}" type="slidenum">
               <a:rPr lang="en-US" smtClean="0"/>
               <a:pPr/>
-              <a:t>10</a:t>
+              <a:t>9</a:t>
             </a:fld>
             <a:endParaRPr lang="en-US" dirty="0"/>
           </a:p>
@@ -12506,7 +12603,7 @@
     </p:spTree>
     <p:extLst>
       <p:ext uri="{BB962C8B-B14F-4D97-AF65-F5344CB8AC3E}">
-        <p14:creationId xmlns:p14="http://schemas.microsoft.com/office/powerpoint/2010/main" val="566569752"/>
+        <p14:creationId xmlns:p14="http://schemas.microsoft.com/office/powerpoint/2010/main" val="3077432855"/>
       </p:ext>
     </p:extLst>
   </p:cSld>
@@ -25476,6 +25573,558 @@
           <a:chExt cx="0" cy="0"/>
         </a:xfrm>
       </p:grpSpPr>
+      <p:pic>
+        <p:nvPicPr>
+          <p:cNvPr id="5" name="Picture 4" descr="Purchase Options - Pricing - Windows Azure - Windows Internet Explorer - [InPrivate]"/>
+          <p:cNvPicPr>
+            <a:picLocks noChangeAspect="1"/>
+          </p:cNvPicPr>
+          <p:nvPr/>
+        </p:nvPicPr>
+        <p:blipFill rotWithShape="1">
+          <a:blip r:embed="rId2">
+            <a:extLst>
+              <a:ext uri="{28A0092B-C50C-407E-A947-70E740481C1C}">
+                <a14:useLocalDpi xmlns:a14="http://schemas.microsoft.com/office/drawing/2010/main" val="0"/>
+              </a:ext>
+            </a:extLst>
+          </a:blip>
+          <a:srcRect l="1289" t="1779" r="15486" b="12158"/>
+          <a:stretch/>
+        </p:blipFill>
+        <p:spPr>
+          <a:xfrm>
+            <a:off x="0" y="0"/>
+            <a:ext cx="12234121" cy="6858000"/>
+          </a:xfrm>
+          <a:prstGeom prst="rect">
+            <a:avLst/>
+          </a:prstGeom>
+        </p:spPr>
+      </p:pic>
+    </p:spTree>
+    <p:extLst>
+      <p:ext uri="{BB962C8B-B14F-4D97-AF65-F5344CB8AC3E}">
+        <p14:creationId xmlns:p14="http://schemas.microsoft.com/office/powerpoint/2010/main" val="2170224061"/>
+      </p:ext>
+    </p:extLst>
+  </p:cSld>
+  <p:clrMapOvr>
+    <a:masterClrMapping/>
+  </p:clrMapOvr>
+  <p:transition>
+    <p:fade/>
+  </p:transition>
+</p:sld>
+</file>
+
+<file path=ppt/slides/slide11.xml><?xml version="1.0" encoding="utf-8"?>
+<p:sld xmlns:a="http://schemas.openxmlformats.org/drawingml/2006/main" xmlns:r="http://schemas.openxmlformats.org/officeDocument/2006/relationships" xmlns:p="http://schemas.openxmlformats.org/presentationml/2006/main">
+  <p:cSld>
+    <p:spTree>
+      <p:nvGrpSpPr>
+        <p:cNvPr id="1" name=""/>
+        <p:cNvGrpSpPr/>
+        <p:nvPr/>
+      </p:nvGrpSpPr>
+      <p:grpSpPr>
+        <a:xfrm>
+          <a:off x="0" y="0"/>
+          <a:ext cx="0" cy="0"/>
+          <a:chOff x="0" y="0"/>
+          <a:chExt cx="0" cy="0"/>
+        </a:xfrm>
+      </p:grpSpPr>
+      <p:pic>
+        <p:nvPicPr>
+          <p:cNvPr id="2" name="Picture 1" descr="Windows Azure Free Trial: Try Windows Azure | Azure Free Trial - Windows Internet Explorer - [InPrivate]"/>
+          <p:cNvPicPr>
+            <a:picLocks noChangeAspect="1"/>
+          </p:cNvPicPr>
+          <p:nvPr/>
+        </p:nvPicPr>
+        <p:blipFill>
+          <a:blip r:embed="rId2">
+            <a:extLst>
+              <a:ext uri="{28A0092B-C50C-407E-A947-70E740481C1C}">
+                <a14:useLocalDpi xmlns:a14="http://schemas.microsoft.com/office/drawing/2010/main" val="0"/>
+              </a:ext>
+            </a:extLst>
+          </a:blip>
+          <a:stretch>
+            <a:fillRect/>
+          </a:stretch>
+        </p:blipFill>
+        <p:spPr>
+          <a:xfrm>
+            <a:off x="0" y="125345"/>
+            <a:ext cx="12188825" cy="6607309"/>
+          </a:xfrm>
+          <a:prstGeom prst="rect">
+            <a:avLst/>
+          </a:prstGeom>
+        </p:spPr>
+      </p:pic>
+    </p:spTree>
+    <p:extLst>
+      <p:ext uri="{BB962C8B-B14F-4D97-AF65-F5344CB8AC3E}">
+        <p14:creationId xmlns:p14="http://schemas.microsoft.com/office/powerpoint/2010/main" val="4116520502"/>
+      </p:ext>
+    </p:extLst>
+  </p:cSld>
+  <p:clrMapOvr>
+    <a:masterClrMapping/>
+  </p:clrMapOvr>
+  <p:transition>
+    <p:fade/>
+  </p:transition>
+  <p:timing>
+    <p:tnLst>
+      <p:par>
+        <p:cTn id="1" dur="indefinite" restart="never" nodeType="tmRoot"/>
+      </p:par>
+    </p:tnLst>
+  </p:timing>
+</p:sld>
+</file>
+
+<file path=ppt/slides/slide12.xml><?xml version="1.0" encoding="utf-8"?>
+<p:sld xmlns:a="http://schemas.openxmlformats.org/drawingml/2006/main" xmlns:r="http://schemas.openxmlformats.org/officeDocument/2006/relationships" xmlns:p="http://schemas.openxmlformats.org/presentationml/2006/main">
+  <p:cSld>
+    <p:spTree>
+      <p:nvGrpSpPr>
+        <p:cNvPr id="1" name=""/>
+        <p:cNvGrpSpPr/>
+        <p:nvPr/>
+      </p:nvGrpSpPr>
+      <p:grpSpPr>
+        <a:xfrm>
+          <a:off x="0" y="0"/>
+          <a:ext cx="0" cy="0"/>
+          <a:chOff x="0" y="0"/>
+          <a:chExt cx="0" cy="0"/>
+        </a:xfrm>
+      </p:grpSpPr>
+      <p:pic>
+        <p:nvPicPr>
+          <p:cNvPr id="2" name="Picture 1" descr="Windows Azure - Windows Internet Explorer - [InPrivate]"/>
+          <p:cNvPicPr>
+            <a:picLocks noChangeAspect="1"/>
+          </p:cNvPicPr>
+          <p:nvPr/>
+        </p:nvPicPr>
+        <p:blipFill>
+          <a:blip r:embed="rId2">
+            <a:extLst>
+              <a:ext uri="{28A0092B-C50C-407E-A947-70E740481C1C}">
+                <a14:useLocalDpi xmlns:a14="http://schemas.microsoft.com/office/drawing/2010/main" val="0"/>
+              </a:ext>
+            </a:extLst>
+          </a:blip>
+          <a:stretch>
+            <a:fillRect/>
+          </a:stretch>
+        </p:blipFill>
+        <p:spPr>
+          <a:xfrm>
+            <a:off x="0" y="125345"/>
+            <a:ext cx="12188825" cy="6607309"/>
+          </a:xfrm>
+          <a:prstGeom prst="rect">
+            <a:avLst/>
+          </a:prstGeom>
+        </p:spPr>
+      </p:pic>
+    </p:spTree>
+    <p:extLst>
+      <p:ext uri="{BB962C8B-B14F-4D97-AF65-F5344CB8AC3E}">
+        <p14:creationId xmlns:p14="http://schemas.microsoft.com/office/powerpoint/2010/main" val="1743761090"/>
+      </p:ext>
+    </p:extLst>
+  </p:cSld>
+  <p:clrMapOvr>
+    <a:masterClrMapping/>
+  </p:clrMapOvr>
+  <p:transition>
+    <p:fade/>
+  </p:transition>
+  <p:timing>
+    <p:tnLst>
+      <p:par>
+        <p:cTn id="1" dur="indefinite" restart="never" nodeType="tmRoot"/>
+      </p:par>
+    </p:tnLst>
+  </p:timing>
+</p:sld>
+</file>
+
+<file path=ppt/slides/slide13.xml><?xml version="1.0" encoding="utf-8"?>
+<p:sld xmlns:a="http://schemas.openxmlformats.org/drawingml/2006/main" xmlns:r="http://schemas.openxmlformats.org/officeDocument/2006/relationships" xmlns:p="http://schemas.openxmlformats.org/presentationml/2006/main">
+  <p:cSld>
+    <p:spTree>
+      <p:nvGrpSpPr>
+        <p:cNvPr id="1" name=""/>
+        <p:cNvGrpSpPr/>
+        <p:nvPr/>
+      </p:nvGrpSpPr>
+      <p:grpSpPr>
+        <a:xfrm>
+          <a:off x="0" y="0"/>
+          <a:ext cx="0" cy="0"/>
+          <a:chOff x="0" y="0"/>
+          <a:chExt cx="0" cy="0"/>
+        </a:xfrm>
+      </p:grpSpPr>
+      <p:pic>
+        <p:nvPicPr>
+          <p:cNvPr id="2" name="Picture 1" descr="Windows Azure - Windows Internet Explorer - [InPrivate]"/>
+          <p:cNvPicPr>
+            <a:picLocks noChangeAspect="1"/>
+          </p:cNvPicPr>
+          <p:nvPr/>
+        </p:nvPicPr>
+        <p:blipFill>
+          <a:blip r:embed="rId2">
+            <a:extLst>
+              <a:ext uri="{28A0092B-C50C-407E-A947-70E740481C1C}">
+                <a14:useLocalDpi xmlns:a14="http://schemas.microsoft.com/office/drawing/2010/main" val="0"/>
+              </a:ext>
+            </a:extLst>
+          </a:blip>
+          <a:stretch>
+            <a:fillRect/>
+          </a:stretch>
+        </p:blipFill>
+        <p:spPr>
+          <a:xfrm>
+            <a:off x="0" y="125345"/>
+            <a:ext cx="12188825" cy="6607309"/>
+          </a:xfrm>
+          <a:prstGeom prst="rect">
+            <a:avLst/>
+          </a:prstGeom>
+        </p:spPr>
+      </p:pic>
+    </p:spTree>
+    <p:extLst>
+      <p:ext uri="{BB962C8B-B14F-4D97-AF65-F5344CB8AC3E}">
+        <p14:creationId xmlns:p14="http://schemas.microsoft.com/office/powerpoint/2010/main" val="3347022352"/>
+      </p:ext>
+    </p:extLst>
+  </p:cSld>
+  <p:clrMapOvr>
+    <a:masterClrMapping/>
+  </p:clrMapOvr>
+  <p:transition>
+    <p:fade/>
+  </p:transition>
+  <p:timing>
+    <p:tnLst>
+      <p:par>
+        <p:cTn id="1" dur="indefinite" restart="never" nodeType="tmRoot"/>
+      </p:par>
+    </p:tnLst>
+  </p:timing>
+</p:sld>
+</file>
+
+<file path=ppt/slides/slide14.xml><?xml version="1.0" encoding="utf-8"?>
+<p:sld xmlns:a="http://schemas.openxmlformats.org/drawingml/2006/main" xmlns:r="http://schemas.openxmlformats.org/officeDocument/2006/relationships" xmlns:p="http://schemas.openxmlformats.org/presentationml/2006/main">
+  <p:cSld>
+    <p:spTree>
+      <p:nvGrpSpPr>
+        <p:cNvPr id="1" name=""/>
+        <p:cNvGrpSpPr/>
+        <p:nvPr/>
+      </p:nvGrpSpPr>
+      <p:grpSpPr>
+        <a:xfrm>
+          <a:off x="0" y="0"/>
+          <a:ext cx="0" cy="0"/>
+          <a:chOff x="0" y="0"/>
+          <a:chExt cx="0" cy="0"/>
+        </a:xfrm>
+      </p:grpSpPr>
+      <p:pic>
+        <p:nvPicPr>
+          <p:cNvPr id="2" name="Picture 1" descr="Windows Azure - Windows Internet Explorer - [InPrivate]"/>
+          <p:cNvPicPr>
+            <a:picLocks noChangeAspect="1"/>
+          </p:cNvPicPr>
+          <p:nvPr/>
+        </p:nvPicPr>
+        <p:blipFill>
+          <a:blip r:embed="rId2">
+            <a:extLst>
+              <a:ext uri="{28A0092B-C50C-407E-A947-70E740481C1C}">
+                <a14:useLocalDpi xmlns:a14="http://schemas.microsoft.com/office/drawing/2010/main" val="0"/>
+              </a:ext>
+            </a:extLst>
+          </a:blip>
+          <a:stretch>
+            <a:fillRect/>
+          </a:stretch>
+        </p:blipFill>
+        <p:spPr>
+          <a:xfrm>
+            <a:off x="0" y="125345"/>
+            <a:ext cx="12188825" cy="6607309"/>
+          </a:xfrm>
+          <a:prstGeom prst="rect">
+            <a:avLst/>
+          </a:prstGeom>
+        </p:spPr>
+      </p:pic>
+    </p:spTree>
+    <p:extLst>
+      <p:ext uri="{BB962C8B-B14F-4D97-AF65-F5344CB8AC3E}">
+        <p14:creationId xmlns:p14="http://schemas.microsoft.com/office/powerpoint/2010/main" val="4074490708"/>
+      </p:ext>
+    </p:extLst>
+  </p:cSld>
+  <p:clrMapOvr>
+    <a:masterClrMapping/>
+  </p:clrMapOvr>
+  <p:transition>
+    <p:fade/>
+  </p:transition>
+  <p:timing>
+    <p:tnLst>
+      <p:par>
+        <p:cTn id="1" dur="indefinite" restart="never" nodeType="tmRoot"/>
+      </p:par>
+    </p:tnLst>
+  </p:timing>
+</p:sld>
+</file>
+
+<file path=ppt/slides/slide15.xml><?xml version="1.0" encoding="utf-8"?>
+<p:sld xmlns:a="http://schemas.openxmlformats.org/drawingml/2006/main" xmlns:r="http://schemas.openxmlformats.org/officeDocument/2006/relationships" xmlns:p="http://schemas.openxmlformats.org/presentationml/2006/main">
+  <p:cSld>
+    <p:spTree>
+      <p:nvGrpSpPr>
+        <p:cNvPr id="1" name=""/>
+        <p:cNvGrpSpPr/>
+        <p:nvPr/>
+      </p:nvGrpSpPr>
+      <p:grpSpPr>
+        <a:xfrm>
+          <a:off x="0" y="0"/>
+          <a:ext cx="0" cy="0"/>
+          <a:chOff x="0" y="0"/>
+          <a:chExt cx="0" cy="0"/>
+        </a:xfrm>
+      </p:grpSpPr>
+      <p:pic>
+        <p:nvPicPr>
+          <p:cNvPr id="2" name="Picture 1" descr="Windows Azure - Windows Internet Explorer - [InPrivate]"/>
+          <p:cNvPicPr>
+            <a:picLocks noChangeAspect="1"/>
+          </p:cNvPicPr>
+          <p:nvPr/>
+        </p:nvPicPr>
+        <p:blipFill>
+          <a:blip r:embed="rId2">
+            <a:extLst>
+              <a:ext uri="{28A0092B-C50C-407E-A947-70E740481C1C}">
+                <a14:useLocalDpi xmlns:a14="http://schemas.microsoft.com/office/drawing/2010/main" val="0"/>
+              </a:ext>
+            </a:extLst>
+          </a:blip>
+          <a:stretch>
+            <a:fillRect/>
+          </a:stretch>
+        </p:blipFill>
+        <p:spPr>
+          <a:xfrm>
+            <a:off x="0" y="125345"/>
+            <a:ext cx="12188825" cy="6607309"/>
+          </a:xfrm>
+          <a:prstGeom prst="rect">
+            <a:avLst/>
+          </a:prstGeom>
+        </p:spPr>
+      </p:pic>
+    </p:spTree>
+    <p:extLst>
+      <p:ext uri="{BB962C8B-B14F-4D97-AF65-F5344CB8AC3E}">
+        <p14:creationId xmlns:p14="http://schemas.microsoft.com/office/powerpoint/2010/main" val="418067639"/>
+      </p:ext>
+    </p:extLst>
+  </p:cSld>
+  <p:clrMapOvr>
+    <a:masterClrMapping/>
+  </p:clrMapOvr>
+  <p:transition>
+    <p:fade/>
+  </p:transition>
+  <p:timing>
+    <p:tnLst>
+      <p:par>
+        <p:cTn id="1" dur="indefinite" restart="never" nodeType="tmRoot"/>
+      </p:par>
+    </p:tnLst>
+  </p:timing>
+</p:sld>
+</file>
+
+<file path=ppt/slides/slide16.xml><?xml version="1.0" encoding="utf-8"?>
+<p:sld xmlns:a="http://schemas.openxmlformats.org/drawingml/2006/main" xmlns:r="http://schemas.openxmlformats.org/officeDocument/2006/relationships" xmlns:p="http://schemas.openxmlformats.org/presentationml/2006/main">
+  <p:cSld>
+    <p:spTree>
+      <p:nvGrpSpPr>
+        <p:cNvPr id="1" name=""/>
+        <p:cNvGrpSpPr/>
+        <p:nvPr/>
+      </p:nvGrpSpPr>
+      <p:grpSpPr>
+        <a:xfrm>
+          <a:off x="0" y="0"/>
+          <a:ext cx="0" cy="0"/>
+          <a:chOff x="0" y="0"/>
+          <a:chExt cx="0" cy="0"/>
+        </a:xfrm>
+      </p:grpSpPr>
+      <p:pic>
+        <p:nvPicPr>
+          <p:cNvPr id="2" name="Picture 1" descr="Windows Azure - Windows Internet Explorer - [InPrivate]"/>
+          <p:cNvPicPr>
+            <a:picLocks noChangeAspect="1"/>
+          </p:cNvPicPr>
+          <p:nvPr/>
+        </p:nvPicPr>
+        <p:blipFill>
+          <a:blip r:embed="rId2">
+            <a:extLst>
+              <a:ext uri="{28A0092B-C50C-407E-A947-70E740481C1C}">
+                <a14:useLocalDpi xmlns:a14="http://schemas.microsoft.com/office/drawing/2010/main" val="0"/>
+              </a:ext>
+            </a:extLst>
+          </a:blip>
+          <a:stretch>
+            <a:fillRect/>
+          </a:stretch>
+        </p:blipFill>
+        <p:spPr>
+          <a:xfrm>
+            <a:off x="0" y="125345"/>
+            <a:ext cx="12188825" cy="6607309"/>
+          </a:xfrm>
+          <a:prstGeom prst="rect">
+            <a:avLst/>
+          </a:prstGeom>
+        </p:spPr>
+      </p:pic>
+    </p:spTree>
+    <p:extLst>
+      <p:ext uri="{BB962C8B-B14F-4D97-AF65-F5344CB8AC3E}">
+        <p14:creationId xmlns:p14="http://schemas.microsoft.com/office/powerpoint/2010/main" val="416633698"/>
+      </p:ext>
+    </p:extLst>
+  </p:cSld>
+  <p:clrMapOvr>
+    <a:masterClrMapping/>
+  </p:clrMapOvr>
+  <p:transition>
+    <p:fade/>
+  </p:transition>
+  <p:timing>
+    <p:tnLst>
+      <p:par>
+        <p:cTn id="1" dur="indefinite" restart="never" nodeType="tmRoot"/>
+      </p:par>
+    </p:tnLst>
+  </p:timing>
+</p:sld>
+</file>
+
+<file path=ppt/slides/slide17.xml><?xml version="1.0" encoding="utf-8"?>
+<p:sld xmlns:a="http://schemas.openxmlformats.org/drawingml/2006/main" xmlns:r="http://schemas.openxmlformats.org/officeDocument/2006/relationships" xmlns:p="http://schemas.openxmlformats.org/presentationml/2006/main">
+  <p:cSld>
+    <p:spTree>
+      <p:nvGrpSpPr>
+        <p:cNvPr id="1" name=""/>
+        <p:cNvGrpSpPr/>
+        <p:nvPr/>
+      </p:nvGrpSpPr>
+      <p:grpSpPr>
+        <a:xfrm>
+          <a:off x="0" y="0"/>
+          <a:ext cx="0" cy="0"/>
+          <a:chOff x="0" y="0"/>
+          <a:chExt cx="0" cy="0"/>
+        </a:xfrm>
+      </p:grpSpPr>
+      <p:pic>
+        <p:nvPicPr>
+          <p:cNvPr id="2" name="Picture 1" descr="Windows Azure - Windows Internet Explorer - [InPrivate]"/>
+          <p:cNvPicPr>
+            <a:picLocks noChangeAspect="1"/>
+          </p:cNvPicPr>
+          <p:nvPr/>
+        </p:nvPicPr>
+        <p:blipFill>
+          <a:blip r:embed="rId2">
+            <a:extLst>
+              <a:ext uri="{28A0092B-C50C-407E-A947-70E740481C1C}">
+                <a14:useLocalDpi xmlns:a14="http://schemas.microsoft.com/office/drawing/2010/main" val="0"/>
+              </a:ext>
+            </a:extLst>
+          </a:blip>
+          <a:stretch>
+            <a:fillRect/>
+          </a:stretch>
+        </p:blipFill>
+        <p:spPr>
+          <a:xfrm>
+            <a:off x="0" y="125345"/>
+            <a:ext cx="12188825" cy="6607309"/>
+          </a:xfrm>
+          <a:prstGeom prst="rect">
+            <a:avLst/>
+          </a:prstGeom>
+        </p:spPr>
+      </p:pic>
+    </p:spTree>
+    <p:extLst>
+      <p:ext uri="{BB962C8B-B14F-4D97-AF65-F5344CB8AC3E}">
+        <p14:creationId xmlns:p14="http://schemas.microsoft.com/office/powerpoint/2010/main" val="3930209509"/>
+      </p:ext>
+    </p:extLst>
+  </p:cSld>
+  <p:clrMapOvr>
+    <a:masterClrMapping/>
+  </p:clrMapOvr>
+  <p:transition>
+    <p:fade/>
+  </p:transition>
+  <p:timing>
+    <p:tnLst>
+      <p:par>
+        <p:cTn id="1" dur="indefinite" restart="never" nodeType="tmRoot"/>
+      </p:par>
+    </p:tnLst>
+  </p:timing>
+</p:sld>
+</file>
+
+<file path=ppt/slides/slide18.xml><?xml version="1.0" encoding="utf-8"?>
+<p:sld xmlns:a="http://schemas.openxmlformats.org/drawingml/2006/main" xmlns:r="http://schemas.openxmlformats.org/officeDocument/2006/relationships" xmlns:p="http://schemas.openxmlformats.org/presentationml/2006/main">
+  <p:cSld>
+    <p:spTree>
+      <p:nvGrpSpPr>
+        <p:cNvPr id="1" name=""/>
+        <p:cNvGrpSpPr/>
+        <p:nvPr/>
+      </p:nvGrpSpPr>
+      <p:grpSpPr>
+        <a:xfrm>
+          <a:off x="0" y="0"/>
+          <a:ext cx="0" cy="0"/>
+          <a:chOff x="0" y="0"/>
+          <a:chExt cx="0" cy="0"/>
+        </a:xfrm>
+      </p:grpSpPr>
       <p:graphicFrame>
         <p:nvGraphicFramePr>
           <p:cNvPr id="2" name="Object 1" hidden="1"/>
@@ -25497,7 +26146,7 @@
           <a:graphicData uri="http://schemas.openxmlformats.org/presentationml/2006/ole">
             <mc:AlternateContent xmlns:mc="http://schemas.openxmlformats.org/markup-compatibility/2006">
               <mc:Choice xmlns:v="urn:schemas-microsoft-com:vml" Requires="v">
-                <p:oleObj spid="_x0000_s67593" name="think-cell Slide" r:id="rId5" imgW="270" imgH="270" progId="TCLayout.ActiveDocument.1">
+                <p:oleObj spid="_x0000_s67599" name="think-cell Slide" r:id="rId5" imgW="270" imgH="270" progId="TCLayout.ActiveDocument.1">
                   <p:embed/>
                 </p:oleObj>
               </mc:Choice>
@@ -27241,7 +27890,7 @@
 </p:sld>
 </file>
 
-<file path=ppt/slides/slide11.xml><?xml version="1.0" encoding="utf-8"?>
+<file path=ppt/slides/slide19.xml><?xml version="1.0" encoding="utf-8"?>
 <p:sld xmlns:a="http://schemas.openxmlformats.org/drawingml/2006/main" xmlns:r="http://schemas.openxmlformats.org/officeDocument/2006/relationships" xmlns:p="http://schemas.openxmlformats.org/presentationml/2006/main">
   <p:cSld>
     <p:spTree>
@@ -27283,7 +27932,7 @@
           <a:graphicData uri="http://schemas.openxmlformats.org/presentationml/2006/ole">
             <mc:AlternateContent xmlns:mc="http://schemas.openxmlformats.org/markup-compatibility/2006">
               <mc:Choice xmlns:v="urn:schemas-microsoft-com:vml" Requires="v">
-                <p:oleObj spid="_x0000_s65561" name="think-cell Slide" r:id="rId5" imgW="270" imgH="270" progId="TCLayout.ActiveDocument.1">
+                <p:oleObj spid="_x0000_s65567" name="think-cell Slide" r:id="rId5" imgW="270" imgH="270" progId="TCLayout.ActiveDocument.1">
                   <p:embed/>
                 </p:oleObj>
               </mc:Choice>
@@ -29293,582 +29942,6 @@
 </p:sld>
 </file>
 
-<file path=ppt/slides/slide12.xml><?xml version="1.0" encoding="utf-8"?>
-<p:sld xmlns:a="http://schemas.openxmlformats.org/drawingml/2006/main" xmlns:r="http://schemas.openxmlformats.org/officeDocument/2006/relationships" xmlns:p="http://schemas.openxmlformats.org/presentationml/2006/main">
-  <p:cSld>
-    <p:spTree>
-      <p:nvGrpSpPr>
-        <p:cNvPr id="1" name=""/>
-        <p:cNvGrpSpPr/>
-        <p:nvPr/>
-      </p:nvGrpSpPr>
-      <p:grpSpPr>
-        <a:xfrm>
-          <a:off x="0" y="0"/>
-          <a:ext cx="0" cy="0"/>
-          <a:chOff x="0" y="0"/>
-          <a:chExt cx="0" cy="0"/>
-        </a:xfrm>
-      </p:grpSpPr>
-      <p:graphicFrame>
-        <p:nvGraphicFramePr>
-          <p:cNvPr id="2" name="Object 1" hidden="1"/>
-          <p:cNvGraphicFramePr>
-            <a:graphicFrameLocks noChangeAspect="1"/>
-          </p:cNvGraphicFramePr>
-          <p:nvPr>
-            <p:custDataLst>
-              <p:tags r:id="rId2"/>
-            </p:custDataLst>
-            <p:extLst>
-              <p:ext uri="{D42A27DB-BD31-4B8C-83A1-F6EECF244321}">
-                <p14:modId xmlns:p14="http://schemas.microsoft.com/office/powerpoint/2010/main" val="321265224"/>
-              </p:ext>
-            </p:extLst>
-          </p:nvPr>
-        </p:nvGraphicFramePr>
-        <p:xfrm>
-          <a:off x="0" y="0"/>
-          <a:ext cx="158750" cy="158750"/>
-        </p:xfrm>
-        <a:graphic>
-          <a:graphicData uri="http://schemas.openxmlformats.org/presentationml/2006/ole">
-            <mc:AlternateContent xmlns:mc="http://schemas.openxmlformats.org/markup-compatibility/2006">
-              <mc:Choice xmlns:v="urn:schemas-microsoft-com:vml" Requires="v">
-                <p:oleObj spid="_x0000_s57423" name="think-cell Slide" r:id="rId6" imgW="270" imgH="270" progId="TCLayout.ActiveDocument.1">
-                  <p:embed/>
-                </p:oleObj>
-              </mc:Choice>
-              <mc:Fallback>
-                <p:oleObj name="think-cell Slide" r:id="rId6" imgW="270" imgH="270" progId="TCLayout.ActiveDocument.1">
-                  <p:embed/>
-                  <p:pic>
-                    <p:nvPicPr>
-                      <p:cNvPr id="0" name=""/>
-                      <p:cNvPicPr/>
-                      <p:nvPr/>
-                    </p:nvPicPr>
-                    <p:blipFill>
-                      <a:blip r:embed="rId7"/>
-                      <a:stretch>
-                        <a:fillRect/>
-                      </a:stretch>
-                    </p:blipFill>
-                    <p:spPr>
-                      <a:xfrm>
-                        <a:off x="0" y="0"/>
-                        <a:ext cx="158750" cy="158750"/>
-                      </a:xfrm>
-                      <a:prstGeom prst="rect">
-                        <a:avLst/>
-                      </a:prstGeom>
-                    </p:spPr>
-                  </p:pic>
-                </p:oleObj>
-              </mc:Fallback>
-            </mc:AlternateContent>
-          </a:graphicData>
-        </a:graphic>
-      </p:graphicFrame>
-      <p:sp>
-        <p:nvSpPr>
-          <p:cNvPr id="5" name="Title 4"/>
-          <p:cNvSpPr>
-            <a:spLocks noGrp="1"/>
-          </p:cNvSpPr>
-          <p:nvPr>
-            <p:ph type="title"/>
-          </p:nvPr>
-        </p:nvSpPr>
-        <p:spPr/>
-        <p:txBody>
-          <a:bodyPr/>
-          <a:lstStyle/>
-          <a:p>
-            <a:r>
-              <a:rPr lang="en-US" smtClean="0"/>
-              <a:t>Resources</a:t>
-            </a:r>
-            <a:endParaRPr lang="en-US" dirty="0"/>
-          </a:p>
-        </p:txBody>
-      </p:sp>
-      <p:sp>
-        <p:nvSpPr>
-          <p:cNvPr id="3" name="Text Placeholder 2"/>
-          <p:cNvSpPr>
-            <a:spLocks noGrp="1"/>
-          </p:cNvSpPr>
-          <p:nvPr>
-            <p:ph type="body" sz="quarter" idx="10"/>
-            <p:custDataLst>
-              <p:tags r:id="rId3"/>
-            </p:custDataLst>
-          </p:nvPr>
-        </p:nvSpPr>
-        <p:spPr>
-          <a:xfrm>
-            <a:off x="519112" y="1447799"/>
-            <a:ext cx="11149013" cy="2246769"/>
-          </a:xfrm>
-        </p:spPr>
-        <p:txBody>
-          <a:bodyPr/>
-          <a:lstStyle/>
-          <a:p>
-            <a:pPr>
-              <a:spcAft>
-                <a:spcPts val="1200"/>
-              </a:spcAft>
-            </a:pPr>
-            <a:r>
-              <a:rPr lang="en-US" sz="4400" dirty="0" smtClean="0">
-                <a:ln w="3175">
-                  <a:noFill/>
-                </a:ln>
-                <a:gradFill flip="none" rotWithShape="1">
-                  <a:gsLst>
-                    <a:gs pos="0">
-                      <a:srgbClr val="595959"/>
-                    </a:gs>
-                    <a:gs pos="86000">
-                      <a:srgbClr val="595959"/>
-                    </a:gs>
-                  </a:gsLst>
-                  <a:lin ang="5400000" scaled="0"/>
-                  <a:tileRect/>
-                </a:gradFill>
-                <a:cs typeface="Arial" charset="0"/>
-              </a:rPr>
-              <a:t>Feedback and questions </a:t>
-            </a:r>
-            <a:r>
-              <a:rPr lang="en-US" dirty="0" smtClean="0"/>
-              <a:t/>
-            </a:r>
-            <a:br>
-              <a:rPr lang="en-US" dirty="0" smtClean="0"/>
-            </a:br>
-            <a:r>
-              <a:rPr lang="en-US" sz="3200" dirty="0" smtClean="0">
-                <a:latin typeface="+mn-lt"/>
-                <a:hlinkClick r:id="rId8"/>
-              </a:rPr>
-              <a:t>http://asp.net</a:t>
-            </a:r>
-            <a:endParaRPr lang="en-US" sz="3200" dirty="0" smtClean="0">
-              <a:latin typeface="+mn-lt"/>
-            </a:endParaRPr>
-          </a:p>
-          <a:p>
-            <a:pPr>
-              <a:spcAft>
-                <a:spcPts val="1200"/>
-              </a:spcAft>
-            </a:pPr>
-            <a:r>
-              <a:rPr lang="en-US" sz="3200" dirty="0" smtClean="0">
-                <a:latin typeface="+mn-lt"/>
-                <a:hlinkClick r:id="rId9"/>
-              </a:rPr>
-              <a:t>http://asp.net/vnext</a:t>
-            </a:r>
-            <a:endParaRPr lang="en-US" sz="3200" dirty="0" smtClean="0">
-              <a:latin typeface="+mn-lt"/>
-            </a:endParaRPr>
-          </a:p>
-          <a:p>
-            <a:pPr>
-              <a:spcAft>
-                <a:spcPts val="1200"/>
-              </a:spcAft>
-            </a:pPr>
-            <a:r>
-              <a:rPr lang="en-US" sz="3200" smtClean="0">
-                <a:latin typeface="+mn-lt"/>
-                <a:hlinkClick r:id="rId10"/>
-              </a:rPr>
-              <a:t>http://www.devcamps.ms/web</a:t>
-            </a:r>
-            <a:r>
-              <a:rPr lang="en-US" sz="3200" smtClean="0">
-                <a:latin typeface="+mn-lt"/>
-              </a:rPr>
-              <a:t> </a:t>
-            </a:r>
-            <a:endParaRPr lang="en-US" sz="3200" dirty="0" smtClean="0">
-              <a:latin typeface="+mn-lt"/>
-            </a:endParaRPr>
-          </a:p>
-        </p:txBody>
-      </p:sp>
-      <p:sp>
-        <p:nvSpPr>
-          <p:cNvPr id="8" name="Freeform 58"/>
-          <p:cNvSpPr>
-            <a:spLocks noEditPoints="1"/>
-          </p:cNvSpPr>
-          <p:nvPr/>
-        </p:nvSpPr>
-        <p:spPr bwMode="black">
-          <a:xfrm>
-            <a:off x="7196409" y="1141413"/>
-            <a:ext cx="3689695" cy="3954680"/>
-          </a:xfrm>
-          <a:custGeom>
-            <a:avLst/>
-            <a:gdLst>
-              <a:gd name="T0" fmla="*/ 181 w 182"/>
-              <a:gd name="T1" fmla="*/ 65 h 195"/>
-              <a:gd name="T2" fmla="*/ 88 w 182"/>
-              <a:gd name="T3" fmla="*/ 0 h 195"/>
-              <a:gd name="T4" fmla="*/ 88 w 182"/>
-              <a:gd name="T5" fmla="*/ 40 h 195"/>
-              <a:gd name="T6" fmla="*/ 1 w 182"/>
-              <a:gd name="T7" fmla="*/ 40 h 195"/>
-              <a:gd name="T8" fmla="*/ 1 w 182"/>
-              <a:gd name="T9" fmla="*/ 89 h 195"/>
-              <a:gd name="T10" fmla="*/ 57 w 182"/>
-              <a:gd name="T11" fmla="*/ 89 h 195"/>
-              <a:gd name="T12" fmla="*/ 88 w 182"/>
-              <a:gd name="T13" fmla="*/ 68 h 195"/>
-              <a:gd name="T14" fmla="*/ 88 w 182"/>
-              <a:gd name="T15" fmla="*/ 130 h 195"/>
-              <a:gd name="T16" fmla="*/ 181 w 182"/>
-              <a:gd name="T17" fmla="*/ 65 h 195"/>
-              <a:gd name="T18" fmla="*/ 19 w 182"/>
-              <a:gd name="T19" fmla="*/ 127 h 195"/>
-              <a:gd name="T20" fmla="*/ 88 w 182"/>
-              <a:gd name="T21" fmla="*/ 172 h 195"/>
-              <a:gd name="T22" fmla="*/ 88 w 182"/>
-              <a:gd name="T23" fmla="*/ 142 h 195"/>
-              <a:gd name="T24" fmla="*/ 178 w 182"/>
-              <a:gd name="T25" fmla="*/ 142 h 195"/>
-              <a:gd name="T26" fmla="*/ 178 w 182"/>
-              <a:gd name="T27" fmla="*/ 153 h 195"/>
-              <a:gd name="T28" fmla="*/ 100 w 182"/>
-              <a:gd name="T29" fmla="*/ 153 h 195"/>
-              <a:gd name="T30" fmla="*/ 100 w 182"/>
-              <a:gd name="T31" fmla="*/ 195 h 195"/>
-              <a:gd name="T32" fmla="*/ 0 w 182"/>
-              <a:gd name="T33" fmla="*/ 127 h 195"/>
-              <a:gd name="T34" fmla="*/ 19 w 182"/>
-              <a:gd name="T35" fmla="*/ 127 h 195"/>
-            </a:gdLst>
-            <a:ahLst/>
-            <a:cxnLst>
-              <a:cxn ang="0">
-                <a:pos x="T0" y="T1"/>
-              </a:cxn>
-              <a:cxn ang="0">
-                <a:pos x="T2" y="T3"/>
-              </a:cxn>
-              <a:cxn ang="0">
-                <a:pos x="T4" y="T5"/>
-              </a:cxn>
-              <a:cxn ang="0">
-                <a:pos x="T6" y="T7"/>
-              </a:cxn>
-              <a:cxn ang="0">
-                <a:pos x="T8" y="T9"/>
-              </a:cxn>
-              <a:cxn ang="0">
-                <a:pos x="T10" y="T11"/>
-              </a:cxn>
-              <a:cxn ang="0">
-                <a:pos x="T12" y="T13"/>
-              </a:cxn>
-              <a:cxn ang="0">
-                <a:pos x="T14" y="T15"/>
-              </a:cxn>
-              <a:cxn ang="0">
-                <a:pos x="T16" y="T17"/>
-              </a:cxn>
-              <a:cxn ang="0">
-                <a:pos x="T18" y="T19"/>
-              </a:cxn>
-              <a:cxn ang="0">
-                <a:pos x="T20" y="T21"/>
-              </a:cxn>
-              <a:cxn ang="0">
-                <a:pos x="T22" y="T23"/>
-              </a:cxn>
-              <a:cxn ang="0">
-                <a:pos x="T24" y="T25"/>
-              </a:cxn>
-              <a:cxn ang="0">
-                <a:pos x="T26" y="T27"/>
-              </a:cxn>
-              <a:cxn ang="0">
-                <a:pos x="T28" y="T29"/>
-              </a:cxn>
-              <a:cxn ang="0">
-                <a:pos x="T30" y="T31"/>
-              </a:cxn>
-              <a:cxn ang="0">
-                <a:pos x="T32" y="T33"/>
-              </a:cxn>
-              <a:cxn ang="0">
-                <a:pos x="T34" y="T35"/>
-              </a:cxn>
-            </a:cxnLst>
-            <a:rect l="0" t="0" r="r" b="b"/>
-            <a:pathLst>
-              <a:path w="182" h="195">
-                <a:moveTo>
-                  <a:pt x="181" y="65"/>
-                </a:moveTo>
-                <a:cubicBezTo>
-                  <a:pt x="88" y="0"/>
-                  <a:pt x="88" y="0"/>
-                  <a:pt x="88" y="0"/>
-                </a:cubicBezTo>
-                <a:cubicBezTo>
-                  <a:pt x="88" y="40"/>
-                  <a:pt x="88" y="40"/>
-                  <a:pt x="88" y="40"/>
-                </a:cubicBezTo>
-                <a:cubicBezTo>
-                  <a:pt x="1" y="40"/>
-                  <a:pt x="1" y="40"/>
-                  <a:pt x="1" y="40"/>
-                </a:cubicBezTo>
-                <a:cubicBezTo>
-                  <a:pt x="1" y="89"/>
-                  <a:pt x="1" y="89"/>
-                  <a:pt x="1" y="89"/>
-                </a:cubicBezTo>
-                <a:cubicBezTo>
-                  <a:pt x="57" y="89"/>
-                  <a:pt x="57" y="89"/>
-                  <a:pt x="57" y="89"/>
-                </a:cubicBezTo>
-                <a:cubicBezTo>
-                  <a:pt x="88" y="68"/>
-                  <a:pt x="88" y="68"/>
-                  <a:pt x="88" y="68"/>
-                </a:cubicBezTo>
-                <a:cubicBezTo>
-                  <a:pt x="88" y="130"/>
-                  <a:pt x="88" y="130"/>
-                  <a:pt x="88" y="130"/>
-                </a:cubicBezTo>
-                <a:cubicBezTo>
-                  <a:pt x="181" y="65"/>
-                  <a:pt x="181" y="65"/>
-                  <a:pt x="181" y="65"/>
-                </a:cubicBezTo>
-                <a:close/>
-                <a:moveTo>
-                  <a:pt x="19" y="127"/>
-                </a:moveTo>
-                <a:cubicBezTo>
-                  <a:pt x="88" y="172"/>
-                  <a:pt x="88" y="172"/>
-                  <a:pt x="88" y="172"/>
-                </a:cubicBezTo>
-                <a:cubicBezTo>
-                  <a:pt x="88" y="142"/>
-                  <a:pt x="88" y="142"/>
-                  <a:pt x="88" y="142"/>
-                </a:cubicBezTo>
-                <a:cubicBezTo>
-                  <a:pt x="178" y="142"/>
-                  <a:pt x="178" y="142"/>
-                  <a:pt x="178" y="142"/>
-                </a:cubicBezTo>
-                <a:cubicBezTo>
-                  <a:pt x="182" y="142"/>
-                  <a:pt x="182" y="153"/>
-                  <a:pt x="178" y="153"/>
-                </a:cubicBezTo>
-                <a:cubicBezTo>
-                  <a:pt x="100" y="153"/>
-                  <a:pt x="100" y="153"/>
-                  <a:pt x="100" y="153"/>
-                </a:cubicBezTo>
-                <a:cubicBezTo>
-                  <a:pt x="100" y="195"/>
-                  <a:pt x="100" y="195"/>
-                  <a:pt x="100" y="195"/>
-                </a:cubicBezTo>
-                <a:cubicBezTo>
-                  <a:pt x="0" y="127"/>
-                  <a:pt x="0" y="127"/>
-                  <a:pt x="0" y="127"/>
-                </a:cubicBezTo>
-                <a:cubicBezTo>
-                  <a:pt x="19" y="127"/>
-                  <a:pt x="19" y="127"/>
-                  <a:pt x="19" y="127"/>
-                </a:cubicBezTo>
-                <a:close/>
-              </a:path>
-            </a:pathLst>
-          </a:custGeom>
-          <a:solidFill>
-            <a:schemeClr val="tx1">
-              <a:lumMod val="10000"/>
-              <a:lumOff val="90000"/>
-            </a:schemeClr>
-          </a:solidFill>
-          <a:ln>
-            <a:noFill/>
-          </a:ln>
-        </p:spPr>
-        <p:txBody>
-          <a:bodyPr vert="horz" wrap="square" lIns="82305" tIns="41153" rIns="82305" bIns="41153" numCol="1" anchor="t" anchorCtr="0" compatLnSpc="1">
-            <a:prstTxWarp prst="textNoShape">
-              <a:avLst/>
-            </a:prstTxWarp>
-          </a:bodyPr>
-          <a:lstStyle/>
-          <a:p>
-            <a:endParaRPr lang="en-US" sz="1600"/>
-          </a:p>
-        </p:txBody>
-      </p:sp>
-    </p:spTree>
-    <p:extLst>
-      <p:ext uri="{BB962C8B-B14F-4D97-AF65-F5344CB8AC3E}">
-        <p14:creationId xmlns:p14="http://schemas.microsoft.com/office/powerpoint/2010/main" val="2687524694"/>
-      </p:ext>
-    </p:extLst>
-  </p:cSld>
-  <p:clrMapOvr>
-    <a:masterClrMapping/>
-  </p:clrMapOvr>
-  <mc:AlternateContent xmlns:mc="http://schemas.openxmlformats.org/markup-compatibility/2006" xmlns:p14="http://schemas.microsoft.com/office/powerpoint/2010/main">
-    <mc:Choice Requires="p14">
-      <p:transition spd="med" p14:dur="700">
-        <p:fade/>
-      </p:transition>
-    </mc:Choice>
-    <mc:Fallback xmlns="">
-      <p:transition spd="med">
-        <p:fade/>
-      </p:transition>
-    </mc:Fallback>
-  </mc:AlternateContent>
-  <p:timing>
-    <p:tnLst>
-      <p:par>
-        <p:cTn id="1" dur="indefinite" restart="never" nodeType="tmRoot"/>
-      </p:par>
-    </p:tnLst>
-  </p:timing>
-</p:sld>
-</file>
-
-<file path=ppt/slides/slide13.xml><?xml version="1.0" encoding="utf-8"?>
-<p:sld xmlns:a="http://schemas.openxmlformats.org/drawingml/2006/main" xmlns:r="http://schemas.openxmlformats.org/officeDocument/2006/relationships" xmlns:p="http://schemas.openxmlformats.org/presentationml/2006/main">
-  <p:cSld>
-    <p:spTree>
-      <p:nvGrpSpPr>
-        <p:cNvPr id="1" name=""/>
-        <p:cNvGrpSpPr/>
-        <p:nvPr/>
-      </p:nvGrpSpPr>
-      <p:grpSpPr>
-        <a:xfrm>
-          <a:off x="0" y="0"/>
-          <a:ext cx="0" cy="0"/>
-          <a:chOff x="0" y="0"/>
-          <a:chExt cx="0" cy="0"/>
-        </a:xfrm>
-      </p:grpSpPr>
-      <p:graphicFrame>
-        <p:nvGraphicFramePr>
-          <p:cNvPr id="2" name="Object 1" hidden="1"/>
-          <p:cNvGraphicFramePr>
-            <a:graphicFrameLocks noChangeAspect="1"/>
-          </p:cNvGraphicFramePr>
-          <p:nvPr>
-            <p:custDataLst>
-              <p:tags r:id="rId2"/>
-            </p:custDataLst>
-            <p:extLst>
-              <p:ext uri="{D42A27DB-BD31-4B8C-83A1-F6EECF244321}">
-                <p14:modId xmlns:p14="http://schemas.microsoft.com/office/powerpoint/2010/main" val="3859461230"/>
-              </p:ext>
-            </p:extLst>
-          </p:nvPr>
-        </p:nvGraphicFramePr>
-        <p:xfrm>
-          <a:off x="0" y="0"/>
-          <a:ext cx="158750" cy="158750"/>
-        </p:xfrm>
-        <a:graphic>
-          <a:graphicData uri="http://schemas.openxmlformats.org/presentationml/2006/ole">
-            <mc:AlternateContent xmlns:mc="http://schemas.openxmlformats.org/markup-compatibility/2006">
-              <mc:Choice xmlns:v="urn:schemas-microsoft-com:vml" Requires="v">
-                <p:oleObj spid="_x0000_s58444" name="think-cell Slide" r:id="rId5" imgW="270" imgH="270" progId="TCLayout.ActiveDocument.1">
-                  <p:embed/>
-                </p:oleObj>
-              </mc:Choice>
-              <mc:Fallback>
-                <p:oleObj name="think-cell Slide" r:id="rId5" imgW="270" imgH="270" progId="TCLayout.ActiveDocument.1">
-                  <p:embed/>
-                  <p:pic>
-                    <p:nvPicPr>
-                      <p:cNvPr id="0" name=""/>
-                      <p:cNvPicPr/>
-                      <p:nvPr/>
-                    </p:nvPicPr>
-                    <p:blipFill>
-                      <a:blip r:embed="rId6"/>
-                      <a:stretch>
-                        <a:fillRect/>
-                      </a:stretch>
-                    </p:blipFill>
-                    <p:spPr>
-                      <a:xfrm>
-                        <a:off x="0" y="0"/>
-                        <a:ext cx="158750" cy="158750"/>
-                      </a:xfrm>
-                      <a:prstGeom prst="rect">
-                        <a:avLst/>
-                      </a:prstGeom>
-                    </p:spPr>
-                  </p:pic>
-                </p:oleObj>
-              </mc:Fallback>
-            </mc:AlternateContent>
-          </a:graphicData>
-        </a:graphic>
-      </p:graphicFrame>
-    </p:spTree>
-    <p:extLst>
-      <p:ext uri="{BB962C8B-B14F-4D97-AF65-F5344CB8AC3E}">
-        <p14:creationId xmlns:p14="http://schemas.microsoft.com/office/powerpoint/2010/main" val="1847082904"/>
-      </p:ext>
-    </p:extLst>
-  </p:cSld>
-  <p:clrMapOvr>
-    <a:masterClrMapping/>
-  </p:clrMapOvr>
-  <mc:AlternateContent xmlns:mc="http://schemas.openxmlformats.org/markup-compatibility/2006" xmlns:p14="http://schemas.microsoft.com/office/powerpoint/2010/main">
-    <mc:Choice Requires="p14">
-      <p:transition spd="med" p14:dur="700">
-        <p:fade/>
-      </p:transition>
-    </mc:Choice>
-    <mc:Fallback xmlns="">
-      <p:transition spd="med">
-        <p:fade/>
-      </p:transition>
-    </mc:Fallback>
-  </mc:AlternateContent>
-  <p:timing>
-    <p:tnLst>
-      <p:par>
-        <p:cTn id="1" dur="indefinite" restart="never" nodeType="tmRoot"/>
-      </p:par>
-    </p:tnLst>
-  </p:timing>
-</p:sld>
-</file>
-
 <file path=ppt/slides/slide2.xml><?xml version="1.0" encoding="utf-8"?>
 <p:sld xmlns:a="http://schemas.openxmlformats.org/drawingml/2006/main" xmlns:r="http://schemas.openxmlformats.org/officeDocument/2006/relationships" xmlns:p="http://schemas.openxmlformats.org/presentationml/2006/main">
   <p:cSld>
@@ -29911,7 +29984,7 @@
           <a:graphicData uri="http://schemas.openxmlformats.org/presentationml/2006/ole">
             <mc:AlternateContent xmlns:mc="http://schemas.openxmlformats.org/markup-compatibility/2006">
               <mc:Choice xmlns:v="urn:schemas-microsoft-com:vml" Requires="v">
-                <p:oleObj spid="_x0000_s59465" name="think-cell Slide" r:id="rId5" imgW="270" imgH="270" progId="TCLayout.ActiveDocument.1">
+                <p:oleObj spid="_x0000_s59471" name="think-cell Slide" r:id="rId5" imgW="270" imgH="270" progId="TCLayout.ActiveDocument.1">
                   <p:embed/>
                 </p:oleObj>
               </mc:Choice>
@@ -30052,6 +30125,670 @@
 </p:sld>
 </file>
 
+<file path=ppt/slides/slide20.xml><?xml version="1.0" encoding="utf-8"?>
+<p:sld xmlns:a="http://schemas.openxmlformats.org/drawingml/2006/main" xmlns:r="http://schemas.openxmlformats.org/officeDocument/2006/relationships" xmlns:p="http://schemas.openxmlformats.org/presentationml/2006/main">
+  <p:cSld>
+    <p:spTree>
+      <p:nvGrpSpPr>
+        <p:cNvPr id="1" name=""/>
+        <p:cNvGrpSpPr/>
+        <p:nvPr/>
+      </p:nvGrpSpPr>
+      <p:grpSpPr>
+        <a:xfrm>
+          <a:off x="0" y="0"/>
+          <a:ext cx="0" cy="0"/>
+          <a:chOff x="0" y="0"/>
+          <a:chExt cx="0" cy="0"/>
+        </a:xfrm>
+      </p:grpSpPr>
+      <p:graphicFrame>
+        <p:nvGraphicFramePr>
+          <p:cNvPr id="2" name="Object 1" hidden="1"/>
+          <p:cNvGraphicFramePr>
+            <a:graphicFrameLocks noChangeAspect="1"/>
+          </p:cNvGraphicFramePr>
+          <p:nvPr>
+            <p:custDataLst>
+              <p:tags r:id="rId2"/>
+            </p:custDataLst>
+            <p:extLst>
+              <p:ext uri="{D42A27DB-BD31-4B8C-83A1-F6EECF244321}">
+                <p14:modId xmlns:p14="http://schemas.microsoft.com/office/powerpoint/2010/main" val="321265224"/>
+              </p:ext>
+            </p:extLst>
+          </p:nvPr>
+        </p:nvGraphicFramePr>
+        <p:xfrm>
+          <a:off x="0" y="0"/>
+          <a:ext cx="158750" cy="158750"/>
+        </p:xfrm>
+        <a:graphic>
+          <a:graphicData uri="http://schemas.openxmlformats.org/presentationml/2006/ole">
+            <mc:AlternateContent xmlns:mc="http://schemas.openxmlformats.org/markup-compatibility/2006">
+              <mc:Choice xmlns:v="urn:schemas-microsoft-com:vml" Requires="v">
+                <p:oleObj spid="_x0000_s57429" name="think-cell Slide" r:id="rId6" imgW="270" imgH="270" progId="TCLayout.ActiveDocument.1">
+                  <p:embed/>
+                </p:oleObj>
+              </mc:Choice>
+              <mc:Fallback>
+                <p:oleObj name="think-cell Slide" r:id="rId6" imgW="270" imgH="270" progId="TCLayout.ActiveDocument.1">
+                  <p:embed/>
+                  <p:pic>
+                    <p:nvPicPr>
+                      <p:cNvPr id="0" name=""/>
+                      <p:cNvPicPr/>
+                      <p:nvPr/>
+                    </p:nvPicPr>
+                    <p:blipFill>
+                      <a:blip r:embed="rId7"/>
+                      <a:stretch>
+                        <a:fillRect/>
+                      </a:stretch>
+                    </p:blipFill>
+                    <p:spPr>
+                      <a:xfrm>
+                        <a:off x="0" y="0"/>
+                        <a:ext cx="158750" cy="158750"/>
+                      </a:xfrm>
+                      <a:prstGeom prst="rect">
+                        <a:avLst/>
+                      </a:prstGeom>
+                    </p:spPr>
+                  </p:pic>
+                </p:oleObj>
+              </mc:Fallback>
+            </mc:AlternateContent>
+          </a:graphicData>
+        </a:graphic>
+      </p:graphicFrame>
+      <p:sp>
+        <p:nvSpPr>
+          <p:cNvPr id="5" name="Title 4"/>
+          <p:cNvSpPr>
+            <a:spLocks noGrp="1"/>
+          </p:cNvSpPr>
+          <p:nvPr>
+            <p:ph type="title"/>
+          </p:nvPr>
+        </p:nvSpPr>
+        <p:spPr/>
+        <p:txBody>
+          <a:bodyPr/>
+          <a:lstStyle/>
+          <a:p>
+            <a:r>
+              <a:rPr lang="en-US" smtClean="0"/>
+              <a:t>Resources</a:t>
+            </a:r>
+            <a:endParaRPr lang="en-US" dirty="0"/>
+          </a:p>
+        </p:txBody>
+      </p:sp>
+      <p:sp>
+        <p:nvSpPr>
+          <p:cNvPr id="3" name="Text Placeholder 2"/>
+          <p:cNvSpPr>
+            <a:spLocks noGrp="1"/>
+          </p:cNvSpPr>
+          <p:nvPr>
+            <p:ph type="body" sz="quarter" idx="10"/>
+            <p:custDataLst>
+              <p:tags r:id="rId3"/>
+            </p:custDataLst>
+          </p:nvPr>
+        </p:nvSpPr>
+        <p:spPr>
+          <a:xfrm>
+            <a:off x="519112" y="1447799"/>
+            <a:ext cx="11149013" cy="4745915"/>
+          </a:xfrm>
+        </p:spPr>
+        <p:txBody>
+          <a:bodyPr/>
+          <a:lstStyle/>
+          <a:p>
+            <a:pPr>
+              <a:spcAft>
+                <a:spcPts val="1200"/>
+              </a:spcAft>
+            </a:pPr>
+            <a:r>
+              <a:rPr lang="en-US" sz="4400" dirty="0" smtClean="0">
+                <a:ln w="3175">
+                  <a:noFill/>
+                </a:ln>
+                <a:gradFill flip="none" rotWithShape="1">
+                  <a:gsLst>
+                    <a:gs pos="0">
+                      <a:srgbClr val="595959"/>
+                    </a:gs>
+                    <a:gs pos="86000">
+                      <a:srgbClr val="595959"/>
+                    </a:gs>
+                  </a:gsLst>
+                  <a:lin ang="5400000" scaled="0"/>
+                  <a:tileRect/>
+                </a:gradFill>
+                <a:cs typeface="Arial" charset="0"/>
+              </a:rPr>
+              <a:t>Feedback and questions </a:t>
+            </a:r>
+            <a:r>
+              <a:rPr lang="en-US" dirty="0" smtClean="0"/>
+              <a:t/>
+            </a:r>
+            <a:br>
+              <a:rPr lang="en-US" dirty="0" smtClean="0"/>
+            </a:br>
+            <a:r>
+              <a:rPr lang="en-US" sz="3200" dirty="0" smtClean="0">
+                <a:latin typeface="+mn-lt"/>
+                <a:hlinkClick r:id="rId8"/>
+              </a:rPr>
+              <a:t>http://asp.net</a:t>
+            </a:r>
+            <a:endParaRPr lang="en-US" sz="3200" dirty="0" smtClean="0">
+              <a:latin typeface="+mn-lt"/>
+            </a:endParaRPr>
+          </a:p>
+          <a:p>
+            <a:pPr>
+              <a:spcAft>
+                <a:spcPts val="1200"/>
+              </a:spcAft>
+            </a:pPr>
+            <a:r>
+              <a:rPr lang="en-US" sz="3200" dirty="0" smtClean="0">
+                <a:latin typeface="+mn-lt"/>
+                <a:hlinkClick r:id="rId9"/>
+              </a:rPr>
+              <a:t>http://asp.net/vnext</a:t>
+            </a:r>
+            <a:endParaRPr lang="en-US" sz="3200" dirty="0" smtClean="0">
+              <a:latin typeface="+mn-lt"/>
+            </a:endParaRPr>
+          </a:p>
+          <a:p>
+            <a:pPr>
+              <a:spcAft>
+                <a:spcPts val="1200"/>
+              </a:spcAft>
+            </a:pPr>
+            <a:r>
+              <a:rPr lang="en-US" sz="3200" dirty="0" smtClean="0">
+                <a:latin typeface="+mn-lt"/>
+                <a:hlinkClick r:id="rId10"/>
+              </a:rPr>
+              <a:t>http://www.devcamps.ms/web</a:t>
+            </a:r>
+            <a:r>
+              <a:rPr lang="en-US" sz="3200" dirty="0" smtClean="0">
+                <a:latin typeface="+mn-lt"/>
+              </a:rPr>
+              <a:t> </a:t>
+            </a:r>
+          </a:p>
+          <a:p>
+            <a:pPr>
+              <a:spcAft>
+                <a:spcPts val="1200"/>
+              </a:spcAft>
+            </a:pPr>
+            <a:r>
+              <a:rPr lang="en-US" sz="3200" dirty="0" smtClean="0">
+                <a:latin typeface="+mn-lt"/>
+                <a:hlinkClick r:id="rId11"/>
+              </a:rPr>
+              <a:t>http://windowsazure.com</a:t>
+            </a:r>
+            <a:r>
+              <a:rPr lang="en-US" sz="3200" dirty="0" smtClean="0">
+                <a:latin typeface="+mn-lt"/>
+              </a:rPr>
+              <a:t> </a:t>
+            </a:r>
+            <a:endParaRPr lang="en-US" sz="3200" dirty="0" smtClean="0">
+              <a:latin typeface="+mn-lt"/>
+            </a:endParaRPr>
+          </a:p>
+          <a:p>
+            <a:pPr>
+              <a:spcAft>
+                <a:spcPts val="1200"/>
+              </a:spcAft>
+            </a:pPr>
+            <a:r>
+              <a:rPr lang="en-US" sz="3200" dirty="0">
+                <a:hlinkClick r:id="rId12"/>
+              </a:rPr>
+              <a:t>http://</a:t>
+            </a:r>
+            <a:r>
+              <a:rPr lang="en-US" sz="3200" dirty="0" smtClean="0">
+                <a:hlinkClick r:id="rId12"/>
+              </a:rPr>
+              <a:t>aka.ms/webcamps-azure</a:t>
+            </a:r>
+            <a:r>
+              <a:rPr lang="en-US" sz="3200" dirty="0" smtClean="0"/>
+              <a:t> </a:t>
+            </a:r>
+            <a:r>
+              <a:rPr lang="en-US" sz="3200" smtClean="0"/>
+              <a:t>(free trial)</a:t>
+            </a:r>
+            <a:endParaRPr lang="en-US" sz="3200" dirty="0" smtClean="0">
+              <a:latin typeface="+mn-lt"/>
+            </a:endParaRPr>
+          </a:p>
+          <a:p>
+            <a:pPr>
+              <a:spcAft>
+                <a:spcPts val="1200"/>
+              </a:spcAft>
+            </a:pPr>
+            <a:endParaRPr lang="en-US" sz="3200" dirty="0">
+              <a:latin typeface="+mn-lt"/>
+            </a:endParaRPr>
+          </a:p>
+          <a:p>
+            <a:pPr>
+              <a:spcAft>
+                <a:spcPts val="1200"/>
+              </a:spcAft>
+            </a:pPr>
+            <a:r>
+              <a:rPr lang="en-US" sz="3200" dirty="0" smtClean="0">
+                <a:latin typeface="+mn-lt"/>
+              </a:rPr>
+              <a:t>[Reminder: </a:t>
+            </a:r>
+            <a:r>
+              <a:rPr lang="en-US" sz="3200" dirty="0" err="1" smtClean="0">
+                <a:latin typeface="+mn-lt"/>
+              </a:rPr>
+              <a:t>Evals</a:t>
+            </a:r>
+            <a:r>
+              <a:rPr lang="en-US" sz="3200" dirty="0">
+                <a:latin typeface="+mn-lt"/>
+              </a:rPr>
+              <a:t>]</a:t>
+            </a:r>
+            <a:endParaRPr lang="en-US" sz="3200" dirty="0" smtClean="0">
+              <a:latin typeface="+mn-lt"/>
+            </a:endParaRPr>
+          </a:p>
+        </p:txBody>
+      </p:sp>
+      <p:sp>
+        <p:nvSpPr>
+          <p:cNvPr id="8" name="Freeform 58"/>
+          <p:cNvSpPr>
+            <a:spLocks noEditPoints="1"/>
+          </p:cNvSpPr>
+          <p:nvPr/>
+        </p:nvSpPr>
+        <p:spPr bwMode="black">
+          <a:xfrm>
+            <a:off x="7196409" y="1141413"/>
+            <a:ext cx="3689695" cy="3954680"/>
+          </a:xfrm>
+          <a:custGeom>
+            <a:avLst/>
+            <a:gdLst>
+              <a:gd name="T0" fmla="*/ 181 w 182"/>
+              <a:gd name="T1" fmla="*/ 65 h 195"/>
+              <a:gd name="T2" fmla="*/ 88 w 182"/>
+              <a:gd name="T3" fmla="*/ 0 h 195"/>
+              <a:gd name="T4" fmla="*/ 88 w 182"/>
+              <a:gd name="T5" fmla="*/ 40 h 195"/>
+              <a:gd name="T6" fmla="*/ 1 w 182"/>
+              <a:gd name="T7" fmla="*/ 40 h 195"/>
+              <a:gd name="T8" fmla="*/ 1 w 182"/>
+              <a:gd name="T9" fmla="*/ 89 h 195"/>
+              <a:gd name="T10" fmla="*/ 57 w 182"/>
+              <a:gd name="T11" fmla="*/ 89 h 195"/>
+              <a:gd name="T12" fmla="*/ 88 w 182"/>
+              <a:gd name="T13" fmla="*/ 68 h 195"/>
+              <a:gd name="T14" fmla="*/ 88 w 182"/>
+              <a:gd name="T15" fmla="*/ 130 h 195"/>
+              <a:gd name="T16" fmla="*/ 181 w 182"/>
+              <a:gd name="T17" fmla="*/ 65 h 195"/>
+              <a:gd name="T18" fmla="*/ 19 w 182"/>
+              <a:gd name="T19" fmla="*/ 127 h 195"/>
+              <a:gd name="T20" fmla="*/ 88 w 182"/>
+              <a:gd name="T21" fmla="*/ 172 h 195"/>
+              <a:gd name="T22" fmla="*/ 88 w 182"/>
+              <a:gd name="T23" fmla="*/ 142 h 195"/>
+              <a:gd name="T24" fmla="*/ 178 w 182"/>
+              <a:gd name="T25" fmla="*/ 142 h 195"/>
+              <a:gd name="T26" fmla="*/ 178 w 182"/>
+              <a:gd name="T27" fmla="*/ 153 h 195"/>
+              <a:gd name="T28" fmla="*/ 100 w 182"/>
+              <a:gd name="T29" fmla="*/ 153 h 195"/>
+              <a:gd name="T30" fmla="*/ 100 w 182"/>
+              <a:gd name="T31" fmla="*/ 195 h 195"/>
+              <a:gd name="T32" fmla="*/ 0 w 182"/>
+              <a:gd name="T33" fmla="*/ 127 h 195"/>
+              <a:gd name="T34" fmla="*/ 19 w 182"/>
+              <a:gd name="T35" fmla="*/ 127 h 195"/>
+            </a:gdLst>
+            <a:ahLst/>
+            <a:cxnLst>
+              <a:cxn ang="0">
+                <a:pos x="T0" y="T1"/>
+              </a:cxn>
+              <a:cxn ang="0">
+                <a:pos x="T2" y="T3"/>
+              </a:cxn>
+              <a:cxn ang="0">
+                <a:pos x="T4" y="T5"/>
+              </a:cxn>
+              <a:cxn ang="0">
+                <a:pos x="T6" y="T7"/>
+              </a:cxn>
+              <a:cxn ang="0">
+                <a:pos x="T8" y="T9"/>
+              </a:cxn>
+              <a:cxn ang="0">
+                <a:pos x="T10" y="T11"/>
+              </a:cxn>
+              <a:cxn ang="0">
+                <a:pos x="T12" y="T13"/>
+              </a:cxn>
+              <a:cxn ang="0">
+                <a:pos x="T14" y="T15"/>
+              </a:cxn>
+              <a:cxn ang="0">
+                <a:pos x="T16" y="T17"/>
+              </a:cxn>
+              <a:cxn ang="0">
+                <a:pos x="T18" y="T19"/>
+              </a:cxn>
+              <a:cxn ang="0">
+                <a:pos x="T20" y="T21"/>
+              </a:cxn>
+              <a:cxn ang="0">
+                <a:pos x="T22" y="T23"/>
+              </a:cxn>
+              <a:cxn ang="0">
+                <a:pos x="T24" y="T25"/>
+              </a:cxn>
+              <a:cxn ang="0">
+                <a:pos x="T26" y="T27"/>
+              </a:cxn>
+              <a:cxn ang="0">
+                <a:pos x="T28" y="T29"/>
+              </a:cxn>
+              <a:cxn ang="0">
+                <a:pos x="T30" y="T31"/>
+              </a:cxn>
+              <a:cxn ang="0">
+                <a:pos x="T32" y="T33"/>
+              </a:cxn>
+              <a:cxn ang="0">
+                <a:pos x="T34" y="T35"/>
+              </a:cxn>
+            </a:cxnLst>
+            <a:rect l="0" t="0" r="r" b="b"/>
+            <a:pathLst>
+              <a:path w="182" h="195">
+                <a:moveTo>
+                  <a:pt x="181" y="65"/>
+                </a:moveTo>
+                <a:cubicBezTo>
+                  <a:pt x="88" y="0"/>
+                  <a:pt x="88" y="0"/>
+                  <a:pt x="88" y="0"/>
+                </a:cubicBezTo>
+                <a:cubicBezTo>
+                  <a:pt x="88" y="40"/>
+                  <a:pt x="88" y="40"/>
+                  <a:pt x="88" y="40"/>
+                </a:cubicBezTo>
+                <a:cubicBezTo>
+                  <a:pt x="1" y="40"/>
+                  <a:pt x="1" y="40"/>
+                  <a:pt x="1" y="40"/>
+                </a:cubicBezTo>
+                <a:cubicBezTo>
+                  <a:pt x="1" y="89"/>
+                  <a:pt x="1" y="89"/>
+                  <a:pt x="1" y="89"/>
+                </a:cubicBezTo>
+                <a:cubicBezTo>
+                  <a:pt x="57" y="89"/>
+                  <a:pt x="57" y="89"/>
+                  <a:pt x="57" y="89"/>
+                </a:cubicBezTo>
+                <a:cubicBezTo>
+                  <a:pt x="88" y="68"/>
+                  <a:pt x="88" y="68"/>
+                  <a:pt x="88" y="68"/>
+                </a:cubicBezTo>
+                <a:cubicBezTo>
+                  <a:pt x="88" y="130"/>
+                  <a:pt x="88" y="130"/>
+                  <a:pt x="88" y="130"/>
+                </a:cubicBezTo>
+                <a:cubicBezTo>
+                  <a:pt x="181" y="65"/>
+                  <a:pt x="181" y="65"/>
+                  <a:pt x="181" y="65"/>
+                </a:cubicBezTo>
+                <a:close/>
+                <a:moveTo>
+                  <a:pt x="19" y="127"/>
+                </a:moveTo>
+                <a:cubicBezTo>
+                  <a:pt x="88" y="172"/>
+                  <a:pt x="88" y="172"/>
+                  <a:pt x="88" y="172"/>
+                </a:cubicBezTo>
+                <a:cubicBezTo>
+                  <a:pt x="88" y="142"/>
+                  <a:pt x="88" y="142"/>
+                  <a:pt x="88" y="142"/>
+                </a:cubicBezTo>
+                <a:cubicBezTo>
+                  <a:pt x="178" y="142"/>
+                  <a:pt x="178" y="142"/>
+                  <a:pt x="178" y="142"/>
+                </a:cubicBezTo>
+                <a:cubicBezTo>
+                  <a:pt x="182" y="142"/>
+                  <a:pt x="182" y="153"/>
+                  <a:pt x="178" y="153"/>
+                </a:cubicBezTo>
+                <a:cubicBezTo>
+                  <a:pt x="100" y="153"/>
+                  <a:pt x="100" y="153"/>
+                  <a:pt x="100" y="153"/>
+                </a:cubicBezTo>
+                <a:cubicBezTo>
+                  <a:pt x="100" y="195"/>
+                  <a:pt x="100" y="195"/>
+                  <a:pt x="100" y="195"/>
+                </a:cubicBezTo>
+                <a:cubicBezTo>
+                  <a:pt x="0" y="127"/>
+                  <a:pt x="0" y="127"/>
+                  <a:pt x="0" y="127"/>
+                </a:cubicBezTo>
+                <a:cubicBezTo>
+                  <a:pt x="19" y="127"/>
+                  <a:pt x="19" y="127"/>
+                  <a:pt x="19" y="127"/>
+                </a:cubicBezTo>
+                <a:close/>
+              </a:path>
+            </a:pathLst>
+          </a:custGeom>
+          <a:solidFill>
+            <a:schemeClr val="tx1">
+              <a:lumMod val="10000"/>
+              <a:lumOff val="90000"/>
+            </a:schemeClr>
+          </a:solidFill>
+          <a:ln>
+            <a:noFill/>
+          </a:ln>
+        </p:spPr>
+        <p:txBody>
+          <a:bodyPr vert="horz" wrap="square" lIns="82305" tIns="41153" rIns="82305" bIns="41153" numCol="1" anchor="t" anchorCtr="0" compatLnSpc="1">
+            <a:prstTxWarp prst="textNoShape">
+              <a:avLst/>
+            </a:prstTxWarp>
+          </a:bodyPr>
+          <a:lstStyle/>
+          <a:p>
+            <a:endParaRPr lang="en-US" sz="1600"/>
+          </a:p>
+        </p:txBody>
+      </p:sp>
+    </p:spTree>
+    <p:extLst>
+      <p:ext uri="{BB962C8B-B14F-4D97-AF65-F5344CB8AC3E}">
+        <p14:creationId xmlns:p14="http://schemas.microsoft.com/office/powerpoint/2010/main" val="2687524694"/>
+      </p:ext>
+    </p:extLst>
+  </p:cSld>
+  <p:clrMapOvr>
+    <a:masterClrMapping/>
+  </p:clrMapOvr>
+  <mc:AlternateContent xmlns:mc="http://schemas.openxmlformats.org/markup-compatibility/2006" xmlns:p14="http://schemas.microsoft.com/office/powerpoint/2010/main">
+    <mc:Choice Requires="p14">
+      <p:transition spd="med" p14:dur="700">
+        <p:fade/>
+      </p:transition>
+    </mc:Choice>
+    <mc:Fallback xmlns="">
+      <p:transition spd="med">
+        <p:fade/>
+      </p:transition>
+    </mc:Fallback>
+  </mc:AlternateContent>
+  <p:timing>
+    <p:tnLst>
+      <p:par>
+        <p:cTn id="1" dur="indefinite" restart="never" nodeType="tmRoot"/>
+      </p:par>
+    </p:tnLst>
+  </p:timing>
+</p:sld>
+</file>
+
+<file path=ppt/slides/slide21.xml><?xml version="1.0" encoding="utf-8"?>
+<p:sld xmlns:a="http://schemas.openxmlformats.org/drawingml/2006/main" xmlns:r="http://schemas.openxmlformats.org/officeDocument/2006/relationships" xmlns:p="http://schemas.openxmlformats.org/presentationml/2006/main">
+  <p:cSld>
+    <p:spTree>
+      <p:nvGrpSpPr>
+        <p:cNvPr id="1" name=""/>
+        <p:cNvGrpSpPr/>
+        <p:nvPr/>
+      </p:nvGrpSpPr>
+      <p:grpSpPr>
+        <a:xfrm>
+          <a:off x="0" y="0"/>
+          <a:ext cx="0" cy="0"/>
+          <a:chOff x="0" y="0"/>
+          <a:chExt cx="0" cy="0"/>
+        </a:xfrm>
+      </p:grpSpPr>
+      <p:graphicFrame>
+        <p:nvGraphicFramePr>
+          <p:cNvPr id="2" name="Object 1" hidden="1"/>
+          <p:cNvGraphicFramePr>
+            <a:graphicFrameLocks noChangeAspect="1"/>
+          </p:cNvGraphicFramePr>
+          <p:nvPr>
+            <p:custDataLst>
+              <p:tags r:id="rId2"/>
+            </p:custDataLst>
+            <p:extLst>
+              <p:ext uri="{D42A27DB-BD31-4B8C-83A1-F6EECF244321}">
+                <p14:modId xmlns:p14="http://schemas.microsoft.com/office/powerpoint/2010/main" val="3859461230"/>
+              </p:ext>
+            </p:extLst>
+          </p:nvPr>
+        </p:nvGraphicFramePr>
+        <p:xfrm>
+          <a:off x="0" y="0"/>
+          <a:ext cx="158750" cy="158750"/>
+        </p:xfrm>
+        <a:graphic>
+          <a:graphicData uri="http://schemas.openxmlformats.org/presentationml/2006/ole">
+            <mc:AlternateContent xmlns:mc="http://schemas.openxmlformats.org/markup-compatibility/2006">
+              <mc:Choice xmlns:v="urn:schemas-microsoft-com:vml" Requires="v">
+                <p:oleObj spid="_x0000_s58450" name="think-cell Slide" r:id="rId5" imgW="270" imgH="270" progId="TCLayout.ActiveDocument.1">
+                  <p:embed/>
+                </p:oleObj>
+              </mc:Choice>
+              <mc:Fallback>
+                <p:oleObj name="think-cell Slide" r:id="rId5" imgW="270" imgH="270" progId="TCLayout.ActiveDocument.1">
+                  <p:embed/>
+                  <p:pic>
+                    <p:nvPicPr>
+                      <p:cNvPr id="0" name=""/>
+                      <p:cNvPicPr/>
+                      <p:nvPr/>
+                    </p:nvPicPr>
+                    <p:blipFill>
+                      <a:blip r:embed="rId6"/>
+                      <a:stretch>
+                        <a:fillRect/>
+                      </a:stretch>
+                    </p:blipFill>
+                    <p:spPr>
+                      <a:xfrm>
+                        <a:off x="0" y="0"/>
+                        <a:ext cx="158750" cy="158750"/>
+                      </a:xfrm>
+                      <a:prstGeom prst="rect">
+                        <a:avLst/>
+                      </a:prstGeom>
+                    </p:spPr>
+                  </p:pic>
+                </p:oleObj>
+              </mc:Fallback>
+            </mc:AlternateContent>
+          </a:graphicData>
+        </a:graphic>
+      </p:graphicFrame>
+    </p:spTree>
+    <p:extLst>
+      <p:ext uri="{BB962C8B-B14F-4D97-AF65-F5344CB8AC3E}">
+        <p14:creationId xmlns:p14="http://schemas.microsoft.com/office/powerpoint/2010/main" val="1847082904"/>
+      </p:ext>
+    </p:extLst>
+  </p:cSld>
+  <p:clrMapOvr>
+    <a:masterClrMapping/>
+  </p:clrMapOvr>
+  <mc:AlternateContent xmlns:mc="http://schemas.openxmlformats.org/markup-compatibility/2006" xmlns:p14="http://schemas.microsoft.com/office/powerpoint/2010/main">
+    <mc:Choice Requires="p14">
+      <p:transition spd="med" p14:dur="700">
+        <p:fade/>
+      </p:transition>
+    </mc:Choice>
+    <mc:Fallback xmlns="">
+      <p:transition spd="med">
+        <p:fade/>
+      </p:transition>
+    </mc:Fallback>
+  </mc:AlternateContent>
+  <p:timing>
+    <p:tnLst>
+      <p:par>
+        <p:cTn id="1" dur="indefinite" restart="never" nodeType="tmRoot"/>
+      </p:par>
+    </p:tnLst>
+  </p:timing>
+</p:sld>
+</file>
+
 <file path=ppt/slides/slide3.xml><?xml version="1.0" encoding="utf-8"?>
 <p:sld xmlns:a="http://schemas.openxmlformats.org/drawingml/2006/main" xmlns:r="http://schemas.openxmlformats.org/officeDocument/2006/relationships" xmlns:p="http://schemas.openxmlformats.org/presentationml/2006/main">
   <p:cSld>
@@ -30094,7 +30831,7 @@
           <a:graphicData uri="http://schemas.openxmlformats.org/presentationml/2006/ole">
             <mc:AlternateContent xmlns:mc="http://schemas.openxmlformats.org/markup-compatibility/2006">
               <mc:Choice xmlns:v="urn:schemas-microsoft-com:vml" Requires="v">
-                <p:oleObj spid="_x0000_s23633" name="think-cell Slide" r:id="rId7" imgW="270" imgH="270" progId="TCLayout.ActiveDocument.1">
+                <p:oleObj spid="_x0000_s23639" name="think-cell Slide" r:id="rId7" imgW="270" imgH="270" progId="TCLayout.ActiveDocument.1">
                   <p:embed/>
                 </p:oleObj>
               </mc:Choice>
@@ -30310,7 +31047,7 @@
           <a:graphicData uri="http://schemas.openxmlformats.org/presentationml/2006/ole">
             <mc:AlternateContent xmlns:mc="http://schemas.openxmlformats.org/markup-compatibility/2006">
               <mc:Choice xmlns:v="urn:schemas-microsoft-com:vml" Requires="v">
-                <p:oleObj spid="_x0000_s60457" name="think-cell Slide" r:id="rId5" imgW="270" imgH="270" progId="TCLayout.ActiveDocument.1">
+                <p:oleObj spid="_x0000_s60463" name="think-cell Slide" r:id="rId5" imgW="270" imgH="270" progId="TCLayout.ActiveDocument.1">
                   <p:embed/>
                 </p:oleObj>
               </mc:Choice>
@@ -32218,7 +32955,7 @@
           <a:graphicData uri="http://schemas.openxmlformats.org/presentationml/2006/ole">
             <mc:AlternateContent xmlns:mc="http://schemas.openxmlformats.org/markup-compatibility/2006">
               <mc:Choice xmlns:v="urn:schemas-microsoft-com:vml" Requires="v">
-                <p:oleObj spid="_x0000_s61485" name="think-cell Slide" r:id="rId5" imgW="270" imgH="270" progId="TCLayout.ActiveDocument.1">
+                <p:oleObj spid="_x0000_s61491" name="think-cell Slide" r:id="rId5" imgW="270" imgH="270" progId="TCLayout.ActiveDocument.1">
                   <p:embed/>
                 </p:oleObj>
               </mc:Choice>
@@ -33079,7 +33816,7 @@
           <a:graphicData uri="http://schemas.openxmlformats.org/presentationml/2006/ole">
             <mc:AlternateContent xmlns:mc="http://schemas.openxmlformats.org/markup-compatibility/2006">
               <mc:Choice xmlns:v="urn:schemas-microsoft-com:vml" Requires="v">
-                <p:oleObj spid="_x0000_s66574" name="think-cell Slide" r:id="rId5" imgW="270" imgH="270" progId="TCLayout.ActiveDocument.1">
+                <p:oleObj spid="_x0000_s66580" name="think-cell Slide" r:id="rId5" imgW="270" imgH="270" progId="TCLayout.ActiveDocument.1">
                   <p:embed/>
                 </p:oleObj>
               </mc:Choice>
@@ -35820,7 +36557,7 @@
           <a:graphicData uri="http://schemas.openxmlformats.org/presentationml/2006/ole">
             <mc:AlternateContent xmlns:mc="http://schemas.openxmlformats.org/markup-compatibility/2006">
               <mc:Choice xmlns:v="urn:schemas-microsoft-com:vml" Requires="v">
-                <p:oleObj spid="_x0000_s64550" name="think-cell Slide" r:id="rId5" imgW="270" imgH="270" progId="TCLayout.ActiveDocument.1">
+                <p:oleObj spid="_x0000_s64556" name="think-cell Slide" r:id="rId5" imgW="270" imgH="270" progId="TCLayout.ActiveDocument.1">
                   <p:embed/>
                 </p:oleObj>
               </mc:Choice>
@@ -36559,7 +37296,11 @@
           <a:bodyPr/>
           <a:lstStyle/>
           <a:p>
-            <a:endParaRPr lang="en-US"/>
+            <a:r>
+              <a:rPr lang="en-US" dirty="0" smtClean="0"/>
+              <a:t>http://aka.ms/webcamps-azure</a:t>
+            </a:r>
+            <a:endParaRPr lang="en-US" dirty="0"/>
           </a:p>
         </p:txBody>
       </p:sp>
@@ -37899,6 +38640,26 @@
 </file>
 
 <file path=customXml/item1.xml><?xml version="1.0" encoding="utf-8"?>
+<?mso-contentType ?>
+<FormTemplates xmlns="http://schemas.microsoft.com/sharepoint/v3/contenttype/forms">
+  <Display>DocumentLibraryForm</Display>
+  <Edit>DocumentLibraryForm</Edit>
+  <New>DocumentLibraryForm</New>
+</FormTemplates>
+</file>
+
+<file path=customXml/item2.xml><?xml version="1.0" encoding="utf-8"?>
+<p:properties xmlns:p="http://schemas.microsoft.com/office/2006/metadata/properties" xmlns:xsi="http://www.w3.org/2001/XMLSchema-instance" xmlns:pc="http://schemas.microsoft.com/office/infopath/2007/PartnerControls">
+  <documentManagement>
+    <TaxKeywordTaxHTField xmlns="230e9df3-be65-4c73-a93b-d1236ebd677e">
+      <Terms xmlns="http://schemas.microsoft.com/office/infopath/2007/PartnerControls"/>
+    </TaxKeywordTaxHTField>
+    <TaxCatchAll xmlns="230e9df3-be65-4c73-a93b-d1236ebd677e"/>
+  </documentManagement>
+</p:properties>
+</file>
+
+<file path=customXml/item3.xml><?xml version="1.0" encoding="utf-8"?>
 <ct:contentTypeSchema xmlns:ct="http://schemas.microsoft.com/office/2006/metadata/contentType" xmlns:ma="http://schemas.microsoft.com/office/2006/metadata/properties/metaAttributes" ct:_="" ma:_="" ma:contentTypeName="Document" ma:contentTypeID="0x010100CA05B43BE68FE54B90DD26FDFB72BB05" ma:contentTypeVersion="0" ma:contentTypeDescription="Create a new document." ma:contentTypeScope="" ma:versionID="6df1bece345c1749bd9b91e82fa4a03a">
   <xsd:schema xmlns:xsd="http://www.w3.org/2001/XMLSchema" xmlns:xs="http://www.w3.org/2001/XMLSchema" xmlns:p="http://schemas.microsoft.com/office/2006/metadata/properties" xmlns:ns2="230e9df3-be65-4c73-a93b-d1236ebd677e" targetNamespace="http://schemas.microsoft.com/office/2006/metadata/properties" ma:root="true" ma:fieldsID="e317b0b832c9845d3aae3abd1bb0954e" ns2:_="">
     <xsd:import namespace="230e9df3-be65-4c73-a93b-d1236ebd677e"/>
@@ -38050,27 +38811,31 @@
 </ct:contentTypeSchema>
 </file>
 
-<file path=customXml/item2.xml><?xml version="1.0" encoding="utf-8"?>
-<?mso-contentType ?>
-<FormTemplates xmlns="http://schemas.microsoft.com/sharepoint/v3/contenttype/forms">
-  <Display>DocumentLibraryForm</Display>
-  <Edit>DocumentLibraryForm</Edit>
-  <New>DocumentLibraryForm</New>
-</FormTemplates>
+<file path=customXml/itemProps1.xml><?xml version="1.0" encoding="utf-8"?>
+<ds:datastoreItem xmlns:ds="http://schemas.openxmlformats.org/officeDocument/2006/customXml" ds:itemID="{B882D8D6-9D38-4159-A398-AAC3689D3D7C}">
+  <ds:schemaRefs>
+    <ds:schemaRef ds:uri="http://schemas.microsoft.com/sharepoint/v3/contenttype/forms"/>
+  </ds:schemaRefs>
+</ds:datastoreItem>
 </file>
 
-<file path=customXml/item3.xml><?xml version="1.0" encoding="utf-8"?>
-<p:properties xmlns:p="http://schemas.microsoft.com/office/2006/metadata/properties" xmlns:xsi="http://www.w3.org/2001/XMLSchema-instance" xmlns:pc="http://schemas.microsoft.com/office/infopath/2007/PartnerControls">
-  <documentManagement>
-    <TaxKeywordTaxHTField xmlns="230e9df3-be65-4c73-a93b-d1236ebd677e">
-      <Terms xmlns="http://schemas.microsoft.com/office/infopath/2007/PartnerControls"/>
-    </TaxKeywordTaxHTField>
-    <TaxCatchAll xmlns="230e9df3-be65-4c73-a93b-d1236ebd677e"/>
-  </documentManagement>
-</p:properties>
+<file path=customXml/itemProps2.xml><?xml version="1.0" encoding="utf-8"?>
+<ds:datastoreItem xmlns:ds="http://schemas.openxmlformats.org/officeDocument/2006/customXml" ds:itemID="{69B2F97D-0457-4986-9734-D03EB073C5EA}">
+  <ds:schemaRefs>
+    <ds:schemaRef ds:uri="http://purl.org/dc/terms/"/>
+    <ds:schemaRef ds:uri="http://schemas.microsoft.com/office/2006/documentManagement/types"/>
+    <ds:schemaRef ds:uri="http://schemas.openxmlformats.org/package/2006/metadata/core-properties"/>
+    <ds:schemaRef ds:uri="http://purl.org/dc/elements/1.1/"/>
+    <ds:schemaRef ds:uri="http://schemas.microsoft.com/office/2006/metadata/properties"/>
+    <ds:schemaRef ds:uri="http://schemas.microsoft.com/office/infopath/2007/PartnerControls"/>
+    <ds:schemaRef ds:uri="230e9df3-be65-4c73-a93b-d1236ebd677e"/>
+    <ds:schemaRef ds:uri="http://www.w3.org/XML/1998/namespace"/>
+    <ds:schemaRef ds:uri="http://purl.org/dc/dcmitype/"/>
+  </ds:schemaRefs>
+</ds:datastoreItem>
 </file>
 
-<file path=customXml/itemProps1.xml><?xml version="1.0" encoding="utf-8"?>
+<file path=customXml/itemProps3.xml><?xml version="1.0" encoding="utf-8"?>
 <ds:datastoreItem xmlns:ds="http://schemas.openxmlformats.org/officeDocument/2006/customXml" ds:itemID="{8F590144-748D-417B-8B69-088F107B0F98}">
   <ds:schemaRefs>
     <ds:schemaRef ds:uri="http://schemas.microsoft.com/office/2006/metadata/contentType"/>
@@ -38086,28 +38851,4 @@
     <ds:schemaRef ds:uri="http://schemas.microsoft.com/internal/obd"/>
   </ds:schemaRefs>
 </ds:datastoreItem>
-</file>
-
-<file path=customXml/itemProps2.xml><?xml version="1.0" encoding="utf-8"?>
-<ds:datastoreItem xmlns:ds="http://schemas.openxmlformats.org/officeDocument/2006/customXml" ds:itemID="{B882D8D6-9D38-4159-A398-AAC3689D3D7C}">
-  <ds:schemaRefs>
-    <ds:schemaRef ds:uri="http://schemas.microsoft.com/sharepoint/v3/contenttype/forms"/>
-  </ds:schemaRefs>
-</ds:datastoreItem>
-</file>
-
-<file path=customXml/itemProps3.xml><?xml version="1.0" encoding="utf-8"?>
-<ds:datastoreItem xmlns:ds="http://schemas.openxmlformats.org/officeDocument/2006/customXml" ds:itemID="{69B2F97D-0457-4986-9734-D03EB073C5EA}">
-  <ds:schemaRefs>
-    <ds:schemaRef ds:uri="http://purl.org/dc/terms/"/>
-    <ds:schemaRef ds:uri="http://schemas.microsoft.com/office/2006/documentManagement/types"/>
-    <ds:schemaRef ds:uri="http://schemas.openxmlformats.org/package/2006/metadata/core-properties"/>
-    <ds:schemaRef ds:uri="http://purl.org/dc/elements/1.1/"/>
-    <ds:schemaRef ds:uri="http://schemas.microsoft.com/office/2006/metadata/properties"/>
-    <ds:schemaRef ds:uri="http://schemas.microsoft.com/office/infopath/2007/PartnerControls"/>
-    <ds:schemaRef ds:uri="230e9df3-be65-4c73-a93b-d1236ebd677e"/>
-    <ds:schemaRef ds:uri="http://www.w3.org/XML/1998/namespace"/>
-    <ds:schemaRef ds:uri="http://purl.org/dc/dcmitype/"/>
-  </ds:schemaRefs>
-</ds:datastoreItem>
 </file>
</xml_diff>

<commit_message>
Added information about ASP.NET and Web Tools update
</commit_message>
<xml_diff>
--- a/WebCampsKeynote.pptx
+++ b/WebCampsKeynote.pptx
@@ -6,10 +6,10 @@
     <p:sldMasterId id="2147483779" r:id="rId5"/>
   </p:sldMasterIdLst>
   <p:notesMasterIdLst>
-    <p:notesMasterId r:id="rId29"/>
+    <p:notesMasterId r:id="rId30"/>
   </p:notesMasterIdLst>
   <p:handoutMasterIdLst>
-    <p:handoutMasterId r:id="rId30"/>
+    <p:handoutMasterId r:id="rId31"/>
   </p:handoutMasterIdLst>
   <p:sldIdLst>
     <p:sldId id="295" r:id="rId6"/>
@@ -21,51 +21,52 @@
     <p:sldId id="296" r:id="rId12"/>
     <p:sldId id="303" r:id="rId13"/>
     <p:sldId id="301" r:id="rId14"/>
-    <p:sldId id="299" r:id="rId15"/>
-    <p:sldId id="304" r:id="rId16"/>
-    <p:sldId id="313" r:id="rId17"/>
-    <p:sldId id="306" r:id="rId18"/>
-    <p:sldId id="307" r:id="rId19"/>
-    <p:sldId id="308" r:id="rId20"/>
-    <p:sldId id="309" r:id="rId21"/>
-    <p:sldId id="310" r:id="rId22"/>
-    <p:sldId id="311" r:id="rId23"/>
-    <p:sldId id="312" r:id="rId24"/>
-    <p:sldId id="305" r:id="rId25"/>
-    <p:sldId id="300" r:id="rId26"/>
-    <p:sldId id="291" r:id="rId27"/>
-    <p:sldId id="292" r:id="rId28"/>
+    <p:sldId id="316" r:id="rId15"/>
+    <p:sldId id="299" r:id="rId16"/>
+    <p:sldId id="304" r:id="rId17"/>
+    <p:sldId id="313" r:id="rId18"/>
+    <p:sldId id="306" r:id="rId19"/>
+    <p:sldId id="307" r:id="rId20"/>
+    <p:sldId id="308" r:id="rId21"/>
+    <p:sldId id="309" r:id="rId22"/>
+    <p:sldId id="310" r:id="rId23"/>
+    <p:sldId id="311" r:id="rId24"/>
+    <p:sldId id="312" r:id="rId25"/>
+    <p:sldId id="305" r:id="rId26"/>
+    <p:sldId id="300" r:id="rId27"/>
+    <p:sldId id="291" r:id="rId28"/>
+    <p:sldId id="292" r:id="rId29"/>
   </p:sldIdLst>
   <p:sldSz cx="12188825" cy="6858000"/>
   <p:notesSz cx="6858000" cy="9296400"/>
   <p:embeddedFontLst>
     <p:embeddedFont>
+      <p:font typeface="Segoe Light" panose="020B0604020202020204" charset="0"/>
+      <p:regular r:id="rId32"/>
+      <p:italic r:id="rId33"/>
+    </p:embeddedFont>
+    <p:embeddedFont>
       <p:font typeface="Segoe UI Light" panose="020B0502040204020203" pitchFamily="34" charset="0"/>
-      <p:regular r:id="rId31"/>
-      <p:italic r:id="rId32"/>
+      <p:regular r:id="rId34"/>
+      <p:italic r:id="rId35"/>
     </p:embeddedFont>
     <p:embeddedFont>
       <p:font typeface="Segoe UI" panose="020B0502040204020203" pitchFamily="34" charset="0"/>
-      <p:regular r:id="rId33"/>
-      <p:bold r:id="rId34"/>
-      <p:italic r:id="rId35"/>
-      <p:boldItalic r:id="rId36"/>
+      <p:regular r:id="rId36"/>
+      <p:bold r:id="rId37"/>
+      <p:italic r:id="rId38"/>
+      <p:boldItalic r:id="rId39"/>
     </p:embeddedFont>
     <p:embeddedFont>
       <p:font typeface="Consolas" panose="020B0609020204030204" pitchFamily="49" charset="0"/>
-      <p:regular r:id="rId37"/>
-      <p:bold r:id="rId38"/>
-      <p:italic r:id="rId39"/>
-      <p:boldItalic r:id="rId40"/>
-    </p:embeddedFont>
-    <p:embeddedFont>
-      <p:font typeface="Segoe Light" panose="020B0604020202020204" charset="0"/>
-      <p:regular r:id="rId41"/>
+      <p:regular r:id="rId40"/>
+      <p:bold r:id="rId41"/>
       <p:italic r:id="rId42"/>
+      <p:boldItalic r:id="rId43"/>
     </p:embeddedFont>
   </p:embeddedFontLst>
   <p:custDataLst>
-    <p:tags r:id="rId43"/>
+    <p:tags r:id="rId44"/>
   </p:custDataLst>
   <p:defaultTextStyle>
     <a:defPPr>
@@ -10765,7 +10766,7 @@
               <a:rPr lang="en-US" smtClean="0">
                 <a:latin typeface="Segoe UI" pitchFamily="34" charset="0"/>
               </a:rPr>
-              <a:t>12/7/2012</a:t>
+              <a:t>12/10/2012</a:t>
             </a:fld>
             <a:endParaRPr lang="en-US" dirty="0">
               <a:latin typeface="Segoe UI" pitchFamily="34" charset="0"/>
@@ -10947,7 +10948,7 @@
             <a:fld id="{CAE3F082-F902-42D8-A765-720E172C3194}" type="datetimeFigureOut">
               <a:rPr lang="en-US" smtClean="0"/>
               <a:pPr/>
-              <a:t>12/7/2012</a:t>
+              <a:t>12/10/2012</a:t>
             </a:fld>
             <a:endParaRPr lang="en-US" dirty="0"/>
           </a:p>
@@ -11545,7 +11546,7 @@
             <a:fld id="{82AABF77-E2E4-44CA-BA5C-65E132CF08D8}" type="slidenum">
               <a:rPr lang="en-US" smtClean="0"/>
               <a:pPr/>
-              <a:t>20</a:t>
+              <a:t>21</a:t>
             </a:fld>
             <a:endParaRPr lang="en-US" dirty="0"/>
           </a:p>
@@ -11638,7 +11639,7 @@
             <a:fld id="{82AABF77-E2E4-44CA-BA5C-65E132CF08D8}" type="slidenum">
               <a:rPr lang="en-US" smtClean="0"/>
               <a:pPr/>
-              <a:t>21</a:t>
+              <a:t>22</a:t>
             </a:fld>
             <a:endParaRPr lang="en-US" dirty="0"/>
           </a:p>
@@ -11723,7 +11724,7 @@
             <a:fld id="{82AABF77-E2E4-44CA-BA5C-65E132CF08D8}" type="slidenum">
               <a:rPr lang="en-US" smtClean="0"/>
               <a:pPr/>
-              <a:t>22</a:t>
+              <a:t>23</a:t>
             </a:fld>
             <a:endParaRPr lang="en-US" dirty="0"/>
           </a:p>
@@ -11812,7 +11813,7 @@
           <a:p>
             <a:fld id="{82AABF77-E2E4-44CA-BA5C-65E132CF08D8}" type="slidenum">
               <a:rPr lang="en-US" smtClean="0"/>
-              <a:t>23</a:t>
+              <a:t>24</a:t>
             </a:fld>
             <a:endParaRPr lang="en-US" dirty="0"/>
           </a:p>
@@ -12507,7 +12508,7 @@
             <a:fld id="{82AABF77-E2E4-44CA-BA5C-65E132CF08D8}" type="slidenum">
               <a:rPr lang="en-US" smtClean="0"/>
               <a:pPr/>
-              <a:t>10</a:t>
+              <a:t>11</a:t>
             </a:fld>
             <a:endParaRPr lang="en-US" dirty="0"/>
           </a:p>
@@ -12596,7 +12597,7 @@
             <a:fld id="{82AABF77-E2E4-44CA-BA5C-65E132CF08D8}" type="slidenum">
               <a:rPr lang="en-US" smtClean="0"/>
               <a:pPr/>
-              <a:t>11</a:t>
+              <a:t>12</a:t>
             </a:fld>
             <a:endParaRPr lang="en-US" dirty="0"/>
           </a:p>
@@ -23796,7 +23797,7 @@
                 <a:buSzPct val="80000"/>
               </a:pPr>
               <a:r>
-                <a:rPr lang="en-US" sz="2600" spc="-100" dirty="0" smtClean="0">
+                <a:rPr lang="en-US" sz="2600" spc="-100" smtClean="0">
                   <a:gradFill>
                     <a:gsLst>
                       <a:gs pos="0">
@@ -23810,92 +23811,7 @@
                   </a:gradFill>
                   <a:latin typeface="Segoe UI Light" pitchFamily="34" charset="0"/>
                 </a:rPr>
-                <a:t>@</a:t>
-              </a:r>
-              <a:r>
-                <a:rPr lang="en-US" sz="2600" spc="-100" dirty="0" err="1" smtClean="0">
-                  <a:gradFill>
-                    <a:gsLst>
-                      <a:gs pos="0">
-                        <a:srgbClr val="595959"/>
-                      </a:gs>
-                      <a:gs pos="86000">
-                        <a:srgbClr val="595959"/>
-                      </a:gs>
-                    </a:gsLst>
-                    <a:lin ang="5400000" scaled="0"/>
-                  </a:gradFill>
-                  <a:latin typeface="Segoe UI Light" pitchFamily="34" charset="0"/>
-                </a:rPr>
-                <a:t>jongalloway</a:t>
-              </a:r>
-              <a:r>
-                <a:rPr lang="en-US" sz="2600" spc="-100" dirty="0" smtClean="0">
-                  <a:gradFill>
-                    <a:gsLst>
-                      <a:gs pos="0">
-                        <a:srgbClr val="595959"/>
-                      </a:gs>
-                      <a:gs pos="86000">
-                        <a:srgbClr val="595959"/>
-                      </a:gs>
-                    </a:gsLst>
-                    <a:lin ang="5400000" scaled="0"/>
-                  </a:gradFill>
-                  <a:latin typeface="Segoe UI Light" pitchFamily="34" charset="0"/>
-                </a:rPr>
-                <a:t> / @</a:t>
-              </a:r>
-              <a:r>
-                <a:rPr lang="en-US" sz="2600" spc="-100" dirty="0" err="1" smtClean="0">
-                  <a:gradFill>
-                    <a:gsLst>
-                      <a:gs pos="0">
-                        <a:srgbClr val="595959"/>
-                      </a:gs>
-                      <a:gs pos="86000">
-                        <a:srgbClr val="595959"/>
-                      </a:gs>
-                    </a:gsLst>
-                    <a:lin ang="5400000" scaled="0"/>
-                  </a:gradFill>
-                  <a:latin typeface="Segoe UI Light" pitchFamily="34" charset="0"/>
-                </a:rPr>
-                <a:t>bradygaster</a:t>
-              </a:r>
-              <a:r>
-                <a:rPr lang="en-US" sz="2600" spc="-100" dirty="0" smtClean="0">
-                  <a:gradFill>
-                    <a:gsLst>
-                      <a:gs pos="0">
-                        <a:srgbClr val="595959"/>
-                      </a:gs>
-                      <a:gs pos="86000">
-                        <a:srgbClr val="595959"/>
-                      </a:gs>
-                    </a:gsLst>
-                    <a:lin ang="5400000" scaled="0"/>
-                  </a:gradFill>
-                  <a:latin typeface="Segoe UI Light" pitchFamily="34" charset="0"/>
-                </a:rPr>
-                <a:t> / @</a:t>
-              </a:r>
-              <a:r>
-                <a:rPr lang="en-US" sz="2600" spc="-100" dirty="0" err="1" smtClean="0">
-                  <a:gradFill>
-                    <a:gsLst>
-                      <a:gs pos="0">
-                        <a:srgbClr val="595959"/>
-                      </a:gs>
-                      <a:gs pos="86000">
-                        <a:srgbClr val="595959"/>
-                      </a:gs>
-                    </a:gsLst>
-                    <a:lin ang="5400000" scaled="0"/>
-                  </a:gradFill>
-                  <a:latin typeface="Segoe UI Light" pitchFamily="34" charset="0"/>
-                </a:rPr>
-                <a:t>xinqiu</a:t>
+                <a:t>SPEAKER NAME / @HASHTAG</a:t>
               </a:r>
               <a:endParaRPr lang="en-US" sz="2600" spc="-100" dirty="0">
                 <a:gradFill>
@@ -25657,6 +25573,129 @@
           <a:chExt cx="0" cy="0"/>
         </a:xfrm>
       </p:grpSpPr>
+      <p:sp>
+        <p:nvSpPr>
+          <p:cNvPr id="2" name="Title 1"/>
+          <p:cNvSpPr>
+            <a:spLocks noGrp="1"/>
+          </p:cNvSpPr>
+          <p:nvPr>
+            <p:ph type="title"/>
+          </p:nvPr>
+        </p:nvSpPr>
+        <p:spPr/>
+        <p:txBody>
+          <a:bodyPr/>
+          <a:lstStyle/>
+          <a:p>
+            <a:r>
+              <a:rPr lang="en-US" dirty="0"/>
+              <a:t>ASP.NET and Web </a:t>
+            </a:r>
+            <a:r>
+              <a:rPr lang="en-US"/>
+              <a:t>Tools </a:t>
+            </a:r>
+            <a:r>
+              <a:rPr lang="en-US" smtClean="0"/>
+              <a:t>2012.2 RC</a:t>
+            </a:r>
+            <a:endParaRPr lang="en-US" dirty="0"/>
+          </a:p>
+        </p:txBody>
+      </p:sp>
+      <p:sp>
+        <p:nvSpPr>
+          <p:cNvPr id="3" name="Text Placeholder 2"/>
+          <p:cNvSpPr>
+            <a:spLocks noGrp="1"/>
+          </p:cNvSpPr>
+          <p:nvPr>
+            <p:ph type="body" sz="quarter" idx="10"/>
+          </p:nvPr>
+        </p:nvSpPr>
+        <p:spPr>
+          <a:xfrm>
+            <a:off x="519112" y="1447799"/>
+            <a:ext cx="11149013" cy="3231654"/>
+          </a:xfrm>
+        </p:spPr>
+        <p:txBody>
+          <a:bodyPr/>
+          <a:lstStyle/>
+          <a:p>
+            <a:r>
+              <a:rPr lang="en-US" dirty="0" smtClean="0"/>
+              <a:t>Just adds new project templates</a:t>
+            </a:r>
+          </a:p>
+          <a:p>
+            <a:r>
+              <a:rPr lang="en-US" dirty="0" smtClean="0"/>
+              <a:t>No changes to .NET or ASP.NET runtime</a:t>
+            </a:r>
+          </a:p>
+          <a:p>
+            <a:r>
+              <a:rPr lang="en-US" dirty="0" smtClean="0"/>
+              <a:t>Lightweight install (5 minutes, no reboot)</a:t>
+            </a:r>
+          </a:p>
+          <a:p>
+            <a:endParaRPr lang="en-US" dirty="0"/>
+          </a:p>
+          <a:p>
+            <a:r>
+              <a:rPr lang="en-US" dirty="0" smtClean="0"/>
+              <a:t>Download and information: </a:t>
+            </a:r>
+            <a:r>
+              <a:rPr lang="en-US" dirty="0" smtClean="0">
+                <a:hlinkClick r:id="rId2"/>
+              </a:rPr>
+              <a:t>http://asp.net/vnext</a:t>
+            </a:r>
+            <a:r>
+              <a:rPr lang="en-US" dirty="0" smtClean="0"/>
+              <a:t> </a:t>
+            </a:r>
+            <a:endParaRPr lang="en-US" dirty="0"/>
+          </a:p>
+        </p:txBody>
+      </p:sp>
+    </p:spTree>
+    <p:extLst>
+      <p:ext uri="{BB962C8B-B14F-4D97-AF65-F5344CB8AC3E}">
+        <p14:creationId xmlns:p14="http://schemas.microsoft.com/office/powerpoint/2010/main" val="2917005989"/>
+      </p:ext>
+    </p:extLst>
+  </p:cSld>
+  <p:clrMapOvr>
+    <a:masterClrMapping/>
+  </p:clrMapOvr>
+  <p:transition>
+    <p:fade/>
+  </p:transition>
+</p:sld>
+</file>
+
+<file path=ppt/slides/slide11.xml><?xml version="1.0" encoding="utf-8"?>
+<p:sld xmlns:a="http://schemas.openxmlformats.org/drawingml/2006/main" xmlns:r="http://schemas.openxmlformats.org/officeDocument/2006/relationships" xmlns:p="http://schemas.openxmlformats.org/presentationml/2006/main">
+  <p:cSld>
+    <p:spTree>
+      <p:nvGrpSpPr>
+        <p:cNvPr id="1" name=""/>
+        <p:cNvGrpSpPr/>
+        <p:nvPr/>
+      </p:nvGrpSpPr>
+      <p:grpSpPr>
+        <a:xfrm>
+          <a:off x="0" y="0"/>
+          <a:ext cx="0" cy="0"/>
+          <a:chOff x="0" y="0"/>
+          <a:chExt cx="0" cy="0"/>
+        </a:xfrm>
+      </p:grpSpPr>
       <p:graphicFrame>
         <p:nvGraphicFramePr>
           <p:cNvPr id="2" name="Object 1" hidden="1"/>
@@ -25682,7 +25721,7 @@
           <a:graphicData uri="http://schemas.openxmlformats.org/presentationml/2006/ole">
             <mc:AlternateContent xmlns:mc="http://schemas.openxmlformats.org/markup-compatibility/2006">
               <mc:Choice xmlns:v="urn:schemas-microsoft-com:vml" Requires="v">
-                <p:oleObj spid="_x0000_s64566" name="think-cell Slide" r:id="rId5" imgW="270" imgH="270" progId="TCLayout.ActiveDocument.1">
+                <p:oleObj spid="_x0000_s64569" name="think-cell Slide" r:id="rId5" imgW="270" imgH="270" progId="TCLayout.ActiveDocument.1">
                   <p:embed/>
                 </p:oleObj>
               </mc:Choice>
@@ -26366,7 +26405,7 @@
 </p:sld>
 </file>
 
-<file path=ppt/slides/slide11.xml><?xml version="1.0" encoding="utf-8"?>
+<file path=ppt/slides/slide12.xml><?xml version="1.0" encoding="utf-8"?>
 <p:sld xmlns:a="http://schemas.openxmlformats.org/drawingml/2006/main" xmlns:r="http://schemas.openxmlformats.org/officeDocument/2006/relationships" xmlns:p="http://schemas.openxmlformats.org/presentationml/2006/main">
   <p:cSld>
     <p:spTree>
@@ -26475,7 +26514,7 @@
 </p:sld>
 </file>
 
-<file path=ppt/slides/slide12.xml><?xml version="1.0" encoding="utf-8"?>
+<file path=ppt/slides/slide13.xml><?xml version="1.0" encoding="utf-8"?>
 <p:sld xmlns:a="http://schemas.openxmlformats.org/drawingml/2006/main" xmlns:r="http://schemas.openxmlformats.org/officeDocument/2006/relationships" xmlns:p="http://schemas.openxmlformats.org/presentationml/2006/main">
   <p:cSld>
     <p:spTree>
@@ -26544,7 +26583,7 @@
 </p:sld>
 </file>
 
-<file path=ppt/slides/slide13.xml><?xml version="1.0" encoding="utf-8"?>
+<file path=ppt/slides/slide14.xml><?xml version="1.0" encoding="utf-8"?>
 <p:sld xmlns:a="http://schemas.openxmlformats.org/drawingml/2006/main" xmlns:r="http://schemas.openxmlformats.org/officeDocument/2006/relationships" xmlns:p="http://schemas.openxmlformats.org/presentationml/2006/main">
   <p:cSld>
     <p:spTree>
@@ -26614,7 +26653,7 @@
 </p:sld>
 </file>
 
-<file path=ppt/slides/slide14.xml><?xml version="1.0" encoding="utf-8"?>
+<file path=ppt/slides/slide15.xml><?xml version="1.0" encoding="utf-8"?>
 <p:sld xmlns:a="http://schemas.openxmlformats.org/drawingml/2006/main" xmlns:r="http://schemas.openxmlformats.org/officeDocument/2006/relationships" xmlns:p="http://schemas.openxmlformats.org/presentationml/2006/main">
   <p:cSld>
     <p:spTree>
@@ -26684,7 +26723,7 @@
 </p:sld>
 </file>
 
-<file path=ppt/slides/slide15.xml><?xml version="1.0" encoding="utf-8"?>
+<file path=ppt/slides/slide16.xml><?xml version="1.0" encoding="utf-8"?>
 <p:sld xmlns:a="http://schemas.openxmlformats.org/drawingml/2006/main" xmlns:r="http://schemas.openxmlformats.org/officeDocument/2006/relationships" xmlns:p="http://schemas.openxmlformats.org/presentationml/2006/main">
   <p:cSld>
     <p:spTree>
@@ -26754,7 +26793,7 @@
 </p:sld>
 </file>
 
-<file path=ppt/slides/slide16.xml><?xml version="1.0" encoding="utf-8"?>
+<file path=ppt/slides/slide17.xml><?xml version="1.0" encoding="utf-8"?>
 <p:sld xmlns:a="http://schemas.openxmlformats.org/drawingml/2006/main" xmlns:r="http://schemas.openxmlformats.org/officeDocument/2006/relationships" xmlns:p="http://schemas.openxmlformats.org/presentationml/2006/main">
   <p:cSld>
     <p:spTree>
@@ -26824,7 +26863,7 @@
 </p:sld>
 </file>
 
-<file path=ppt/slides/slide17.xml><?xml version="1.0" encoding="utf-8"?>
+<file path=ppt/slides/slide18.xml><?xml version="1.0" encoding="utf-8"?>
 <p:sld xmlns:a="http://schemas.openxmlformats.org/drawingml/2006/main" xmlns:r="http://schemas.openxmlformats.org/officeDocument/2006/relationships" xmlns:p="http://schemas.openxmlformats.org/presentationml/2006/main">
   <p:cSld>
     <p:spTree>
@@ -26894,7 +26933,7 @@
 </p:sld>
 </file>
 
-<file path=ppt/slides/slide18.xml><?xml version="1.0" encoding="utf-8"?>
+<file path=ppt/slides/slide19.xml><?xml version="1.0" encoding="utf-8"?>
 <p:sld xmlns:a="http://schemas.openxmlformats.org/drawingml/2006/main" xmlns:r="http://schemas.openxmlformats.org/officeDocument/2006/relationships" xmlns:p="http://schemas.openxmlformats.org/presentationml/2006/main">
   <p:cSld>
     <p:spTree>
@@ -26945,76 +26984,6 @@
     <p:extLst>
       <p:ext uri="{BB962C8B-B14F-4D97-AF65-F5344CB8AC3E}">
         <p14:creationId xmlns:p14="http://schemas.microsoft.com/office/powerpoint/2010/main" val="416633698"/>
-      </p:ext>
-    </p:extLst>
-  </p:cSld>
-  <p:clrMapOvr>
-    <a:masterClrMapping/>
-  </p:clrMapOvr>
-  <p:transition>
-    <p:fade/>
-  </p:transition>
-  <p:timing>
-    <p:tnLst>
-      <p:par>
-        <p:cTn id="1" dur="indefinite" restart="never" nodeType="tmRoot"/>
-      </p:par>
-    </p:tnLst>
-  </p:timing>
-</p:sld>
-</file>
-
-<file path=ppt/slides/slide19.xml><?xml version="1.0" encoding="utf-8"?>
-<p:sld xmlns:a="http://schemas.openxmlformats.org/drawingml/2006/main" xmlns:r="http://schemas.openxmlformats.org/officeDocument/2006/relationships" xmlns:p="http://schemas.openxmlformats.org/presentationml/2006/main">
-  <p:cSld>
-    <p:spTree>
-      <p:nvGrpSpPr>
-        <p:cNvPr id="1" name=""/>
-        <p:cNvGrpSpPr/>
-        <p:nvPr/>
-      </p:nvGrpSpPr>
-      <p:grpSpPr>
-        <a:xfrm>
-          <a:off x="0" y="0"/>
-          <a:ext cx="0" cy="0"/>
-          <a:chOff x="0" y="0"/>
-          <a:chExt cx="0" cy="0"/>
-        </a:xfrm>
-      </p:grpSpPr>
-      <p:pic>
-        <p:nvPicPr>
-          <p:cNvPr id="2" name="Picture 1" descr="Windows Azure - Windows Internet Explorer - [InPrivate]"/>
-          <p:cNvPicPr>
-            <a:picLocks noChangeAspect="1"/>
-          </p:cNvPicPr>
-          <p:nvPr/>
-        </p:nvPicPr>
-        <p:blipFill>
-          <a:blip r:embed="rId2">
-            <a:extLst>
-              <a:ext uri="{28A0092B-C50C-407E-A947-70E740481C1C}">
-                <a14:useLocalDpi xmlns:a14="http://schemas.microsoft.com/office/drawing/2010/main" val="0"/>
-              </a:ext>
-            </a:extLst>
-          </a:blip>
-          <a:stretch>
-            <a:fillRect/>
-          </a:stretch>
-        </p:blipFill>
-        <p:spPr>
-          <a:xfrm>
-            <a:off x="0" y="125345"/>
-            <a:ext cx="12188825" cy="6607309"/>
-          </a:xfrm>
-          <a:prstGeom prst="rect">
-            <a:avLst/>
-          </a:prstGeom>
-        </p:spPr>
-      </p:pic>
-    </p:spTree>
-    <p:extLst>
-      <p:ext uri="{BB962C8B-B14F-4D97-AF65-F5344CB8AC3E}">
-        <p14:creationId xmlns:p14="http://schemas.microsoft.com/office/powerpoint/2010/main" val="3930209509"/>
       </p:ext>
     </p:extLst>
   </p:cSld>
@@ -27098,7 +27067,6 @@
               <a:rPr lang="en-US" dirty="0" smtClean="0"/>
               <a:t>Wireless information:</a:t>
             </a:r>
-            <a:endParaRPr lang="en-US" dirty="0" smtClean="0"/>
           </a:p>
         </p:txBody>
       </p:sp>
@@ -27142,6 +27110,76 @@
           <a:chExt cx="0" cy="0"/>
         </a:xfrm>
       </p:grpSpPr>
+      <p:pic>
+        <p:nvPicPr>
+          <p:cNvPr id="2" name="Picture 1" descr="Windows Azure - Windows Internet Explorer - [InPrivate]"/>
+          <p:cNvPicPr>
+            <a:picLocks noChangeAspect="1"/>
+          </p:cNvPicPr>
+          <p:nvPr/>
+        </p:nvPicPr>
+        <p:blipFill>
+          <a:blip r:embed="rId2">
+            <a:extLst>
+              <a:ext uri="{28A0092B-C50C-407E-A947-70E740481C1C}">
+                <a14:useLocalDpi xmlns:a14="http://schemas.microsoft.com/office/drawing/2010/main" val="0"/>
+              </a:ext>
+            </a:extLst>
+          </a:blip>
+          <a:stretch>
+            <a:fillRect/>
+          </a:stretch>
+        </p:blipFill>
+        <p:spPr>
+          <a:xfrm>
+            <a:off x="0" y="125345"/>
+            <a:ext cx="12188825" cy="6607309"/>
+          </a:xfrm>
+          <a:prstGeom prst="rect">
+            <a:avLst/>
+          </a:prstGeom>
+        </p:spPr>
+      </p:pic>
+    </p:spTree>
+    <p:extLst>
+      <p:ext uri="{BB962C8B-B14F-4D97-AF65-F5344CB8AC3E}">
+        <p14:creationId xmlns:p14="http://schemas.microsoft.com/office/powerpoint/2010/main" val="3930209509"/>
+      </p:ext>
+    </p:extLst>
+  </p:cSld>
+  <p:clrMapOvr>
+    <a:masterClrMapping/>
+  </p:clrMapOvr>
+  <p:transition>
+    <p:fade/>
+  </p:transition>
+  <p:timing>
+    <p:tnLst>
+      <p:par>
+        <p:cTn id="1" dur="indefinite" restart="never" nodeType="tmRoot"/>
+      </p:par>
+    </p:tnLst>
+  </p:timing>
+</p:sld>
+</file>
+
+<file path=ppt/slides/slide21.xml><?xml version="1.0" encoding="utf-8"?>
+<p:sld xmlns:a="http://schemas.openxmlformats.org/drawingml/2006/main" xmlns:r="http://schemas.openxmlformats.org/officeDocument/2006/relationships" xmlns:p="http://schemas.openxmlformats.org/presentationml/2006/main">
+  <p:cSld>
+    <p:spTree>
+      <p:nvGrpSpPr>
+        <p:cNvPr id="1" name=""/>
+        <p:cNvGrpSpPr/>
+        <p:nvPr/>
+      </p:nvGrpSpPr>
+      <p:grpSpPr>
+        <a:xfrm>
+          <a:off x="0" y="0"/>
+          <a:ext cx="0" cy="0"/>
+          <a:chOff x="0" y="0"/>
+          <a:chExt cx="0" cy="0"/>
+        </a:xfrm>
+      </p:grpSpPr>
       <p:graphicFrame>
         <p:nvGraphicFramePr>
           <p:cNvPr id="2" name="Object 1" hidden="1"/>
@@ -27163,7 +27201,7 @@
           <a:graphicData uri="http://schemas.openxmlformats.org/presentationml/2006/ole">
             <mc:AlternateContent xmlns:mc="http://schemas.openxmlformats.org/markup-compatibility/2006">
               <mc:Choice xmlns:v="urn:schemas-microsoft-com:vml" Requires="v">
-                <p:oleObj spid="_x0000_s67609" name="think-cell Slide" r:id="rId5" imgW="270" imgH="270" progId="TCLayout.ActiveDocument.1">
+                <p:oleObj spid="_x0000_s67612" name="think-cell Slide" r:id="rId5" imgW="270" imgH="270" progId="TCLayout.ActiveDocument.1">
                   <p:embed/>
                 </p:oleObj>
               </mc:Choice>
@@ -28907,7 +28945,7 @@
 </p:sld>
 </file>
 
-<file path=ppt/slides/slide21.xml><?xml version="1.0" encoding="utf-8"?>
+<file path=ppt/slides/slide22.xml><?xml version="1.0" encoding="utf-8"?>
 <p:sld xmlns:a="http://schemas.openxmlformats.org/drawingml/2006/main" xmlns:r="http://schemas.openxmlformats.org/officeDocument/2006/relationships" xmlns:p="http://schemas.openxmlformats.org/presentationml/2006/main">
   <p:cSld>
     <p:spTree>
@@ -28949,7 +28987,7 @@
           <a:graphicData uri="http://schemas.openxmlformats.org/presentationml/2006/ole">
             <mc:AlternateContent xmlns:mc="http://schemas.openxmlformats.org/markup-compatibility/2006">
               <mc:Choice xmlns:v="urn:schemas-microsoft-com:vml" Requires="v">
-                <p:oleObj spid="_x0000_s65577" name="think-cell Slide" r:id="rId5" imgW="270" imgH="270" progId="TCLayout.ActiveDocument.1">
+                <p:oleObj spid="_x0000_s65580" name="think-cell Slide" r:id="rId5" imgW="270" imgH="270" progId="TCLayout.ActiveDocument.1">
                   <p:embed/>
                 </p:oleObj>
               </mc:Choice>
@@ -30959,7 +30997,7 @@
 </p:sld>
 </file>
 
-<file path=ppt/slides/slide22.xml><?xml version="1.0" encoding="utf-8"?>
+<file path=ppt/slides/slide23.xml><?xml version="1.0" encoding="utf-8"?>
 <p:sld xmlns:a="http://schemas.openxmlformats.org/drawingml/2006/main" xmlns:r="http://schemas.openxmlformats.org/officeDocument/2006/relationships" xmlns:p="http://schemas.openxmlformats.org/presentationml/2006/main">
   <p:cSld>
     <p:spTree>
@@ -31001,7 +31039,7 @@
           <a:graphicData uri="http://schemas.openxmlformats.org/presentationml/2006/ole">
             <mc:AlternateContent xmlns:mc="http://schemas.openxmlformats.org/markup-compatibility/2006">
               <mc:Choice xmlns:v="urn:schemas-microsoft-com:vml" Requires="v">
-                <p:oleObj spid="_x0000_s57439" name="think-cell Slide" r:id="rId6" imgW="270" imgH="270" progId="TCLayout.ActiveDocument.1">
+                <p:oleObj spid="_x0000_s57442" name="think-cell Slide" r:id="rId6" imgW="270" imgH="270" progId="TCLayout.ActiveDocument.1">
                   <p:embed/>
                 </p:oleObj>
               </mc:Choice>
@@ -31194,14 +31232,7 @@
                 <a:latin typeface="+mn-lt"/>
                 <a:hlinkClick r:id="rId12"/>
               </a:rPr>
-              <a:t>http://</a:t>
-            </a:r>
-            <a:r>
-              <a:rPr lang="en-US" sz="3200" dirty="0">
-                <a:latin typeface="+mn-lt"/>
-                <a:hlinkClick r:id="rId12"/>
-              </a:rPr>
-              <a:t>aka.ms/webcamps-azure</a:t>
+              <a:t>http://aka.ms/webcamps-azure</a:t>
             </a:r>
             <a:r>
               <a:rPr lang="en-US" sz="3200" dirty="0">
@@ -31515,7 +31546,7 @@
 </p:sld>
 </file>
 
-<file path=ppt/slides/slide23.xml><?xml version="1.0" encoding="utf-8"?>
+<file path=ppt/slides/slide24.xml><?xml version="1.0" encoding="utf-8"?>
 <p:sld xmlns:a="http://schemas.openxmlformats.org/drawingml/2006/main" xmlns:r="http://schemas.openxmlformats.org/officeDocument/2006/relationships" xmlns:p="http://schemas.openxmlformats.org/presentationml/2006/main">
   <p:cSld>
     <p:spTree>
@@ -31557,7 +31588,7 @@
           <a:graphicData uri="http://schemas.openxmlformats.org/presentationml/2006/ole">
             <mc:AlternateContent xmlns:mc="http://schemas.openxmlformats.org/markup-compatibility/2006">
               <mc:Choice xmlns:v="urn:schemas-microsoft-com:vml" Requires="v">
-                <p:oleObj spid="_x0000_s58460" name="think-cell Slide" r:id="rId5" imgW="270" imgH="270" progId="TCLayout.ActiveDocument.1">
+                <p:oleObj spid="_x0000_s58463" name="think-cell Slide" r:id="rId5" imgW="270" imgH="270" progId="TCLayout.ActiveDocument.1">
                   <p:embed/>
                 </p:oleObj>
               </mc:Choice>
@@ -31666,7 +31697,7 @@
           <a:graphicData uri="http://schemas.openxmlformats.org/presentationml/2006/ole">
             <mc:AlternateContent xmlns:mc="http://schemas.openxmlformats.org/markup-compatibility/2006">
               <mc:Choice xmlns:v="urn:schemas-microsoft-com:vml" Requires="v">
-                <p:oleObj spid="_x0000_s59481" name="think-cell Slide" r:id="rId5" imgW="270" imgH="270" progId="TCLayout.ActiveDocument.1">
+                <p:oleObj spid="_x0000_s59484" name="think-cell Slide" r:id="rId5" imgW="270" imgH="270" progId="TCLayout.ActiveDocument.1">
                   <p:embed/>
                 </p:oleObj>
               </mc:Choice>
@@ -31756,14 +31787,12 @@
               <a:rPr lang="en-US" dirty="0" smtClean="0"/>
               <a:t>Name</a:t>
             </a:r>
-            <a:endParaRPr lang="en-US" dirty="0" smtClean="0"/>
           </a:p>
           <a:p>
             <a:r>
               <a:rPr lang="en-US" dirty="0" smtClean="0"/>
               <a:t>Role</a:t>
             </a:r>
-            <a:endParaRPr lang="en-US" dirty="0" smtClean="0"/>
           </a:p>
           <a:p>
             <a:r>
@@ -31848,7 +31877,7 @@
           <a:graphicData uri="http://schemas.openxmlformats.org/presentationml/2006/ole">
             <mc:AlternateContent xmlns:mc="http://schemas.openxmlformats.org/markup-compatibility/2006">
               <mc:Choice xmlns:v="urn:schemas-microsoft-com:vml" Requires="v">
-                <p:oleObj spid="_x0000_s23649" name="think-cell Slide" r:id="rId7" imgW="270" imgH="270" progId="TCLayout.ActiveDocument.1">
+                <p:oleObj spid="_x0000_s23652" name="think-cell Slide" r:id="rId7" imgW="270" imgH="270" progId="TCLayout.ActiveDocument.1">
                   <p:embed/>
                 </p:oleObj>
               </mc:Choice>
@@ -34679,7 +34708,7 @@
           <a:graphicData uri="http://schemas.openxmlformats.org/presentationml/2006/ole">
             <mc:AlternateContent xmlns:mc="http://schemas.openxmlformats.org/markup-compatibility/2006">
               <mc:Choice xmlns:v="urn:schemas-microsoft-com:vml" Requires="v">
-                <p:oleObj spid="_x0000_s60473" name="think-cell Slide" r:id="rId5" imgW="270" imgH="270" progId="TCLayout.ActiveDocument.1">
+                <p:oleObj spid="_x0000_s60476" name="think-cell Slide" r:id="rId5" imgW="270" imgH="270" progId="TCLayout.ActiveDocument.1">
                   <p:embed/>
                 </p:oleObj>
               </mc:Choice>
@@ -36587,7 +36616,7 @@
           <a:graphicData uri="http://schemas.openxmlformats.org/presentationml/2006/ole">
             <mc:AlternateContent xmlns:mc="http://schemas.openxmlformats.org/markup-compatibility/2006">
               <mc:Choice xmlns:v="urn:schemas-microsoft-com:vml" Requires="v">
-                <p:oleObj spid="_x0000_s61501" name="think-cell Slide" r:id="rId5" imgW="270" imgH="270" progId="TCLayout.ActiveDocument.1">
+                <p:oleObj spid="_x0000_s61504" name="think-cell Slide" r:id="rId5" imgW="270" imgH="270" progId="TCLayout.ActiveDocument.1">
                   <p:embed/>
                 </p:oleObj>
               </mc:Choice>
@@ -37448,7 +37477,7 @@
           <a:graphicData uri="http://schemas.openxmlformats.org/presentationml/2006/ole">
             <mc:AlternateContent xmlns:mc="http://schemas.openxmlformats.org/markup-compatibility/2006">
               <mc:Choice xmlns:v="urn:schemas-microsoft-com:vml" Requires="v">
-                <p:oleObj spid="_x0000_s66590" name="think-cell Slide" r:id="rId5" imgW="270" imgH="270" progId="TCLayout.ActiveDocument.1">
+                <p:oleObj spid="_x0000_s66593" name="think-cell Slide" r:id="rId5" imgW="270" imgH="270" progId="TCLayout.ActiveDocument.1">
                   <p:embed/>
                 </p:oleObj>
               </mc:Choice>

</xml_diff>

<commit_message>
Updated with Web Camps TK link
</commit_message>
<xml_diff>
--- a/WebCampsKeynote.pptx
+++ b/WebCampsKeynote.pptx
@@ -41,28 +41,28 @@
   <p:notesSz cx="6858000" cy="9296400"/>
   <p:embeddedFontLst>
     <p:embeddedFont>
-      <p:font typeface="Segoe Light" panose="020B0604020202020204" charset="0"/>
+      <p:font typeface="Segoe UI Light" panose="020B0502040204020203" pitchFamily="34" charset="0"/>
       <p:regular r:id="rId32"/>
       <p:italic r:id="rId33"/>
     </p:embeddedFont>
     <p:embeddedFont>
-      <p:font typeface="Segoe UI Light" panose="020B0502040204020203" pitchFamily="34" charset="0"/>
+      <p:font typeface="Segoe UI" panose="020B0502040204020203" pitchFamily="34" charset="0"/>
       <p:regular r:id="rId34"/>
-      <p:italic r:id="rId35"/>
-    </p:embeddedFont>
-    <p:embeddedFont>
-      <p:font typeface="Segoe UI" panose="020B0502040204020203" pitchFamily="34" charset="0"/>
-      <p:regular r:id="rId36"/>
-      <p:bold r:id="rId37"/>
-      <p:italic r:id="rId38"/>
-      <p:boldItalic r:id="rId39"/>
+      <p:bold r:id="rId35"/>
+      <p:italic r:id="rId36"/>
+      <p:boldItalic r:id="rId37"/>
     </p:embeddedFont>
     <p:embeddedFont>
       <p:font typeface="Consolas" panose="020B0609020204030204" pitchFamily="49" charset="0"/>
-      <p:regular r:id="rId40"/>
-      <p:bold r:id="rId41"/>
-      <p:italic r:id="rId42"/>
-      <p:boldItalic r:id="rId43"/>
+      <p:regular r:id="rId38"/>
+      <p:bold r:id="rId39"/>
+      <p:italic r:id="rId40"/>
+      <p:boldItalic r:id="rId41"/>
+    </p:embeddedFont>
+    <p:embeddedFont>
+      <p:font typeface="Segoe Light" panose="020B0604020202020204" charset="0"/>
+      <p:regular r:id="rId42"/>
+      <p:italic r:id="rId43"/>
     </p:embeddedFont>
   </p:embeddedFontLst>
   <p:custDataLst>
@@ -10766,7 +10766,7 @@
               <a:rPr lang="en-US" smtClean="0">
                 <a:latin typeface="Segoe UI" pitchFamily="34" charset="0"/>
               </a:rPr>
-              <a:t>12/10/2012</a:t>
+              <a:t>12/20/2012</a:t>
             </a:fld>
             <a:endParaRPr lang="en-US" dirty="0">
               <a:latin typeface="Segoe UI" pitchFamily="34" charset="0"/>
@@ -10948,7 +10948,7 @@
             <a:fld id="{CAE3F082-F902-42D8-A765-720E172C3194}" type="datetimeFigureOut">
               <a:rPr lang="en-US" smtClean="0"/>
               <a:pPr/>
-              <a:t>12/10/2012</a:t>
+              <a:t>12/20/2012</a:t>
             </a:fld>
             <a:endParaRPr lang="en-US" dirty="0"/>
           </a:p>
@@ -25721,7 +25721,7 @@
           <a:graphicData uri="http://schemas.openxmlformats.org/presentationml/2006/ole">
             <mc:AlternateContent xmlns:mc="http://schemas.openxmlformats.org/markup-compatibility/2006">
               <mc:Choice xmlns:v="urn:schemas-microsoft-com:vml" Requires="v">
-                <p:oleObj spid="_x0000_s64569" name="think-cell Slide" r:id="rId5" imgW="270" imgH="270" progId="TCLayout.ActiveDocument.1">
+                <p:oleObj spid="_x0000_s64570" name="think-cell Slide" r:id="rId5" imgW="270" imgH="270" progId="TCLayout.ActiveDocument.1">
                   <p:embed/>
                 </p:oleObj>
               </mc:Choice>
@@ -27201,7 +27201,7 @@
           <a:graphicData uri="http://schemas.openxmlformats.org/presentationml/2006/ole">
             <mc:AlternateContent xmlns:mc="http://schemas.openxmlformats.org/markup-compatibility/2006">
               <mc:Choice xmlns:v="urn:schemas-microsoft-com:vml" Requires="v">
-                <p:oleObj spid="_x0000_s67612" name="think-cell Slide" r:id="rId5" imgW="270" imgH="270" progId="TCLayout.ActiveDocument.1">
+                <p:oleObj spid="_x0000_s67613" name="think-cell Slide" r:id="rId5" imgW="270" imgH="270" progId="TCLayout.ActiveDocument.1">
                   <p:embed/>
                 </p:oleObj>
               </mc:Choice>
@@ -28987,7 +28987,7 @@
           <a:graphicData uri="http://schemas.openxmlformats.org/presentationml/2006/ole">
             <mc:AlternateContent xmlns:mc="http://schemas.openxmlformats.org/markup-compatibility/2006">
               <mc:Choice xmlns:v="urn:schemas-microsoft-com:vml" Requires="v">
-                <p:oleObj spid="_x0000_s65580" name="think-cell Slide" r:id="rId5" imgW="270" imgH="270" progId="TCLayout.ActiveDocument.1">
+                <p:oleObj spid="_x0000_s65581" name="think-cell Slide" r:id="rId5" imgW="270" imgH="270" progId="TCLayout.ActiveDocument.1">
                   <p:embed/>
                 </p:oleObj>
               </mc:Choice>
@@ -31039,7 +31039,7 @@
           <a:graphicData uri="http://schemas.openxmlformats.org/presentationml/2006/ole">
             <mc:AlternateContent xmlns:mc="http://schemas.openxmlformats.org/markup-compatibility/2006">
               <mc:Choice xmlns:v="urn:schemas-microsoft-com:vml" Requires="v">
-                <p:oleObj spid="_x0000_s57442" name="think-cell Slide" r:id="rId6" imgW="270" imgH="270" progId="TCLayout.ActiveDocument.1">
+                <p:oleObj spid="_x0000_s57443" name="think-cell Slide" r:id="rId6" imgW="270" imgH="270" progId="TCLayout.ActiveDocument.1">
                   <p:embed/>
                 </p:oleObj>
               </mc:Choice>
@@ -31113,7 +31113,7 @@
         <p:spPr>
           <a:xfrm>
             <a:off x="519112" y="1447799"/>
-            <a:ext cx="11149013" cy="4745915"/>
+            <a:ext cx="11149013" cy="4038029"/>
           </a:xfrm>
         </p:spPr>
         <p:txBody>
@@ -31220,41 +31220,7 @@
               </a:rPr>
               <a:t> </a:t>
             </a:r>
-          </a:p>
-          <a:p>
-            <a:pPr>
-              <a:spcAft>
-                <a:spcPts val="1200"/>
-              </a:spcAft>
-            </a:pPr>
-            <a:r>
-              <a:rPr lang="en-US" sz="3200" dirty="0">
-                <a:latin typeface="+mn-lt"/>
-                <a:hlinkClick r:id="rId12"/>
-              </a:rPr>
-              <a:t>http://aka.ms/webcamps-azure</a:t>
-            </a:r>
-            <a:r>
-              <a:rPr lang="en-US" sz="3200" dirty="0">
-                <a:latin typeface="+mn-lt"/>
-              </a:rPr>
-              <a:t> </a:t>
-            </a:r>
-            <a:r>
-              <a:rPr lang="en-US" sz="3200" dirty="0" smtClean="0"/>
-              <a:t>(free trial)</a:t>
-            </a:r>
             <a:endParaRPr lang="en-US" sz="3200" dirty="0" smtClean="0">
-              <a:latin typeface="+mn-lt"/>
-            </a:endParaRPr>
-          </a:p>
-          <a:p>
-            <a:pPr>
-              <a:spcAft>
-                <a:spcPts val="1200"/>
-              </a:spcAft>
-            </a:pPr>
-            <a:endParaRPr lang="en-US" sz="3200" dirty="0">
               <a:latin typeface="+mn-lt"/>
             </a:endParaRPr>
           </a:p>
@@ -31267,20 +31233,46 @@
             <a:r>
               <a:rPr lang="en-US" sz="3200" dirty="0" smtClean="0">
                 <a:latin typeface="+mn-lt"/>
+                <a:hlinkClick r:id="rId12"/>
               </a:rPr>
-              <a:t>[Reminder: </a:t>
+              <a:t>http://aka.ms/webcamps-training-kit</a:t>
             </a:r>
             <a:r>
-              <a:rPr lang="en-US" sz="3200" dirty="0" err="1" smtClean="0">
+              <a:rPr lang="en-US" sz="3200" dirty="0" smtClean="0">
                 <a:latin typeface="+mn-lt"/>
               </a:rPr>
-              <a:t>Evals</a:t>
+              <a:t> </a:t>
+            </a:r>
+            <a:endParaRPr lang="en-US" sz="3200" dirty="0" smtClean="0">
+              <a:latin typeface="+mn-lt"/>
+            </a:endParaRPr>
+          </a:p>
+          <a:p>
+            <a:pPr>
+              <a:spcAft>
+                <a:spcPts val="1200"/>
+              </a:spcAft>
+            </a:pPr>
+            <a:r>
+              <a:rPr lang="en-US" sz="3200" dirty="0">
+                <a:latin typeface="+mn-lt"/>
+                <a:hlinkClick r:id="rId13"/>
+              </a:rPr>
+              <a:t>http://aka.ms/webcamps-azure</a:t>
             </a:r>
             <a:r>
               <a:rPr lang="en-US" sz="3200" dirty="0">
                 <a:latin typeface="+mn-lt"/>
               </a:rPr>
-              <a:t>]</a:t>
+              <a:t> </a:t>
+            </a:r>
+            <a:r>
+              <a:rPr lang="en-US" sz="3200" dirty="0" smtClean="0"/>
+              <a:t>(free trial</a:t>
+            </a:r>
+            <a:r>
+              <a:rPr lang="en-US" sz="3200" dirty="0" smtClean="0"/>
+              <a:t>)</a:t>
             </a:r>
             <a:endParaRPr lang="en-US" sz="3200" dirty="0" smtClean="0">
               <a:latin typeface="+mn-lt"/>
@@ -31588,7 +31580,7 @@
           <a:graphicData uri="http://schemas.openxmlformats.org/presentationml/2006/ole">
             <mc:AlternateContent xmlns:mc="http://schemas.openxmlformats.org/markup-compatibility/2006">
               <mc:Choice xmlns:v="urn:schemas-microsoft-com:vml" Requires="v">
-                <p:oleObj spid="_x0000_s58463" name="think-cell Slide" r:id="rId5" imgW="270" imgH="270" progId="TCLayout.ActiveDocument.1">
+                <p:oleObj spid="_x0000_s58464" name="think-cell Slide" r:id="rId5" imgW="270" imgH="270" progId="TCLayout.ActiveDocument.1">
                   <p:embed/>
                 </p:oleObj>
               </mc:Choice>
@@ -31697,7 +31689,7 @@
           <a:graphicData uri="http://schemas.openxmlformats.org/presentationml/2006/ole">
             <mc:AlternateContent xmlns:mc="http://schemas.openxmlformats.org/markup-compatibility/2006">
               <mc:Choice xmlns:v="urn:schemas-microsoft-com:vml" Requires="v">
-                <p:oleObj spid="_x0000_s59484" name="think-cell Slide" r:id="rId5" imgW="270" imgH="270" progId="TCLayout.ActiveDocument.1">
+                <p:oleObj spid="_x0000_s59485" name="think-cell Slide" r:id="rId5" imgW="270" imgH="270" progId="TCLayout.ActiveDocument.1">
                   <p:embed/>
                 </p:oleObj>
               </mc:Choice>
@@ -31877,7 +31869,7 @@
           <a:graphicData uri="http://schemas.openxmlformats.org/presentationml/2006/ole">
             <mc:AlternateContent xmlns:mc="http://schemas.openxmlformats.org/markup-compatibility/2006">
               <mc:Choice xmlns:v="urn:schemas-microsoft-com:vml" Requires="v">
-                <p:oleObj spid="_x0000_s23652" name="think-cell Slide" r:id="rId7" imgW="270" imgH="270" progId="TCLayout.ActiveDocument.1">
+                <p:oleObj spid="_x0000_s23653" name="think-cell Slide" r:id="rId7" imgW="270" imgH="270" progId="TCLayout.ActiveDocument.1">
                   <p:embed/>
                 </p:oleObj>
               </mc:Choice>
@@ -34708,7 +34700,7 @@
           <a:graphicData uri="http://schemas.openxmlformats.org/presentationml/2006/ole">
             <mc:AlternateContent xmlns:mc="http://schemas.openxmlformats.org/markup-compatibility/2006">
               <mc:Choice xmlns:v="urn:schemas-microsoft-com:vml" Requires="v">
-                <p:oleObj spid="_x0000_s60476" name="think-cell Slide" r:id="rId5" imgW="270" imgH="270" progId="TCLayout.ActiveDocument.1">
+                <p:oleObj spid="_x0000_s60477" name="think-cell Slide" r:id="rId5" imgW="270" imgH="270" progId="TCLayout.ActiveDocument.1">
                   <p:embed/>
                 </p:oleObj>
               </mc:Choice>
@@ -36616,7 +36608,7 @@
           <a:graphicData uri="http://schemas.openxmlformats.org/presentationml/2006/ole">
             <mc:AlternateContent xmlns:mc="http://schemas.openxmlformats.org/markup-compatibility/2006">
               <mc:Choice xmlns:v="urn:schemas-microsoft-com:vml" Requires="v">
-                <p:oleObj spid="_x0000_s61504" name="think-cell Slide" r:id="rId5" imgW="270" imgH="270" progId="TCLayout.ActiveDocument.1">
+                <p:oleObj spid="_x0000_s61505" name="think-cell Slide" r:id="rId5" imgW="270" imgH="270" progId="TCLayout.ActiveDocument.1">
                   <p:embed/>
                 </p:oleObj>
               </mc:Choice>
@@ -37477,7 +37469,7 @@
           <a:graphicData uri="http://schemas.openxmlformats.org/presentationml/2006/ole">
             <mc:AlternateContent xmlns:mc="http://schemas.openxmlformats.org/markup-compatibility/2006">
               <mc:Choice xmlns:v="urn:schemas-microsoft-com:vml" Requires="v">
-                <p:oleObj spid="_x0000_s66593" name="think-cell Slide" r:id="rId5" imgW="270" imgH="270" progId="TCLayout.ActiveDocument.1">
+                <p:oleObj spid="_x0000_s66594" name="think-cell Slide" r:id="rId5" imgW="270" imgH="270" progId="TCLayout.ActiveDocument.1">
                   <p:embed/>
                 </p:oleObj>
               </mc:Choice>
@@ -41466,6 +41458,15 @@
 </file>
 
 <file path=customXml/item1.xml><?xml version="1.0" encoding="utf-8"?>
+<?mso-contentType ?>
+<FormTemplates xmlns="http://schemas.microsoft.com/sharepoint/v3/contenttype/forms">
+  <Display>DocumentLibraryForm</Display>
+  <Edit>DocumentLibraryForm</Edit>
+  <New>DocumentLibraryForm</New>
+</FormTemplates>
+</file>
+
+<file path=customXml/item2.xml><?xml version="1.0" encoding="utf-8"?>
 <p:properties xmlns:p="http://schemas.microsoft.com/office/2006/metadata/properties" xmlns:xsi="http://www.w3.org/2001/XMLSchema-instance" xmlns:pc="http://schemas.microsoft.com/office/infopath/2007/PartnerControls">
   <documentManagement>
     <TaxKeywordTaxHTField xmlns="230e9df3-be65-4c73-a93b-d1236ebd677e">
@@ -41474,15 +41475,6 @@
     <TaxCatchAll xmlns="230e9df3-be65-4c73-a93b-d1236ebd677e"/>
   </documentManagement>
 </p:properties>
-</file>
-
-<file path=customXml/item2.xml><?xml version="1.0" encoding="utf-8"?>
-<?mso-contentType ?>
-<FormTemplates xmlns="http://schemas.microsoft.com/sharepoint/v3/contenttype/forms">
-  <Display>DocumentLibraryForm</Display>
-  <Edit>DocumentLibraryForm</Edit>
-  <New>DocumentLibraryForm</New>
-</FormTemplates>
 </file>
 
 <file path=customXml/item3.xml><?xml version="1.0" encoding="utf-8"?>
@@ -41638,6 +41630,14 @@
 </file>
 
 <file path=customXml/itemProps1.xml><?xml version="1.0" encoding="utf-8"?>
+<ds:datastoreItem xmlns:ds="http://schemas.openxmlformats.org/officeDocument/2006/customXml" ds:itemID="{B882D8D6-9D38-4159-A398-AAC3689D3D7C}">
+  <ds:schemaRefs>
+    <ds:schemaRef ds:uri="http://schemas.microsoft.com/sharepoint/v3/contenttype/forms"/>
+  </ds:schemaRefs>
+</ds:datastoreItem>
+</file>
+
+<file path=customXml/itemProps2.xml><?xml version="1.0" encoding="utf-8"?>
 <ds:datastoreItem xmlns:ds="http://schemas.openxmlformats.org/officeDocument/2006/customXml" ds:itemID="{69B2F97D-0457-4986-9734-D03EB073C5EA}">
   <ds:schemaRefs>
     <ds:schemaRef ds:uri="http://purl.org/dc/terms/"/>
@@ -41649,14 +41649,6 @@
     <ds:schemaRef ds:uri="230e9df3-be65-4c73-a93b-d1236ebd677e"/>
     <ds:schemaRef ds:uri="http://www.w3.org/XML/1998/namespace"/>
     <ds:schemaRef ds:uri="http://purl.org/dc/dcmitype/"/>
-  </ds:schemaRefs>
-</ds:datastoreItem>
-</file>
-
-<file path=customXml/itemProps2.xml><?xml version="1.0" encoding="utf-8"?>
-<ds:datastoreItem xmlns:ds="http://schemas.openxmlformats.org/officeDocument/2006/customXml" ds:itemID="{B882D8D6-9D38-4159-A398-AAC3689D3D7C}">
-  <ds:schemaRefs>
-    <ds:schemaRef ds:uri="http://schemas.microsoft.com/sharepoint/v3/contenttype/forms"/>
   </ds:schemaRefs>
 </ds:datastoreItem>
 </file>

</xml_diff>

<commit_message>
Final version from 2012 tour
</commit_message>
<xml_diff>
--- a/WebCampsKeynote.pptx
+++ b/WebCampsKeynote.pptx
@@ -6,10 +6,10 @@
     <p:sldMasterId id="2147483779" r:id="rId5"/>
   </p:sldMasterIdLst>
   <p:notesMasterIdLst>
-    <p:notesMasterId r:id="rId30"/>
+    <p:notesMasterId r:id="rId31"/>
   </p:notesMasterIdLst>
   <p:handoutMasterIdLst>
-    <p:handoutMasterId r:id="rId31"/>
+    <p:handoutMasterId r:id="rId32"/>
   </p:handoutMasterIdLst>
   <p:sldIdLst>
     <p:sldId id="295" r:id="rId6"/>
@@ -20,53 +20,54 @@
     <p:sldId id="294" r:id="rId11"/>
     <p:sldId id="296" r:id="rId12"/>
     <p:sldId id="303" r:id="rId13"/>
-    <p:sldId id="301" r:id="rId14"/>
-    <p:sldId id="316" r:id="rId15"/>
-    <p:sldId id="299" r:id="rId16"/>
-    <p:sldId id="304" r:id="rId17"/>
-    <p:sldId id="313" r:id="rId18"/>
-    <p:sldId id="306" r:id="rId19"/>
-    <p:sldId id="307" r:id="rId20"/>
-    <p:sldId id="308" r:id="rId21"/>
-    <p:sldId id="309" r:id="rId22"/>
-    <p:sldId id="310" r:id="rId23"/>
-    <p:sldId id="311" r:id="rId24"/>
-    <p:sldId id="312" r:id="rId25"/>
-    <p:sldId id="305" r:id="rId26"/>
-    <p:sldId id="300" r:id="rId27"/>
-    <p:sldId id="291" r:id="rId28"/>
-    <p:sldId id="292" r:id="rId29"/>
+    <p:sldId id="317" r:id="rId14"/>
+    <p:sldId id="301" r:id="rId15"/>
+    <p:sldId id="316" r:id="rId16"/>
+    <p:sldId id="299" r:id="rId17"/>
+    <p:sldId id="304" r:id="rId18"/>
+    <p:sldId id="313" r:id="rId19"/>
+    <p:sldId id="306" r:id="rId20"/>
+    <p:sldId id="307" r:id="rId21"/>
+    <p:sldId id="308" r:id="rId22"/>
+    <p:sldId id="309" r:id="rId23"/>
+    <p:sldId id="310" r:id="rId24"/>
+    <p:sldId id="311" r:id="rId25"/>
+    <p:sldId id="312" r:id="rId26"/>
+    <p:sldId id="305" r:id="rId27"/>
+    <p:sldId id="300" r:id="rId28"/>
+    <p:sldId id="291" r:id="rId29"/>
+    <p:sldId id="292" r:id="rId30"/>
   </p:sldIdLst>
   <p:sldSz cx="12188825" cy="6858000"/>
   <p:notesSz cx="6858000" cy="9296400"/>
   <p:embeddedFontLst>
     <p:embeddedFont>
+      <p:font typeface="Segoe Light" panose="020B0604020202020204" charset="0"/>
+      <p:regular r:id="rId33"/>
+      <p:italic r:id="rId34"/>
+    </p:embeddedFont>
+    <p:embeddedFont>
+      <p:font typeface="Consolas" panose="020B0609020204030204" pitchFamily="49" charset="0"/>
+      <p:regular r:id="rId35"/>
+      <p:bold r:id="rId36"/>
+      <p:italic r:id="rId37"/>
+      <p:boldItalic r:id="rId38"/>
+    </p:embeddedFont>
+    <p:embeddedFont>
       <p:font typeface="Segoe UI Light" panose="020B0502040204020203" pitchFamily="34" charset="0"/>
-      <p:regular r:id="rId32"/>
-      <p:italic r:id="rId33"/>
+      <p:regular r:id="rId39"/>
+      <p:italic r:id="rId40"/>
     </p:embeddedFont>
     <p:embeddedFont>
       <p:font typeface="Segoe UI" panose="020B0502040204020203" pitchFamily="34" charset="0"/>
-      <p:regular r:id="rId34"/>
-      <p:bold r:id="rId35"/>
-      <p:italic r:id="rId36"/>
-      <p:boldItalic r:id="rId37"/>
-    </p:embeddedFont>
-    <p:embeddedFont>
-      <p:font typeface="Consolas" panose="020B0609020204030204" pitchFamily="49" charset="0"/>
-      <p:regular r:id="rId38"/>
-      <p:bold r:id="rId39"/>
-      <p:italic r:id="rId40"/>
-      <p:boldItalic r:id="rId41"/>
-    </p:embeddedFont>
-    <p:embeddedFont>
-      <p:font typeface="Segoe Light" panose="020B0604020202020204" charset="0"/>
-      <p:regular r:id="rId42"/>
+      <p:regular r:id="rId41"/>
+      <p:bold r:id="rId42"/>
       <p:italic r:id="rId43"/>
+      <p:boldItalic r:id="rId44"/>
     </p:embeddedFont>
   </p:embeddedFontLst>
   <p:custDataLst>
-    <p:tags r:id="rId44"/>
+    <p:tags r:id="rId45"/>
   </p:custDataLst>
   <p:defaultTextStyle>
     <a:defPPr>
@@ -10766,7 +10767,7 @@
               <a:rPr lang="en-US" smtClean="0">
                 <a:latin typeface="Segoe UI" pitchFamily="34" charset="0"/>
               </a:rPr>
-              <a:t>12/20/2012</a:t>
+              <a:t>8/21/2013</a:t>
             </a:fld>
             <a:endParaRPr lang="en-US" dirty="0">
               <a:latin typeface="Segoe UI" pitchFamily="34" charset="0"/>
@@ -10948,7 +10949,7 @@
             <a:fld id="{CAE3F082-F902-42D8-A765-720E172C3194}" type="datetimeFigureOut">
               <a:rPr lang="en-US" smtClean="0"/>
               <a:pPr/>
-              <a:t>12/20/2012</a:t>
+              <a:t>8/21/2013</a:t>
             </a:fld>
             <a:endParaRPr lang="en-US" dirty="0"/>
           </a:p>
@@ -11546,7 +11547,7 @@
             <a:fld id="{82AABF77-E2E4-44CA-BA5C-65E132CF08D8}" type="slidenum">
               <a:rPr lang="en-US" smtClean="0"/>
               <a:pPr/>
-              <a:t>21</a:t>
+              <a:t>22</a:t>
             </a:fld>
             <a:endParaRPr lang="en-US" dirty="0"/>
           </a:p>
@@ -11639,7 +11640,7 @@
             <a:fld id="{82AABF77-E2E4-44CA-BA5C-65E132CF08D8}" type="slidenum">
               <a:rPr lang="en-US" smtClean="0"/>
               <a:pPr/>
-              <a:t>22</a:t>
+              <a:t>23</a:t>
             </a:fld>
             <a:endParaRPr lang="en-US" dirty="0"/>
           </a:p>
@@ -11724,7 +11725,7 @@
             <a:fld id="{82AABF77-E2E4-44CA-BA5C-65E132CF08D8}" type="slidenum">
               <a:rPr lang="en-US" smtClean="0"/>
               <a:pPr/>
-              <a:t>23</a:t>
+              <a:t>24</a:t>
             </a:fld>
             <a:endParaRPr lang="en-US" dirty="0"/>
           </a:p>
@@ -11813,7 +11814,7 @@
           <a:p>
             <a:fld id="{82AABF77-E2E4-44CA-BA5C-65E132CF08D8}" type="slidenum">
               <a:rPr lang="en-US" smtClean="0"/>
-              <a:t>24</a:t>
+              <a:t>25</a:t>
             </a:fld>
             <a:endParaRPr lang="en-US" dirty="0"/>
           </a:p>
@@ -12423,7 +12424,7 @@
             <a:fld id="{87A12A5C-4330-4241-88FF-F2EE6603F1FB}" type="slidenum">
               <a:rPr lang="en-US" smtClean="0"/>
               <a:pPr/>
-              <a:t>9</a:t>
+              <a:t>10</a:t>
             </a:fld>
             <a:endParaRPr lang="en-US"/>
           </a:p>
@@ -12508,7 +12509,7 @@
             <a:fld id="{82AABF77-E2E4-44CA-BA5C-65E132CF08D8}" type="slidenum">
               <a:rPr lang="en-US" smtClean="0"/>
               <a:pPr/>
-              <a:t>11</a:t>
+              <a:t>12</a:t>
             </a:fld>
             <a:endParaRPr lang="en-US" dirty="0"/>
           </a:p>
@@ -12597,7 +12598,7 @@
             <a:fld id="{82AABF77-E2E4-44CA-BA5C-65E132CF08D8}" type="slidenum">
               <a:rPr lang="en-US" smtClean="0"/>
               <a:pPr/>
-              <a:t>12</a:t>
+              <a:t>13</a:t>
             </a:fld>
             <a:endParaRPr lang="en-US" dirty="0"/>
           </a:p>
@@ -17922,8 +17923,8 @@
 </file>
 
 <file path=ppt/slideLayouts/slideLayout19.xml><?xml version="1.0" encoding="utf-8"?>
-<p:sldLayout xmlns:a="http://schemas.openxmlformats.org/drawingml/2006/main" xmlns:r="http://schemas.openxmlformats.org/officeDocument/2006/relationships" xmlns:p="http://schemas.openxmlformats.org/presentationml/2006/main" preserve="1">
-  <p:cSld name="Use for slides with Software Code">
+<p:sldLayout xmlns:a="http://schemas.openxmlformats.org/drawingml/2006/main" xmlns:r="http://schemas.openxmlformats.org/officeDocument/2006/relationships" xmlns:p="http://schemas.openxmlformats.org/presentationml/2006/main" userDrawn="1">
+  <p:cSld name="Title and Content">
     <p:spTree>
       <p:nvGrpSpPr>
         <p:cNvPr id="1" name=""/>
@@ -17940,75 +17941,57 @@
       </p:grpSpPr>
       <p:sp>
         <p:nvSpPr>
-          <p:cNvPr id="2" name="Title 1"/>
+          <p:cNvPr id="7" name="Content Placeholder 6"/>
           <p:cNvSpPr>
             <a:spLocks noGrp="1"/>
           </p:cNvSpPr>
           <p:nvPr>
-            <p:ph type="title"/>
-          </p:nvPr>
-        </p:nvSpPr>
-        <p:spPr/>
-        <p:txBody>
-          <a:bodyPr/>
-          <a:lstStyle/>
-          <a:p>
-            <a:r>
-              <a:rPr lang="en-US" dirty="0" smtClean="0"/>
-              <a:t>Click to edit Master title style</a:t>
-            </a:r>
-            <a:endParaRPr lang="en-US" dirty="0"/>
-          </a:p>
-        </p:txBody>
-      </p:sp>
-      <p:sp>
-        <p:nvSpPr>
-          <p:cNvPr id="6" name="Text Placeholder 5"/>
-          <p:cNvSpPr>
-            <a:spLocks noGrp="1"/>
-          </p:cNvSpPr>
-          <p:nvPr>
-            <p:ph type="body" sz="quarter" idx="10"/>
+            <p:ph sz="quarter" idx="10"/>
           </p:nvPr>
         </p:nvSpPr>
         <p:spPr>
           <a:xfrm>
-            <a:off x="519114" y="1905000"/>
-            <a:ext cx="11149012" cy="1618905"/>
+            <a:off x="379415" y="1219200"/>
+            <a:ext cx="11506197" cy="2000548"/>
           </a:xfrm>
         </p:spPr>
         <p:txBody>
           <a:bodyPr/>
           <a:lstStyle>
             <a:lvl1pPr>
-              <a:lnSpc>
-                <a:spcPct val="90000"/>
-              </a:lnSpc>
-              <a:defRPr sz="2400"/>
+              <a:defRPr b="1">
+                <a:latin typeface="Segoe UI" pitchFamily="34" charset="0"/>
+                <a:ea typeface="Segoe UI" pitchFamily="34" charset="0"/>
+                <a:cs typeface="Segoe UI" pitchFamily="34" charset="0"/>
+              </a:defRPr>
             </a:lvl1pPr>
             <a:lvl2pPr>
-              <a:lnSpc>
-                <a:spcPct val="90000"/>
-              </a:lnSpc>
-              <a:defRPr sz="2000"/>
+              <a:defRPr>
+                <a:latin typeface="Segoe UI" pitchFamily="34" charset="0"/>
+                <a:ea typeface="Segoe UI" pitchFamily="34" charset="0"/>
+                <a:cs typeface="Segoe UI" pitchFamily="34" charset="0"/>
+              </a:defRPr>
             </a:lvl2pPr>
             <a:lvl3pPr>
-              <a:lnSpc>
-                <a:spcPct val="90000"/>
-              </a:lnSpc>
-              <a:defRPr sz="1800"/>
+              <a:defRPr>
+                <a:latin typeface="Segoe UI" pitchFamily="34" charset="0"/>
+                <a:ea typeface="Segoe UI" pitchFamily="34" charset="0"/>
+                <a:cs typeface="Segoe UI" pitchFamily="34" charset="0"/>
+              </a:defRPr>
             </a:lvl3pPr>
             <a:lvl4pPr>
-              <a:lnSpc>
-                <a:spcPct val="90000"/>
-              </a:lnSpc>
-              <a:defRPr sz="1800"/>
+              <a:defRPr>
+                <a:latin typeface="Segoe UI" pitchFamily="34" charset="0"/>
+                <a:ea typeface="Segoe UI" pitchFamily="34" charset="0"/>
+                <a:cs typeface="Segoe UI" pitchFamily="34" charset="0"/>
+              </a:defRPr>
             </a:lvl4pPr>
             <a:lvl5pPr>
-              <a:lnSpc>
-                <a:spcPct val="90000"/>
-              </a:lnSpc>
-              <a:defRPr sz="1800"/>
+              <a:defRPr>
+                <a:latin typeface="Segoe UI" pitchFamily="34" charset="0"/>
+                <a:ea typeface="Segoe UI" pitchFamily="34" charset="0"/>
+                <a:cs typeface="Segoe UI" pitchFamily="34" charset="0"/>
+              </a:defRPr>
             </a:lvl5pPr>
           </a:lstStyle>
           <a:p>
@@ -18049,19 +18032,39 @@
           </a:p>
         </p:txBody>
       </p:sp>
+      <p:sp>
+        <p:nvSpPr>
+          <p:cNvPr id="3" name="Title 2"/>
+          <p:cNvSpPr>
+            <a:spLocks noGrp="1"/>
+          </p:cNvSpPr>
+          <p:nvPr>
+            <p:ph type="title"/>
+          </p:nvPr>
+        </p:nvSpPr>
+        <p:spPr/>
+        <p:txBody>
+          <a:bodyPr/>
+          <a:lstStyle/>
+          <a:p>
+            <a:r>
+              <a:rPr lang="en-US" dirty="0" smtClean="0"/>
+              <a:t>Click to edit Master title style</a:t>
+            </a:r>
+            <a:endParaRPr lang="en-US" dirty="0"/>
+          </a:p>
+        </p:txBody>
+      </p:sp>
     </p:spTree>
     <p:extLst>
       <p:ext uri="{BB962C8B-B14F-4D97-AF65-F5344CB8AC3E}">
-        <p14:creationId xmlns:p14="http://schemas.microsoft.com/office/powerpoint/2010/main" val="1078997337"/>
+        <p14:creationId xmlns:p14="http://schemas.microsoft.com/office/powerpoint/2010/main" val="2385118451"/>
       </p:ext>
     </p:extLst>
   </p:cSld>
   <p:clrMapOvr>
     <a:masterClrMapping/>
   </p:clrMapOvr>
-  <p:transition>
-    <p:fade/>
-  </p:transition>
   <p:timing>
     <p:tnLst>
       <p:par>
@@ -18285,6 +18288,157 @@
     <p:extLst>
       <p:ext uri="{BB962C8B-B14F-4D97-AF65-F5344CB8AC3E}">
         <p14:creationId xmlns:p14="http://schemas.microsoft.com/office/powerpoint/2010/main" val="505028237"/>
+      </p:ext>
+    </p:extLst>
+  </p:cSld>
+  <p:clrMapOvr>
+    <a:masterClrMapping/>
+  </p:clrMapOvr>
+  <p:transition>
+    <p:fade/>
+  </p:transition>
+  <p:timing>
+    <p:tnLst>
+      <p:par>
+        <p:cTn id="1" dur="indefinite" restart="never" nodeType="tmRoot"/>
+      </p:par>
+    </p:tnLst>
+  </p:timing>
+</p:sldLayout>
+</file>
+
+<file path=ppt/slideLayouts/slideLayout20.xml><?xml version="1.0" encoding="utf-8"?>
+<p:sldLayout xmlns:a="http://schemas.openxmlformats.org/drawingml/2006/main" xmlns:r="http://schemas.openxmlformats.org/officeDocument/2006/relationships" xmlns:p="http://schemas.openxmlformats.org/presentationml/2006/main" preserve="1">
+  <p:cSld name="Use for slides with Software Code">
+    <p:spTree>
+      <p:nvGrpSpPr>
+        <p:cNvPr id="1" name=""/>
+        <p:cNvGrpSpPr/>
+        <p:nvPr/>
+      </p:nvGrpSpPr>
+      <p:grpSpPr>
+        <a:xfrm>
+          <a:off x="0" y="0"/>
+          <a:ext cx="0" cy="0"/>
+          <a:chOff x="0" y="0"/>
+          <a:chExt cx="0" cy="0"/>
+        </a:xfrm>
+      </p:grpSpPr>
+      <p:sp>
+        <p:nvSpPr>
+          <p:cNvPr id="2" name="Title 1"/>
+          <p:cNvSpPr>
+            <a:spLocks noGrp="1"/>
+          </p:cNvSpPr>
+          <p:nvPr>
+            <p:ph type="title"/>
+          </p:nvPr>
+        </p:nvSpPr>
+        <p:spPr/>
+        <p:txBody>
+          <a:bodyPr/>
+          <a:lstStyle/>
+          <a:p>
+            <a:r>
+              <a:rPr lang="en-US" dirty="0" smtClean="0"/>
+              <a:t>Click to edit Master title style</a:t>
+            </a:r>
+            <a:endParaRPr lang="en-US" dirty="0"/>
+          </a:p>
+        </p:txBody>
+      </p:sp>
+      <p:sp>
+        <p:nvSpPr>
+          <p:cNvPr id="6" name="Text Placeholder 5"/>
+          <p:cNvSpPr>
+            <a:spLocks noGrp="1"/>
+          </p:cNvSpPr>
+          <p:nvPr>
+            <p:ph type="body" sz="quarter" idx="10"/>
+          </p:nvPr>
+        </p:nvSpPr>
+        <p:spPr>
+          <a:xfrm>
+            <a:off x="519114" y="1905000"/>
+            <a:ext cx="11149012" cy="1618905"/>
+          </a:xfrm>
+        </p:spPr>
+        <p:txBody>
+          <a:bodyPr/>
+          <a:lstStyle>
+            <a:lvl1pPr>
+              <a:lnSpc>
+                <a:spcPct val="90000"/>
+              </a:lnSpc>
+              <a:defRPr sz="2400"/>
+            </a:lvl1pPr>
+            <a:lvl2pPr>
+              <a:lnSpc>
+                <a:spcPct val="90000"/>
+              </a:lnSpc>
+              <a:defRPr sz="2000"/>
+            </a:lvl2pPr>
+            <a:lvl3pPr>
+              <a:lnSpc>
+                <a:spcPct val="90000"/>
+              </a:lnSpc>
+              <a:defRPr sz="1800"/>
+            </a:lvl3pPr>
+            <a:lvl4pPr>
+              <a:lnSpc>
+                <a:spcPct val="90000"/>
+              </a:lnSpc>
+              <a:defRPr sz="1800"/>
+            </a:lvl4pPr>
+            <a:lvl5pPr>
+              <a:lnSpc>
+                <a:spcPct val="90000"/>
+              </a:lnSpc>
+              <a:defRPr sz="1800"/>
+            </a:lvl5pPr>
+          </a:lstStyle>
+          <a:p>
+            <a:pPr lvl="0"/>
+            <a:r>
+              <a:rPr lang="en-US" dirty="0" smtClean="0"/>
+              <a:t>Click to edit Master text styles</a:t>
+            </a:r>
+          </a:p>
+          <a:p>
+            <a:pPr lvl="1"/>
+            <a:r>
+              <a:rPr lang="en-US" dirty="0" smtClean="0"/>
+              <a:t>Second level</a:t>
+            </a:r>
+          </a:p>
+          <a:p>
+            <a:pPr lvl="2"/>
+            <a:r>
+              <a:rPr lang="en-US" dirty="0" smtClean="0"/>
+              <a:t>Third level</a:t>
+            </a:r>
+          </a:p>
+          <a:p>
+            <a:pPr lvl="3"/>
+            <a:r>
+              <a:rPr lang="en-US" dirty="0" smtClean="0"/>
+              <a:t>Fourth level</a:t>
+            </a:r>
+          </a:p>
+          <a:p>
+            <a:pPr lvl="4"/>
+            <a:r>
+              <a:rPr lang="en-US" dirty="0" smtClean="0"/>
+              <a:t>Fifth level</a:t>
+            </a:r>
+            <a:endParaRPr lang="en-US" dirty="0"/>
+          </a:p>
+        </p:txBody>
+      </p:sp>
+    </p:spTree>
+    <p:extLst>
+      <p:ext uri="{BB962C8B-B14F-4D97-AF65-F5344CB8AC3E}">
+        <p14:creationId xmlns:p14="http://schemas.microsoft.com/office/powerpoint/2010/main" val="1078997337"/>
       </p:ext>
     </p:extLst>
   </p:cSld>
@@ -22510,6 +22664,7 @@
     <p:sldLayoutId id="2147483776" r:id="rId16"/>
     <p:sldLayoutId id="2147483777" r:id="rId17"/>
     <p:sldLayoutId id="2147483778" r:id="rId18"/>
+    <p:sldLayoutId id="2147483782" r:id="rId19"/>
   </p:sldLayoutIdLst>
   <p:transition>
     <p:fade/>
@@ -23807,41 +23962,7 @@
                   </a:gradFill>
                   <a:latin typeface="Segoe UI Light" pitchFamily="34" charset="0"/>
                 </a:rPr>
-                <a:t>[Speaker] </a:t>
-              </a:r>
-              <a:r>
-                <a:rPr lang="en-US" sz="2600" spc="-100" dirty="0" smtClean="0">
-                  <a:gradFill>
-                    <a:gsLst>
-                      <a:gs pos="0">
-                        <a:srgbClr val="595959"/>
-                      </a:gs>
-                      <a:gs pos="86000">
-                        <a:srgbClr val="595959"/>
-                      </a:gs>
-                    </a:gsLst>
-                    <a:lin ang="5400000" scaled="0"/>
-                  </a:gradFill>
-                  <a:latin typeface="Segoe UI Light" pitchFamily="34" charset="0"/>
-                </a:rPr>
-                <a:t>/ </a:t>
-              </a:r>
-              <a:r>
-                <a:rPr lang="en-US" sz="2600" spc="-100" dirty="0" smtClean="0">
-                  <a:gradFill>
-                    <a:gsLst>
-                      <a:gs pos="0">
-                        <a:srgbClr val="595959"/>
-                      </a:gs>
-                      <a:gs pos="86000">
-                        <a:srgbClr val="595959"/>
-                      </a:gs>
-                    </a:gsLst>
-                    <a:lin ang="5400000" scaled="0"/>
-                  </a:gradFill>
-                  <a:latin typeface="Segoe UI Light" pitchFamily="34" charset="0"/>
-                </a:rPr>
-                <a:t>[Twitter]</a:t>
+                <a:t>[Speaker] / [Twitter]</a:t>
               </a:r>
               <a:endParaRPr lang="en-US" sz="2600" spc="-100" dirty="0">
                 <a:gradFill>
@@ -25587,6 +25708,1743 @@
 </file>
 
 <file path=ppt/slides/slide10.xml><?xml version="1.0" encoding="utf-8"?>
+<p:sld xmlns:a="http://schemas.openxmlformats.org/drawingml/2006/main" xmlns:r="http://schemas.openxmlformats.org/officeDocument/2006/relationships" xmlns:p="http://schemas.openxmlformats.org/presentationml/2006/main" show="0">
+  <p:cSld>
+    <p:spTree>
+      <p:nvGrpSpPr>
+        <p:cNvPr id="1" name=""/>
+        <p:cNvGrpSpPr/>
+        <p:nvPr/>
+      </p:nvGrpSpPr>
+      <p:grpSpPr>
+        <a:xfrm>
+          <a:off x="0" y="0"/>
+          <a:ext cx="0" cy="0"/>
+          <a:chOff x="0" y="0"/>
+          <a:chExt cx="0" cy="0"/>
+        </a:xfrm>
+      </p:grpSpPr>
+      <p:sp>
+        <p:nvSpPr>
+          <p:cNvPr id="19" name="Rectangle 18"/>
+          <p:cNvSpPr/>
+          <p:nvPr/>
+        </p:nvSpPr>
+        <p:spPr bwMode="auto">
+          <a:xfrm>
+            <a:off x="519112" y="6363586"/>
+            <a:ext cx="1766888" cy="207336"/>
+          </a:xfrm>
+          <a:prstGeom prst="rect">
+            <a:avLst/>
+          </a:prstGeom>
+          <a:solidFill>
+            <a:schemeClr val="bg1"/>
+          </a:solidFill>
+          <a:ln>
+            <a:noFill/>
+            <a:headEnd type="none" w="med" len="med"/>
+            <a:tailEnd type="none" w="med" len="med"/>
+          </a:ln>
+          <a:effectLst/>
+        </p:spPr>
+        <p:style>
+          <a:lnRef idx="1">
+            <a:schemeClr val="accent2"/>
+          </a:lnRef>
+          <a:fillRef idx="3">
+            <a:schemeClr val="accent2"/>
+          </a:fillRef>
+          <a:effectRef idx="2">
+            <a:schemeClr val="accent2"/>
+          </a:effectRef>
+          <a:fontRef idx="minor">
+            <a:schemeClr val="lt1"/>
+          </a:fontRef>
+        </p:style>
+        <p:txBody>
+          <a:bodyPr vert="horz" wrap="square" lIns="91436" tIns="45718" rIns="91436" bIns="45718" numCol="1" rtlCol="0" anchor="ctr" anchorCtr="0" compatLnSpc="1">
+            <a:prstTxWarp prst="textNoShape">
+              <a:avLst/>
+            </a:prstTxWarp>
+          </a:bodyPr>
+          <a:lstStyle/>
+          <a:p>
+            <a:pPr algn="ctr" defTabSz="914099" fontAlgn="base">
+              <a:spcBef>
+                <a:spcPct val="0"/>
+              </a:spcBef>
+              <a:spcAft>
+                <a:spcPct val="0"/>
+              </a:spcAft>
+            </a:pPr>
+            <a:endParaRPr lang="en-US" sz="2200" dirty="0" smtClean="0">
+              <a:gradFill>
+                <a:gsLst>
+                  <a:gs pos="0">
+                    <a:srgbClr val="FFFFFF"/>
+                  </a:gs>
+                  <a:gs pos="100000">
+                    <a:srgbClr val="FFFFFF"/>
+                  </a:gs>
+                </a:gsLst>
+                <a:lin ang="5400000" scaled="0"/>
+              </a:gradFill>
+            </a:endParaRPr>
+          </a:p>
+        </p:txBody>
+      </p:sp>
+      <p:sp>
+        <p:nvSpPr>
+          <p:cNvPr id="3" name="Title 2"/>
+          <p:cNvSpPr>
+            <a:spLocks noGrp="1"/>
+          </p:cNvSpPr>
+          <p:nvPr>
+            <p:ph type="title"/>
+          </p:nvPr>
+        </p:nvSpPr>
+        <p:spPr/>
+        <p:txBody>
+          <a:bodyPr>
+            <a:noAutofit/>
+          </a:bodyPr>
+          <a:lstStyle/>
+          <a:p>
+            <a:r>
+              <a:rPr lang="en-US" dirty="0" smtClean="0"/>
+              <a:t>ASP.NET: A </a:t>
+            </a:r>
+            <a:r>
+              <a:rPr lang="en-US" dirty="0"/>
+              <a:t>F</a:t>
+            </a:r>
+            <a:r>
+              <a:rPr lang="en-US" dirty="0" smtClean="0"/>
+              <a:t>ramework </a:t>
+            </a:r>
+            <a:r>
+              <a:rPr lang="en-US" dirty="0"/>
+              <a:t>F</a:t>
+            </a:r>
+            <a:r>
+              <a:rPr lang="en-US" dirty="0" smtClean="0"/>
+              <a:t>or </a:t>
+            </a:r>
+            <a:r>
+              <a:rPr lang="en-US" dirty="0"/>
+              <a:t>A</a:t>
+            </a:r>
+            <a:r>
+              <a:rPr lang="en-US" dirty="0" smtClean="0"/>
+              <a:t>ll</a:t>
+            </a:r>
+            <a:endParaRPr lang="en-US" dirty="0"/>
+          </a:p>
+        </p:txBody>
+      </p:sp>
+      <p:sp>
+        <p:nvSpPr>
+          <p:cNvPr id="4" name="Rectangle 3"/>
+          <p:cNvSpPr/>
+          <p:nvPr/>
+        </p:nvSpPr>
+        <p:spPr bwMode="auto">
+          <a:xfrm>
+            <a:off x="879902" y="4527299"/>
+            <a:ext cx="8935748" cy="2004005"/>
+          </a:xfrm>
+          <a:prstGeom prst="rect">
+            <a:avLst/>
+          </a:prstGeom>
+          <a:solidFill>
+            <a:schemeClr val="accent2"/>
+          </a:solidFill>
+          <a:ln>
+            <a:noFill/>
+            <a:headEnd type="none" w="med" len="med"/>
+            <a:tailEnd type="none" w="med" len="med"/>
+          </a:ln>
+          <a:effectLst/>
+        </p:spPr>
+        <p:style>
+          <a:lnRef idx="1">
+            <a:schemeClr val="accent2"/>
+          </a:lnRef>
+          <a:fillRef idx="3">
+            <a:schemeClr val="accent2"/>
+          </a:fillRef>
+          <a:effectRef idx="2">
+            <a:schemeClr val="accent2"/>
+          </a:effectRef>
+          <a:fontRef idx="minor">
+            <a:schemeClr val="lt1"/>
+          </a:fontRef>
+        </p:style>
+        <p:txBody>
+          <a:bodyPr vert="horz" wrap="square" lIns="91436" tIns="45718" rIns="91436" bIns="45718" numCol="1" rtlCol="0" anchor="ctr" anchorCtr="0" compatLnSpc="1">
+            <a:prstTxWarp prst="textNoShape">
+              <a:avLst/>
+            </a:prstTxWarp>
+          </a:bodyPr>
+          <a:lstStyle/>
+          <a:p>
+            <a:pPr algn="ctr" defTabSz="914099" fontAlgn="base">
+              <a:spcBef>
+                <a:spcPct val="0"/>
+              </a:spcBef>
+              <a:spcAft>
+                <a:spcPct val="0"/>
+              </a:spcAft>
+            </a:pPr>
+            <a:endParaRPr lang="en-US" dirty="0">
+              <a:gradFill>
+                <a:gsLst>
+                  <a:gs pos="0">
+                    <a:srgbClr val="FFFFFF"/>
+                  </a:gs>
+                  <a:gs pos="100000">
+                    <a:srgbClr val="FFFFFF"/>
+                  </a:gs>
+                </a:gsLst>
+                <a:lin ang="5400000" scaled="0"/>
+              </a:gradFill>
+            </a:endParaRPr>
+          </a:p>
+        </p:txBody>
+      </p:sp>
+      <p:sp>
+        <p:nvSpPr>
+          <p:cNvPr id="5" name="Rectangle 4"/>
+          <p:cNvSpPr/>
+          <p:nvPr/>
+        </p:nvSpPr>
+        <p:spPr bwMode="auto">
+          <a:xfrm>
+            <a:off x="3898929" y="5763308"/>
+            <a:ext cx="2850125" cy="487680"/>
+          </a:xfrm>
+          <a:prstGeom prst="rect">
+            <a:avLst/>
+          </a:prstGeom>
+          <a:solidFill>
+            <a:schemeClr val="accent4"/>
+          </a:solidFill>
+          <a:ln>
+            <a:noFill/>
+            <a:headEnd type="none" w="med" len="med"/>
+            <a:tailEnd type="none" w="med" len="med"/>
+          </a:ln>
+          <a:effectLst/>
+        </p:spPr>
+        <p:style>
+          <a:lnRef idx="1">
+            <a:schemeClr val="accent2"/>
+          </a:lnRef>
+          <a:fillRef idx="3">
+            <a:schemeClr val="accent2"/>
+          </a:fillRef>
+          <a:effectRef idx="2">
+            <a:schemeClr val="accent2"/>
+          </a:effectRef>
+          <a:fontRef idx="minor">
+            <a:schemeClr val="lt1"/>
+          </a:fontRef>
+        </p:style>
+        <p:txBody>
+          <a:bodyPr vert="horz" wrap="square" lIns="91436" tIns="45718" rIns="91436" bIns="45718" numCol="1" rtlCol="0" anchor="ctr" anchorCtr="0" compatLnSpc="1">
+            <a:prstTxWarp prst="textNoShape">
+              <a:avLst/>
+            </a:prstTxWarp>
+          </a:bodyPr>
+          <a:lstStyle/>
+          <a:p>
+            <a:pPr algn="ctr" defTabSz="914099" fontAlgn="base">
+              <a:spcBef>
+                <a:spcPct val="0"/>
+              </a:spcBef>
+              <a:spcAft>
+                <a:spcPct val="0"/>
+              </a:spcAft>
+            </a:pPr>
+            <a:r>
+              <a:rPr lang="en-US" sz="2000" dirty="0">
+                <a:gradFill>
+                  <a:gsLst>
+                    <a:gs pos="0">
+                      <a:srgbClr val="FFFFFF"/>
+                    </a:gs>
+                    <a:gs pos="100000">
+                      <a:srgbClr val="FFFFFF"/>
+                    </a:gs>
+                  </a:gsLst>
+                  <a:lin ang="5400000" scaled="0"/>
+                </a:gradFill>
+              </a:rPr>
+              <a:t>Caching</a:t>
+            </a:r>
+          </a:p>
+        </p:txBody>
+      </p:sp>
+      <p:sp>
+        <p:nvSpPr>
+          <p:cNvPr id="6" name="Rectangle 5"/>
+          <p:cNvSpPr/>
+          <p:nvPr/>
+        </p:nvSpPr>
+        <p:spPr bwMode="auto">
+          <a:xfrm>
+            <a:off x="948136" y="5232075"/>
+            <a:ext cx="2850125" cy="487680"/>
+          </a:xfrm>
+          <a:prstGeom prst="rect">
+            <a:avLst/>
+          </a:prstGeom>
+          <a:solidFill>
+            <a:schemeClr val="accent4"/>
+          </a:solidFill>
+          <a:ln>
+            <a:noFill/>
+            <a:headEnd type="none" w="med" len="med"/>
+            <a:tailEnd type="none" w="med" len="med"/>
+          </a:ln>
+          <a:effectLst/>
+        </p:spPr>
+        <p:style>
+          <a:lnRef idx="1">
+            <a:schemeClr val="accent2"/>
+          </a:lnRef>
+          <a:fillRef idx="3">
+            <a:schemeClr val="accent2"/>
+          </a:fillRef>
+          <a:effectRef idx="2">
+            <a:schemeClr val="accent2"/>
+          </a:effectRef>
+          <a:fontRef idx="minor">
+            <a:schemeClr val="lt1"/>
+          </a:fontRef>
+        </p:style>
+        <p:txBody>
+          <a:bodyPr vert="horz" wrap="square" lIns="91436" tIns="45718" rIns="91436" bIns="45718" numCol="1" rtlCol="0" anchor="ctr" anchorCtr="0" compatLnSpc="1">
+            <a:prstTxWarp prst="textNoShape">
+              <a:avLst/>
+            </a:prstTxWarp>
+          </a:bodyPr>
+          <a:lstStyle/>
+          <a:p>
+            <a:pPr algn="ctr" defTabSz="914099" fontAlgn="base">
+              <a:spcBef>
+                <a:spcPct val="0"/>
+              </a:spcBef>
+              <a:spcAft>
+                <a:spcPct val="0"/>
+              </a:spcAft>
+            </a:pPr>
+            <a:r>
+              <a:rPr lang="en-US" sz="2000" dirty="0">
+                <a:gradFill>
+                  <a:gsLst>
+                    <a:gs pos="0">
+                      <a:srgbClr val="FFFFFF"/>
+                    </a:gs>
+                    <a:gs pos="100000">
+                      <a:srgbClr val="FFFFFF"/>
+                    </a:gs>
+                  </a:gsLst>
+                  <a:lin ang="5400000" scaled="0"/>
+                </a:gradFill>
+              </a:rPr>
+              <a:t>Modules</a:t>
+            </a:r>
+          </a:p>
+        </p:txBody>
+      </p:sp>
+      <p:sp>
+        <p:nvSpPr>
+          <p:cNvPr id="7" name="Rectangle 6"/>
+          <p:cNvSpPr/>
+          <p:nvPr/>
+        </p:nvSpPr>
+        <p:spPr bwMode="auto">
+          <a:xfrm>
+            <a:off x="3911208" y="5232075"/>
+            <a:ext cx="2850125" cy="487680"/>
+          </a:xfrm>
+          <a:prstGeom prst="rect">
+            <a:avLst/>
+          </a:prstGeom>
+          <a:solidFill>
+            <a:schemeClr val="accent4"/>
+          </a:solidFill>
+          <a:ln>
+            <a:noFill/>
+            <a:headEnd type="none" w="med" len="med"/>
+            <a:tailEnd type="none" w="med" len="med"/>
+          </a:ln>
+          <a:effectLst/>
+        </p:spPr>
+        <p:style>
+          <a:lnRef idx="1">
+            <a:schemeClr val="accent2"/>
+          </a:lnRef>
+          <a:fillRef idx="3">
+            <a:schemeClr val="accent2"/>
+          </a:fillRef>
+          <a:effectRef idx="2">
+            <a:schemeClr val="accent2"/>
+          </a:effectRef>
+          <a:fontRef idx="minor">
+            <a:schemeClr val="lt1"/>
+          </a:fontRef>
+        </p:style>
+        <p:txBody>
+          <a:bodyPr vert="horz" wrap="square" lIns="91436" tIns="45718" rIns="91436" bIns="45718" numCol="1" rtlCol="0" anchor="ctr" anchorCtr="0" compatLnSpc="1">
+            <a:prstTxWarp prst="textNoShape">
+              <a:avLst/>
+            </a:prstTxWarp>
+          </a:bodyPr>
+          <a:lstStyle/>
+          <a:p>
+            <a:pPr algn="ctr" defTabSz="914099" fontAlgn="base">
+              <a:spcBef>
+                <a:spcPct val="0"/>
+              </a:spcBef>
+              <a:spcAft>
+                <a:spcPct val="0"/>
+              </a:spcAft>
+            </a:pPr>
+            <a:r>
+              <a:rPr lang="en-US" sz="2000" dirty="0">
+                <a:gradFill>
+                  <a:gsLst>
+                    <a:gs pos="0">
+                      <a:srgbClr val="FFFFFF"/>
+                    </a:gs>
+                    <a:gs pos="100000">
+                      <a:srgbClr val="FFFFFF"/>
+                    </a:gs>
+                  </a:gsLst>
+                  <a:lin ang="5400000" scaled="0"/>
+                </a:gradFill>
+              </a:rPr>
+              <a:t>Handlers</a:t>
+            </a:r>
+          </a:p>
+        </p:txBody>
+      </p:sp>
+      <p:sp>
+        <p:nvSpPr>
+          <p:cNvPr id="8" name="Rectangle 7"/>
+          <p:cNvSpPr/>
+          <p:nvPr/>
+        </p:nvSpPr>
+        <p:spPr bwMode="auto">
+          <a:xfrm>
+            <a:off x="948136" y="5780715"/>
+            <a:ext cx="2850125" cy="487680"/>
+          </a:xfrm>
+          <a:prstGeom prst="rect">
+            <a:avLst/>
+          </a:prstGeom>
+          <a:solidFill>
+            <a:schemeClr val="accent4"/>
+          </a:solidFill>
+          <a:ln>
+            <a:noFill/>
+            <a:headEnd type="none" w="med" len="med"/>
+            <a:tailEnd type="none" w="med" len="med"/>
+          </a:ln>
+          <a:effectLst/>
+        </p:spPr>
+        <p:style>
+          <a:lnRef idx="1">
+            <a:schemeClr val="accent2"/>
+          </a:lnRef>
+          <a:fillRef idx="3">
+            <a:schemeClr val="accent2"/>
+          </a:fillRef>
+          <a:effectRef idx="2">
+            <a:schemeClr val="accent2"/>
+          </a:effectRef>
+          <a:fontRef idx="minor">
+            <a:schemeClr val="lt1"/>
+          </a:fontRef>
+        </p:style>
+        <p:txBody>
+          <a:bodyPr vert="horz" wrap="square" lIns="91436" tIns="45718" rIns="91436" bIns="45718" numCol="1" rtlCol="0" anchor="ctr" anchorCtr="0" compatLnSpc="1">
+            <a:prstTxWarp prst="textNoShape">
+              <a:avLst/>
+            </a:prstTxWarp>
+          </a:bodyPr>
+          <a:lstStyle/>
+          <a:p>
+            <a:pPr algn="ctr" defTabSz="914099" fontAlgn="base">
+              <a:spcBef>
+                <a:spcPct val="0"/>
+              </a:spcBef>
+              <a:spcAft>
+                <a:spcPct val="0"/>
+              </a:spcAft>
+            </a:pPr>
+            <a:r>
+              <a:rPr lang="en-US" sz="2000" dirty="0">
+                <a:gradFill>
+                  <a:gsLst>
+                    <a:gs pos="0">
+                      <a:srgbClr val="FFFFFF"/>
+                    </a:gs>
+                    <a:gs pos="100000">
+                      <a:srgbClr val="FFFFFF"/>
+                    </a:gs>
+                  </a:gsLst>
+                  <a:lin ang="5400000" scaled="0"/>
+                </a:gradFill>
+              </a:rPr>
+              <a:t>Intrinsics</a:t>
+            </a:r>
+          </a:p>
+        </p:txBody>
+      </p:sp>
+      <p:sp>
+        <p:nvSpPr>
+          <p:cNvPr id="14" name="Rectangle 13"/>
+          <p:cNvSpPr/>
+          <p:nvPr/>
+        </p:nvSpPr>
+        <p:spPr bwMode="auto">
+          <a:xfrm>
+            <a:off x="6838093" y="5214668"/>
+            <a:ext cx="2850125" cy="487680"/>
+          </a:xfrm>
+          <a:prstGeom prst="rect">
+            <a:avLst/>
+          </a:prstGeom>
+          <a:solidFill>
+            <a:schemeClr val="accent4"/>
+          </a:solidFill>
+          <a:ln>
+            <a:noFill/>
+            <a:headEnd type="none" w="med" len="med"/>
+            <a:tailEnd type="none" w="med" len="med"/>
+          </a:ln>
+          <a:effectLst/>
+        </p:spPr>
+        <p:style>
+          <a:lnRef idx="1">
+            <a:schemeClr val="accent2"/>
+          </a:lnRef>
+          <a:fillRef idx="3">
+            <a:schemeClr val="accent2"/>
+          </a:fillRef>
+          <a:effectRef idx="2">
+            <a:schemeClr val="accent2"/>
+          </a:effectRef>
+          <a:fontRef idx="minor">
+            <a:schemeClr val="lt1"/>
+          </a:fontRef>
+        </p:style>
+        <p:txBody>
+          <a:bodyPr vert="horz" wrap="square" lIns="91436" tIns="45718" rIns="91436" bIns="45718" numCol="1" rtlCol="0" anchor="ctr" anchorCtr="0" compatLnSpc="1">
+            <a:prstTxWarp prst="textNoShape">
+              <a:avLst/>
+            </a:prstTxWarp>
+          </a:bodyPr>
+          <a:lstStyle/>
+          <a:p>
+            <a:pPr algn="ctr" defTabSz="914099" fontAlgn="base">
+              <a:spcBef>
+                <a:spcPct val="0"/>
+              </a:spcBef>
+              <a:spcAft>
+                <a:spcPct val="0"/>
+              </a:spcAft>
+            </a:pPr>
+            <a:r>
+              <a:rPr lang="en-US" sz="2000" dirty="0">
+                <a:gradFill>
+                  <a:gsLst>
+                    <a:gs pos="0">
+                      <a:srgbClr val="FFFFFF"/>
+                    </a:gs>
+                    <a:gs pos="100000">
+                      <a:srgbClr val="FFFFFF"/>
+                    </a:gs>
+                  </a:gsLst>
+                  <a:lin ang="5400000" scaled="0"/>
+                </a:gradFill>
+              </a:rPr>
+              <a:t>Membership</a:t>
+            </a:r>
+          </a:p>
+        </p:txBody>
+      </p:sp>
+      <p:sp>
+        <p:nvSpPr>
+          <p:cNvPr id="16" name="Rectangle 15"/>
+          <p:cNvSpPr/>
+          <p:nvPr/>
+        </p:nvSpPr>
+        <p:spPr bwMode="auto">
+          <a:xfrm>
+            <a:off x="6838093" y="5763308"/>
+            <a:ext cx="2850125" cy="487680"/>
+          </a:xfrm>
+          <a:prstGeom prst="rect">
+            <a:avLst/>
+          </a:prstGeom>
+          <a:solidFill>
+            <a:schemeClr val="accent4"/>
+          </a:solidFill>
+          <a:ln>
+            <a:noFill/>
+            <a:headEnd type="none" w="med" len="med"/>
+            <a:tailEnd type="none" w="med" len="med"/>
+          </a:ln>
+          <a:effectLst/>
+        </p:spPr>
+        <p:style>
+          <a:lnRef idx="1">
+            <a:schemeClr val="accent2"/>
+          </a:lnRef>
+          <a:fillRef idx="3">
+            <a:schemeClr val="accent2"/>
+          </a:fillRef>
+          <a:effectRef idx="2">
+            <a:schemeClr val="accent2"/>
+          </a:effectRef>
+          <a:fontRef idx="minor">
+            <a:schemeClr val="lt1"/>
+          </a:fontRef>
+        </p:style>
+        <p:txBody>
+          <a:bodyPr vert="horz" wrap="square" lIns="91436" tIns="45718" rIns="91436" bIns="45718" numCol="1" rtlCol="0" anchor="ctr" anchorCtr="0" compatLnSpc="1">
+            <a:prstTxWarp prst="textNoShape">
+              <a:avLst/>
+            </a:prstTxWarp>
+          </a:bodyPr>
+          <a:lstStyle/>
+          <a:p>
+            <a:pPr algn="ctr" defTabSz="914099" fontAlgn="base">
+              <a:spcBef>
+                <a:spcPct val="0"/>
+              </a:spcBef>
+              <a:spcAft>
+                <a:spcPct val="0"/>
+              </a:spcAft>
+            </a:pPr>
+            <a:r>
+              <a:rPr lang="en-US" sz="2000" dirty="0">
+                <a:gradFill>
+                  <a:gsLst>
+                    <a:gs pos="0">
+                      <a:srgbClr val="FFFFFF"/>
+                    </a:gs>
+                    <a:gs pos="100000">
+                      <a:srgbClr val="FFFFFF"/>
+                    </a:gs>
+                  </a:gsLst>
+                  <a:lin ang="5400000" scaled="0"/>
+                </a:gradFill>
+              </a:rPr>
+              <a:t>Etc.</a:t>
+            </a:r>
+          </a:p>
+        </p:txBody>
+      </p:sp>
+      <p:sp>
+        <p:nvSpPr>
+          <p:cNvPr id="17" name="TextBox 28"/>
+          <p:cNvSpPr txBox="1"/>
+          <p:nvPr/>
+        </p:nvSpPr>
+        <p:spPr>
+          <a:xfrm>
+            <a:off x="574570" y="4528923"/>
+            <a:ext cx="8130153" cy="553998"/>
+          </a:xfrm>
+          <a:prstGeom prst="rect">
+            <a:avLst/>
+          </a:prstGeom>
+          <a:noFill/>
+        </p:spPr>
+        <p:txBody>
+          <a:bodyPr wrap="square" rtlCol="0">
+            <a:spAutoFit/>
+          </a:bodyPr>
+          <a:lstStyle>
+            <a:defPPr>
+              <a:defRPr lang="en-US"/>
+            </a:defPPr>
+            <a:lvl1pPr marL="0" algn="l" defTabSz="914363" rtl="0" eaLnBrk="1" latinLnBrk="0" hangingPunct="1">
+              <a:defRPr sz="1800" kern="1200">
+                <a:solidFill>
+                  <a:schemeClr val="tx1"/>
+                </a:solidFill>
+                <a:latin typeface="+mn-lt"/>
+                <a:ea typeface="+mn-ea"/>
+                <a:cs typeface="+mn-cs"/>
+              </a:defRPr>
+            </a:lvl1pPr>
+            <a:lvl2pPr marL="457182" algn="l" defTabSz="914363" rtl="0" eaLnBrk="1" latinLnBrk="0" hangingPunct="1">
+              <a:defRPr sz="1800" kern="1200">
+                <a:solidFill>
+                  <a:schemeClr val="tx1"/>
+                </a:solidFill>
+                <a:latin typeface="+mn-lt"/>
+                <a:ea typeface="+mn-ea"/>
+                <a:cs typeface="+mn-cs"/>
+              </a:defRPr>
+            </a:lvl2pPr>
+            <a:lvl3pPr marL="914363" algn="l" defTabSz="914363" rtl="0" eaLnBrk="1" latinLnBrk="0" hangingPunct="1">
+              <a:defRPr sz="1800" kern="1200">
+                <a:solidFill>
+                  <a:schemeClr val="tx1"/>
+                </a:solidFill>
+                <a:latin typeface="+mn-lt"/>
+                <a:ea typeface="+mn-ea"/>
+                <a:cs typeface="+mn-cs"/>
+              </a:defRPr>
+            </a:lvl3pPr>
+            <a:lvl4pPr marL="1371545" algn="l" defTabSz="914363" rtl="0" eaLnBrk="1" latinLnBrk="0" hangingPunct="1">
+              <a:defRPr sz="1800" kern="1200">
+                <a:solidFill>
+                  <a:schemeClr val="tx1"/>
+                </a:solidFill>
+                <a:latin typeface="+mn-lt"/>
+                <a:ea typeface="+mn-ea"/>
+                <a:cs typeface="+mn-cs"/>
+              </a:defRPr>
+            </a:lvl4pPr>
+            <a:lvl5pPr marL="1828727" algn="l" defTabSz="914363" rtl="0" eaLnBrk="1" latinLnBrk="0" hangingPunct="1">
+              <a:defRPr sz="1800" kern="1200">
+                <a:solidFill>
+                  <a:schemeClr val="tx1"/>
+                </a:solidFill>
+                <a:latin typeface="+mn-lt"/>
+                <a:ea typeface="+mn-ea"/>
+                <a:cs typeface="+mn-cs"/>
+              </a:defRPr>
+            </a:lvl5pPr>
+            <a:lvl6pPr marL="2285909" algn="l" defTabSz="914363" rtl="0" eaLnBrk="1" latinLnBrk="0" hangingPunct="1">
+              <a:defRPr sz="1800" kern="1200">
+                <a:solidFill>
+                  <a:schemeClr val="tx1"/>
+                </a:solidFill>
+                <a:latin typeface="+mn-lt"/>
+                <a:ea typeface="+mn-ea"/>
+                <a:cs typeface="+mn-cs"/>
+              </a:defRPr>
+            </a:lvl6pPr>
+            <a:lvl7pPr marL="2743090" algn="l" defTabSz="914363" rtl="0" eaLnBrk="1" latinLnBrk="0" hangingPunct="1">
+              <a:defRPr sz="1800" kern="1200">
+                <a:solidFill>
+                  <a:schemeClr val="tx1"/>
+                </a:solidFill>
+                <a:latin typeface="+mn-lt"/>
+                <a:ea typeface="+mn-ea"/>
+                <a:cs typeface="+mn-cs"/>
+              </a:defRPr>
+            </a:lvl7pPr>
+            <a:lvl8pPr marL="3200272" algn="l" defTabSz="914363" rtl="0" eaLnBrk="1" latinLnBrk="0" hangingPunct="1">
+              <a:defRPr sz="1800" kern="1200">
+                <a:solidFill>
+                  <a:schemeClr val="tx1"/>
+                </a:solidFill>
+                <a:latin typeface="+mn-lt"/>
+                <a:ea typeface="+mn-ea"/>
+                <a:cs typeface="+mn-cs"/>
+              </a:defRPr>
+            </a:lvl8pPr>
+            <a:lvl9pPr marL="3657454" algn="l" defTabSz="914363" rtl="0" eaLnBrk="1" latinLnBrk="0" hangingPunct="1">
+              <a:defRPr sz="1800" kern="1200">
+                <a:solidFill>
+                  <a:schemeClr val="tx1"/>
+                </a:solidFill>
+                <a:latin typeface="+mn-lt"/>
+                <a:ea typeface="+mn-ea"/>
+                <a:cs typeface="+mn-cs"/>
+              </a:defRPr>
+            </a:lvl9pPr>
+          </a:lstStyle>
+          <a:p>
+            <a:pPr algn="ctr"/>
+            <a:r>
+              <a:rPr lang="en-US" sz="3000" dirty="0" smtClean="0">
+                <a:solidFill>
+                  <a:schemeClr val="bg1">
+                    <a:alpha val="99000"/>
+                  </a:schemeClr>
+                </a:solidFill>
+              </a:rPr>
+              <a:t>ASP.NET Core</a:t>
+            </a:r>
+            <a:endParaRPr lang="en-US" sz="3000" dirty="0">
+              <a:solidFill>
+                <a:schemeClr val="bg1">
+                  <a:alpha val="99000"/>
+                </a:schemeClr>
+              </a:solidFill>
+            </a:endParaRPr>
+          </a:p>
+        </p:txBody>
+      </p:sp>
+      <p:sp>
+        <p:nvSpPr>
+          <p:cNvPr id="23" name="Rectangle 22"/>
+          <p:cNvSpPr/>
+          <p:nvPr/>
+        </p:nvSpPr>
+        <p:spPr>
+          <a:xfrm>
+            <a:off x="8263156" y="3456263"/>
+            <a:ext cx="3058968" cy="979067"/>
+          </a:xfrm>
+          <a:prstGeom prst="rect">
+            <a:avLst/>
+          </a:prstGeom>
+          <a:solidFill>
+            <a:schemeClr val="accent2"/>
+          </a:solidFill>
+          <a:ln>
+            <a:noFill/>
+            <a:headEnd type="none" w="med" len="med"/>
+            <a:tailEnd type="none" w="med" len="med"/>
+          </a:ln>
+          <a:effectLst/>
+        </p:spPr>
+        <p:style>
+          <a:lnRef idx="1">
+            <a:schemeClr val="accent2"/>
+          </a:lnRef>
+          <a:fillRef idx="3">
+            <a:schemeClr val="accent2"/>
+          </a:fillRef>
+          <a:effectRef idx="2">
+            <a:schemeClr val="accent2"/>
+          </a:effectRef>
+          <a:fontRef idx="minor">
+            <a:schemeClr val="lt1"/>
+          </a:fontRef>
+        </p:style>
+        <p:txBody>
+          <a:bodyPr vert="horz" wrap="square" lIns="91436" tIns="45718" rIns="91436" bIns="45718" numCol="1" rtlCol="0" anchor="t" anchorCtr="0" compatLnSpc="1">
+            <a:prstTxWarp prst="textNoShape">
+              <a:avLst/>
+            </a:prstTxWarp>
+          </a:bodyPr>
+          <a:lstStyle/>
+          <a:p>
+            <a:pPr algn="ctr" defTabSz="914099" fontAlgn="base">
+              <a:spcBef>
+                <a:spcPct val="0"/>
+              </a:spcBef>
+              <a:spcAft>
+                <a:spcPct val="0"/>
+              </a:spcAft>
+            </a:pPr>
+            <a:r>
+              <a:rPr lang="en-US" dirty="0" smtClean="0">
+                <a:gradFill>
+                  <a:gsLst>
+                    <a:gs pos="0">
+                      <a:srgbClr val="FFFFFF"/>
+                    </a:gs>
+                    <a:gs pos="100000">
+                      <a:srgbClr val="FFFFFF"/>
+                    </a:gs>
+                  </a:gsLst>
+                  <a:lin ang="5400000" scaled="0"/>
+                </a:gradFill>
+              </a:rPr>
+              <a:t>MVC</a:t>
+            </a:r>
+            <a:endParaRPr lang="en-US" dirty="0">
+              <a:gradFill>
+                <a:gsLst>
+                  <a:gs pos="0">
+                    <a:srgbClr val="FFFFFF"/>
+                  </a:gs>
+                  <a:gs pos="100000">
+                    <a:srgbClr val="FFFFFF"/>
+                  </a:gs>
+                </a:gsLst>
+                <a:lin ang="5400000" scaled="0"/>
+              </a:gradFill>
+            </a:endParaRPr>
+          </a:p>
+        </p:txBody>
+      </p:sp>
+      <p:sp>
+        <p:nvSpPr>
+          <p:cNvPr id="24" name="Rectangle 23"/>
+          <p:cNvSpPr/>
+          <p:nvPr/>
+        </p:nvSpPr>
+        <p:spPr>
+          <a:xfrm>
+            <a:off x="5075339" y="3449433"/>
+            <a:ext cx="3114838" cy="985898"/>
+          </a:xfrm>
+          <a:prstGeom prst="rect">
+            <a:avLst/>
+          </a:prstGeom>
+          <a:solidFill>
+            <a:schemeClr val="accent2"/>
+          </a:solidFill>
+          <a:ln>
+            <a:noFill/>
+            <a:headEnd type="none" w="med" len="med"/>
+            <a:tailEnd type="none" w="med" len="med"/>
+          </a:ln>
+          <a:effectLst/>
+        </p:spPr>
+        <p:style>
+          <a:lnRef idx="1">
+            <a:schemeClr val="accent2"/>
+          </a:lnRef>
+          <a:fillRef idx="3">
+            <a:schemeClr val="accent2"/>
+          </a:fillRef>
+          <a:effectRef idx="2">
+            <a:schemeClr val="accent2"/>
+          </a:effectRef>
+          <a:fontRef idx="minor">
+            <a:schemeClr val="lt1"/>
+          </a:fontRef>
+        </p:style>
+        <p:txBody>
+          <a:bodyPr vert="horz" wrap="square" lIns="91436" tIns="45718" rIns="91436" bIns="45718" numCol="1" rtlCol="0" anchor="ctr" anchorCtr="0" compatLnSpc="1">
+            <a:prstTxWarp prst="textNoShape">
+              <a:avLst/>
+            </a:prstTxWarp>
+          </a:bodyPr>
+          <a:lstStyle/>
+          <a:p>
+            <a:pPr algn="ctr" defTabSz="914099" fontAlgn="base">
+              <a:spcBef>
+                <a:spcPct val="0"/>
+              </a:spcBef>
+              <a:spcAft>
+                <a:spcPct val="0"/>
+              </a:spcAft>
+            </a:pPr>
+            <a:r>
+              <a:rPr lang="en-US" dirty="0" smtClean="0">
+                <a:gradFill>
+                  <a:gsLst>
+                    <a:gs pos="0">
+                      <a:srgbClr val="FFFFFF"/>
+                    </a:gs>
+                    <a:gs pos="100000">
+                      <a:srgbClr val="FFFFFF"/>
+                    </a:gs>
+                  </a:gsLst>
+                  <a:lin ang="5400000" scaled="0"/>
+                </a:gradFill>
+              </a:rPr>
+              <a:t>Web Pages</a:t>
+            </a:r>
+            <a:endParaRPr lang="en-US" dirty="0">
+              <a:gradFill>
+                <a:gsLst>
+                  <a:gs pos="0">
+                    <a:srgbClr val="FFFFFF"/>
+                  </a:gs>
+                  <a:gs pos="100000">
+                    <a:srgbClr val="FFFFFF"/>
+                  </a:gs>
+                </a:gsLst>
+                <a:lin ang="5400000" scaled="0"/>
+              </a:gradFill>
+            </a:endParaRPr>
+          </a:p>
+        </p:txBody>
+      </p:sp>
+      <p:sp>
+        <p:nvSpPr>
+          <p:cNvPr id="28" name="Rectangle 27"/>
+          <p:cNvSpPr/>
+          <p:nvPr/>
+        </p:nvSpPr>
+        <p:spPr>
+          <a:xfrm>
+            <a:off x="879902" y="2659310"/>
+            <a:ext cx="4124455" cy="1768401"/>
+          </a:xfrm>
+          <a:prstGeom prst="rect">
+            <a:avLst/>
+          </a:prstGeom>
+          <a:solidFill>
+            <a:schemeClr val="accent2"/>
+          </a:solidFill>
+          <a:ln>
+            <a:noFill/>
+            <a:headEnd type="none" w="med" len="med"/>
+            <a:tailEnd type="none" w="med" len="med"/>
+          </a:ln>
+          <a:effectLst/>
+        </p:spPr>
+        <p:style>
+          <a:lnRef idx="1">
+            <a:schemeClr val="accent2"/>
+          </a:lnRef>
+          <a:fillRef idx="3">
+            <a:schemeClr val="accent2"/>
+          </a:fillRef>
+          <a:effectRef idx="2">
+            <a:schemeClr val="accent2"/>
+          </a:effectRef>
+          <a:fontRef idx="minor">
+            <a:schemeClr val="lt1"/>
+          </a:fontRef>
+        </p:style>
+        <p:txBody>
+          <a:bodyPr vert="horz" wrap="square" lIns="91436" tIns="45718" rIns="91436" bIns="45718" numCol="1" rtlCol="0" anchor="ctr" anchorCtr="0" compatLnSpc="1">
+            <a:prstTxWarp prst="textNoShape">
+              <a:avLst/>
+            </a:prstTxWarp>
+          </a:bodyPr>
+          <a:lstStyle/>
+          <a:p>
+            <a:pPr algn="ctr" defTabSz="914099" fontAlgn="base">
+              <a:spcBef>
+                <a:spcPct val="0"/>
+              </a:spcBef>
+              <a:spcAft>
+                <a:spcPct val="0"/>
+              </a:spcAft>
+            </a:pPr>
+            <a:r>
+              <a:rPr lang="en-US" dirty="0" smtClean="0">
+                <a:gradFill>
+                  <a:gsLst>
+                    <a:gs pos="0">
+                      <a:srgbClr val="FFFFFF"/>
+                    </a:gs>
+                    <a:gs pos="100000">
+                      <a:srgbClr val="FFFFFF"/>
+                    </a:gs>
+                  </a:gsLst>
+                  <a:lin ang="5400000" scaled="0"/>
+                </a:gradFill>
+              </a:rPr>
+              <a:t>Web Forms</a:t>
+            </a:r>
+            <a:endParaRPr lang="en-US" dirty="0">
+              <a:gradFill>
+                <a:gsLst>
+                  <a:gs pos="0">
+                    <a:srgbClr val="FFFFFF"/>
+                  </a:gs>
+                  <a:gs pos="100000">
+                    <a:srgbClr val="FFFFFF"/>
+                  </a:gs>
+                </a:gsLst>
+                <a:lin ang="5400000" scaled="0"/>
+              </a:gradFill>
+            </a:endParaRPr>
+          </a:p>
+        </p:txBody>
+      </p:sp>
+      <p:sp>
+        <p:nvSpPr>
+          <p:cNvPr id="29" name="Rectangle 28"/>
+          <p:cNvSpPr/>
+          <p:nvPr/>
+        </p:nvSpPr>
+        <p:spPr>
+          <a:xfrm>
+            <a:off x="5075339" y="2659310"/>
+            <a:ext cx="4740311" cy="709674"/>
+          </a:xfrm>
+          <a:prstGeom prst="rect">
+            <a:avLst/>
+          </a:prstGeom>
+          <a:solidFill>
+            <a:schemeClr val="accent2"/>
+          </a:solidFill>
+          <a:ln>
+            <a:noFill/>
+            <a:headEnd type="none" w="med" len="med"/>
+            <a:tailEnd type="none" w="med" len="med"/>
+          </a:ln>
+          <a:effectLst/>
+        </p:spPr>
+        <p:style>
+          <a:lnRef idx="1">
+            <a:schemeClr val="accent2"/>
+          </a:lnRef>
+          <a:fillRef idx="3">
+            <a:schemeClr val="accent2"/>
+          </a:fillRef>
+          <a:effectRef idx="2">
+            <a:schemeClr val="accent2"/>
+          </a:effectRef>
+          <a:fontRef idx="minor">
+            <a:schemeClr val="lt1"/>
+          </a:fontRef>
+        </p:style>
+        <p:txBody>
+          <a:bodyPr vert="horz" wrap="square" lIns="91436" tIns="45718" rIns="91436" bIns="45718" numCol="1" rtlCol="0" anchor="ctr" anchorCtr="0" compatLnSpc="1">
+            <a:prstTxWarp prst="textNoShape">
+              <a:avLst/>
+            </a:prstTxWarp>
+          </a:bodyPr>
+          <a:lstStyle/>
+          <a:p>
+            <a:pPr algn="ctr" defTabSz="914099" fontAlgn="base">
+              <a:spcBef>
+                <a:spcPct val="0"/>
+              </a:spcBef>
+              <a:spcAft>
+                <a:spcPct val="0"/>
+              </a:spcAft>
+            </a:pPr>
+            <a:r>
+              <a:rPr lang="en-US" dirty="0">
+                <a:gradFill>
+                  <a:gsLst>
+                    <a:gs pos="0">
+                      <a:srgbClr val="FFFFFF"/>
+                    </a:gs>
+                    <a:gs pos="100000">
+                      <a:srgbClr val="FFFFFF"/>
+                    </a:gs>
+                  </a:gsLst>
+                  <a:lin ang="5400000" scaled="0"/>
+                </a:gradFill>
+              </a:rPr>
+              <a:t>Razor View Engine</a:t>
+            </a:r>
+          </a:p>
+        </p:txBody>
+      </p:sp>
+      <p:sp>
+        <p:nvSpPr>
+          <p:cNvPr id="35" name="Rectangle 34"/>
+          <p:cNvSpPr/>
+          <p:nvPr/>
+        </p:nvSpPr>
+        <p:spPr>
+          <a:xfrm>
+            <a:off x="9899010" y="4536821"/>
+            <a:ext cx="1423114" cy="1996106"/>
+          </a:xfrm>
+          <a:prstGeom prst="rect">
+            <a:avLst/>
+          </a:prstGeom>
+          <a:solidFill>
+            <a:schemeClr val="accent2"/>
+          </a:solidFill>
+          <a:ln>
+            <a:noFill/>
+            <a:headEnd type="none" w="med" len="med"/>
+            <a:tailEnd type="none" w="med" len="med"/>
+          </a:ln>
+          <a:effectLst/>
+        </p:spPr>
+        <p:style>
+          <a:lnRef idx="1">
+            <a:schemeClr val="accent2"/>
+          </a:lnRef>
+          <a:fillRef idx="3">
+            <a:schemeClr val="accent2"/>
+          </a:fillRef>
+          <a:effectRef idx="2">
+            <a:schemeClr val="accent2"/>
+          </a:effectRef>
+          <a:fontRef idx="minor">
+            <a:schemeClr val="lt1"/>
+          </a:fontRef>
+        </p:style>
+        <p:txBody>
+          <a:bodyPr vert="horz" wrap="square" lIns="91436" tIns="45718" rIns="91436" bIns="45718" numCol="1" rtlCol="0" anchor="ctr" anchorCtr="0" compatLnSpc="1">
+            <a:prstTxWarp prst="textNoShape">
+              <a:avLst/>
+            </a:prstTxWarp>
+          </a:bodyPr>
+          <a:lstStyle/>
+          <a:p>
+            <a:pPr algn="ctr" defTabSz="914099" fontAlgn="base">
+              <a:spcBef>
+                <a:spcPct val="0"/>
+              </a:spcBef>
+              <a:spcAft>
+                <a:spcPct val="0"/>
+              </a:spcAft>
+            </a:pPr>
+            <a:r>
+              <a:rPr lang="en-US" dirty="0" smtClean="0">
+                <a:gradFill>
+                  <a:gsLst>
+                    <a:gs pos="0">
+                      <a:srgbClr val="FFFFFF"/>
+                    </a:gs>
+                    <a:gs pos="100000">
+                      <a:srgbClr val="FFFFFF"/>
+                    </a:gs>
+                  </a:gsLst>
+                  <a:lin ang="5400000" scaled="0"/>
+                </a:gradFill>
+              </a:rPr>
+              <a:t>Self Host</a:t>
+            </a:r>
+            <a:endParaRPr lang="en-US" dirty="0">
+              <a:gradFill>
+                <a:gsLst>
+                  <a:gs pos="0">
+                    <a:srgbClr val="FFFFFF"/>
+                  </a:gs>
+                  <a:gs pos="100000">
+                    <a:srgbClr val="FFFFFF"/>
+                  </a:gs>
+                </a:gsLst>
+                <a:lin ang="5400000" scaled="0"/>
+              </a:gradFill>
+            </a:endParaRPr>
+          </a:p>
+        </p:txBody>
+      </p:sp>
+      <p:sp>
+        <p:nvSpPr>
+          <p:cNvPr id="37" name="Rectangle 36"/>
+          <p:cNvSpPr/>
+          <p:nvPr/>
+        </p:nvSpPr>
+        <p:spPr bwMode="auto">
+          <a:xfrm>
+            <a:off x="9899010" y="3881611"/>
+            <a:ext cx="1357301" cy="455497"/>
+          </a:xfrm>
+          <a:prstGeom prst="rect">
+            <a:avLst/>
+          </a:prstGeom>
+          <a:solidFill>
+            <a:schemeClr val="accent4"/>
+          </a:solidFill>
+          <a:ln>
+            <a:noFill/>
+            <a:headEnd type="none" w="med" len="med"/>
+            <a:tailEnd type="none" w="med" len="med"/>
+          </a:ln>
+          <a:effectLst/>
+        </p:spPr>
+        <p:style>
+          <a:lnRef idx="1">
+            <a:schemeClr val="accent2"/>
+          </a:lnRef>
+          <a:fillRef idx="3">
+            <a:schemeClr val="accent2"/>
+          </a:fillRef>
+          <a:effectRef idx="2">
+            <a:schemeClr val="accent2"/>
+          </a:effectRef>
+          <a:fontRef idx="minor">
+            <a:schemeClr val="lt1"/>
+          </a:fontRef>
+        </p:style>
+        <p:txBody>
+          <a:bodyPr vert="horz" wrap="square" lIns="91436" tIns="45718" rIns="91436" bIns="45718" numCol="1" rtlCol="0" anchor="ctr" anchorCtr="0" compatLnSpc="1">
+            <a:prstTxWarp prst="textNoShape">
+              <a:avLst/>
+            </a:prstTxWarp>
+          </a:bodyPr>
+          <a:lstStyle/>
+          <a:p>
+            <a:pPr algn="ctr" defTabSz="914099" fontAlgn="base">
+              <a:spcBef>
+                <a:spcPct val="0"/>
+              </a:spcBef>
+              <a:spcAft>
+                <a:spcPct val="0"/>
+              </a:spcAft>
+            </a:pPr>
+            <a:r>
+              <a:rPr lang="en-US" sz="2000" dirty="0" smtClean="0">
+                <a:gradFill>
+                  <a:gsLst>
+                    <a:gs pos="0">
+                      <a:srgbClr val="FFFFFF"/>
+                    </a:gs>
+                    <a:gs pos="100000">
+                      <a:srgbClr val="FFFFFF"/>
+                    </a:gs>
+                  </a:gsLst>
+                  <a:lin ang="5400000" scaled="0"/>
+                </a:gradFill>
+              </a:rPr>
+              <a:t>Web API</a:t>
+            </a:r>
+            <a:endParaRPr lang="en-US" sz="2000" dirty="0">
+              <a:gradFill>
+                <a:gsLst>
+                  <a:gs pos="0">
+                    <a:srgbClr val="FFFFFF"/>
+                  </a:gs>
+                  <a:gs pos="100000">
+                    <a:srgbClr val="FFFFFF"/>
+                  </a:gs>
+                </a:gsLst>
+                <a:lin ang="5400000" scaled="0"/>
+              </a:gradFill>
+            </a:endParaRPr>
+          </a:p>
+        </p:txBody>
+      </p:sp>
+      <p:sp>
+        <p:nvSpPr>
+          <p:cNvPr id="38" name="Rectangle 37"/>
+          <p:cNvSpPr/>
+          <p:nvPr/>
+        </p:nvSpPr>
+        <p:spPr bwMode="auto">
+          <a:xfrm>
+            <a:off x="8414918" y="3881611"/>
+            <a:ext cx="1400732" cy="455497"/>
+          </a:xfrm>
+          <a:prstGeom prst="rect">
+            <a:avLst/>
+          </a:prstGeom>
+          <a:solidFill>
+            <a:schemeClr val="accent4"/>
+          </a:solidFill>
+          <a:ln>
+            <a:noFill/>
+            <a:headEnd type="none" w="med" len="med"/>
+            <a:tailEnd type="none" w="med" len="med"/>
+          </a:ln>
+          <a:effectLst/>
+        </p:spPr>
+        <p:style>
+          <a:lnRef idx="1">
+            <a:schemeClr val="accent2"/>
+          </a:lnRef>
+          <a:fillRef idx="3">
+            <a:schemeClr val="accent2"/>
+          </a:fillRef>
+          <a:effectRef idx="2">
+            <a:schemeClr val="accent2"/>
+          </a:effectRef>
+          <a:fontRef idx="minor">
+            <a:schemeClr val="lt1"/>
+          </a:fontRef>
+        </p:style>
+        <p:txBody>
+          <a:bodyPr vert="horz" wrap="square" lIns="91436" tIns="45718" rIns="91436" bIns="45718" numCol="1" rtlCol="0" anchor="ctr" anchorCtr="0" compatLnSpc="1">
+            <a:prstTxWarp prst="textNoShape">
+              <a:avLst/>
+            </a:prstTxWarp>
+          </a:bodyPr>
+          <a:lstStyle/>
+          <a:p>
+            <a:pPr algn="ctr" defTabSz="914099" fontAlgn="base">
+              <a:spcBef>
+                <a:spcPct val="0"/>
+              </a:spcBef>
+              <a:spcAft>
+                <a:spcPct val="0"/>
+              </a:spcAft>
+            </a:pPr>
+            <a:r>
+              <a:rPr lang="en-US" sz="2000" dirty="0" smtClean="0">
+                <a:gradFill>
+                  <a:gsLst>
+                    <a:gs pos="0">
+                      <a:srgbClr val="FFFFFF"/>
+                    </a:gs>
+                    <a:gs pos="100000">
+                      <a:srgbClr val="FFFFFF"/>
+                    </a:gs>
+                  </a:gsLst>
+                  <a:lin ang="5400000" scaled="0"/>
+                </a:gradFill>
+              </a:rPr>
+              <a:t>MVC 4</a:t>
+            </a:r>
+            <a:endParaRPr lang="en-US" sz="2000" dirty="0">
+              <a:gradFill>
+                <a:gsLst>
+                  <a:gs pos="0">
+                    <a:srgbClr val="FFFFFF"/>
+                  </a:gs>
+                  <a:gs pos="100000">
+                    <a:srgbClr val="FFFFFF"/>
+                  </a:gs>
+                </a:gsLst>
+                <a:lin ang="5400000" scaled="0"/>
+              </a:gradFill>
+            </a:endParaRPr>
+          </a:p>
+        </p:txBody>
+      </p:sp>
+      <p:sp>
+        <p:nvSpPr>
+          <p:cNvPr id="40" name="Rectangle 39"/>
+          <p:cNvSpPr/>
+          <p:nvPr/>
+        </p:nvSpPr>
+        <p:spPr>
+          <a:xfrm>
+            <a:off x="879902" y="1703024"/>
+            <a:ext cx="8912738" cy="879485"/>
+          </a:xfrm>
+          <a:prstGeom prst="rect">
+            <a:avLst/>
+          </a:prstGeom>
+          <a:solidFill>
+            <a:schemeClr val="accent2"/>
+          </a:solidFill>
+          <a:ln>
+            <a:noFill/>
+            <a:headEnd type="none" w="med" len="med"/>
+            <a:tailEnd type="none" w="med" len="med"/>
+          </a:ln>
+          <a:effectLst/>
+        </p:spPr>
+        <p:style>
+          <a:lnRef idx="1">
+            <a:schemeClr val="accent2"/>
+          </a:lnRef>
+          <a:fillRef idx="3">
+            <a:schemeClr val="accent2"/>
+          </a:fillRef>
+          <a:effectRef idx="2">
+            <a:schemeClr val="accent2"/>
+          </a:effectRef>
+          <a:fontRef idx="minor">
+            <a:schemeClr val="lt1"/>
+          </a:fontRef>
+        </p:style>
+        <p:txBody>
+          <a:bodyPr vert="horz" wrap="square" lIns="91436" tIns="45718" rIns="91436" bIns="45718" numCol="1" rtlCol="0" anchor="ctr" anchorCtr="0" compatLnSpc="1">
+            <a:prstTxWarp prst="textNoShape">
+              <a:avLst/>
+            </a:prstTxWarp>
+          </a:bodyPr>
+          <a:lstStyle/>
+          <a:p>
+            <a:pPr algn="ctr" defTabSz="914099" fontAlgn="base">
+              <a:spcBef>
+                <a:spcPct val="0"/>
+              </a:spcBef>
+              <a:spcAft>
+                <a:spcPct val="0"/>
+              </a:spcAft>
+            </a:pPr>
+            <a:r>
+              <a:rPr lang="en-US" dirty="0" smtClean="0">
+                <a:gradFill>
+                  <a:gsLst>
+                    <a:gs pos="0">
+                      <a:srgbClr val="FFFFFF"/>
+                    </a:gs>
+                    <a:gs pos="100000">
+                      <a:srgbClr val="FFFFFF"/>
+                    </a:gs>
+                  </a:gsLst>
+                  <a:lin ang="5400000" scaled="0"/>
+                </a:gradFill>
+              </a:rPr>
+              <a:t>HTML</a:t>
+            </a:r>
+            <a:endParaRPr lang="en-US" dirty="0">
+              <a:gradFill>
+                <a:gsLst>
+                  <a:gs pos="0">
+                    <a:srgbClr val="FFFFFF"/>
+                  </a:gs>
+                  <a:gs pos="100000">
+                    <a:srgbClr val="FFFFFF"/>
+                  </a:gs>
+                </a:gsLst>
+                <a:lin ang="5400000" scaled="0"/>
+              </a:gradFill>
+            </a:endParaRPr>
+          </a:p>
+        </p:txBody>
+      </p:sp>
+      <p:sp>
+        <p:nvSpPr>
+          <p:cNvPr id="41" name="Rectangle 40"/>
+          <p:cNvSpPr/>
+          <p:nvPr/>
+        </p:nvSpPr>
+        <p:spPr>
+          <a:xfrm>
+            <a:off x="9899009" y="2659310"/>
+            <a:ext cx="1423115" cy="721959"/>
+          </a:xfrm>
+          <a:prstGeom prst="rect">
+            <a:avLst/>
+          </a:prstGeom>
+          <a:solidFill>
+            <a:schemeClr val="accent2"/>
+          </a:solidFill>
+          <a:ln>
+            <a:noFill/>
+            <a:headEnd type="none" w="med" len="med"/>
+            <a:tailEnd type="none" w="med" len="med"/>
+          </a:ln>
+          <a:effectLst/>
+        </p:spPr>
+        <p:style>
+          <a:lnRef idx="1">
+            <a:schemeClr val="accent2"/>
+          </a:lnRef>
+          <a:fillRef idx="3">
+            <a:schemeClr val="accent2"/>
+          </a:fillRef>
+          <a:effectRef idx="2">
+            <a:schemeClr val="accent2"/>
+          </a:effectRef>
+          <a:fontRef idx="minor">
+            <a:schemeClr val="lt1"/>
+          </a:fontRef>
+        </p:style>
+        <p:txBody>
+          <a:bodyPr vert="horz" wrap="square" lIns="91436" tIns="45718" rIns="91436" bIns="45718" numCol="1" rtlCol="0" anchor="ctr" anchorCtr="0" compatLnSpc="1">
+            <a:prstTxWarp prst="textNoShape">
+              <a:avLst/>
+            </a:prstTxWarp>
+          </a:bodyPr>
+          <a:lstStyle/>
+          <a:p>
+            <a:pPr algn="ctr" defTabSz="914099" fontAlgn="base">
+              <a:spcBef>
+                <a:spcPct val="0"/>
+              </a:spcBef>
+              <a:spcAft>
+                <a:spcPct val="0"/>
+              </a:spcAft>
+            </a:pPr>
+            <a:r>
+              <a:rPr lang="en-US" dirty="0" smtClean="0">
+                <a:gradFill>
+                  <a:gsLst>
+                    <a:gs pos="0">
+                      <a:srgbClr val="FFFFFF"/>
+                    </a:gs>
+                    <a:gs pos="100000">
+                      <a:srgbClr val="FFFFFF"/>
+                    </a:gs>
+                  </a:gsLst>
+                  <a:lin ang="5400000" scaled="0"/>
+                </a:gradFill>
+              </a:rPr>
+              <a:t>Code</a:t>
+            </a:r>
+            <a:endParaRPr lang="en-US" dirty="0">
+              <a:gradFill>
+                <a:gsLst>
+                  <a:gs pos="0">
+                    <a:srgbClr val="FFFFFF"/>
+                  </a:gs>
+                  <a:gs pos="100000">
+                    <a:srgbClr val="FFFFFF"/>
+                  </a:gs>
+                </a:gsLst>
+                <a:lin ang="5400000" scaled="0"/>
+              </a:gradFill>
+            </a:endParaRPr>
+          </a:p>
+        </p:txBody>
+      </p:sp>
+      <p:sp>
+        <p:nvSpPr>
+          <p:cNvPr id="42" name="Rectangle 41"/>
+          <p:cNvSpPr/>
+          <p:nvPr/>
+        </p:nvSpPr>
+        <p:spPr>
+          <a:xfrm>
+            <a:off x="9889114" y="2170626"/>
+            <a:ext cx="1423115" cy="408788"/>
+          </a:xfrm>
+          <a:prstGeom prst="rect">
+            <a:avLst/>
+          </a:prstGeom>
+          <a:solidFill>
+            <a:schemeClr val="accent2"/>
+          </a:solidFill>
+          <a:ln>
+            <a:noFill/>
+            <a:headEnd type="none" w="med" len="med"/>
+            <a:tailEnd type="none" w="med" len="med"/>
+          </a:ln>
+          <a:effectLst/>
+        </p:spPr>
+        <p:style>
+          <a:lnRef idx="1">
+            <a:schemeClr val="accent2"/>
+          </a:lnRef>
+          <a:fillRef idx="3">
+            <a:schemeClr val="accent2"/>
+          </a:fillRef>
+          <a:effectRef idx="2">
+            <a:schemeClr val="accent2"/>
+          </a:effectRef>
+          <a:fontRef idx="minor">
+            <a:schemeClr val="lt1"/>
+          </a:fontRef>
+        </p:style>
+        <p:txBody>
+          <a:bodyPr vert="horz" wrap="square" lIns="91436" tIns="45718" rIns="91436" bIns="45718" numCol="1" rtlCol="0" anchor="ctr" anchorCtr="0" compatLnSpc="1">
+            <a:prstTxWarp prst="textNoShape">
+              <a:avLst/>
+            </a:prstTxWarp>
+          </a:bodyPr>
+          <a:lstStyle/>
+          <a:p>
+            <a:pPr algn="ctr" defTabSz="914099" fontAlgn="base">
+              <a:spcBef>
+                <a:spcPct val="0"/>
+              </a:spcBef>
+              <a:spcAft>
+                <a:spcPct val="0"/>
+              </a:spcAft>
+            </a:pPr>
+            <a:r>
+              <a:rPr lang="en-US" dirty="0" smtClean="0">
+                <a:gradFill>
+                  <a:gsLst>
+                    <a:gs pos="0">
+                      <a:srgbClr val="FFFFFF"/>
+                    </a:gs>
+                    <a:gs pos="100000">
+                      <a:srgbClr val="FFFFFF"/>
+                    </a:gs>
+                  </a:gsLst>
+                  <a:lin ang="5400000" scaled="0"/>
+                </a:gradFill>
+              </a:rPr>
+              <a:t>JSON</a:t>
+            </a:r>
+            <a:endParaRPr lang="en-US" dirty="0">
+              <a:gradFill>
+                <a:gsLst>
+                  <a:gs pos="0">
+                    <a:srgbClr val="FFFFFF"/>
+                  </a:gs>
+                  <a:gs pos="100000">
+                    <a:srgbClr val="FFFFFF"/>
+                  </a:gs>
+                </a:gsLst>
+                <a:lin ang="5400000" scaled="0"/>
+              </a:gradFill>
+            </a:endParaRPr>
+          </a:p>
+        </p:txBody>
+      </p:sp>
+      <p:sp>
+        <p:nvSpPr>
+          <p:cNvPr id="44" name="Rectangle 43"/>
+          <p:cNvSpPr/>
+          <p:nvPr/>
+        </p:nvSpPr>
+        <p:spPr>
+          <a:xfrm>
+            <a:off x="9899008" y="1703024"/>
+            <a:ext cx="1423115" cy="408788"/>
+          </a:xfrm>
+          <a:prstGeom prst="rect">
+            <a:avLst/>
+          </a:prstGeom>
+          <a:solidFill>
+            <a:schemeClr val="accent2"/>
+          </a:solidFill>
+          <a:ln>
+            <a:noFill/>
+            <a:headEnd type="none" w="med" len="med"/>
+            <a:tailEnd type="none" w="med" len="med"/>
+          </a:ln>
+          <a:effectLst/>
+        </p:spPr>
+        <p:style>
+          <a:lnRef idx="1">
+            <a:schemeClr val="accent2"/>
+          </a:lnRef>
+          <a:fillRef idx="3">
+            <a:schemeClr val="accent2"/>
+          </a:fillRef>
+          <a:effectRef idx="2">
+            <a:schemeClr val="accent2"/>
+          </a:effectRef>
+          <a:fontRef idx="minor">
+            <a:schemeClr val="lt1"/>
+          </a:fontRef>
+        </p:style>
+        <p:txBody>
+          <a:bodyPr vert="horz" wrap="square" lIns="91436" tIns="45718" rIns="91436" bIns="45718" numCol="1" rtlCol="0" anchor="ctr" anchorCtr="0" compatLnSpc="1">
+            <a:prstTxWarp prst="textNoShape">
+              <a:avLst/>
+            </a:prstTxWarp>
+          </a:bodyPr>
+          <a:lstStyle/>
+          <a:p>
+            <a:pPr algn="ctr" defTabSz="914099" fontAlgn="base">
+              <a:spcBef>
+                <a:spcPct val="0"/>
+              </a:spcBef>
+              <a:spcAft>
+                <a:spcPct val="0"/>
+              </a:spcAft>
+            </a:pPr>
+            <a:r>
+              <a:rPr lang="en-US" dirty="0" smtClean="0">
+                <a:gradFill>
+                  <a:gsLst>
+                    <a:gs pos="0">
+                      <a:srgbClr val="FFFFFF"/>
+                    </a:gs>
+                    <a:gs pos="100000">
+                      <a:srgbClr val="FFFFFF"/>
+                    </a:gs>
+                  </a:gsLst>
+                  <a:lin ang="5400000" scaled="0"/>
+                </a:gradFill>
+              </a:rPr>
+              <a:t>XML</a:t>
+            </a:r>
+            <a:endParaRPr lang="en-US" dirty="0">
+              <a:gradFill>
+                <a:gsLst>
+                  <a:gs pos="0">
+                    <a:srgbClr val="FFFFFF"/>
+                  </a:gs>
+                  <a:gs pos="100000">
+                    <a:srgbClr val="FFFFFF"/>
+                  </a:gs>
+                </a:gsLst>
+                <a:lin ang="5400000" scaled="0"/>
+              </a:gradFill>
+            </a:endParaRPr>
+          </a:p>
+        </p:txBody>
+      </p:sp>
+    </p:spTree>
+    <p:extLst>
+      <p:ext uri="{BB962C8B-B14F-4D97-AF65-F5344CB8AC3E}">
+        <p14:creationId xmlns:p14="http://schemas.microsoft.com/office/powerpoint/2010/main" val="1578264052"/>
+      </p:ext>
+    </p:extLst>
+  </p:cSld>
+  <p:clrMapOvr>
+    <a:masterClrMapping/>
+  </p:clrMapOvr>
+  <p:transition>
+    <p:fade/>
+  </p:transition>
+  <p:timing>
+    <p:tnLst>
+      <p:par>
+        <p:cTn id="1" dur="indefinite" restart="never" nodeType="tmRoot"/>
+      </p:par>
+    </p:tnLst>
+  </p:timing>
+</p:sld>
+</file>
+
+<file path=ppt/slides/slide11.xml><?xml version="1.0" encoding="utf-8"?>
 <p:sld xmlns:a="http://schemas.openxmlformats.org/drawingml/2006/main" xmlns:r="http://schemas.openxmlformats.org/officeDocument/2006/relationships" xmlns:p="http://schemas.openxmlformats.org/presentationml/2006/main">
   <p:cSld>
     <p:spTree>
@@ -25706,10 +27564,17 @@
   <p:transition>
     <p:fade/>
   </p:transition>
+  <p:timing>
+    <p:tnLst>
+      <p:par>
+        <p:cTn id="1" dur="indefinite" restart="never" nodeType="tmRoot"/>
+      </p:par>
+    </p:tnLst>
+  </p:timing>
 </p:sld>
 </file>
 
-<file path=ppt/slides/slide11.xml><?xml version="1.0" encoding="utf-8"?>
+<file path=ppt/slides/slide12.xml><?xml version="1.0" encoding="utf-8"?>
 <p:sld xmlns:a="http://schemas.openxmlformats.org/drawingml/2006/main" xmlns:r="http://schemas.openxmlformats.org/officeDocument/2006/relationships" xmlns:p="http://schemas.openxmlformats.org/presentationml/2006/main">
   <p:cSld>
     <p:spTree>
@@ -25751,7 +27616,7 @@
           <a:graphicData uri="http://schemas.openxmlformats.org/presentationml/2006/ole">
             <mc:AlternateContent xmlns:mc="http://schemas.openxmlformats.org/markup-compatibility/2006">
               <mc:Choice xmlns:v="urn:schemas-microsoft-com:vml" Requires="v">
-                <p:oleObj spid="_x0000_s64571" name="think-cell Slide" r:id="rId5" imgW="270" imgH="270" progId="TCLayout.ActiveDocument.1">
+                <p:oleObj spid="_x0000_s64573" name="think-cell Slide" r:id="rId5" imgW="270" imgH="270" progId="TCLayout.ActiveDocument.1">
                   <p:embed/>
                 </p:oleObj>
               </mc:Choice>
@@ -26435,7 +28300,7 @@
 </p:sld>
 </file>
 
-<file path=ppt/slides/slide12.xml><?xml version="1.0" encoding="utf-8"?>
+<file path=ppt/slides/slide13.xml><?xml version="1.0" encoding="utf-8"?>
 <p:sld xmlns:a="http://schemas.openxmlformats.org/drawingml/2006/main" xmlns:r="http://schemas.openxmlformats.org/officeDocument/2006/relationships" xmlns:p="http://schemas.openxmlformats.org/presentationml/2006/main">
   <p:cSld>
     <p:spTree>
@@ -26544,7 +28409,7 @@
 </p:sld>
 </file>
 
-<file path=ppt/slides/slide13.xml><?xml version="1.0" encoding="utf-8"?>
+<file path=ppt/slides/slide14.xml><?xml version="1.0" encoding="utf-8"?>
 <p:sld xmlns:a="http://schemas.openxmlformats.org/drawingml/2006/main" xmlns:r="http://schemas.openxmlformats.org/officeDocument/2006/relationships" xmlns:p="http://schemas.openxmlformats.org/presentationml/2006/main">
   <p:cSld>
     <p:spTree>
@@ -26613,7 +28478,7 @@
 </p:sld>
 </file>
 
-<file path=ppt/slides/slide14.xml><?xml version="1.0" encoding="utf-8"?>
+<file path=ppt/slides/slide15.xml><?xml version="1.0" encoding="utf-8"?>
 <p:sld xmlns:a="http://schemas.openxmlformats.org/drawingml/2006/main" xmlns:r="http://schemas.openxmlformats.org/officeDocument/2006/relationships" xmlns:p="http://schemas.openxmlformats.org/presentationml/2006/main">
   <p:cSld>
     <p:spTree>
@@ -26683,7 +28548,7 @@
 </p:sld>
 </file>
 
-<file path=ppt/slides/slide15.xml><?xml version="1.0" encoding="utf-8"?>
+<file path=ppt/slides/slide16.xml><?xml version="1.0" encoding="utf-8"?>
 <p:sld xmlns:a="http://schemas.openxmlformats.org/drawingml/2006/main" xmlns:r="http://schemas.openxmlformats.org/officeDocument/2006/relationships" xmlns:p="http://schemas.openxmlformats.org/presentationml/2006/main">
   <p:cSld>
     <p:spTree>
@@ -26753,7 +28618,7 @@
 </p:sld>
 </file>
 
-<file path=ppt/slides/slide16.xml><?xml version="1.0" encoding="utf-8"?>
+<file path=ppt/slides/slide17.xml><?xml version="1.0" encoding="utf-8"?>
 <p:sld xmlns:a="http://schemas.openxmlformats.org/drawingml/2006/main" xmlns:r="http://schemas.openxmlformats.org/officeDocument/2006/relationships" xmlns:p="http://schemas.openxmlformats.org/presentationml/2006/main">
   <p:cSld>
     <p:spTree>
@@ -26823,7 +28688,7 @@
 </p:sld>
 </file>
 
-<file path=ppt/slides/slide17.xml><?xml version="1.0" encoding="utf-8"?>
+<file path=ppt/slides/slide18.xml><?xml version="1.0" encoding="utf-8"?>
 <p:sld xmlns:a="http://schemas.openxmlformats.org/drawingml/2006/main" xmlns:r="http://schemas.openxmlformats.org/officeDocument/2006/relationships" xmlns:p="http://schemas.openxmlformats.org/presentationml/2006/main">
   <p:cSld>
     <p:spTree>
@@ -26893,7 +28758,7 @@
 </p:sld>
 </file>
 
-<file path=ppt/slides/slide18.xml><?xml version="1.0" encoding="utf-8"?>
+<file path=ppt/slides/slide19.xml><?xml version="1.0" encoding="utf-8"?>
 <p:sld xmlns:a="http://schemas.openxmlformats.org/drawingml/2006/main" xmlns:r="http://schemas.openxmlformats.org/officeDocument/2006/relationships" xmlns:p="http://schemas.openxmlformats.org/presentationml/2006/main">
   <p:cSld>
     <p:spTree>
@@ -26944,76 +28809,6 @@
     <p:extLst>
       <p:ext uri="{BB962C8B-B14F-4D97-AF65-F5344CB8AC3E}">
         <p14:creationId xmlns:p14="http://schemas.microsoft.com/office/powerpoint/2010/main" val="418067639"/>
-      </p:ext>
-    </p:extLst>
-  </p:cSld>
-  <p:clrMapOvr>
-    <a:masterClrMapping/>
-  </p:clrMapOvr>
-  <p:transition>
-    <p:fade/>
-  </p:transition>
-  <p:timing>
-    <p:tnLst>
-      <p:par>
-        <p:cTn id="1" dur="indefinite" restart="never" nodeType="tmRoot"/>
-      </p:par>
-    </p:tnLst>
-  </p:timing>
-</p:sld>
-</file>
-
-<file path=ppt/slides/slide19.xml><?xml version="1.0" encoding="utf-8"?>
-<p:sld xmlns:a="http://schemas.openxmlformats.org/drawingml/2006/main" xmlns:r="http://schemas.openxmlformats.org/officeDocument/2006/relationships" xmlns:p="http://schemas.openxmlformats.org/presentationml/2006/main">
-  <p:cSld>
-    <p:spTree>
-      <p:nvGrpSpPr>
-        <p:cNvPr id="1" name=""/>
-        <p:cNvGrpSpPr/>
-        <p:nvPr/>
-      </p:nvGrpSpPr>
-      <p:grpSpPr>
-        <a:xfrm>
-          <a:off x="0" y="0"/>
-          <a:ext cx="0" cy="0"/>
-          <a:chOff x="0" y="0"/>
-          <a:chExt cx="0" cy="0"/>
-        </a:xfrm>
-      </p:grpSpPr>
-      <p:pic>
-        <p:nvPicPr>
-          <p:cNvPr id="2" name="Picture 1" descr="Windows Azure - Windows Internet Explorer - [InPrivate]"/>
-          <p:cNvPicPr>
-            <a:picLocks noChangeAspect="1"/>
-          </p:cNvPicPr>
-          <p:nvPr/>
-        </p:nvPicPr>
-        <p:blipFill>
-          <a:blip r:embed="rId2">
-            <a:extLst>
-              <a:ext uri="{28A0092B-C50C-407E-A947-70E740481C1C}">
-                <a14:useLocalDpi xmlns:a14="http://schemas.microsoft.com/office/drawing/2010/main" val="0"/>
-              </a:ext>
-            </a:extLst>
-          </a:blip>
-          <a:stretch>
-            <a:fillRect/>
-          </a:stretch>
-        </p:blipFill>
-        <p:spPr>
-          <a:xfrm>
-            <a:off x="0" y="125345"/>
-            <a:ext cx="12188825" cy="6607309"/>
-          </a:xfrm>
-          <a:prstGeom prst="rect">
-            <a:avLst/>
-          </a:prstGeom>
-        </p:spPr>
-      </p:pic>
-    </p:spTree>
-    <p:extLst>
-      <p:ext uri="{BB962C8B-B14F-4D97-AF65-F5344CB8AC3E}">
-        <p14:creationId xmlns:p14="http://schemas.microsoft.com/office/powerpoint/2010/main" val="416633698"/>
       </p:ext>
     </p:extLst>
   </p:cSld>
@@ -27173,6 +28968,76 @@
     </p:spTree>
     <p:extLst>
       <p:ext uri="{BB962C8B-B14F-4D97-AF65-F5344CB8AC3E}">
+        <p14:creationId xmlns:p14="http://schemas.microsoft.com/office/powerpoint/2010/main" val="416633698"/>
+      </p:ext>
+    </p:extLst>
+  </p:cSld>
+  <p:clrMapOvr>
+    <a:masterClrMapping/>
+  </p:clrMapOvr>
+  <p:transition>
+    <p:fade/>
+  </p:transition>
+  <p:timing>
+    <p:tnLst>
+      <p:par>
+        <p:cTn id="1" dur="indefinite" restart="never" nodeType="tmRoot"/>
+      </p:par>
+    </p:tnLst>
+  </p:timing>
+</p:sld>
+</file>
+
+<file path=ppt/slides/slide21.xml><?xml version="1.0" encoding="utf-8"?>
+<p:sld xmlns:a="http://schemas.openxmlformats.org/drawingml/2006/main" xmlns:r="http://schemas.openxmlformats.org/officeDocument/2006/relationships" xmlns:p="http://schemas.openxmlformats.org/presentationml/2006/main">
+  <p:cSld>
+    <p:spTree>
+      <p:nvGrpSpPr>
+        <p:cNvPr id="1" name=""/>
+        <p:cNvGrpSpPr/>
+        <p:nvPr/>
+      </p:nvGrpSpPr>
+      <p:grpSpPr>
+        <a:xfrm>
+          <a:off x="0" y="0"/>
+          <a:ext cx="0" cy="0"/>
+          <a:chOff x="0" y="0"/>
+          <a:chExt cx="0" cy="0"/>
+        </a:xfrm>
+      </p:grpSpPr>
+      <p:pic>
+        <p:nvPicPr>
+          <p:cNvPr id="2" name="Picture 1" descr="Windows Azure - Windows Internet Explorer - [InPrivate]"/>
+          <p:cNvPicPr>
+            <a:picLocks noChangeAspect="1"/>
+          </p:cNvPicPr>
+          <p:nvPr/>
+        </p:nvPicPr>
+        <p:blipFill>
+          <a:blip r:embed="rId2">
+            <a:extLst>
+              <a:ext uri="{28A0092B-C50C-407E-A947-70E740481C1C}">
+                <a14:useLocalDpi xmlns:a14="http://schemas.microsoft.com/office/drawing/2010/main" val="0"/>
+              </a:ext>
+            </a:extLst>
+          </a:blip>
+          <a:stretch>
+            <a:fillRect/>
+          </a:stretch>
+        </p:blipFill>
+        <p:spPr>
+          <a:xfrm>
+            <a:off x="0" y="125345"/>
+            <a:ext cx="12188825" cy="6607309"/>
+          </a:xfrm>
+          <a:prstGeom prst="rect">
+            <a:avLst/>
+          </a:prstGeom>
+        </p:spPr>
+      </p:pic>
+    </p:spTree>
+    <p:extLst>
+      <p:ext uri="{BB962C8B-B14F-4D97-AF65-F5344CB8AC3E}">
         <p14:creationId xmlns:p14="http://schemas.microsoft.com/office/powerpoint/2010/main" val="3930209509"/>
       </p:ext>
     </p:extLst>
@@ -27193,7 +29058,7 @@
 </p:sld>
 </file>
 
-<file path=ppt/slides/slide21.xml><?xml version="1.0" encoding="utf-8"?>
+<file path=ppt/slides/slide22.xml><?xml version="1.0" encoding="utf-8"?>
 <p:sld xmlns:a="http://schemas.openxmlformats.org/drawingml/2006/main" xmlns:r="http://schemas.openxmlformats.org/officeDocument/2006/relationships" xmlns:p="http://schemas.openxmlformats.org/presentationml/2006/main">
   <p:cSld>
     <p:spTree>
@@ -27231,7 +29096,7 @@
           <a:graphicData uri="http://schemas.openxmlformats.org/presentationml/2006/ole">
             <mc:AlternateContent xmlns:mc="http://schemas.openxmlformats.org/markup-compatibility/2006">
               <mc:Choice xmlns:v="urn:schemas-microsoft-com:vml" Requires="v">
-                <p:oleObj spid="_x0000_s67614" name="think-cell Slide" r:id="rId5" imgW="270" imgH="270" progId="TCLayout.ActiveDocument.1">
+                <p:oleObj spid="_x0000_s67616" name="think-cell Slide" r:id="rId5" imgW="270" imgH="270" progId="TCLayout.ActiveDocument.1">
                   <p:embed/>
                 </p:oleObj>
               </mc:Choice>
@@ -28975,7 +30840,7 @@
 </p:sld>
 </file>
 
-<file path=ppt/slides/slide22.xml><?xml version="1.0" encoding="utf-8"?>
+<file path=ppt/slides/slide23.xml><?xml version="1.0" encoding="utf-8"?>
 <p:sld xmlns:a="http://schemas.openxmlformats.org/drawingml/2006/main" xmlns:r="http://schemas.openxmlformats.org/officeDocument/2006/relationships" xmlns:p="http://schemas.openxmlformats.org/presentationml/2006/main">
   <p:cSld>
     <p:spTree>
@@ -29017,7 +30882,7 @@
           <a:graphicData uri="http://schemas.openxmlformats.org/presentationml/2006/ole">
             <mc:AlternateContent xmlns:mc="http://schemas.openxmlformats.org/markup-compatibility/2006">
               <mc:Choice xmlns:v="urn:schemas-microsoft-com:vml" Requires="v">
-                <p:oleObj spid="_x0000_s65582" name="think-cell Slide" r:id="rId5" imgW="270" imgH="270" progId="TCLayout.ActiveDocument.1">
+                <p:oleObj spid="_x0000_s65584" name="think-cell Slide" r:id="rId5" imgW="270" imgH="270" progId="TCLayout.ActiveDocument.1">
                   <p:embed/>
                 </p:oleObj>
               </mc:Choice>
@@ -31027,7 +32892,7 @@
 </p:sld>
 </file>
 
-<file path=ppt/slides/slide23.xml><?xml version="1.0" encoding="utf-8"?>
+<file path=ppt/slides/slide24.xml><?xml version="1.0" encoding="utf-8"?>
 <p:sld xmlns:a="http://schemas.openxmlformats.org/drawingml/2006/main" xmlns:r="http://schemas.openxmlformats.org/officeDocument/2006/relationships" xmlns:p="http://schemas.openxmlformats.org/presentationml/2006/main">
   <p:cSld>
     <p:spTree>
@@ -31069,7 +32934,7 @@
           <a:graphicData uri="http://schemas.openxmlformats.org/presentationml/2006/ole">
             <mc:AlternateContent xmlns:mc="http://schemas.openxmlformats.org/markup-compatibility/2006">
               <mc:Choice xmlns:v="urn:schemas-microsoft-com:vml" Requires="v">
-                <p:oleObj spid="_x0000_s57444" name="think-cell Slide" r:id="rId6" imgW="270" imgH="270" progId="TCLayout.ActiveDocument.1">
+                <p:oleObj spid="_x0000_s57446" name="think-cell Slide" r:id="rId6" imgW="270" imgH="270" progId="TCLayout.ActiveDocument.1">
                   <p:embed/>
                 </p:oleObj>
               </mc:Choice>
@@ -31558,7 +33423,7 @@
 </p:sld>
 </file>
 
-<file path=ppt/slides/slide24.xml><?xml version="1.0" encoding="utf-8"?>
+<file path=ppt/slides/slide25.xml><?xml version="1.0" encoding="utf-8"?>
 <p:sld xmlns:a="http://schemas.openxmlformats.org/drawingml/2006/main" xmlns:r="http://schemas.openxmlformats.org/officeDocument/2006/relationships" xmlns:p="http://schemas.openxmlformats.org/presentationml/2006/main">
   <p:cSld>
     <p:spTree>
@@ -31600,7 +33465,7 @@
           <a:graphicData uri="http://schemas.openxmlformats.org/presentationml/2006/ole">
             <mc:AlternateContent xmlns:mc="http://schemas.openxmlformats.org/markup-compatibility/2006">
               <mc:Choice xmlns:v="urn:schemas-microsoft-com:vml" Requires="v">
-                <p:oleObj spid="_x0000_s58465" name="think-cell Slide" r:id="rId5" imgW="270" imgH="270" progId="TCLayout.ActiveDocument.1">
+                <p:oleObj spid="_x0000_s58467" name="think-cell Slide" r:id="rId5" imgW="270" imgH="270" progId="TCLayout.ActiveDocument.1">
                   <p:embed/>
                 </p:oleObj>
               </mc:Choice>
@@ -31709,7 +33574,7 @@
           <a:graphicData uri="http://schemas.openxmlformats.org/presentationml/2006/ole">
             <mc:AlternateContent xmlns:mc="http://schemas.openxmlformats.org/markup-compatibility/2006">
               <mc:Choice xmlns:v="urn:schemas-microsoft-com:vml" Requires="v">
-                <p:oleObj spid="_x0000_s59486" name="think-cell Slide" r:id="rId5" imgW="270" imgH="270" progId="TCLayout.ActiveDocument.1">
+                <p:oleObj spid="_x0000_s59488" name="think-cell Slide" r:id="rId5" imgW="270" imgH="270" progId="TCLayout.ActiveDocument.1">
                   <p:embed/>
                 </p:oleObj>
               </mc:Choice>
@@ -31883,7 +33748,7 @@
           <a:graphicData uri="http://schemas.openxmlformats.org/presentationml/2006/ole">
             <mc:AlternateContent xmlns:mc="http://schemas.openxmlformats.org/markup-compatibility/2006">
               <mc:Choice xmlns:v="urn:schemas-microsoft-com:vml" Requires="v">
-                <p:oleObj spid="_x0000_s23654" name="think-cell Slide" r:id="rId7" imgW="270" imgH="270" progId="TCLayout.ActiveDocument.1">
+                <p:oleObj spid="_x0000_s23656" name="think-cell Slide" r:id="rId7" imgW="270" imgH="270" progId="TCLayout.ActiveDocument.1">
                   <p:embed/>
                 </p:oleObj>
               </mc:Choice>
@@ -34714,7 +36579,7 @@
           <a:graphicData uri="http://schemas.openxmlformats.org/presentationml/2006/ole">
             <mc:AlternateContent xmlns:mc="http://schemas.openxmlformats.org/markup-compatibility/2006">
               <mc:Choice xmlns:v="urn:schemas-microsoft-com:vml" Requires="v">
-                <p:oleObj spid="_x0000_s60478" name="think-cell Slide" r:id="rId5" imgW="270" imgH="270" progId="TCLayout.ActiveDocument.1">
+                <p:oleObj spid="_x0000_s60480" name="think-cell Slide" r:id="rId5" imgW="270" imgH="270" progId="TCLayout.ActiveDocument.1">
                   <p:embed/>
                 </p:oleObj>
               </mc:Choice>
@@ -36622,7 +38487,7 @@
           <a:graphicData uri="http://schemas.openxmlformats.org/presentationml/2006/ole">
             <mc:AlternateContent xmlns:mc="http://schemas.openxmlformats.org/markup-compatibility/2006">
               <mc:Choice xmlns:v="urn:schemas-microsoft-com:vml" Requires="v">
-                <p:oleObj spid="_x0000_s61506" name="think-cell Slide" r:id="rId5" imgW="270" imgH="270" progId="TCLayout.ActiveDocument.1">
+                <p:oleObj spid="_x0000_s61508" name="think-cell Slide" r:id="rId5" imgW="270" imgH="270" progId="TCLayout.ActiveDocument.1">
                   <p:embed/>
                 </p:oleObj>
               </mc:Choice>
@@ -37483,7 +39348,7 @@
           <a:graphicData uri="http://schemas.openxmlformats.org/presentationml/2006/ole">
             <mc:AlternateContent xmlns:mc="http://schemas.openxmlformats.org/markup-compatibility/2006">
               <mc:Choice xmlns:v="urn:schemas-microsoft-com:vml" Requires="v">
-                <p:oleObj spid="_x0000_s66595" name="think-cell Slide" r:id="rId5" imgW="270" imgH="270" progId="TCLayout.ActiveDocument.1">
+                <p:oleObj spid="_x0000_s66597" name="think-cell Slide" r:id="rId5" imgW="270" imgH="270" progId="TCLayout.ActiveDocument.1">
                   <p:embed/>
                 </p:oleObj>
               </mc:Choice>
@@ -38464,59 +40329,106 @@
       </p:grpSpPr>
       <p:sp>
         <p:nvSpPr>
-          <p:cNvPr id="19" name="Rectangle 18"/>
+          <p:cNvPr id="2" name="Title 1"/>
+          <p:cNvSpPr>
+            <a:spLocks noGrp="1"/>
+          </p:cNvSpPr>
+          <p:nvPr>
+            <p:ph type="title"/>
+          </p:nvPr>
+        </p:nvSpPr>
+        <p:spPr/>
+        <p:txBody>
+          <a:bodyPr/>
+          <a:lstStyle/>
+          <a:p>
+            <a:r>
+              <a:rPr lang="en-US" dirty="0" smtClean="0"/>
+              <a:t>One ASP.NET: A Framework for us all</a:t>
+            </a:r>
+            <a:endParaRPr lang="en-US" dirty="0"/>
+          </a:p>
+        </p:txBody>
+      </p:sp>
+      <p:sp>
+        <p:nvSpPr>
+          <p:cNvPr id="34" name="Rectangle 33"/>
           <p:cNvSpPr/>
           <p:nvPr/>
         </p:nvSpPr>
-        <p:spPr bwMode="auto">
+        <p:spPr bwMode="gray">
           <a:xfrm>
-            <a:off x="519112" y="6363586"/>
-            <a:ext cx="1766888" cy="207336"/>
+            <a:off x="2105433" y="4519097"/>
+            <a:ext cx="8155865" cy="1466765"/>
           </a:xfrm>
           <a:prstGeom prst="rect">
             <a:avLst/>
           </a:prstGeom>
           <a:solidFill>
-            <a:schemeClr val="bg1"/>
+            <a:srgbClr val="68217A"/>
           </a:solidFill>
-          <a:ln>
+          <a:ln w="9525" cap="flat" cmpd="sng" algn="ctr">
             <a:noFill/>
+            <a:prstDash val="solid"/>
             <a:headEnd type="none" w="med" len="med"/>
             <a:tailEnd type="none" w="med" len="med"/>
           </a:ln>
           <a:effectLst/>
         </p:spPr>
-        <p:style>
-          <a:lnRef idx="1">
-            <a:schemeClr val="accent2"/>
-          </a:lnRef>
-          <a:fillRef idx="3">
-            <a:schemeClr val="accent2"/>
-          </a:fillRef>
-          <a:effectRef idx="2">
-            <a:schemeClr val="accent2"/>
-          </a:effectRef>
-          <a:fontRef idx="minor">
-            <a:schemeClr val="lt1"/>
-          </a:fontRef>
-        </p:style>
         <p:txBody>
-          <a:bodyPr vert="horz" wrap="square" lIns="91436" tIns="45718" rIns="91436" bIns="45718" numCol="1" rtlCol="0" anchor="ctr" anchorCtr="0" compatLnSpc="1">
+          <a:bodyPr rot="0" spcFirstLastPara="0" vertOverflow="overflow" horzOverflow="overflow" vert="horz" wrap="square" lIns="45719" tIns="45719" rIns="45719" bIns="45719" numCol="1" spcCol="0" rtlCol="0" fromWordArt="0" anchor="ctr" anchorCtr="0" forceAA="0" compatLnSpc="1">
             <a:prstTxWarp prst="textNoShape">
               <a:avLst/>
             </a:prstTxWarp>
+            <a:noAutofit/>
           </a:bodyPr>
           <a:lstStyle/>
           <a:p>
-            <a:pPr algn="ctr" defTabSz="914099" fontAlgn="base">
+            <a:pPr marL="0" marR="0" lvl="0" indent="0" algn="ctr" defTabSz="914061" eaLnBrk="1" fontAlgn="base" latinLnBrk="0" hangingPunct="1">
+              <a:lnSpc>
+                <a:spcPct val="100000"/>
+              </a:lnSpc>
               <a:spcBef>
                 <a:spcPct val="0"/>
               </a:spcBef>
               <a:spcAft>
                 <a:spcPct val="0"/>
               </a:spcAft>
+              <a:buClrTx/>
+              <a:buSzTx/>
+              <a:buFontTx/>
+              <a:buNone/>
+              <a:tabLst/>
+              <a:defRPr/>
             </a:pPr>
-            <a:endParaRPr lang="en-US" sz="2200" dirty="0" smtClean="0">
+            <a:r>
+              <a:rPr kumimoji="0" lang="en-US" sz="5400" b="1" i="0" u="none" strike="noStrike" kern="0" cap="none" spc="-51" normalizeH="0" baseline="0" noProof="0" dirty="0" smtClean="0">
+                <a:ln>
+                  <a:noFill/>
+                </a:ln>
+                <a:gradFill>
+                  <a:gsLst>
+                    <a:gs pos="0">
+                      <a:srgbClr val="FFFFFF"/>
+                    </a:gs>
+                    <a:gs pos="100000">
+                      <a:srgbClr val="FFFFFF"/>
+                    </a:gs>
+                  </a:gsLst>
+                  <a:lin ang="5400000" scaled="0"/>
+                </a:gradFill>
+                <a:uLnTx/>
+                <a:uFillTx/>
+                <a:latin typeface="Segoe UI Light" panose="020B0502040204020203" pitchFamily="34" charset="0"/>
+                <a:ea typeface="Segoe UI" pitchFamily="34" charset="0"/>
+                <a:cs typeface="Segoe UI" pitchFamily="34" charset="0"/>
+              </a:rPr>
+              <a:t>ASP.NET</a:t>
+            </a:r>
+            <a:endParaRPr kumimoji="0" lang="en-US" sz="5400" b="0" i="0" u="none" strike="noStrike" kern="0" cap="none" spc="-51" normalizeH="0" baseline="0" noProof="0" dirty="0" smtClean="0">
+              <a:ln>
+                <a:noFill/>
+              </a:ln>
               <a:gradFill>
                 <a:gsLst>
                   <a:gs pos="0">
@@ -38528,114 +40440,132 @@
                 </a:gsLst>
                 <a:lin ang="5400000" scaled="0"/>
               </a:gradFill>
+              <a:uLnTx/>
+              <a:uFillTx/>
+              <a:latin typeface="Segoe UI Light" panose="020B0502040204020203" pitchFamily="34" charset="0"/>
+              <a:ea typeface="Segoe UI" pitchFamily="34" charset="0"/>
+              <a:cs typeface="Segoe UI" pitchFamily="34" charset="0"/>
             </a:endParaRPr>
           </a:p>
         </p:txBody>
       </p:sp>
       <p:sp>
         <p:nvSpPr>
-          <p:cNvPr id="3" name="Title 2"/>
-          <p:cNvSpPr>
-            <a:spLocks noGrp="1"/>
-          </p:cNvSpPr>
-          <p:nvPr>
-            <p:ph type="title"/>
-          </p:nvPr>
-        </p:nvSpPr>
-        <p:spPr/>
-        <p:txBody>
-          <a:bodyPr>
-            <a:noAutofit/>
-          </a:bodyPr>
-          <a:lstStyle/>
-          <a:p>
-            <a:r>
-              <a:rPr lang="en-US" dirty="0" smtClean="0"/>
-              <a:t>ASP.NET: A </a:t>
-            </a:r>
-            <a:r>
-              <a:rPr lang="en-US" dirty="0"/>
-              <a:t>F</a:t>
-            </a:r>
-            <a:r>
-              <a:rPr lang="en-US" dirty="0" smtClean="0"/>
-              <a:t>ramework </a:t>
-            </a:r>
-            <a:r>
-              <a:rPr lang="en-US" dirty="0"/>
-              <a:t>F</a:t>
-            </a:r>
-            <a:r>
-              <a:rPr lang="en-US" dirty="0" smtClean="0"/>
-              <a:t>or </a:t>
-            </a:r>
-            <a:r>
-              <a:rPr lang="en-US" dirty="0"/>
-              <a:t>A</a:t>
-            </a:r>
-            <a:r>
-              <a:rPr lang="en-US" dirty="0" smtClean="0"/>
-              <a:t>ll</a:t>
-            </a:r>
-            <a:endParaRPr lang="en-US" dirty="0"/>
-          </a:p>
-        </p:txBody>
-      </p:sp>
-      <p:sp>
-        <p:nvSpPr>
-          <p:cNvPr id="4" name="Rectangle 3"/>
+          <p:cNvPr id="36" name="Rectangle 35"/>
           <p:cNvSpPr/>
           <p:nvPr/>
         </p:nvSpPr>
-        <p:spPr bwMode="auto">
+        <p:spPr bwMode="gray">
           <a:xfrm>
-            <a:off x="879902" y="4527299"/>
-            <a:ext cx="8935748" cy="2004005"/>
+            <a:off x="2105432" y="2965619"/>
+            <a:ext cx="1271249" cy="1445937"/>
           </a:xfrm>
           <a:prstGeom prst="rect">
             <a:avLst/>
           </a:prstGeom>
           <a:solidFill>
-            <a:schemeClr val="accent2"/>
+            <a:srgbClr val="009E49"/>
           </a:solidFill>
-          <a:ln>
+          <a:ln w="9525" cap="flat" cmpd="sng" algn="ctr">
             <a:noFill/>
+            <a:prstDash val="solid"/>
             <a:headEnd type="none" w="med" len="med"/>
             <a:tailEnd type="none" w="med" len="med"/>
           </a:ln>
           <a:effectLst/>
         </p:spPr>
-        <p:style>
-          <a:lnRef idx="1">
-            <a:schemeClr val="accent2"/>
-          </a:lnRef>
-          <a:fillRef idx="3">
-            <a:schemeClr val="accent2"/>
-          </a:fillRef>
-          <a:effectRef idx="2">
-            <a:schemeClr val="accent2"/>
-          </a:effectRef>
-          <a:fontRef idx="minor">
-            <a:schemeClr val="lt1"/>
-          </a:fontRef>
-        </p:style>
         <p:txBody>
-          <a:bodyPr vert="horz" wrap="square" lIns="91436" tIns="45718" rIns="91436" bIns="45718" numCol="1" rtlCol="0" anchor="ctr" anchorCtr="0" compatLnSpc="1">
+          <a:bodyPr rot="0" spcFirstLastPara="0" vertOverflow="overflow" horzOverflow="overflow" vert="horz" wrap="square" lIns="45719" tIns="45719" rIns="45719" bIns="45719" numCol="1" spcCol="0" rtlCol="0" fromWordArt="0" anchor="ctr" anchorCtr="0" forceAA="0" compatLnSpc="1">
             <a:prstTxWarp prst="textNoShape">
               <a:avLst/>
             </a:prstTxWarp>
+            <a:noAutofit/>
           </a:bodyPr>
           <a:lstStyle/>
           <a:p>
-            <a:pPr algn="ctr" defTabSz="914099" fontAlgn="base">
+            <a:pPr marL="0" marR="0" lvl="0" indent="0" algn="ctr" defTabSz="914061" eaLnBrk="1" fontAlgn="base" latinLnBrk="0" hangingPunct="1">
+              <a:lnSpc>
+                <a:spcPct val="100000"/>
+              </a:lnSpc>
               <a:spcBef>
                 <a:spcPct val="0"/>
               </a:spcBef>
               <a:spcAft>
                 <a:spcPct val="0"/>
               </a:spcAft>
+              <a:buClrTx/>
+              <a:buSzTx/>
+              <a:buFontTx/>
+              <a:buNone/>
+              <a:tabLst/>
+              <a:defRPr/>
             </a:pPr>
-            <a:endParaRPr lang="en-US" dirty="0">
+            <a:r>
+              <a:rPr kumimoji="0" lang="en-US" sz="2800" b="1" i="0" u="none" strike="noStrike" kern="0" cap="none" spc="-51" normalizeH="0" baseline="0" noProof="0" dirty="0" smtClean="0">
+                <a:ln>
+                  <a:noFill/>
+                </a:ln>
+                <a:gradFill>
+                  <a:gsLst>
+                    <a:gs pos="0">
+                      <a:srgbClr val="FFFFFF"/>
+                    </a:gs>
+                    <a:gs pos="100000">
+                      <a:srgbClr val="FFFFFF"/>
+                    </a:gs>
+                  </a:gsLst>
+                  <a:lin ang="5400000" scaled="0"/>
+                </a:gradFill>
+                <a:uLnTx/>
+                <a:uFillTx/>
+                <a:latin typeface="Segoe UI Light" panose="020B0502040204020203" pitchFamily="34" charset="0"/>
+                <a:ea typeface="Segoe UI" pitchFamily="34" charset="0"/>
+                <a:cs typeface="Segoe UI" pitchFamily="34" charset="0"/>
+              </a:rPr>
+              <a:t>Web</a:t>
+            </a:r>
+          </a:p>
+          <a:p>
+            <a:pPr marL="0" marR="0" lvl="0" indent="0" algn="ctr" defTabSz="914061" eaLnBrk="1" fontAlgn="base" latinLnBrk="0" hangingPunct="1">
+              <a:lnSpc>
+                <a:spcPct val="100000"/>
+              </a:lnSpc>
+              <a:spcBef>
+                <a:spcPct val="0"/>
+              </a:spcBef>
+              <a:spcAft>
+                <a:spcPct val="0"/>
+              </a:spcAft>
+              <a:buClrTx/>
+              <a:buSzTx/>
+              <a:buFontTx/>
+              <a:buNone/>
+              <a:tabLst/>
+              <a:defRPr/>
+            </a:pPr>
+            <a:r>
+              <a:rPr lang="en-US" sz="2800" b="1" kern="0" spc="-51" dirty="0" smtClean="0">
+                <a:gradFill>
+                  <a:gsLst>
+                    <a:gs pos="0">
+                      <a:srgbClr val="FFFFFF"/>
+                    </a:gs>
+                    <a:gs pos="100000">
+                      <a:srgbClr val="FFFFFF"/>
+                    </a:gs>
+                  </a:gsLst>
+                  <a:lin ang="5400000" scaled="0"/>
+                </a:gradFill>
+                <a:latin typeface="Segoe UI Light" panose="020B0502040204020203" pitchFamily="34" charset="0"/>
+                <a:ea typeface="Segoe UI" pitchFamily="34" charset="0"/>
+                <a:cs typeface="Segoe UI" pitchFamily="34" charset="0"/>
+              </a:rPr>
+              <a:t>Forms</a:t>
+            </a:r>
+            <a:endParaRPr kumimoji="0" lang="en-US" sz="2800" b="0" i="0" u="none" strike="noStrike" kern="0" cap="none" spc="-51" normalizeH="0" baseline="0" noProof="0" dirty="0" smtClean="0">
+              <a:ln>
+                <a:noFill/>
+              </a:ln>
               <a:gradFill>
                 <a:gsLst>
                   <a:gs pos="0">
@@ -38647,66 +40577,71 @@
                 </a:gsLst>
                 <a:lin ang="5400000" scaled="0"/>
               </a:gradFill>
+              <a:uLnTx/>
+              <a:uFillTx/>
+              <a:latin typeface="Segoe UI Light" panose="020B0502040204020203" pitchFamily="34" charset="0"/>
+              <a:ea typeface="Segoe UI" pitchFamily="34" charset="0"/>
+              <a:cs typeface="Segoe UI" pitchFamily="34" charset="0"/>
             </a:endParaRPr>
           </a:p>
         </p:txBody>
       </p:sp>
       <p:sp>
         <p:nvSpPr>
-          <p:cNvPr id="5" name="Rectangle 4"/>
+          <p:cNvPr id="37" name="Rectangle 36"/>
           <p:cNvSpPr/>
           <p:nvPr/>
         </p:nvSpPr>
-        <p:spPr bwMode="auto">
+        <p:spPr bwMode="gray">
           <a:xfrm>
-            <a:off x="3898929" y="5763308"/>
-            <a:ext cx="2850125" cy="487680"/>
+            <a:off x="2105432" y="1329716"/>
+            <a:ext cx="5402018" cy="1528363"/>
           </a:xfrm>
           <a:prstGeom prst="rect">
             <a:avLst/>
           </a:prstGeom>
           <a:solidFill>
-            <a:schemeClr val="accent4"/>
+            <a:srgbClr val="0070C0"/>
           </a:solidFill>
-          <a:ln>
+          <a:ln w="9525" cap="flat" cmpd="sng" algn="ctr">
             <a:noFill/>
+            <a:prstDash val="solid"/>
             <a:headEnd type="none" w="med" len="med"/>
             <a:tailEnd type="none" w="med" len="med"/>
           </a:ln>
           <a:effectLst/>
         </p:spPr>
-        <p:style>
-          <a:lnRef idx="1">
-            <a:schemeClr val="accent2"/>
-          </a:lnRef>
-          <a:fillRef idx="3">
-            <a:schemeClr val="accent2"/>
-          </a:fillRef>
-          <a:effectRef idx="2">
-            <a:schemeClr val="accent2"/>
-          </a:effectRef>
-          <a:fontRef idx="minor">
-            <a:schemeClr val="lt1"/>
-          </a:fontRef>
-        </p:style>
         <p:txBody>
-          <a:bodyPr vert="horz" wrap="square" lIns="91436" tIns="45718" rIns="91436" bIns="45718" numCol="1" rtlCol="0" anchor="ctr" anchorCtr="0" compatLnSpc="1">
+          <a:bodyPr rot="0" spcFirstLastPara="0" vertOverflow="overflow" horzOverflow="overflow" vert="horz" wrap="square" lIns="45719" tIns="45719" rIns="45719" bIns="45719" numCol="1" spcCol="0" rtlCol="0" fromWordArt="0" anchor="ctr" anchorCtr="0" forceAA="0" compatLnSpc="1">
             <a:prstTxWarp prst="textNoShape">
               <a:avLst/>
             </a:prstTxWarp>
+            <a:noAutofit/>
           </a:bodyPr>
           <a:lstStyle/>
           <a:p>
-            <a:pPr algn="ctr" defTabSz="914099" fontAlgn="base">
+            <a:pPr marL="0" marR="0" lvl="0" indent="0" algn="ctr" defTabSz="914061" eaLnBrk="1" fontAlgn="base" latinLnBrk="0" hangingPunct="1">
+              <a:lnSpc>
+                <a:spcPct val="100000"/>
+              </a:lnSpc>
               <a:spcBef>
                 <a:spcPct val="0"/>
               </a:spcBef>
               <a:spcAft>
                 <a:spcPct val="0"/>
               </a:spcAft>
+              <a:buClrTx/>
+              <a:buSzTx/>
+              <a:buFontTx/>
+              <a:buNone/>
+              <a:tabLst/>
+              <a:defRPr/>
             </a:pPr>
             <a:r>
-              <a:rPr lang="en-US" sz="2000" dirty="0">
+              <a:rPr kumimoji="0" lang="en-US" sz="5400" b="1" i="0" u="none" strike="noStrike" kern="0" cap="none" spc="-51" normalizeH="0" baseline="0" noProof="0" dirty="0" smtClean="0">
+                <a:ln>
+                  <a:noFill/>
+                </a:ln>
                 <a:gradFill>
                   <a:gsLst>
                     <a:gs pos="0">
@@ -38718,68 +40653,94 @@
                   </a:gsLst>
                   <a:lin ang="5400000" scaled="0"/>
                 </a:gradFill>
+                <a:uLnTx/>
+                <a:uFillTx/>
+                <a:latin typeface="Segoe UI Light" panose="020B0502040204020203" pitchFamily="34" charset="0"/>
+                <a:ea typeface="Segoe UI" pitchFamily="34" charset="0"/>
+                <a:cs typeface="Segoe UI" pitchFamily="34" charset="0"/>
               </a:rPr>
-              <a:t>Caching</a:t>
+              <a:t>Sites</a:t>
             </a:r>
+            <a:endParaRPr kumimoji="0" lang="en-US" sz="5400" b="0" i="0" u="none" strike="noStrike" kern="0" cap="none" spc="-51" normalizeH="0" baseline="0" noProof="0" dirty="0" smtClean="0">
+              <a:ln>
+                <a:noFill/>
+              </a:ln>
+              <a:gradFill>
+                <a:gsLst>
+                  <a:gs pos="0">
+                    <a:srgbClr val="FFFFFF"/>
+                  </a:gs>
+                  <a:gs pos="100000">
+                    <a:srgbClr val="FFFFFF"/>
+                  </a:gs>
+                </a:gsLst>
+                <a:lin ang="5400000" scaled="0"/>
+              </a:gradFill>
+              <a:uLnTx/>
+              <a:uFillTx/>
+              <a:latin typeface="Segoe UI Light" panose="020B0502040204020203" pitchFamily="34" charset="0"/>
+              <a:ea typeface="Segoe UI" pitchFamily="34" charset="0"/>
+              <a:cs typeface="Segoe UI" pitchFamily="34" charset="0"/>
+            </a:endParaRPr>
           </a:p>
         </p:txBody>
       </p:sp>
       <p:sp>
         <p:nvSpPr>
-          <p:cNvPr id="6" name="Rectangle 5"/>
+          <p:cNvPr id="38" name="Rectangle 37"/>
           <p:cNvSpPr/>
           <p:nvPr/>
         </p:nvSpPr>
-        <p:spPr bwMode="auto">
+        <p:spPr bwMode="gray">
           <a:xfrm>
-            <a:off x="948136" y="5232075"/>
-            <a:ext cx="2850125" cy="487680"/>
+            <a:off x="3482355" y="2965619"/>
+            <a:ext cx="1271249" cy="1445937"/>
           </a:xfrm>
           <a:prstGeom prst="rect">
             <a:avLst/>
           </a:prstGeom>
           <a:solidFill>
-            <a:schemeClr val="accent4"/>
+            <a:srgbClr val="009E49"/>
           </a:solidFill>
-          <a:ln>
+          <a:ln w="9525" cap="flat" cmpd="sng" algn="ctr">
             <a:noFill/>
+            <a:prstDash val="solid"/>
             <a:headEnd type="none" w="med" len="med"/>
             <a:tailEnd type="none" w="med" len="med"/>
           </a:ln>
           <a:effectLst/>
         </p:spPr>
-        <p:style>
-          <a:lnRef idx="1">
-            <a:schemeClr val="accent2"/>
-          </a:lnRef>
-          <a:fillRef idx="3">
-            <a:schemeClr val="accent2"/>
-          </a:fillRef>
-          <a:effectRef idx="2">
-            <a:schemeClr val="accent2"/>
-          </a:effectRef>
-          <a:fontRef idx="minor">
-            <a:schemeClr val="lt1"/>
-          </a:fontRef>
-        </p:style>
         <p:txBody>
-          <a:bodyPr vert="horz" wrap="square" lIns="91436" tIns="45718" rIns="91436" bIns="45718" numCol="1" rtlCol="0" anchor="ctr" anchorCtr="0" compatLnSpc="1">
+          <a:bodyPr rot="0" spcFirstLastPara="0" vertOverflow="overflow" horzOverflow="overflow" vert="horz" wrap="square" lIns="45719" tIns="45719" rIns="45719" bIns="45719" numCol="1" spcCol="0" rtlCol="0" fromWordArt="0" anchor="ctr" anchorCtr="0" forceAA="0" compatLnSpc="1">
             <a:prstTxWarp prst="textNoShape">
               <a:avLst/>
             </a:prstTxWarp>
+            <a:noAutofit/>
           </a:bodyPr>
           <a:lstStyle/>
           <a:p>
-            <a:pPr algn="ctr" defTabSz="914099" fontAlgn="base">
+            <a:pPr marL="0" marR="0" lvl="0" indent="0" algn="ctr" defTabSz="914061" eaLnBrk="1" fontAlgn="base" latinLnBrk="0" hangingPunct="1">
+              <a:lnSpc>
+                <a:spcPct val="100000"/>
+              </a:lnSpc>
               <a:spcBef>
                 <a:spcPct val="0"/>
               </a:spcBef>
               <a:spcAft>
                 <a:spcPct val="0"/>
               </a:spcAft>
+              <a:buClrTx/>
+              <a:buSzTx/>
+              <a:buFontTx/>
+              <a:buNone/>
+              <a:tabLst/>
+              <a:defRPr/>
             </a:pPr>
             <a:r>
-              <a:rPr lang="en-US" sz="2000" dirty="0">
+              <a:rPr kumimoji="0" lang="en-US" sz="2800" b="1" i="0" u="none" strike="noStrike" kern="0" cap="none" spc="-51" normalizeH="0" baseline="0" noProof="0" dirty="0" smtClean="0">
+                <a:ln>
+                  <a:noFill/>
+                </a:ln>
                 <a:gradFill>
                   <a:gsLst>
                     <a:gs pos="0">
@@ -38791,68 +40752,35 @@
                   </a:gsLst>
                   <a:lin ang="5400000" scaled="0"/>
                 </a:gradFill>
+                <a:uLnTx/>
+                <a:uFillTx/>
+                <a:latin typeface="Segoe UI Light" panose="020B0502040204020203" pitchFamily="34" charset="0"/>
+                <a:ea typeface="Segoe UI" pitchFamily="34" charset="0"/>
+                <a:cs typeface="Segoe UI" pitchFamily="34" charset="0"/>
               </a:rPr>
-              <a:t>Modules</a:t>
+              <a:t>Web</a:t>
             </a:r>
           </a:p>
-        </p:txBody>
-      </p:sp>
-      <p:sp>
-        <p:nvSpPr>
-          <p:cNvPr id="7" name="Rectangle 6"/>
-          <p:cNvSpPr/>
-          <p:nvPr/>
-        </p:nvSpPr>
-        <p:spPr bwMode="auto">
-          <a:xfrm>
-            <a:off x="3911208" y="5232075"/>
-            <a:ext cx="2850125" cy="487680"/>
-          </a:xfrm>
-          <a:prstGeom prst="rect">
-            <a:avLst/>
-          </a:prstGeom>
-          <a:solidFill>
-            <a:schemeClr val="accent4"/>
-          </a:solidFill>
-          <a:ln>
-            <a:noFill/>
-            <a:headEnd type="none" w="med" len="med"/>
-            <a:tailEnd type="none" w="med" len="med"/>
-          </a:ln>
-          <a:effectLst/>
-        </p:spPr>
-        <p:style>
-          <a:lnRef idx="1">
-            <a:schemeClr val="accent2"/>
-          </a:lnRef>
-          <a:fillRef idx="3">
-            <a:schemeClr val="accent2"/>
-          </a:fillRef>
-          <a:effectRef idx="2">
-            <a:schemeClr val="accent2"/>
-          </a:effectRef>
-          <a:fontRef idx="minor">
-            <a:schemeClr val="lt1"/>
-          </a:fontRef>
-        </p:style>
-        <p:txBody>
-          <a:bodyPr vert="horz" wrap="square" lIns="91436" tIns="45718" rIns="91436" bIns="45718" numCol="1" rtlCol="0" anchor="ctr" anchorCtr="0" compatLnSpc="1">
-            <a:prstTxWarp prst="textNoShape">
-              <a:avLst/>
-            </a:prstTxWarp>
-          </a:bodyPr>
-          <a:lstStyle/>
           <a:p>
-            <a:pPr algn="ctr" defTabSz="914099" fontAlgn="base">
+            <a:pPr marL="0" marR="0" lvl="0" indent="0" algn="ctr" defTabSz="914061" eaLnBrk="1" fontAlgn="base" latinLnBrk="0" hangingPunct="1">
+              <a:lnSpc>
+                <a:spcPct val="100000"/>
+              </a:lnSpc>
               <a:spcBef>
                 <a:spcPct val="0"/>
               </a:spcBef>
               <a:spcAft>
                 <a:spcPct val="0"/>
               </a:spcAft>
+              <a:buClrTx/>
+              <a:buSzTx/>
+              <a:buFontTx/>
+              <a:buNone/>
+              <a:tabLst/>
+              <a:defRPr/>
             </a:pPr>
             <a:r>
-              <a:rPr lang="en-US" sz="2000" dirty="0">
+              <a:rPr lang="en-US" sz="2800" b="1" kern="0" spc="-51" dirty="0" smtClean="0">
                 <a:gradFill>
                   <a:gsLst>
                     <a:gs pos="0">
@@ -38864,68 +40792,92 @@
                   </a:gsLst>
                   <a:lin ang="5400000" scaled="0"/>
                 </a:gradFill>
+                <a:latin typeface="Segoe UI Light" panose="020B0502040204020203" pitchFamily="34" charset="0"/>
+                <a:ea typeface="Segoe UI" pitchFamily="34" charset="0"/>
+                <a:cs typeface="Segoe UI" pitchFamily="34" charset="0"/>
               </a:rPr>
-              <a:t>Handlers</a:t>
+              <a:t>Pages</a:t>
             </a:r>
+            <a:endParaRPr kumimoji="0" lang="en-US" sz="2800" b="0" i="0" u="none" strike="noStrike" kern="0" cap="none" spc="-51" normalizeH="0" baseline="0" noProof="0" dirty="0" smtClean="0">
+              <a:ln>
+                <a:noFill/>
+              </a:ln>
+              <a:gradFill>
+                <a:gsLst>
+                  <a:gs pos="0">
+                    <a:srgbClr val="FFFFFF"/>
+                  </a:gs>
+                  <a:gs pos="100000">
+                    <a:srgbClr val="FFFFFF"/>
+                  </a:gs>
+                </a:gsLst>
+                <a:lin ang="5400000" scaled="0"/>
+              </a:gradFill>
+              <a:uLnTx/>
+              <a:uFillTx/>
+              <a:latin typeface="Segoe UI Light" panose="020B0502040204020203" pitchFamily="34" charset="0"/>
+              <a:ea typeface="Segoe UI" pitchFamily="34" charset="0"/>
+              <a:cs typeface="Segoe UI" pitchFamily="34" charset="0"/>
+            </a:endParaRPr>
           </a:p>
         </p:txBody>
       </p:sp>
       <p:sp>
         <p:nvSpPr>
-          <p:cNvPr id="8" name="Rectangle 7"/>
+          <p:cNvPr id="39" name="Rectangle 38"/>
           <p:cNvSpPr/>
           <p:nvPr/>
         </p:nvSpPr>
-        <p:spPr bwMode="auto">
+        <p:spPr bwMode="gray">
           <a:xfrm>
-            <a:off x="948136" y="5780715"/>
-            <a:ext cx="2850125" cy="487680"/>
+            <a:off x="4859277" y="2965620"/>
+            <a:ext cx="4025095" cy="608978"/>
           </a:xfrm>
           <a:prstGeom prst="rect">
             <a:avLst/>
           </a:prstGeom>
           <a:solidFill>
-            <a:schemeClr val="accent4"/>
+            <a:srgbClr val="009E49"/>
           </a:solidFill>
-          <a:ln>
+          <a:ln w="9525" cap="flat" cmpd="sng" algn="ctr">
             <a:noFill/>
+            <a:prstDash val="solid"/>
             <a:headEnd type="none" w="med" len="med"/>
             <a:tailEnd type="none" w="med" len="med"/>
           </a:ln>
           <a:effectLst/>
         </p:spPr>
-        <p:style>
-          <a:lnRef idx="1">
-            <a:schemeClr val="accent2"/>
-          </a:lnRef>
-          <a:fillRef idx="3">
-            <a:schemeClr val="accent2"/>
-          </a:fillRef>
-          <a:effectRef idx="2">
-            <a:schemeClr val="accent2"/>
-          </a:effectRef>
-          <a:fontRef idx="minor">
-            <a:schemeClr val="lt1"/>
-          </a:fontRef>
-        </p:style>
         <p:txBody>
-          <a:bodyPr vert="horz" wrap="square" lIns="91436" tIns="45718" rIns="91436" bIns="45718" numCol="1" rtlCol="0" anchor="ctr" anchorCtr="0" compatLnSpc="1">
+          <a:bodyPr rot="0" spcFirstLastPara="0" vertOverflow="overflow" horzOverflow="overflow" vert="horz" wrap="square" lIns="45719" tIns="45719" rIns="45719" bIns="45719" numCol="1" spcCol="0" rtlCol="0" fromWordArt="0" anchor="ctr" anchorCtr="0" forceAA="0" compatLnSpc="1">
             <a:prstTxWarp prst="textNoShape">
               <a:avLst/>
             </a:prstTxWarp>
+            <a:noAutofit/>
           </a:bodyPr>
           <a:lstStyle/>
           <a:p>
-            <a:pPr algn="ctr" defTabSz="914099" fontAlgn="base">
+            <a:pPr marL="0" marR="0" lvl="0" indent="0" algn="ctr" defTabSz="914061" eaLnBrk="1" fontAlgn="base" latinLnBrk="0" hangingPunct="1">
+              <a:lnSpc>
+                <a:spcPct val="100000"/>
+              </a:lnSpc>
               <a:spcBef>
                 <a:spcPct val="0"/>
               </a:spcBef>
               <a:spcAft>
                 <a:spcPct val="0"/>
               </a:spcAft>
+              <a:buClrTx/>
+              <a:buSzTx/>
+              <a:buFontTx/>
+              <a:buNone/>
+              <a:tabLst/>
+              <a:defRPr/>
             </a:pPr>
             <a:r>
-              <a:rPr lang="en-US" sz="2000" dirty="0">
+              <a:rPr kumimoji="0" lang="en-US" sz="2800" b="1" i="0" u="none" strike="noStrike" kern="0" cap="none" spc="-51" normalizeH="0" baseline="0" noProof="0" dirty="0" smtClean="0">
+                <a:ln>
+                  <a:noFill/>
+                </a:ln>
                 <a:gradFill>
                   <a:gsLst>
                     <a:gs pos="0">
@@ -38937,68 +40889,16 @@
                   </a:gsLst>
                   <a:lin ang="5400000" scaled="0"/>
                 </a:gradFill>
+                <a:uLnTx/>
+                <a:uFillTx/>
+                <a:latin typeface="Segoe UI Light" panose="020B0502040204020203" pitchFamily="34" charset="0"/>
+                <a:ea typeface="Segoe UI" pitchFamily="34" charset="0"/>
+                <a:cs typeface="Segoe UI" pitchFamily="34" charset="0"/>
               </a:rPr>
-              <a:t>Intrinsics</a:t>
+              <a:t>Single </a:t>
             </a:r>
-          </a:p>
-        </p:txBody>
-      </p:sp>
-      <p:sp>
-        <p:nvSpPr>
-          <p:cNvPr id="14" name="Rectangle 13"/>
-          <p:cNvSpPr/>
-          <p:nvPr/>
-        </p:nvSpPr>
-        <p:spPr bwMode="auto">
-          <a:xfrm>
-            <a:off x="6838093" y="5214668"/>
-            <a:ext cx="2850125" cy="487680"/>
-          </a:xfrm>
-          <a:prstGeom prst="rect">
-            <a:avLst/>
-          </a:prstGeom>
-          <a:solidFill>
-            <a:schemeClr val="accent4"/>
-          </a:solidFill>
-          <a:ln>
-            <a:noFill/>
-            <a:headEnd type="none" w="med" len="med"/>
-            <a:tailEnd type="none" w="med" len="med"/>
-          </a:ln>
-          <a:effectLst/>
-        </p:spPr>
-        <p:style>
-          <a:lnRef idx="1">
-            <a:schemeClr val="accent2"/>
-          </a:lnRef>
-          <a:fillRef idx="3">
-            <a:schemeClr val="accent2"/>
-          </a:fillRef>
-          <a:effectRef idx="2">
-            <a:schemeClr val="accent2"/>
-          </a:effectRef>
-          <a:fontRef idx="minor">
-            <a:schemeClr val="lt1"/>
-          </a:fontRef>
-        </p:style>
-        <p:txBody>
-          <a:bodyPr vert="horz" wrap="square" lIns="91436" tIns="45718" rIns="91436" bIns="45718" numCol="1" rtlCol="0" anchor="ctr" anchorCtr="0" compatLnSpc="1">
-            <a:prstTxWarp prst="textNoShape">
-              <a:avLst/>
-            </a:prstTxWarp>
-          </a:bodyPr>
-          <a:lstStyle/>
-          <a:p>
-            <a:pPr algn="ctr" defTabSz="914099" fontAlgn="base">
-              <a:spcBef>
-                <a:spcPct val="0"/>
-              </a:spcBef>
-              <a:spcAft>
-                <a:spcPct val="0"/>
-              </a:spcAft>
-            </a:pPr>
             <a:r>
-              <a:rPr lang="en-US" sz="2000" dirty="0">
+              <a:rPr lang="en-US" sz="2800" b="1" kern="0" spc="-51" dirty="0" smtClean="0">
                 <a:gradFill>
                   <a:gsLst>
                     <a:gs pos="0">
@@ -39010,68 +40910,17 @@
                   </a:gsLst>
                   <a:lin ang="5400000" scaled="0"/>
                 </a:gradFill>
+                <a:latin typeface="Segoe UI Light" panose="020B0502040204020203" pitchFamily="34" charset="0"/>
+                <a:ea typeface="Segoe UI" pitchFamily="34" charset="0"/>
+                <a:cs typeface="Segoe UI" pitchFamily="34" charset="0"/>
               </a:rPr>
-              <a:t>Membership</a:t>
+              <a:t>Page </a:t>
             </a:r>
-          </a:p>
-        </p:txBody>
-      </p:sp>
-      <p:sp>
-        <p:nvSpPr>
-          <p:cNvPr id="16" name="Rectangle 15"/>
-          <p:cNvSpPr/>
-          <p:nvPr/>
-        </p:nvSpPr>
-        <p:spPr bwMode="auto">
-          <a:xfrm>
-            <a:off x="6838093" y="5763308"/>
-            <a:ext cx="2850125" cy="487680"/>
-          </a:xfrm>
-          <a:prstGeom prst="rect">
-            <a:avLst/>
-          </a:prstGeom>
-          <a:solidFill>
-            <a:schemeClr val="accent4"/>
-          </a:solidFill>
-          <a:ln>
-            <a:noFill/>
-            <a:headEnd type="none" w="med" len="med"/>
-            <a:tailEnd type="none" w="med" len="med"/>
-          </a:ln>
-          <a:effectLst/>
-        </p:spPr>
-        <p:style>
-          <a:lnRef idx="1">
-            <a:schemeClr val="accent2"/>
-          </a:lnRef>
-          <a:fillRef idx="3">
-            <a:schemeClr val="accent2"/>
-          </a:fillRef>
-          <a:effectRef idx="2">
-            <a:schemeClr val="accent2"/>
-          </a:effectRef>
-          <a:fontRef idx="minor">
-            <a:schemeClr val="lt1"/>
-          </a:fontRef>
-        </p:style>
-        <p:txBody>
-          <a:bodyPr vert="horz" wrap="square" lIns="91436" tIns="45718" rIns="91436" bIns="45718" numCol="1" rtlCol="0" anchor="ctr" anchorCtr="0" compatLnSpc="1">
-            <a:prstTxWarp prst="textNoShape">
-              <a:avLst/>
-            </a:prstTxWarp>
-          </a:bodyPr>
-          <a:lstStyle/>
-          <a:p>
-            <a:pPr algn="ctr" defTabSz="914099" fontAlgn="base">
-              <a:spcBef>
-                <a:spcPct val="0"/>
-              </a:spcBef>
-              <a:spcAft>
-                <a:spcPct val="0"/>
-              </a:spcAft>
-            </a:pPr>
             <a:r>
-              <a:rPr lang="en-US" sz="2000" dirty="0">
+              <a:rPr kumimoji="0" lang="en-US" sz="2800" b="1" i="0" u="none" strike="noStrike" kern="0" cap="none" spc="-51" normalizeH="0" baseline="0" noProof="0" dirty="0" smtClean="0">
+                <a:ln>
+                  <a:noFill/>
+                </a:ln>
                 <a:gradFill>
                   <a:gsLst>
                     <a:gs pos="0">
@@ -39083,205 +40932,94 @@
                   </a:gsLst>
                   <a:lin ang="5400000" scaled="0"/>
                 </a:gradFill>
+                <a:uLnTx/>
+                <a:uFillTx/>
+                <a:latin typeface="Segoe UI Light" panose="020B0502040204020203" pitchFamily="34" charset="0"/>
+                <a:ea typeface="Segoe UI" pitchFamily="34" charset="0"/>
+                <a:cs typeface="Segoe UI" pitchFamily="34" charset="0"/>
               </a:rPr>
-              <a:t>Etc.</a:t>
+              <a:t>Apps</a:t>
             </a:r>
-          </a:p>
-        </p:txBody>
-      </p:sp>
-      <p:sp>
-        <p:nvSpPr>
-          <p:cNvPr id="17" name="TextBox 28"/>
-          <p:cNvSpPr txBox="1"/>
-          <p:nvPr/>
-        </p:nvSpPr>
-        <p:spPr>
-          <a:xfrm>
-            <a:off x="574570" y="4528923"/>
-            <a:ext cx="8130153" cy="553998"/>
-          </a:xfrm>
-          <a:prstGeom prst="rect">
-            <a:avLst/>
-          </a:prstGeom>
-          <a:noFill/>
-        </p:spPr>
-        <p:txBody>
-          <a:bodyPr wrap="square" rtlCol="0">
-            <a:spAutoFit/>
-          </a:bodyPr>
-          <a:lstStyle>
-            <a:defPPr>
-              <a:defRPr lang="en-US"/>
-            </a:defPPr>
-            <a:lvl1pPr marL="0" algn="l" defTabSz="914363" rtl="0" eaLnBrk="1" latinLnBrk="0" hangingPunct="1">
-              <a:defRPr sz="1800" kern="1200">
-                <a:solidFill>
-                  <a:schemeClr val="tx1"/>
-                </a:solidFill>
-                <a:latin typeface="+mn-lt"/>
-                <a:ea typeface="+mn-ea"/>
-                <a:cs typeface="+mn-cs"/>
-              </a:defRPr>
-            </a:lvl1pPr>
-            <a:lvl2pPr marL="457182" algn="l" defTabSz="914363" rtl="0" eaLnBrk="1" latinLnBrk="0" hangingPunct="1">
-              <a:defRPr sz="1800" kern="1200">
-                <a:solidFill>
-                  <a:schemeClr val="tx1"/>
-                </a:solidFill>
-                <a:latin typeface="+mn-lt"/>
-                <a:ea typeface="+mn-ea"/>
-                <a:cs typeface="+mn-cs"/>
-              </a:defRPr>
-            </a:lvl2pPr>
-            <a:lvl3pPr marL="914363" algn="l" defTabSz="914363" rtl="0" eaLnBrk="1" latinLnBrk="0" hangingPunct="1">
-              <a:defRPr sz="1800" kern="1200">
-                <a:solidFill>
-                  <a:schemeClr val="tx1"/>
-                </a:solidFill>
-                <a:latin typeface="+mn-lt"/>
-                <a:ea typeface="+mn-ea"/>
-                <a:cs typeface="+mn-cs"/>
-              </a:defRPr>
-            </a:lvl3pPr>
-            <a:lvl4pPr marL="1371545" algn="l" defTabSz="914363" rtl="0" eaLnBrk="1" latinLnBrk="0" hangingPunct="1">
-              <a:defRPr sz="1800" kern="1200">
-                <a:solidFill>
-                  <a:schemeClr val="tx1"/>
-                </a:solidFill>
-                <a:latin typeface="+mn-lt"/>
-                <a:ea typeface="+mn-ea"/>
-                <a:cs typeface="+mn-cs"/>
-              </a:defRPr>
-            </a:lvl4pPr>
-            <a:lvl5pPr marL="1828727" algn="l" defTabSz="914363" rtl="0" eaLnBrk="1" latinLnBrk="0" hangingPunct="1">
-              <a:defRPr sz="1800" kern="1200">
-                <a:solidFill>
-                  <a:schemeClr val="tx1"/>
-                </a:solidFill>
-                <a:latin typeface="+mn-lt"/>
-                <a:ea typeface="+mn-ea"/>
-                <a:cs typeface="+mn-cs"/>
-              </a:defRPr>
-            </a:lvl5pPr>
-            <a:lvl6pPr marL="2285909" algn="l" defTabSz="914363" rtl="0" eaLnBrk="1" latinLnBrk="0" hangingPunct="1">
-              <a:defRPr sz="1800" kern="1200">
-                <a:solidFill>
-                  <a:schemeClr val="tx1"/>
-                </a:solidFill>
-                <a:latin typeface="+mn-lt"/>
-                <a:ea typeface="+mn-ea"/>
-                <a:cs typeface="+mn-cs"/>
-              </a:defRPr>
-            </a:lvl6pPr>
-            <a:lvl7pPr marL="2743090" algn="l" defTabSz="914363" rtl="0" eaLnBrk="1" latinLnBrk="0" hangingPunct="1">
-              <a:defRPr sz="1800" kern="1200">
-                <a:solidFill>
-                  <a:schemeClr val="tx1"/>
-                </a:solidFill>
-                <a:latin typeface="+mn-lt"/>
-                <a:ea typeface="+mn-ea"/>
-                <a:cs typeface="+mn-cs"/>
-              </a:defRPr>
-            </a:lvl7pPr>
-            <a:lvl8pPr marL="3200272" algn="l" defTabSz="914363" rtl="0" eaLnBrk="1" latinLnBrk="0" hangingPunct="1">
-              <a:defRPr sz="1800" kern="1200">
-                <a:solidFill>
-                  <a:schemeClr val="tx1"/>
-                </a:solidFill>
-                <a:latin typeface="+mn-lt"/>
-                <a:ea typeface="+mn-ea"/>
-                <a:cs typeface="+mn-cs"/>
-              </a:defRPr>
-            </a:lvl8pPr>
-            <a:lvl9pPr marL="3657454" algn="l" defTabSz="914363" rtl="0" eaLnBrk="1" latinLnBrk="0" hangingPunct="1">
-              <a:defRPr sz="1800" kern="1200">
-                <a:solidFill>
-                  <a:schemeClr val="tx1"/>
-                </a:solidFill>
-                <a:latin typeface="+mn-lt"/>
-                <a:ea typeface="+mn-ea"/>
-                <a:cs typeface="+mn-cs"/>
-              </a:defRPr>
-            </a:lvl9pPr>
-          </a:lstStyle>
-          <a:p>
-            <a:pPr algn="ctr"/>
-            <a:r>
-              <a:rPr lang="en-US" sz="3000" dirty="0" smtClean="0">
-                <a:solidFill>
-                  <a:schemeClr val="bg1">
-                    <a:alpha val="99000"/>
-                  </a:schemeClr>
-                </a:solidFill>
-              </a:rPr>
-              <a:t>ASP.NET Core</a:t>
-            </a:r>
-            <a:endParaRPr lang="en-US" sz="3000" dirty="0">
-              <a:solidFill>
-                <a:schemeClr val="bg1">
-                  <a:alpha val="99000"/>
-                </a:schemeClr>
-              </a:solidFill>
+            <a:endParaRPr kumimoji="0" lang="en-US" sz="2800" b="0" i="0" u="none" strike="noStrike" kern="0" cap="none" spc="-51" normalizeH="0" baseline="0" noProof="0" dirty="0" smtClean="0">
+              <a:ln>
+                <a:noFill/>
+              </a:ln>
+              <a:gradFill>
+                <a:gsLst>
+                  <a:gs pos="0">
+                    <a:srgbClr val="FFFFFF"/>
+                  </a:gs>
+                  <a:gs pos="100000">
+                    <a:srgbClr val="FFFFFF"/>
+                  </a:gs>
+                </a:gsLst>
+                <a:lin ang="5400000" scaled="0"/>
+              </a:gradFill>
+              <a:uLnTx/>
+              <a:uFillTx/>
+              <a:latin typeface="Segoe UI Light" panose="020B0502040204020203" pitchFamily="34" charset="0"/>
+              <a:ea typeface="Segoe UI" pitchFamily="34" charset="0"/>
+              <a:cs typeface="Segoe UI" pitchFamily="34" charset="0"/>
             </a:endParaRPr>
           </a:p>
         </p:txBody>
       </p:sp>
       <p:sp>
         <p:nvSpPr>
-          <p:cNvPr id="23" name="Rectangle 22"/>
+          <p:cNvPr id="40" name="Rectangle 39"/>
           <p:cNvSpPr/>
           <p:nvPr/>
         </p:nvSpPr>
-        <p:spPr>
+        <p:spPr bwMode="gray">
           <a:xfrm>
-            <a:off x="8263156" y="3456263"/>
-            <a:ext cx="3058968" cy="979067"/>
+            <a:off x="4859279" y="3682139"/>
+            <a:ext cx="2648172" cy="729417"/>
           </a:xfrm>
           <a:prstGeom prst="rect">
             <a:avLst/>
           </a:prstGeom>
           <a:solidFill>
-            <a:schemeClr val="accent2"/>
+            <a:srgbClr val="009E49"/>
           </a:solidFill>
-          <a:ln>
+          <a:ln w="9525" cap="flat" cmpd="sng" algn="ctr">
             <a:noFill/>
+            <a:prstDash val="solid"/>
             <a:headEnd type="none" w="med" len="med"/>
             <a:tailEnd type="none" w="med" len="med"/>
           </a:ln>
           <a:effectLst/>
         </p:spPr>
-        <p:style>
-          <a:lnRef idx="1">
-            <a:schemeClr val="accent2"/>
-          </a:lnRef>
-          <a:fillRef idx="3">
-            <a:schemeClr val="accent2"/>
-          </a:fillRef>
-          <a:effectRef idx="2">
-            <a:schemeClr val="accent2"/>
-          </a:effectRef>
-          <a:fontRef idx="minor">
-            <a:schemeClr val="lt1"/>
-          </a:fontRef>
-        </p:style>
         <p:txBody>
-          <a:bodyPr vert="horz" wrap="square" lIns="91436" tIns="45718" rIns="91436" bIns="45718" numCol="1" rtlCol="0" anchor="t" anchorCtr="0" compatLnSpc="1">
+          <a:bodyPr rot="0" spcFirstLastPara="0" vertOverflow="overflow" horzOverflow="overflow" vert="horz" wrap="square" lIns="45719" tIns="45719" rIns="45719" bIns="45719" numCol="1" spcCol="0" rtlCol="0" fromWordArt="0" anchor="ctr" anchorCtr="0" forceAA="0" compatLnSpc="1">
             <a:prstTxWarp prst="textNoShape">
               <a:avLst/>
             </a:prstTxWarp>
+            <a:noAutofit/>
           </a:bodyPr>
           <a:lstStyle/>
           <a:p>
-            <a:pPr algn="ctr" defTabSz="914099" fontAlgn="base">
+            <a:pPr marL="0" marR="0" lvl="0" indent="0" algn="ctr" defTabSz="914061" eaLnBrk="1" fontAlgn="base" latinLnBrk="0" hangingPunct="1">
+              <a:lnSpc>
+                <a:spcPct val="100000"/>
+              </a:lnSpc>
               <a:spcBef>
                 <a:spcPct val="0"/>
               </a:spcBef>
               <a:spcAft>
                 <a:spcPct val="0"/>
               </a:spcAft>
+              <a:buClrTx/>
+              <a:buSzTx/>
+              <a:buFontTx/>
+              <a:buNone/>
+              <a:tabLst/>
+              <a:defRPr/>
             </a:pPr>
             <a:r>
-              <a:rPr lang="en-US" dirty="0" smtClean="0">
+              <a:rPr kumimoji="0" lang="en-US" sz="2800" b="1" i="0" u="none" strike="noStrike" kern="0" cap="none" spc="-51" normalizeH="0" baseline="0" noProof="0" dirty="0" smtClean="0">
+                <a:ln>
+                  <a:noFill/>
+                </a:ln>
                 <a:gradFill>
                   <a:gsLst>
                     <a:gs pos="0">
@@ -39293,10 +41031,18 @@
                   </a:gsLst>
                   <a:lin ang="5400000" scaled="0"/>
                 </a:gradFill>
+                <a:uLnTx/>
+                <a:uFillTx/>
+                <a:latin typeface="Segoe UI Light" panose="020B0502040204020203" pitchFamily="34" charset="0"/>
+                <a:ea typeface="Segoe UI" pitchFamily="34" charset="0"/>
+                <a:cs typeface="Segoe UI" pitchFamily="34" charset="0"/>
               </a:rPr>
               <a:t>MVC</a:t>
             </a:r>
-            <a:endParaRPr lang="en-US" dirty="0">
+            <a:endParaRPr kumimoji="0" lang="en-US" sz="2800" b="0" i="0" u="none" strike="noStrike" kern="0" cap="none" spc="-51" normalizeH="0" baseline="0" noProof="0" dirty="0" smtClean="0">
+              <a:ln>
+                <a:noFill/>
+              </a:ln>
               <a:gradFill>
                 <a:gsLst>
                   <a:gs pos="0">
@@ -39308,66 +41054,71 @@
                 </a:gsLst>
                 <a:lin ang="5400000" scaled="0"/>
               </a:gradFill>
+              <a:uLnTx/>
+              <a:uFillTx/>
+              <a:latin typeface="Segoe UI Light" panose="020B0502040204020203" pitchFamily="34" charset="0"/>
+              <a:ea typeface="Segoe UI" pitchFamily="34" charset="0"/>
+              <a:cs typeface="Segoe UI" pitchFamily="34" charset="0"/>
             </a:endParaRPr>
           </a:p>
         </p:txBody>
       </p:sp>
       <p:sp>
         <p:nvSpPr>
-          <p:cNvPr id="24" name="Rectangle 23"/>
+          <p:cNvPr id="41" name="Rectangle 40"/>
           <p:cNvSpPr/>
           <p:nvPr/>
         </p:nvSpPr>
-        <p:spPr>
+        <p:spPr bwMode="gray">
           <a:xfrm>
-            <a:off x="5075339" y="3449433"/>
-            <a:ext cx="3114838" cy="985898"/>
+            <a:off x="7613124" y="3682139"/>
+            <a:ext cx="1271249" cy="729417"/>
           </a:xfrm>
           <a:prstGeom prst="rect">
             <a:avLst/>
           </a:prstGeom>
           <a:solidFill>
-            <a:schemeClr val="accent2"/>
+            <a:srgbClr val="009E49"/>
           </a:solidFill>
-          <a:ln>
+          <a:ln w="9525" cap="flat" cmpd="sng" algn="ctr">
             <a:noFill/>
+            <a:prstDash val="solid"/>
             <a:headEnd type="none" w="med" len="med"/>
             <a:tailEnd type="none" w="med" len="med"/>
           </a:ln>
           <a:effectLst/>
         </p:spPr>
-        <p:style>
-          <a:lnRef idx="1">
-            <a:schemeClr val="accent2"/>
-          </a:lnRef>
-          <a:fillRef idx="3">
-            <a:schemeClr val="accent2"/>
-          </a:fillRef>
-          <a:effectRef idx="2">
-            <a:schemeClr val="accent2"/>
-          </a:effectRef>
-          <a:fontRef idx="minor">
-            <a:schemeClr val="lt1"/>
-          </a:fontRef>
-        </p:style>
         <p:txBody>
-          <a:bodyPr vert="horz" wrap="square" lIns="91436" tIns="45718" rIns="91436" bIns="45718" numCol="1" rtlCol="0" anchor="ctr" anchorCtr="0" compatLnSpc="1">
+          <a:bodyPr rot="0" spcFirstLastPara="0" vertOverflow="overflow" horzOverflow="overflow" vert="horz" wrap="square" lIns="45719" tIns="45719" rIns="45719" bIns="45719" numCol="1" spcCol="0" rtlCol="0" fromWordArt="0" anchor="ctr" anchorCtr="0" forceAA="0" compatLnSpc="1">
             <a:prstTxWarp prst="textNoShape">
               <a:avLst/>
             </a:prstTxWarp>
+            <a:noAutofit/>
           </a:bodyPr>
           <a:lstStyle/>
           <a:p>
-            <a:pPr algn="ctr" defTabSz="914099" fontAlgn="base">
+            <a:pPr marL="0" marR="0" lvl="0" indent="0" algn="ctr" defTabSz="914061" eaLnBrk="1" fontAlgn="base" latinLnBrk="0" hangingPunct="1">
+              <a:lnSpc>
+                <a:spcPct val="100000"/>
+              </a:lnSpc>
               <a:spcBef>
                 <a:spcPct val="0"/>
               </a:spcBef>
               <a:spcAft>
                 <a:spcPct val="0"/>
               </a:spcAft>
+              <a:buClrTx/>
+              <a:buSzTx/>
+              <a:buFontTx/>
+              <a:buNone/>
+              <a:tabLst/>
+              <a:defRPr/>
             </a:pPr>
             <a:r>
-              <a:rPr lang="en-US" dirty="0" smtClean="0">
+              <a:rPr kumimoji="0" lang="en-US" sz="2400" b="1" i="0" u="none" strike="noStrike" kern="0" cap="none" spc="-51" normalizeH="0" baseline="0" noProof="0" dirty="0" smtClean="0">
+                <a:ln>
+                  <a:noFill/>
+                </a:ln>
                 <a:gradFill>
                   <a:gsLst>
                     <a:gs pos="0">
@@ -39379,10 +41130,37 @@
                   </a:gsLst>
                   <a:lin ang="5400000" scaled="0"/>
                 </a:gradFill>
+                <a:uLnTx/>
+                <a:uFillTx/>
+                <a:latin typeface="Segoe UI Light" panose="020B0502040204020203" pitchFamily="34" charset="0"/>
+                <a:ea typeface="Segoe UI" pitchFamily="34" charset="0"/>
+                <a:cs typeface="Segoe UI" pitchFamily="34" charset="0"/>
               </a:rPr>
-              <a:t>Web Pages</a:t>
+              <a:t>Web </a:t>
             </a:r>
-            <a:endParaRPr lang="en-US" dirty="0">
+            <a:r>
+              <a:rPr lang="en-US" sz="2400" b="1" kern="0" spc="-51" dirty="0" smtClean="0">
+                <a:gradFill>
+                  <a:gsLst>
+                    <a:gs pos="0">
+                      <a:srgbClr val="FFFFFF"/>
+                    </a:gs>
+                    <a:gs pos="100000">
+                      <a:srgbClr val="FFFFFF"/>
+                    </a:gs>
+                  </a:gsLst>
+                  <a:lin ang="5400000" scaled="0"/>
+                </a:gradFill>
+                <a:latin typeface="Segoe UI Light" panose="020B0502040204020203" pitchFamily="34" charset="0"/>
+                <a:ea typeface="Segoe UI" pitchFamily="34" charset="0"/>
+                <a:cs typeface="Segoe UI" pitchFamily="34" charset="0"/>
+              </a:rPr>
+              <a:t>API</a:t>
+            </a:r>
+            <a:endParaRPr kumimoji="0" lang="en-US" sz="2400" b="0" i="0" u="none" strike="noStrike" kern="0" cap="none" spc="-51" normalizeH="0" baseline="0" noProof="0" dirty="0" smtClean="0">
+              <a:ln>
+                <a:noFill/>
+              </a:ln>
               <a:gradFill>
                 <a:gsLst>
                   <a:gs pos="0">
@@ -39394,66 +41172,71 @@
                 </a:gsLst>
                 <a:lin ang="5400000" scaled="0"/>
               </a:gradFill>
+              <a:uLnTx/>
+              <a:uFillTx/>
+              <a:latin typeface="Segoe UI Light" panose="020B0502040204020203" pitchFamily="34" charset="0"/>
+              <a:ea typeface="Segoe UI" pitchFamily="34" charset="0"/>
+              <a:cs typeface="Segoe UI" pitchFamily="34" charset="0"/>
             </a:endParaRPr>
           </a:p>
         </p:txBody>
       </p:sp>
       <p:sp>
         <p:nvSpPr>
-          <p:cNvPr id="28" name="Rectangle 27"/>
+          <p:cNvPr id="42" name="Rectangle 41"/>
           <p:cNvSpPr/>
           <p:nvPr/>
         </p:nvSpPr>
-        <p:spPr>
+        <p:spPr bwMode="gray">
           <a:xfrm>
-            <a:off x="879902" y="2659310"/>
-            <a:ext cx="4124455" cy="1768401"/>
+            <a:off x="8990049" y="2965619"/>
+            <a:ext cx="1271249" cy="1445937"/>
           </a:xfrm>
           <a:prstGeom prst="rect">
             <a:avLst/>
           </a:prstGeom>
           <a:solidFill>
-            <a:schemeClr val="accent2"/>
+            <a:srgbClr val="009E49"/>
           </a:solidFill>
-          <a:ln>
+          <a:ln w="9525" cap="flat" cmpd="sng" algn="ctr">
             <a:noFill/>
+            <a:prstDash val="solid"/>
             <a:headEnd type="none" w="med" len="med"/>
             <a:tailEnd type="none" w="med" len="med"/>
           </a:ln>
           <a:effectLst/>
         </p:spPr>
-        <p:style>
-          <a:lnRef idx="1">
-            <a:schemeClr val="accent2"/>
-          </a:lnRef>
-          <a:fillRef idx="3">
-            <a:schemeClr val="accent2"/>
-          </a:fillRef>
-          <a:effectRef idx="2">
-            <a:schemeClr val="accent2"/>
-          </a:effectRef>
-          <a:fontRef idx="minor">
-            <a:schemeClr val="lt1"/>
-          </a:fontRef>
-        </p:style>
         <p:txBody>
-          <a:bodyPr vert="horz" wrap="square" lIns="91436" tIns="45718" rIns="91436" bIns="45718" numCol="1" rtlCol="0" anchor="ctr" anchorCtr="0" compatLnSpc="1">
+          <a:bodyPr rot="0" spcFirstLastPara="0" vertOverflow="overflow" horzOverflow="overflow" vert="horz" wrap="square" lIns="45719" tIns="45719" rIns="45719" bIns="45719" numCol="1" spcCol="0" rtlCol="0" fromWordArt="0" anchor="ctr" anchorCtr="0" forceAA="0" compatLnSpc="1">
             <a:prstTxWarp prst="textNoShape">
               <a:avLst/>
             </a:prstTxWarp>
+            <a:noAutofit/>
           </a:bodyPr>
           <a:lstStyle/>
           <a:p>
-            <a:pPr algn="ctr" defTabSz="914099" fontAlgn="base">
+            <a:pPr marL="0" marR="0" lvl="0" indent="0" algn="ctr" defTabSz="914061" eaLnBrk="1" fontAlgn="base" latinLnBrk="0" hangingPunct="1">
+              <a:lnSpc>
+                <a:spcPct val="100000"/>
+              </a:lnSpc>
               <a:spcBef>
                 <a:spcPct val="0"/>
               </a:spcBef>
               <a:spcAft>
                 <a:spcPct val="0"/>
               </a:spcAft>
+              <a:buClrTx/>
+              <a:buSzTx/>
+              <a:buFontTx/>
+              <a:buNone/>
+              <a:tabLst/>
+              <a:defRPr/>
             </a:pPr>
             <a:r>
-              <a:rPr lang="en-US" dirty="0" smtClean="0">
+              <a:rPr kumimoji="0" lang="en-US" sz="2800" b="1" i="0" u="none" strike="noStrike" kern="0" cap="none" spc="-51" normalizeH="0" baseline="0" noProof="0" dirty="0" smtClean="0">
+                <a:ln>
+                  <a:noFill/>
+                </a:ln>
                 <a:gradFill>
                   <a:gsLst>
                     <a:gs pos="0">
@@ -39465,10 +41248,18 @@
                   </a:gsLst>
                   <a:lin ang="5400000" scaled="0"/>
                 </a:gradFill>
+                <a:uLnTx/>
+                <a:uFillTx/>
+                <a:latin typeface="Segoe UI Light" panose="020B0502040204020203" pitchFamily="34" charset="0"/>
+                <a:ea typeface="Segoe UI" pitchFamily="34" charset="0"/>
+                <a:cs typeface="Segoe UI" pitchFamily="34" charset="0"/>
               </a:rPr>
-              <a:t>Web Forms</a:t>
+              <a:t>SignalR</a:t>
             </a:r>
-            <a:endParaRPr lang="en-US" dirty="0">
+            <a:endParaRPr kumimoji="0" lang="en-US" sz="2800" b="0" i="0" u="none" strike="noStrike" kern="0" cap="none" spc="-51" normalizeH="0" baseline="0" noProof="0" dirty="0" smtClean="0">
+              <a:ln>
+                <a:noFill/>
+              </a:ln>
               <a:gradFill>
                 <a:gsLst>
                   <a:gs pos="0">
@@ -39480,66 +41271,71 @@
                 </a:gsLst>
                 <a:lin ang="5400000" scaled="0"/>
               </a:gradFill>
+              <a:uLnTx/>
+              <a:uFillTx/>
+              <a:latin typeface="Segoe UI Light" panose="020B0502040204020203" pitchFamily="34" charset="0"/>
+              <a:ea typeface="Segoe UI" pitchFamily="34" charset="0"/>
+              <a:cs typeface="Segoe UI" pitchFamily="34" charset="0"/>
             </a:endParaRPr>
           </a:p>
         </p:txBody>
       </p:sp>
       <p:sp>
         <p:nvSpPr>
-          <p:cNvPr id="29" name="Rectangle 28"/>
+          <p:cNvPr id="43" name="Rectangle 42"/>
           <p:cNvSpPr/>
           <p:nvPr/>
         </p:nvSpPr>
-        <p:spPr>
+        <p:spPr bwMode="gray">
           <a:xfrm>
-            <a:off x="5075339" y="2659310"/>
-            <a:ext cx="4740311" cy="709674"/>
+            <a:off x="7613124" y="1329717"/>
+            <a:ext cx="2648174" cy="1528363"/>
           </a:xfrm>
           <a:prstGeom prst="rect">
             <a:avLst/>
           </a:prstGeom>
           <a:solidFill>
-            <a:schemeClr val="accent2"/>
+            <a:srgbClr val="0070C0"/>
           </a:solidFill>
-          <a:ln>
+          <a:ln w="9525" cap="flat" cmpd="sng" algn="ctr">
             <a:noFill/>
+            <a:prstDash val="solid"/>
             <a:headEnd type="none" w="med" len="med"/>
             <a:tailEnd type="none" w="med" len="med"/>
           </a:ln>
           <a:effectLst/>
         </p:spPr>
-        <p:style>
-          <a:lnRef idx="1">
-            <a:schemeClr val="accent2"/>
-          </a:lnRef>
-          <a:fillRef idx="3">
-            <a:schemeClr val="accent2"/>
-          </a:fillRef>
-          <a:effectRef idx="2">
-            <a:schemeClr val="accent2"/>
-          </a:effectRef>
-          <a:fontRef idx="minor">
-            <a:schemeClr val="lt1"/>
-          </a:fontRef>
-        </p:style>
         <p:txBody>
-          <a:bodyPr vert="horz" wrap="square" lIns="91436" tIns="45718" rIns="91436" bIns="45718" numCol="1" rtlCol="0" anchor="ctr" anchorCtr="0" compatLnSpc="1">
+          <a:bodyPr rot="0" spcFirstLastPara="0" vertOverflow="overflow" horzOverflow="overflow" vert="horz" wrap="square" lIns="45719" tIns="45719" rIns="45719" bIns="45719" numCol="1" spcCol="0" rtlCol="0" fromWordArt="0" anchor="ctr" anchorCtr="0" forceAA="0" compatLnSpc="1">
             <a:prstTxWarp prst="textNoShape">
               <a:avLst/>
             </a:prstTxWarp>
+            <a:noAutofit/>
           </a:bodyPr>
           <a:lstStyle/>
           <a:p>
-            <a:pPr algn="ctr" defTabSz="914099" fontAlgn="base">
+            <a:pPr marL="0" marR="0" lvl="0" indent="0" algn="ctr" defTabSz="914061" eaLnBrk="1" fontAlgn="base" latinLnBrk="0" hangingPunct="1">
+              <a:lnSpc>
+                <a:spcPct val="100000"/>
+              </a:lnSpc>
               <a:spcBef>
                 <a:spcPct val="0"/>
               </a:spcBef>
               <a:spcAft>
                 <a:spcPct val="0"/>
               </a:spcAft>
+              <a:buClrTx/>
+              <a:buSzTx/>
+              <a:buFontTx/>
+              <a:buNone/>
+              <a:tabLst/>
+              <a:defRPr/>
             </a:pPr>
             <a:r>
-              <a:rPr lang="en-US" dirty="0">
+              <a:rPr kumimoji="0" lang="en-US" sz="5400" b="1" i="0" u="none" strike="noStrike" kern="0" cap="none" spc="-51" normalizeH="0" baseline="0" noProof="0" dirty="0" smtClean="0">
+                <a:ln>
+                  <a:noFill/>
+                </a:ln>
                 <a:gradFill>
                   <a:gsLst>
                     <a:gs pos="0">
@@ -39551,83 +41347,18 @@
                   </a:gsLst>
                   <a:lin ang="5400000" scaled="0"/>
                 </a:gradFill>
+                <a:uLnTx/>
+                <a:uFillTx/>
+                <a:latin typeface="Segoe UI Light" panose="020B0502040204020203" pitchFamily="34" charset="0"/>
+                <a:ea typeface="Segoe UI" pitchFamily="34" charset="0"/>
+                <a:cs typeface="Segoe UI" pitchFamily="34" charset="0"/>
               </a:rPr>
-              <a:t>Razor View Engine</a:t>
+              <a:t>Services</a:t>
             </a:r>
-          </a:p>
-        </p:txBody>
-      </p:sp>
-      <p:sp>
-        <p:nvSpPr>
-          <p:cNvPr id="35" name="Rectangle 34"/>
-          <p:cNvSpPr/>
-          <p:nvPr/>
-        </p:nvSpPr>
-        <p:spPr>
-          <a:xfrm>
-            <a:off x="9899010" y="4536821"/>
-            <a:ext cx="1423114" cy="1996106"/>
-          </a:xfrm>
-          <a:prstGeom prst="rect">
-            <a:avLst/>
-          </a:prstGeom>
-          <a:solidFill>
-            <a:schemeClr val="accent2"/>
-          </a:solidFill>
-          <a:ln>
-            <a:noFill/>
-            <a:headEnd type="none" w="med" len="med"/>
-            <a:tailEnd type="none" w="med" len="med"/>
-          </a:ln>
-          <a:effectLst/>
-        </p:spPr>
-        <p:style>
-          <a:lnRef idx="1">
-            <a:schemeClr val="accent2"/>
-          </a:lnRef>
-          <a:fillRef idx="3">
-            <a:schemeClr val="accent2"/>
-          </a:fillRef>
-          <a:effectRef idx="2">
-            <a:schemeClr val="accent2"/>
-          </a:effectRef>
-          <a:fontRef idx="minor">
-            <a:schemeClr val="lt1"/>
-          </a:fontRef>
-        </p:style>
-        <p:txBody>
-          <a:bodyPr vert="horz" wrap="square" lIns="91436" tIns="45718" rIns="91436" bIns="45718" numCol="1" rtlCol="0" anchor="ctr" anchorCtr="0" compatLnSpc="1">
-            <a:prstTxWarp prst="textNoShape">
-              <a:avLst/>
-            </a:prstTxWarp>
-          </a:bodyPr>
-          <a:lstStyle/>
-          <a:p>
-            <a:pPr algn="ctr" defTabSz="914099" fontAlgn="base">
-              <a:spcBef>
-                <a:spcPct val="0"/>
-              </a:spcBef>
-              <a:spcAft>
-                <a:spcPct val="0"/>
-              </a:spcAft>
-            </a:pPr>
-            <a:r>
-              <a:rPr lang="en-US" dirty="0" smtClean="0">
-                <a:gradFill>
-                  <a:gsLst>
-                    <a:gs pos="0">
-                      <a:srgbClr val="FFFFFF"/>
-                    </a:gs>
-                    <a:gs pos="100000">
-                      <a:srgbClr val="FFFFFF"/>
-                    </a:gs>
-                  </a:gsLst>
-                  <a:lin ang="5400000" scaled="0"/>
-                </a:gradFill>
-              </a:rPr>
-              <a:t>Self Host</a:t>
-            </a:r>
-            <a:endParaRPr lang="en-US" dirty="0">
+            <a:endParaRPr kumimoji="0" lang="en-US" sz="5400" b="0" i="0" u="none" strike="noStrike" kern="0" cap="none" spc="-51" normalizeH="0" baseline="0" noProof="0" dirty="0" smtClean="0">
+              <a:ln>
+                <a:noFill/>
+              </a:ln>
               <a:gradFill>
                 <a:gsLst>
                   <a:gs pos="0">
@@ -39639,522 +41370,11 @@
                 </a:gsLst>
                 <a:lin ang="5400000" scaled="0"/>
               </a:gradFill>
-            </a:endParaRPr>
-          </a:p>
-        </p:txBody>
-      </p:sp>
-      <p:sp>
-        <p:nvSpPr>
-          <p:cNvPr id="37" name="Rectangle 36"/>
-          <p:cNvSpPr/>
-          <p:nvPr/>
-        </p:nvSpPr>
-        <p:spPr bwMode="auto">
-          <a:xfrm>
-            <a:off x="9899010" y="3881611"/>
-            <a:ext cx="1357301" cy="455497"/>
-          </a:xfrm>
-          <a:prstGeom prst="rect">
-            <a:avLst/>
-          </a:prstGeom>
-          <a:solidFill>
-            <a:schemeClr val="accent4"/>
-          </a:solidFill>
-          <a:ln>
-            <a:noFill/>
-            <a:headEnd type="none" w="med" len="med"/>
-            <a:tailEnd type="none" w="med" len="med"/>
-          </a:ln>
-          <a:effectLst/>
-        </p:spPr>
-        <p:style>
-          <a:lnRef idx="1">
-            <a:schemeClr val="accent2"/>
-          </a:lnRef>
-          <a:fillRef idx="3">
-            <a:schemeClr val="accent2"/>
-          </a:fillRef>
-          <a:effectRef idx="2">
-            <a:schemeClr val="accent2"/>
-          </a:effectRef>
-          <a:fontRef idx="minor">
-            <a:schemeClr val="lt1"/>
-          </a:fontRef>
-        </p:style>
-        <p:txBody>
-          <a:bodyPr vert="horz" wrap="square" lIns="91436" tIns="45718" rIns="91436" bIns="45718" numCol="1" rtlCol="0" anchor="ctr" anchorCtr="0" compatLnSpc="1">
-            <a:prstTxWarp prst="textNoShape">
-              <a:avLst/>
-            </a:prstTxWarp>
-          </a:bodyPr>
-          <a:lstStyle/>
-          <a:p>
-            <a:pPr algn="ctr" defTabSz="914099" fontAlgn="base">
-              <a:spcBef>
-                <a:spcPct val="0"/>
-              </a:spcBef>
-              <a:spcAft>
-                <a:spcPct val="0"/>
-              </a:spcAft>
-            </a:pPr>
-            <a:r>
-              <a:rPr lang="en-US" sz="2000" dirty="0" smtClean="0">
-                <a:gradFill>
-                  <a:gsLst>
-                    <a:gs pos="0">
-                      <a:srgbClr val="FFFFFF"/>
-                    </a:gs>
-                    <a:gs pos="100000">
-                      <a:srgbClr val="FFFFFF"/>
-                    </a:gs>
-                  </a:gsLst>
-                  <a:lin ang="5400000" scaled="0"/>
-                </a:gradFill>
-              </a:rPr>
-              <a:t>Web API</a:t>
-            </a:r>
-            <a:endParaRPr lang="en-US" sz="2000" dirty="0">
-              <a:gradFill>
-                <a:gsLst>
-                  <a:gs pos="0">
-                    <a:srgbClr val="FFFFFF"/>
-                  </a:gs>
-                  <a:gs pos="100000">
-                    <a:srgbClr val="FFFFFF"/>
-                  </a:gs>
-                </a:gsLst>
-                <a:lin ang="5400000" scaled="0"/>
-              </a:gradFill>
-            </a:endParaRPr>
-          </a:p>
-        </p:txBody>
-      </p:sp>
-      <p:sp>
-        <p:nvSpPr>
-          <p:cNvPr id="38" name="Rectangle 37"/>
-          <p:cNvSpPr/>
-          <p:nvPr/>
-        </p:nvSpPr>
-        <p:spPr bwMode="auto">
-          <a:xfrm>
-            <a:off x="8414918" y="3881611"/>
-            <a:ext cx="1400732" cy="455497"/>
-          </a:xfrm>
-          <a:prstGeom prst="rect">
-            <a:avLst/>
-          </a:prstGeom>
-          <a:solidFill>
-            <a:schemeClr val="accent4"/>
-          </a:solidFill>
-          <a:ln>
-            <a:noFill/>
-            <a:headEnd type="none" w="med" len="med"/>
-            <a:tailEnd type="none" w="med" len="med"/>
-          </a:ln>
-          <a:effectLst/>
-        </p:spPr>
-        <p:style>
-          <a:lnRef idx="1">
-            <a:schemeClr val="accent2"/>
-          </a:lnRef>
-          <a:fillRef idx="3">
-            <a:schemeClr val="accent2"/>
-          </a:fillRef>
-          <a:effectRef idx="2">
-            <a:schemeClr val="accent2"/>
-          </a:effectRef>
-          <a:fontRef idx="minor">
-            <a:schemeClr val="lt1"/>
-          </a:fontRef>
-        </p:style>
-        <p:txBody>
-          <a:bodyPr vert="horz" wrap="square" lIns="91436" tIns="45718" rIns="91436" bIns="45718" numCol="1" rtlCol="0" anchor="ctr" anchorCtr="0" compatLnSpc="1">
-            <a:prstTxWarp prst="textNoShape">
-              <a:avLst/>
-            </a:prstTxWarp>
-          </a:bodyPr>
-          <a:lstStyle/>
-          <a:p>
-            <a:pPr algn="ctr" defTabSz="914099" fontAlgn="base">
-              <a:spcBef>
-                <a:spcPct val="0"/>
-              </a:spcBef>
-              <a:spcAft>
-                <a:spcPct val="0"/>
-              </a:spcAft>
-            </a:pPr>
-            <a:r>
-              <a:rPr lang="en-US" sz="2000" dirty="0" smtClean="0">
-                <a:gradFill>
-                  <a:gsLst>
-                    <a:gs pos="0">
-                      <a:srgbClr val="FFFFFF"/>
-                    </a:gs>
-                    <a:gs pos="100000">
-                      <a:srgbClr val="FFFFFF"/>
-                    </a:gs>
-                  </a:gsLst>
-                  <a:lin ang="5400000" scaled="0"/>
-                </a:gradFill>
-              </a:rPr>
-              <a:t>MVC 4</a:t>
-            </a:r>
-            <a:endParaRPr lang="en-US" sz="2000" dirty="0">
-              <a:gradFill>
-                <a:gsLst>
-                  <a:gs pos="0">
-                    <a:srgbClr val="FFFFFF"/>
-                  </a:gs>
-                  <a:gs pos="100000">
-                    <a:srgbClr val="FFFFFF"/>
-                  </a:gs>
-                </a:gsLst>
-                <a:lin ang="5400000" scaled="0"/>
-              </a:gradFill>
-            </a:endParaRPr>
-          </a:p>
-        </p:txBody>
-      </p:sp>
-      <p:sp>
-        <p:nvSpPr>
-          <p:cNvPr id="40" name="Rectangle 39"/>
-          <p:cNvSpPr/>
-          <p:nvPr/>
-        </p:nvSpPr>
-        <p:spPr>
-          <a:xfrm>
-            <a:off x="879902" y="1703024"/>
-            <a:ext cx="8912738" cy="879485"/>
-          </a:xfrm>
-          <a:prstGeom prst="rect">
-            <a:avLst/>
-          </a:prstGeom>
-          <a:solidFill>
-            <a:schemeClr val="accent2"/>
-          </a:solidFill>
-          <a:ln>
-            <a:noFill/>
-            <a:headEnd type="none" w="med" len="med"/>
-            <a:tailEnd type="none" w="med" len="med"/>
-          </a:ln>
-          <a:effectLst/>
-        </p:spPr>
-        <p:style>
-          <a:lnRef idx="1">
-            <a:schemeClr val="accent2"/>
-          </a:lnRef>
-          <a:fillRef idx="3">
-            <a:schemeClr val="accent2"/>
-          </a:fillRef>
-          <a:effectRef idx="2">
-            <a:schemeClr val="accent2"/>
-          </a:effectRef>
-          <a:fontRef idx="minor">
-            <a:schemeClr val="lt1"/>
-          </a:fontRef>
-        </p:style>
-        <p:txBody>
-          <a:bodyPr vert="horz" wrap="square" lIns="91436" tIns="45718" rIns="91436" bIns="45718" numCol="1" rtlCol="0" anchor="ctr" anchorCtr="0" compatLnSpc="1">
-            <a:prstTxWarp prst="textNoShape">
-              <a:avLst/>
-            </a:prstTxWarp>
-          </a:bodyPr>
-          <a:lstStyle/>
-          <a:p>
-            <a:pPr algn="ctr" defTabSz="914099" fontAlgn="base">
-              <a:spcBef>
-                <a:spcPct val="0"/>
-              </a:spcBef>
-              <a:spcAft>
-                <a:spcPct val="0"/>
-              </a:spcAft>
-            </a:pPr>
-            <a:r>
-              <a:rPr lang="en-US" dirty="0" smtClean="0">
-                <a:gradFill>
-                  <a:gsLst>
-                    <a:gs pos="0">
-                      <a:srgbClr val="FFFFFF"/>
-                    </a:gs>
-                    <a:gs pos="100000">
-                      <a:srgbClr val="FFFFFF"/>
-                    </a:gs>
-                  </a:gsLst>
-                  <a:lin ang="5400000" scaled="0"/>
-                </a:gradFill>
-              </a:rPr>
-              <a:t>HTML</a:t>
-            </a:r>
-            <a:endParaRPr lang="en-US" dirty="0">
-              <a:gradFill>
-                <a:gsLst>
-                  <a:gs pos="0">
-                    <a:srgbClr val="FFFFFF"/>
-                  </a:gs>
-                  <a:gs pos="100000">
-                    <a:srgbClr val="FFFFFF"/>
-                  </a:gs>
-                </a:gsLst>
-                <a:lin ang="5400000" scaled="0"/>
-              </a:gradFill>
-            </a:endParaRPr>
-          </a:p>
-        </p:txBody>
-      </p:sp>
-      <p:sp>
-        <p:nvSpPr>
-          <p:cNvPr id="41" name="Rectangle 40"/>
-          <p:cNvSpPr/>
-          <p:nvPr/>
-        </p:nvSpPr>
-        <p:spPr>
-          <a:xfrm>
-            <a:off x="9899009" y="2659310"/>
-            <a:ext cx="1423115" cy="721959"/>
-          </a:xfrm>
-          <a:prstGeom prst="rect">
-            <a:avLst/>
-          </a:prstGeom>
-          <a:solidFill>
-            <a:schemeClr val="accent2"/>
-          </a:solidFill>
-          <a:ln>
-            <a:noFill/>
-            <a:headEnd type="none" w="med" len="med"/>
-            <a:tailEnd type="none" w="med" len="med"/>
-          </a:ln>
-          <a:effectLst/>
-        </p:spPr>
-        <p:style>
-          <a:lnRef idx="1">
-            <a:schemeClr val="accent2"/>
-          </a:lnRef>
-          <a:fillRef idx="3">
-            <a:schemeClr val="accent2"/>
-          </a:fillRef>
-          <a:effectRef idx="2">
-            <a:schemeClr val="accent2"/>
-          </a:effectRef>
-          <a:fontRef idx="minor">
-            <a:schemeClr val="lt1"/>
-          </a:fontRef>
-        </p:style>
-        <p:txBody>
-          <a:bodyPr vert="horz" wrap="square" lIns="91436" tIns="45718" rIns="91436" bIns="45718" numCol="1" rtlCol="0" anchor="ctr" anchorCtr="0" compatLnSpc="1">
-            <a:prstTxWarp prst="textNoShape">
-              <a:avLst/>
-            </a:prstTxWarp>
-          </a:bodyPr>
-          <a:lstStyle/>
-          <a:p>
-            <a:pPr algn="ctr" defTabSz="914099" fontAlgn="base">
-              <a:spcBef>
-                <a:spcPct val="0"/>
-              </a:spcBef>
-              <a:spcAft>
-                <a:spcPct val="0"/>
-              </a:spcAft>
-            </a:pPr>
-            <a:r>
-              <a:rPr lang="en-US" dirty="0" smtClean="0">
-                <a:gradFill>
-                  <a:gsLst>
-                    <a:gs pos="0">
-                      <a:srgbClr val="FFFFFF"/>
-                    </a:gs>
-                    <a:gs pos="100000">
-                      <a:srgbClr val="FFFFFF"/>
-                    </a:gs>
-                  </a:gsLst>
-                  <a:lin ang="5400000" scaled="0"/>
-                </a:gradFill>
-              </a:rPr>
-              <a:t>Code</a:t>
-            </a:r>
-            <a:endParaRPr lang="en-US" dirty="0">
-              <a:gradFill>
-                <a:gsLst>
-                  <a:gs pos="0">
-                    <a:srgbClr val="FFFFFF"/>
-                  </a:gs>
-                  <a:gs pos="100000">
-                    <a:srgbClr val="FFFFFF"/>
-                  </a:gs>
-                </a:gsLst>
-                <a:lin ang="5400000" scaled="0"/>
-              </a:gradFill>
-            </a:endParaRPr>
-          </a:p>
-        </p:txBody>
-      </p:sp>
-      <p:sp>
-        <p:nvSpPr>
-          <p:cNvPr id="42" name="Rectangle 41"/>
-          <p:cNvSpPr/>
-          <p:nvPr/>
-        </p:nvSpPr>
-        <p:spPr>
-          <a:xfrm>
-            <a:off x="9889114" y="2170626"/>
-            <a:ext cx="1423115" cy="408788"/>
-          </a:xfrm>
-          <a:prstGeom prst="rect">
-            <a:avLst/>
-          </a:prstGeom>
-          <a:solidFill>
-            <a:schemeClr val="accent2"/>
-          </a:solidFill>
-          <a:ln>
-            <a:noFill/>
-            <a:headEnd type="none" w="med" len="med"/>
-            <a:tailEnd type="none" w="med" len="med"/>
-          </a:ln>
-          <a:effectLst/>
-        </p:spPr>
-        <p:style>
-          <a:lnRef idx="1">
-            <a:schemeClr val="accent2"/>
-          </a:lnRef>
-          <a:fillRef idx="3">
-            <a:schemeClr val="accent2"/>
-          </a:fillRef>
-          <a:effectRef idx="2">
-            <a:schemeClr val="accent2"/>
-          </a:effectRef>
-          <a:fontRef idx="minor">
-            <a:schemeClr val="lt1"/>
-          </a:fontRef>
-        </p:style>
-        <p:txBody>
-          <a:bodyPr vert="horz" wrap="square" lIns="91436" tIns="45718" rIns="91436" bIns="45718" numCol="1" rtlCol="0" anchor="ctr" anchorCtr="0" compatLnSpc="1">
-            <a:prstTxWarp prst="textNoShape">
-              <a:avLst/>
-            </a:prstTxWarp>
-          </a:bodyPr>
-          <a:lstStyle/>
-          <a:p>
-            <a:pPr algn="ctr" defTabSz="914099" fontAlgn="base">
-              <a:spcBef>
-                <a:spcPct val="0"/>
-              </a:spcBef>
-              <a:spcAft>
-                <a:spcPct val="0"/>
-              </a:spcAft>
-            </a:pPr>
-            <a:r>
-              <a:rPr lang="en-US" dirty="0" smtClean="0">
-                <a:gradFill>
-                  <a:gsLst>
-                    <a:gs pos="0">
-                      <a:srgbClr val="FFFFFF"/>
-                    </a:gs>
-                    <a:gs pos="100000">
-                      <a:srgbClr val="FFFFFF"/>
-                    </a:gs>
-                  </a:gsLst>
-                  <a:lin ang="5400000" scaled="0"/>
-                </a:gradFill>
-              </a:rPr>
-              <a:t>JSON</a:t>
-            </a:r>
-            <a:endParaRPr lang="en-US" dirty="0">
-              <a:gradFill>
-                <a:gsLst>
-                  <a:gs pos="0">
-                    <a:srgbClr val="FFFFFF"/>
-                  </a:gs>
-                  <a:gs pos="100000">
-                    <a:srgbClr val="FFFFFF"/>
-                  </a:gs>
-                </a:gsLst>
-                <a:lin ang="5400000" scaled="0"/>
-              </a:gradFill>
-            </a:endParaRPr>
-          </a:p>
-        </p:txBody>
-      </p:sp>
-      <p:sp>
-        <p:nvSpPr>
-          <p:cNvPr id="44" name="Rectangle 43"/>
-          <p:cNvSpPr/>
-          <p:nvPr/>
-        </p:nvSpPr>
-        <p:spPr>
-          <a:xfrm>
-            <a:off x="9899008" y="1703024"/>
-            <a:ext cx="1423115" cy="408788"/>
-          </a:xfrm>
-          <a:prstGeom prst="rect">
-            <a:avLst/>
-          </a:prstGeom>
-          <a:solidFill>
-            <a:schemeClr val="accent2"/>
-          </a:solidFill>
-          <a:ln>
-            <a:noFill/>
-            <a:headEnd type="none" w="med" len="med"/>
-            <a:tailEnd type="none" w="med" len="med"/>
-          </a:ln>
-          <a:effectLst/>
-        </p:spPr>
-        <p:style>
-          <a:lnRef idx="1">
-            <a:schemeClr val="accent2"/>
-          </a:lnRef>
-          <a:fillRef idx="3">
-            <a:schemeClr val="accent2"/>
-          </a:fillRef>
-          <a:effectRef idx="2">
-            <a:schemeClr val="accent2"/>
-          </a:effectRef>
-          <a:fontRef idx="minor">
-            <a:schemeClr val="lt1"/>
-          </a:fontRef>
-        </p:style>
-        <p:txBody>
-          <a:bodyPr vert="horz" wrap="square" lIns="91436" tIns="45718" rIns="91436" bIns="45718" numCol="1" rtlCol="0" anchor="ctr" anchorCtr="0" compatLnSpc="1">
-            <a:prstTxWarp prst="textNoShape">
-              <a:avLst/>
-            </a:prstTxWarp>
-          </a:bodyPr>
-          <a:lstStyle/>
-          <a:p>
-            <a:pPr algn="ctr" defTabSz="914099" fontAlgn="base">
-              <a:spcBef>
-                <a:spcPct val="0"/>
-              </a:spcBef>
-              <a:spcAft>
-                <a:spcPct val="0"/>
-              </a:spcAft>
-            </a:pPr>
-            <a:r>
-              <a:rPr lang="en-US" dirty="0" smtClean="0">
-                <a:gradFill>
-                  <a:gsLst>
-                    <a:gs pos="0">
-                      <a:srgbClr val="FFFFFF"/>
-                    </a:gs>
-                    <a:gs pos="100000">
-                      <a:srgbClr val="FFFFFF"/>
-                    </a:gs>
-                  </a:gsLst>
-                  <a:lin ang="5400000" scaled="0"/>
-                </a:gradFill>
-              </a:rPr>
-              <a:t>XML</a:t>
-            </a:r>
-            <a:endParaRPr lang="en-US" dirty="0">
-              <a:gradFill>
-                <a:gsLst>
-                  <a:gs pos="0">
-                    <a:srgbClr val="FFFFFF"/>
-                  </a:gs>
-                  <a:gs pos="100000">
-                    <a:srgbClr val="FFFFFF"/>
-                  </a:gs>
-                </a:gsLst>
-                <a:lin ang="5400000" scaled="0"/>
-              </a:gradFill>
+              <a:uLnTx/>
+              <a:uFillTx/>
+              <a:latin typeface="Segoe UI Light" panose="020B0502040204020203" pitchFamily="34" charset="0"/>
+              <a:ea typeface="Segoe UI" pitchFamily="34" charset="0"/>
+              <a:cs typeface="Segoe UI" pitchFamily="34" charset="0"/>
             </a:endParaRPr>
           </a:p>
         </p:txBody>
@@ -40162,7 +41382,7 @@
     </p:spTree>
     <p:extLst>
       <p:ext uri="{BB962C8B-B14F-4D97-AF65-F5344CB8AC3E}">
-        <p14:creationId xmlns:p14="http://schemas.microsoft.com/office/powerpoint/2010/main" val="1578264052"/>
+        <p14:creationId xmlns:p14="http://schemas.microsoft.com/office/powerpoint/2010/main" val="518231108"/>
       </p:ext>
     </p:extLst>
   </p:cSld>
@@ -40170,7 +41390,7 @@
     <a:masterClrMapping/>
   </p:clrMapOvr>
   <p:transition>
-    <p:fade/>
+    <p:wipe/>
   </p:transition>
   <p:timing>
     <p:tnLst>

</xml_diff>